<commit_message>
Ya agregue mi nombre a la presentacion
</commit_message>
<xml_diff>
--- a/Proyecto Final CS.pptx
+++ b/Proyecto Final CS.pptx
@@ -104,6 +104,11 @@
       </a:defRPr>
     </a:lvl9pPr>
   </p:defaultTextStyle>
+  <p:extLst>
+    <p:ext uri="{EFAFB233-063F-42B5-8137-9DF3F51BA10A}">
+      <p15:sldGuideLst xmlns:p15="http://schemas.microsoft.com/office/powerpoint/2012/main"/>
+    </p:ext>
+  </p:extLst>
 </p:presentation>
 </file>
 
@@ -1709,7 +1714,7 @@
                 </a:solidFill>
                 <a:latin typeface="Calibri"/>
               </a:rPr>
-              <a:t>3/18/21</a:t>
+              <a:t>3/18/2021</a:t>
             </a:fld>
             <a:endParaRPr lang="en-US" sz="1200" b="0" strike="noStrike" spc="-1">
               <a:latin typeface="Times New Roman"/>
@@ -2180,18 +2185,47 @@
               <a:rPr lang="en-US" sz="3200" b="0" strike="noStrike" spc="-1" dirty="0">
                 <a:latin typeface="Arial"/>
               </a:rPr>
-              <a:t>Santiago Andrés Serrano Vacca - A01734988</a:t>
+              <a:t>Santiago Andrés Serrano Vacca - </a:t>
+            </a:r>
+            <a:r>
+              <a:rPr lang="en-US" sz="3200" b="0" strike="noStrike" spc="-1" dirty="0" smtClean="0">
+                <a:latin typeface="Arial"/>
+              </a:rPr>
+              <a:t>A01734988</a:t>
             </a:r>
           </a:p>
           <a:p>
             <a:pPr algn="ctr"/>
             <a:r>
-              <a:rPr lang="en-US" sz="3200" spc="-1">
+              <a:rPr lang="en-US" sz="3200" spc="-1" dirty="0" smtClean="0">
                 <a:latin typeface="Arial"/>
               </a:rPr>
               <a:t>Iker Martinez Parra – A01770097</a:t>
             </a:r>
-            <a:endParaRPr lang="en-US" sz="3200" b="0" strike="noStrike" spc="-1">
+            <a:br>
+              <a:rPr lang="en-US" sz="3200" spc="-1" dirty="0" smtClean="0">
+                <a:latin typeface="Arial"/>
+              </a:rPr>
+            </a:br>
+            <a:r>
+              <a:rPr lang="en-US" sz="3200" spc="-1" dirty="0" smtClean="0">
+                <a:latin typeface="Arial"/>
+              </a:rPr>
+              <a:t>Diana Laura </a:t>
+            </a:r>
+            <a:r>
+              <a:rPr lang="en-US" sz="3200" spc="-1" dirty="0" err="1" smtClean="0">
+                <a:latin typeface="Arial"/>
+              </a:rPr>
+              <a:t>Hdz</a:t>
+            </a:r>
+            <a:r>
+              <a:rPr lang="en-US" sz="3200" spc="-1" smtClean="0">
+                <a:latin typeface="Arial"/>
+              </a:rPr>
+              <a:t> Villarreal – A01570679</a:t>
+            </a:r>
+            <a:endParaRPr lang="en-US" sz="3200" b="0" strike="noStrike" spc="-1" dirty="0">
               <a:latin typeface="Arial"/>
             </a:endParaRPr>
           </a:p>

</xml_diff>

<commit_message>
también agregué mi nombre
</commit_message>
<xml_diff>
--- a/Proyecto Final CS.pptx
+++ b/Proyecto Final CS.pptx
@@ -1714,7 +1714,7 @@
                 </a:solidFill>
                 <a:latin typeface="Calibri"/>
               </a:rPr>
-              <a:t>3/18/2021</a:t>
+              <a:t>3/18/21</a:t>
             </a:fld>
             <a:endParaRPr lang="en-US" sz="1200" b="0" strike="noStrike" spc="-1">
               <a:latin typeface="Times New Roman"/>
@@ -2185,49 +2185,61 @@
               <a:rPr lang="en-US" sz="3200" b="0" strike="noStrike" spc="-1" dirty="0">
                 <a:latin typeface="Arial"/>
               </a:rPr>
-              <a:t>Santiago Andrés Serrano Vacca - </a:t>
-            </a:r>
-            <a:r>
-              <a:rPr lang="en-US" sz="3200" b="0" strike="noStrike" spc="-1" dirty="0" smtClean="0">
-                <a:latin typeface="Arial"/>
-              </a:rPr>
-              <a:t>A01734988</a:t>
+              <a:t>Santiago Andrés Serrano Vacca - A01734988</a:t>
             </a:r>
           </a:p>
           <a:p>
             <a:pPr algn="ctr"/>
             <a:r>
-              <a:rPr lang="en-US" sz="3200" spc="-1" dirty="0" smtClean="0">
+              <a:rPr lang="en-US" sz="3200" spc="-1" dirty="0">
                 <a:latin typeface="Arial"/>
               </a:rPr>
               <a:t>Iker Martinez Parra – A01770097</a:t>
             </a:r>
             <a:br>
-              <a:rPr lang="en-US" sz="3200" spc="-1" dirty="0" smtClean="0">
+              <a:rPr lang="en-US" sz="3200" spc="-1" dirty="0">
                 <a:latin typeface="Arial"/>
               </a:rPr>
             </a:br>
             <a:r>
-              <a:rPr lang="en-US" sz="3200" spc="-1" dirty="0" smtClean="0">
+              <a:rPr lang="en-US" sz="3200" spc="-1" dirty="0">
                 <a:latin typeface="Arial"/>
               </a:rPr>
               <a:t>Diana Laura </a:t>
             </a:r>
             <a:r>
-              <a:rPr lang="en-US" sz="3200" spc="-1" dirty="0" err="1" smtClean="0">
+              <a:rPr lang="en-US" sz="3200" spc="-1" dirty="0" err="1">
                 <a:latin typeface="Arial"/>
               </a:rPr>
               <a:t>Hdz</a:t>
             </a:r>
             <a:r>
-              <a:rPr lang="en-US" sz="3200" spc="-1" smtClean="0">
+              <a:rPr lang="en-US" sz="3200" spc="-1" dirty="0">
                 <a:latin typeface="Arial"/>
               </a:rPr>
               <a:t> Villarreal – A01570679</a:t>
             </a:r>
-            <a:endParaRPr lang="en-US" sz="3200" b="0" strike="noStrike" spc="-1" dirty="0">
-              <a:latin typeface="Arial"/>
-            </a:endParaRPr>
+          </a:p>
+          <a:p>
+            <a:pPr algn="ctr"/>
+            <a:r>
+              <a:rPr lang="en-US" sz="3200" b="0" strike="noStrike" spc="-1" dirty="0">
+                <a:latin typeface="Arial"/>
+              </a:rPr>
+              <a:t>Ricardo Andrés Cavazos </a:t>
+            </a:r>
+            <a:r>
+              <a:rPr lang="en-US" sz="3200" b="0" strike="noStrike" spc="-1" dirty="0" err="1">
+                <a:latin typeface="Arial"/>
+              </a:rPr>
+              <a:t>Cantú</a:t>
+            </a:r>
+            <a:r>
+              <a:rPr lang="en-US" sz="3200" b="0" strike="noStrike" spc="-1" dirty="0">
+                <a:latin typeface="Arial"/>
+              </a:rPr>
+              <a:t> – A01177189</a:t>
+            </a:r>
           </a:p>
         </p:txBody>
       </p:sp>

</xml_diff>

<commit_message>
Ya esta mi informacion en la presentacion
</commit_message>
<xml_diff>
--- a/Proyecto Final CS.pptx
+++ b/Proyecto Final CS.pptx
@@ -6,6 +6,7 @@
   </p:sldMasterIdLst>
   <p:sldIdLst>
     <p:sldId id="256" r:id="rId2"/>
+    <p:sldId id="257" r:id="rId3"/>
   </p:sldIdLst>
   <p:sldSz cx="12192000" cy="6858000"/>
   <p:notesSz cx="7772400" cy="10058400"/>
@@ -169,7 +170,7 @@
           <a:noFill/>
           <a:extLst>
             <a:ext uri="{909E8E84-426E-40dd-AFC4-6F175D3DCCD1}">
-              <a14:hiddenFill xmlns:a14="http://schemas.microsoft.com/office/drawing/2010/main" xmlns="">
+              <a14:hiddenFill xmlns="" xmlns:a14="http://schemas.microsoft.com/office/drawing/2010/main">
                 <a:solidFill>
                   <a:srgbClr val="FFFFFF"/>
                 </a:solidFill>
@@ -228,7 +229,7 @@
             </a:ln>
             <a:extLst>
               <a:ext uri="{91240B29-F687-4f45-9708-019B960494DF}">
-                <a14:hiddenLine xmlns:a14="http://schemas.microsoft.com/office/drawing/2010/main" xmlns="" w="9525">
+                <a14:hiddenLine xmlns="" xmlns:a14="http://schemas.microsoft.com/office/drawing/2010/main" w="9525">
                   <a:solidFill>
                     <a:srgbClr val="000000"/>
                   </a:solidFill>
@@ -318,7 +319,7 @@
             </a:ln>
             <a:extLst>
               <a:ext uri="{91240B29-F687-4f45-9708-019B960494DF}">
-                <a14:hiddenLine xmlns:a14="http://schemas.microsoft.com/office/drawing/2010/main" xmlns="" w="9525">
+                <a14:hiddenLine xmlns="" xmlns:a14="http://schemas.microsoft.com/office/drawing/2010/main" w="9525">
                   <a:solidFill>
                     <a:srgbClr val="000000"/>
                   </a:solidFill>
@@ -408,7 +409,7 @@
             </a:ln>
             <a:extLst>
               <a:ext uri="{91240B29-F687-4f45-9708-019B960494DF}">
-                <a14:hiddenLine xmlns:a14="http://schemas.microsoft.com/office/drawing/2010/main" xmlns="" w="9525">
+                <a14:hiddenLine xmlns="" xmlns:a14="http://schemas.microsoft.com/office/drawing/2010/main" w="9525">
                   <a:solidFill>
                     <a:srgbClr val="000000"/>
                   </a:solidFill>
@@ -442,7 +443,7 @@
             </a:ln>
             <a:extLst>
               <a:ext uri="{91240B29-F687-4f45-9708-019B960494DF}">
-                <a14:hiddenLine xmlns:a14="http://schemas.microsoft.com/office/drawing/2010/main" xmlns="" w="9525">
+                <a14:hiddenLine xmlns="" xmlns:a14="http://schemas.microsoft.com/office/drawing/2010/main" w="9525">
                   <a:solidFill>
                     <a:srgbClr val="000000"/>
                   </a:solidFill>
@@ -532,7 +533,7 @@
             </a:ln>
             <a:extLst>
               <a:ext uri="{91240B29-F687-4f45-9708-019B960494DF}">
-                <a14:hiddenLine xmlns:a14="http://schemas.microsoft.com/office/drawing/2010/main" xmlns="" w="9525">
+                <a14:hiddenLine xmlns="" xmlns:a14="http://schemas.microsoft.com/office/drawing/2010/main" w="9525">
                   <a:solidFill>
                     <a:srgbClr val="000000"/>
                   </a:solidFill>
@@ -594,7 +595,7 @@
             </a:ln>
             <a:extLst>
               <a:ext uri="{91240B29-F687-4f45-9708-019B960494DF}">
-                <a14:hiddenLine xmlns:a14="http://schemas.microsoft.com/office/drawing/2010/main" xmlns="" w="9525">
+                <a14:hiddenLine xmlns="" xmlns:a14="http://schemas.microsoft.com/office/drawing/2010/main" w="9525">
                   <a:solidFill>
                     <a:srgbClr val="000000"/>
                   </a:solidFill>
@@ -656,7 +657,7 @@
             </a:ln>
             <a:extLst>
               <a:ext uri="{91240B29-F687-4f45-9708-019B960494DF}">
-                <a14:hiddenLine xmlns:a14="http://schemas.microsoft.com/office/drawing/2010/main" xmlns="" w="9525">
+                <a14:hiddenLine xmlns="" xmlns:a14="http://schemas.microsoft.com/office/drawing/2010/main" w="9525">
                   <a:solidFill>
                     <a:srgbClr val="000000"/>
                   </a:solidFill>
@@ -746,7 +747,7 @@
             </a:ln>
             <a:extLst>
               <a:ext uri="{91240B29-F687-4f45-9708-019B960494DF}">
-                <a14:hiddenLine xmlns:a14="http://schemas.microsoft.com/office/drawing/2010/main" xmlns="" w="9525">
+                <a14:hiddenLine xmlns="" xmlns:a14="http://schemas.microsoft.com/office/drawing/2010/main" w="9525">
                   <a:solidFill>
                     <a:srgbClr val="000000"/>
                   </a:solidFill>
@@ -808,7 +809,7 @@
             </a:ln>
             <a:extLst>
               <a:ext uri="{91240B29-F687-4f45-9708-019B960494DF}">
-                <a14:hiddenLine xmlns:a14="http://schemas.microsoft.com/office/drawing/2010/main" xmlns="" w="9525">
+                <a14:hiddenLine xmlns="" xmlns:a14="http://schemas.microsoft.com/office/drawing/2010/main" w="9525">
                   <a:solidFill>
                     <a:srgbClr val="000000"/>
                   </a:solidFill>
@@ -870,7 +871,7 @@
             </a:ln>
             <a:extLst>
               <a:ext uri="{91240B29-F687-4f45-9708-019B960494DF}">
-                <a14:hiddenLine xmlns:a14="http://schemas.microsoft.com/office/drawing/2010/main" xmlns="" w="9525">
+                <a14:hiddenLine xmlns="" xmlns:a14="http://schemas.microsoft.com/office/drawing/2010/main" w="9525">
                   <a:solidFill>
                     <a:srgbClr val="000000"/>
                   </a:solidFill>
@@ -960,7 +961,7 @@
             </a:ln>
             <a:extLst>
               <a:ext uri="{91240B29-F687-4f45-9708-019B960494DF}">
-                <a14:hiddenLine xmlns:a14="http://schemas.microsoft.com/office/drawing/2010/main" xmlns="" w="9525">
+                <a14:hiddenLine xmlns="" xmlns:a14="http://schemas.microsoft.com/office/drawing/2010/main" w="9525">
                   <a:solidFill>
                     <a:srgbClr val="000000"/>
                   </a:solidFill>
@@ -1050,7 +1051,7 @@
             </a:ln>
             <a:extLst>
               <a:ext uri="{91240B29-F687-4f45-9708-019B960494DF}">
-                <a14:hiddenLine xmlns:a14="http://schemas.microsoft.com/office/drawing/2010/main" xmlns="" w="9525">
+                <a14:hiddenLine xmlns="" xmlns:a14="http://schemas.microsoft.com/office/drawing/2010/main" w="9525">
                   <a:solidFill>
                     <a:srgbClr val="000000"/>
                   </a:solidFill>
@@ -1112,7 +1113,7 @@
             </a:ln>
             <a:extLst>
               <a:ext uri="{91240B29-F687-4f45-9708-019B960494DF}">
-                <a14:hiddenLine xmlns:a14="http://schemas.microsoft.com/office/drawing/2010/main" xmlns="" w="9525">
+                <a14:hiddenLine xmlns="" xmlns:a14="http://schemas.microsoft.com/office/drawing/2010/main" w="9525">
                   <a:solidFill>
                     <a:srgbClr val="000000"/>
                   </a:solidFill>
@@ -1222,7 +1223,7 @@
             </a:ln>
             <a:extLst>
               <a:ext uri="{91240B29-F687-4f45-9708-019B960494DF}">
-                <a14:hiddenLine xmlns:a14="http://schemas.microsoft.com/office/drawing/2010/main" xmlns="" w="9525">
+                <a14:hiddenLine xmlns="" xmlns:a14="http://schemas.microsoft.com/office/drawing/2010/main" w="9525">
                   <a:solidFill>
                     <a:srgbClr val="000000"/>
                   </a:solidFill>
@@ -1284,7 +1285,7 @@
             </a:ln>
             <a:extLst>
               <a:ext uri="{91240B29-F687-4f45-9708-019B960494DF}">
-                <a14:hiddenLine xmlns:a14="http://schemas.microsoft.com/office/drawing/2010/main" xmlns="" w="9525">
+                <a14:hiddenLine xmlns="" xmlns:a14="http://schemas.microsoft.com/office/drawing/2010/main" w="9525">
                   <a:solidFill>
                     <a:srgbClr val="000000"/>
                   </a:solidFill>
@@ -1374,7 +1375,7 @@
             </a:ln>
             <a:extLst>
               <a:ext uri="{91240B29-F687-4f45-9708-019B960494DF}">
-                <a14:hiddenLine xmlns:a14="http://schemas.microsoft.com/office/drawing/2010/main" xmlns="" w="9525">
+                <a14:hiddenLine xmlns="" xmlns:a14="http://schemas.microsoft.com/office/drawing/2010/main" w="9525">
                   <a:solidFill>
                     <a:srgbClr val="000000"/>
                   </a:solidFill>
@@ -1464,7 +1465,7 @@
             </a:ln>
             <a:extLst>
               <a:ext uri="{91240B29-F687-4f45-9708-019B960494DF}">
-                <a14:hiddenLine xmlns:a14="http://schemas.microsoft.com/office/drawing/2010/main" xmlns="" w="9525">
+                <a14:hiddenLine xmlns="" xmlns:a14="http://schemas.microsoft.com/office/drawing/2010/main" w="9525">
                   <a:solidFill>
                     <a:srgbClr val="000000"/>
                   </a:solidFill>
@@ -1526,7 +1527,7 @@
             </a:ln>
             <a:extLst>
               <a:ext uri="{91240B29-F687-4f45-9708-019B960494DF}">
-                <a14:hiddenLine xmlns:a14="http://schemas.microsoft.com/office/drawing/2010/main" xmlns="" w="9525">
+                <a14:hiddenLine xmlns="" xmlns:a14="http://schemas.microsoft.com/office/drawing/2010/main" w="9525">
                   <a:solidFill>
                     <a:srgbClr val="000000"/>
                   </a:solidFill>
@@ -1616,7 +1617,7 @@
             </a:ln>
             <a:extLst>
               <a:ext uri="{91240B29-F687-4f45-9708-019B960494DF}">
-                <a14:hiddenLine xmlns:a14="http://schemas.microsoft.com/office/drawing/2010/main" xmlns="" w="9525">
+                <a14:hiddenLine xmlns="" xmlns:a14="http://schemas.microsoft.com/office/drawing/2010/main" w="9525">
                   <a:solidFill>
                     <a:srgbClr val="000000"/>
                   </a:solidFill>
@@ -1706,7 +1707,7 @@
             </a:ln>
             <a:extLst>
               <a:ext uri="{91240B29-F687-4f45-9708-019B960494DF}">
-                <a14:hiddenLine xmlns:a14="http://schemas.microsoft.com/office/drawing/2010/main" xmlns="" w="9525">
+                <a14:hiddenLine xmlns="" xmlns:a14="http://schemas.microsoft.com/office/drawing/2010/main" w="9525">
                   <a:solidFill>
                     <a:srgbClr val="000000"/>
                   </a:solidFill>
@@ -1762,7 +1763,7 @@
             </a:ln>
             <a:extLst>
               <a:ext uri="{91240B29-F687-4f45-9708-019B960494DF}">
-                <a14:hiddenLine xmlns:a14="http://schemas.microsoft.com/office/drawing/2010/main" xmlns="" w="9525">
+                <a14:hiddenLine xmlns="" xmlns:a14="http://schemas.microsoft.com/office/drawing/2010/main" w="9525">
                   <a:solidFill>
                     <a:srgbClr val="000000"/>
                   </a:solidFill>
@@ -1852,7 +1853,7 @@
             </a:ln>
             <a:extLst>
               <a:ext uri="{91240B29-F687-4f45-9708-019B960494DF}">
-                <a14:hiddenLine xmlns:a14="http://schemas.microsoft.com/office/drawing/2010/main" xmlns="" w="9525">
+                <a14:hiddenLine xmlns="" xmlns:a14="http://schemas.microsoft.com/office/drawing/2010/main" w="9525">
                   <a:solidFill>
                     <a:srgbClr val="000000"/>
                   </a:solidFill>
@@ -1908,7 +1909,7 @@
             </a:ln>
             <a:extLst>
               <a:ext uri="{91240B29-F687-4f45-9708-019B960494DF}">
-                <a14:hiddenLine xmlns:a14="http://schemas.microsoft.com/office/drawing/2010/main" xmlns="" w="9525">
+                <a14:hiddenLine xmlns="" xmlns:a14="http://schemas.microsoft.com/office/drawing/2010/main" w="9525">
                   <a:solidFill>
                     <a:srgbClr val="000000"/>
                   </a:solidFill>
@@ -1998,7 +1999,7 @@
             </a:ln>
             <a:extLst>
               <a:ext uri="{91240B29-F687-4f45-9708-019B960494DF}">
-                <a14:hiddenLine xmlns:a14="http://schemas.microsoft.com/office/drawing/2010/main" xmlns="" w="9525">
+                <a14:hiddenLine xmlns="" xmlns:a14="http://schemas.microsoft.com/office/drawing/2010/main" w="9525">
                   <a:solidFill>
                     <a:srgbClr val="000000"/>
                   </a:solidFill>
@@ -2066,7 +2067,7 @@
             </a:ln>
             <a:extLst>
               <a:ext uri="{91240B29-F687-4f45-9708-019B960494DF}">
-                <a14:hiddenLine xmlns:a14="http://schemas.microsoft.com/office/drawing/2010/main" xmlns="" w="9525">
+                <a14:hiddenLine xmlns="" xmlns:a14="http://schemas.microsoft.com/office/drawing/2010/main" w="9525">
                   <a:solidFill>
                     <a:srgbClr val="000000"/>
                   </a:solidFill>
@@ -2156,7 +2157,7 @@
             </a:ln>
             <a:extLst>
               <a:ext uri="{91240B29-F687-4f45-9708-019B960494DF}">
-                <a14:hiddenLine xmlns:a14="http://schemas.microsoft.com/office/drawing/2010/main" xmlns="" w="9525">
+                <a14:hiddenLine xmlns="" xmlns:a14="http://schemas.microsoft.com/office/drawing/2010/main" w="9525">
                   <a:solidFill>
                     <a:srgbClr val="000000"/>
                   </a:solidFill>
@@ -2224,7 +2225,7 @@
             </a:ln>
             <a:extLst>
               <a:ext uri="{91240B29-F687-4f45-9708-019B960494DF}">
-                <a14:hiddenLine xmlns:a14="http://schemas.microsoft.com/office/drawing/2010/main" xmlns="" w="9525">
+                <a14:hiddenLine xmlns="" xmlns:a14="http://schemas.microsoft.com/office/drawing/2010/main" w="9525">
                   <a:solidFill>
                     <a:srgbClr val="000000"/>
                   </a:solidFill>
@@ -2314,7 +2315,7 @@
             </a:ln>
             <a:extLst>
               <a:ext uri="{91240B29-F687-4f45-9708-019B960494DF}">
-                <a14:hiddenLine xmlns:a14="http://schemas.microsoft.com/office/drawing/2010/main" xmlns="" w="9525">
+                <a14:hiddenLine xmlns="" xmlns:a14="http://schemas.microsoft.com/office/drawing/2010/main" w="9525">
                   <a:solidFill>
                     <a:srgbClr val="000000"/>
                   </a:solidFill>
@@ -2348,7 +2349,7 @@
             </a:ln>
             <a:extLst>
               <a:ext uri="{91240B29-F687-4f45-9708-019B960494DF}">
-                <a14:hiddenLine xmlns:a14="http://schemas.microsoft.com/office/drawing/2010/main" xmlns="" w="9525">
+                <a14:hiddenLine xmlns="" xmlns:a14="http://schemas.microsoft.com/office/drawing/2010/main" w="9525">
                   <a:solidFill>
                     <a:srgbClr val="000000"/>
                   </a:solidFill>
@@ -2438,7 +2439,7 @@
             </a:ln>
             <a:extLst>
               <a:ext uri="{91240B29-F687-4f45-9708-019B960494DF}">
-                <a14:hiddenLine xmlns:a14="http://schemas.microsoft.com/office/drawing/2010/main" xmlns="" w="9525">
+                <a14:hiddenLine xmlns="" xmlns:a14="http://schemas.microsoft.com/office/drawing/2010/main" w="9525">
                   <a:solidFill>
                     <a:srgbClr val="000000"/>
                   </a:solidFill>
@@ -2500,7 +2501,7 @@
             </a:ln>
             <a:extLst>
               <a:ext uri="{91240B29-F687-4f45-9708-019B960494DF}">
-                <a14:hiddenLine xmlns:a14="http://schemas.microsoft.com/office/drawing/2010/main" xmlns="" w="9525">
+                <a14:hiddenLine xmlns="" xmlns:a14="http://schemas.microsoft.com/office/drawing/2010/main" w="9525">
                   <a:solidFill>
                     <a:srgbClr val="000000"/>
                   </a:solidFill>
@@ -2562,7 +2563,7 @@
             </a:ln>
             <a:extLst>
               <a:ext uri="{91240B29-F687-4f45-9708-019B960494DF}">
-                <a14:hiddenLine xmlns:a14="http://schemas.microsoft.com/office/drawing/2010/main" xmlns="" w="9525">
+                <a14:hiddenLine xmlns="" xmlns:a14="http://schemas.microsoft.com/office/drawing/2010/main" w="9525">
                   <a:solidFill>
                     <a:srgbClr val="000000"/>
                   </a:solidFill>
@@ -2652,7 +2653,7 @@
             </a:ln>
             <a:extLst>
               <a:ext uri="{91240B29-F687-4f45-9708-019B960494DF}">
-                <a14:hiddenLine xmlns:a14="http://schemas.microsoft.com/office/drawing/2010/main" xmlns="" w="9525">
+                <a14:hiddenLine xmlns="" xmlns:a14="http://schemas.microsoft.com/office/drawing/2010/main" w="9525">
                   <a:solidFill>
                     <a:srgbClr val="000000"/>
                   </a:solidFill>
@@ -2720,7 +2721,7 @@
             </a:ln>
             <a:extLst>
               <a:ext uri="{91240B29-F687-4f45-9708-019B960494DF}">
-                <a14:hiddenLine xmlns:a14="http://schemas.microsoft.com/office/drawing/2010/main" xmlns="" w="9525">
+                <a14:hiddenLine xmlns="" xmlns:a14="http://schemas.microsoft.com/office/drawing/2010/main" w="9525">
                   <a:solidFill>
                     <a:srgbClr val="000000"/>
                   </a:solidFill>
@@ -2782,7 +2783,7 @@
             </a:ln>
             <a:extLst>
               <a:ext uri="{91240B29-F687-4f45-9708-019B960494DF}">
-                <a14:hiddenLine xmlns:a14="http://schemas.microsoft.com/office/drawing/2010/main" xmlns="" w="9525">
+                <a14:hiddenLine xmlns="" xmlns:a14="http://schemas.microsoft.com/office/drawing/2010/main" w="9525">
                   <a:solidFill>
                     <a:srgbClr val="000000"/>
                   </a:solidFill>
@@ -2872,7 +2873,7 @@
             </a:ln>
             <a:extLst>
               <a:ext uri="{91240B29-F687-4f45-9708-019B960494DF}">
-                <a14:hiddenLine xmlns:a14="http://schemas.microsoft.com/office/drawing/2010/main" xmlns="" w="9525">
+                <a14:hiddenLine xmlns="" xmlns:a14="http://schemas.microsoft.com/office/drawing/2010/main" w="9525">
                   <a:solidFill>
                     <a:srgbClr val="000000"/>
                   </a:solidFill>
@@ -2934,7 +2935,7 @@
             </a:ln>
             <a:extLst>
               <a:ext uri="{91240B29-F687-4f45-9708-019B960494DF}">
-                <a14:hiddenLine xmlns:a14="http://schemas.microsoft.com/office/drawing/2010/main" xmlns="" w="9525">
+                <a14:hiddenLine xmlns="" xmlns:a14="http://schemas.microsoft.com/office/drawing/2010/main" w="9525">
                   <a:solidFill>
                     <a:srgbClr val="000000"/>
                   </a:solidFill>
@@ -3024,7 +3025,7 @@
             </a:ln>
             <a:extLst>
               <a:ext uri="{91240B29-F687-4f45-9708-019B960494DF}">
-                <a14:hiddenLine xmlns:a14="http://schemas.microsoft.com/office/drawing/2010/main" xmlns="" w="9525">
+                <a14:hiddenLine xmlns="" xmlns:a14="http://schemas.microsoft.com/office/drawing/2010/main" w="9525">
                   <a:solidFill>
                     <a:srgbClr val="000000"/>
                   </a:solidFill>
@@ -3086,7 +3087,7 @@
             </a:ln>
             <a:extLst>
               <a:ext uri="{91240B29-F687-4f45-9708-019B960494DF}">
-                <a14:hiddenLine xmlns:a14="http://schemas.microsoft.com/office/drawing/2010/main" xmlns="" w="9525">
+                <a14:hiddenLine xmlns="" xmlns:a14="http://schemas.microsoft.com/office/drawing/2010/main" w="9525">
                   <a:solidFill>
                     <a:srgbClr val="000000"/>
                   </a:solidFill>
@@ -3176,7 +3177,7 @@
             </a:ln>
             <a:extLst>
               <a:ext uri="{91240B29-F687-4f45-9708-019B960494DF}">
-                <a14:hiddenLine xmlns:a14="http://schemas.microsoft.com/office/drawing/2010/main" xmlns="" w="9525">
+                <a14:hiddenLine xmlns="" xmlns:a14="http://schemas.microsoft.com/office/drawing/2010/main" w="9525">
                   <a:solidFill>
                     <a:srgbClr val="000000"/>
                   </a:solidFill>
@@ -3210,7 +3211,7 @@
             </a:ln>
             <a:extLst>
               <a:ext uri="{91240B29-F687-4f45-9708-019B960494DF}">
-                <a14:hiddenLine xmlns:a14="http://schemas.microsoft.com/office/drawing/2010/main" xmlns="" w="9525">
+                <a14:hiddenLine xmlns="" xmlns:a14="http://schemas.microsoft.com/office/drawing/2010/main" w="9525">
                   <a:solidFill>
                     <a:srgbClr val="000000"/>
                   </a:solidFill>
@@ -3275,7 +3276,7 @@
             </a:ln>
             <a:extLst>
               <a:ext uri="{91240B29-F687-4f45-9708-019B960494DF}">
-                <a14:hiddenLine xmlns:a14="http://schemas.microsoft.com/office/drawing/2010/main" xmlns="" w="9525">
+                <a14:hiddenLine xmlns="" xmlns:a14="http://schemas.microsoft.com/office/drawing/2010/main" w="9525">
                   <a:solidFill>
                     <a:srgbClr val="000000"/>
                   </a:solidFill>
@@ -3365,7 +3366,7 @@
             </a:ln>
             <a:extLst>
               <a:ext uri="{91240B29-F687-4f45-9708-019B960494DF}">
-                <a14:hiddenLine xmlns:a14="http://schemas.microsoft.com/office/drawing/2010/main" xmlns="" w="9525">
+                <a14:hiddenLine xmlns="" xmlns:a14="http://schemas.microsoft.com/office/drawing/2010/main" w="9525">
                   <a:solidFill>
                     <a:srgbClr val="000000"/>
                   </a:solidFill>
@@ -3427,7 +3428,7 @@
             </a:ln>
             <a:extLst>
               <a:ext uri="{91240B29-F687-4f45-9708-019B960494DF}">
-                <a14:hiddenLine xmlns:a14="http://schemas.microsoft.com/office/drawing/2010/main" xmlns="" w="9525">
+                <a14:hiddenLine xmlns="" xmlns:a14="http://schemas.microsoft.com/office/drawing/2010/main" w="9525">
                   <a:solidFill>
                     <a:srgbClr val="000000"/>
                   </a:solidFill>
@@ -3517,7 +3518,7 @@
             </a:ln>
             <a:extLst>
               <a:ext uri="{91240B29-F687-4f45-9708-019B960494DF}">
-                <a14:hiddenLine xmlns:a14="http://schemas.microsoft.com/office/drawing/2010/main" xmlns="" w="9525">
+                <a14:hiddenLine xmlns="" xmlns:a14="http://schemas.microsoft.com/office/drawing/2010/main" w="9525">
                   <a:solidFill>
                     <a:srgbClr val="000000"/>
                   </a:solidFill>
@@ -3607,7 +3608,7 @@
             </a:ln>
             <a:extLst>
               <a:ext uri="{91240B29-F687-4f45-9708-019B960494DF}">
-                <a14:hiddenLine xmlns:a14="http://schemas.microsoft.com/office/drawing/2010/main" xmlns="" w="9525">
+                <a14:hiddenLine xmlns="" xmlns:a14="http://schemas.microsoft.com/office/drawing/2010/main" w="9525">
                   <a:solidFill>
                     <a:srgbClr val="000000"/>
                   </a:solidFill>
@@ -3672,7 +3673,7 @@
             </a:ln>
             <a:extLst>
               <a:ext uri="{91240B29-F687-4f45-9708-019B960494DF}">
-                <a14:hiddenLine xmlns:a14="http://schemas.microsoft.com/office/drawing/2010/main" xmlns="" w="9525">
+                <a14:hiddenLine xmlns="" xmlns:a14="http://schemas.microsoft.com/office/drawing/2010/main" w="9525">
                   <a:solidFill>
                     <a:srgbClr val="000000"/>
                   </a:solidFill>
@@ -3734,7 +3735,7 @@
             </a:ln>
             <a:extLst>
               <a:ext uri="{91240B29-F687-4f45-9708-019B960494DF}">
-                <a14:hiddenLine xmlns:a14="http://schemas.microsoft.com/office/drawing/2010/main" xmlns="" w="9525">
+                <a14:hiddenLine xmlns="" xmlns:a14="http://schemas.microsoft.com/office/drawing/2010/main" w="9525">
                   <a:solidFill>
                     <a:srgbClr val="000000"/>
                   </a:solidFill>
@@ -3824,7 +3825,7 @@
             </a:ln>
             <a:extLst>
               <a:ext uri="{91240B29-F687-4f45-9708-019B960494DF}">
-                <a14:hiddenLine xmlns:a14="http://schemas.microsoft.com/office/drawing/2010/main" xmlns="" w="9525">
+                <a14:hiddenLine xmlns="" xmlns:a14="http://schemas.microsoft.com/office/drawing/2010/main" w="9525">
                   <a:solidFill>
                     <a:srgbClr val="000000"/>
                   </a:solidFill>
@@ -3914,7 +3915,7 @@
             </a:ln>
             <a:extLst>
               <a:ext uri="{91240B29-F687-4f45-9708-019B960494DF}">
-                <a14:hiddenLine xmlns:a14="http://schemas.microsoft.com/office/drawing/2010/main" xmlns="" w="9525">
+                <a14:hiddenLine xmlns="" xmlns:a14="http://schemas.microsoft.com/office/drawing/2010/main" w="9525">
                   <a:solidFill>
                     <a:srgbClr val="000000"/>
                   </a:solidFill>
@@ -3976,7 +3977,7 @@
             </a:ln>
             <a:extLst>
               <a:ext uri="{91240B29-F687-4f45-9708-019B960494DF}">
-                <a14:hiddenLine xmlns:a14="http://schemas.microsoft.com/office/drawing/2010/main" xmlns="" w="9525">
+                <a14:hiddenLine xmlns="" xmlns:a14="http://schemas.microsoft.com/office/drawing/2010/main" w="9525">
                   <a:solidFill>
                     <a:srgbClr val="000000"/>
                   </a:solidFill>
@@ -4096,7 +4097,7 @@
             </a:ln>
             <a:extLst>
               <a:ext uri="{91240B29-F687-4f45-9708-019B960494DF}">
-                <a14:hiddenLine xmlns:a14="http://schemas.microsoft.com/office/drawing/2010/main" xmlns="" w="9525">
+                <a14:hiddenLine xmlns="" xmlns:a14="http://schemas.microsoft.com/office/drawing/2010/main" w="9525">
                   <a:solidFill>
                     <a:srgbClr val="000000"/>
                   </a:solidFill>
@@ -4164,7 +4165,7 @@
             </a:ln>
             <a:extLst>
               <a:ext uri="{91240B29-F687-4f45-9708-019B960494DF}">
-                <a14:hiddenLine xmlns:a14="http://schemas.microsoft.com/office/drawing/2010/main" xmlns="" w="9525">
+                <a14:hiddenLine xmlns="" xmlns:a14="http://schemas.microsoft.com/office/drawing/2010/main" w="9525">
                   <a:solidFill>
                     <a:srgbClr val="000000"/>
                   </a:solidFill>
@@ -4254,7 +4255,7 @@
             </a:ln>
             <a:extLst>
               <a:ext uri="{91240B29-F687-4f45-9708-019B960494DF}">
-                <a14:hiddenLine xmlns:a14="http://schemas.microsoft.com/office/drawing/2010/main" xmlns="" w="9525">
+                <a14:hiddenLine xmlns="" xmlns:a14="http://schemas.microsoft.com/office/drawing/2010/main" w="9525">
                   <a:solidFill>
                     <a:srgbClr val="000000"/>
                   </a:solidFill>
@@ -9576,7 +9577,7 @@
           <a:noFill/>
           <a:extLst>
             <a:ext uri="{909E8E84-426E-40dd-AFC4-6F175D3DCCD1}">
-              <a14:hiddenFill xmlns:a14="http://schemas.microsoft.com/office/drawing/2010/main" xmlns="">
+              <a14:hiddenFill xmlns="" xmlns:a14="http://schemas.microsoft.com/office/drawing/2010/main">
                 <a:solidFill>
                   <a:srgbClr val="FFFFFF"/>
                 </a:solidFill>
@@ -9650,7 +9651,7 @@
               </a:ln>
               <a:extLst>
                 <a:ext uri="{91240B29-F687-4f45-9708-019B960494DF}">
-                  <a14:hiddenLine xmlns:a14="http://schemas.microsoft.com/office/drawing/2010/main" xmlns="" w="9525">
+                  <a14:hiddenLine xmlns="" xmlns:a14="http://schemas.microsoft.com/office/drawing/2010/main" w="9525">
                     <a:solidFill>
                       <a:srgbClr val="000000"/>
                     </a:solidFill>
@@ -9740,7 +9741,7 @@
               </a:ln>
               <a:extLst>
                 <a:ext uri="{91240B29-F687-4f45-9708-019B960494DF}">
-                  <a14:hiddenLine xmlns:a14="http://schemas.microsoft.com/office/drawing/2010/main" xmlns="" w="9525">
+                  <a14:hiddenLine xmlns="" xmlns:a14="http://schemas.microsoft.com/office/drawing/2010/main" w="9525">
                     <a:solidFill>
                       <a:srgbClr val="000000"/>
                     </a:solidFill>
@@ -9830,7 +9831,7 @@
               </a:ln>
               <a:extLst>
                 <a:ext uri="{91240B29-F687-4f45-9708-019B960494DF}">
-                  <a14:hiddenLine xmlns:a14="http://schemas.microsoft.com/office/drawing/2010/main" xmlns="" w="9525">
+                  <a14:hiddenLine xmlns="" xmlns:a14="http://schemas.microsoft.com/office/drawing/2010/main" w="9525">
                     <a:solidFill>
                       <a:srgbClr val="000000"/>
                     </a:solidFill>
@@ -9892,7 +9893,7 @@
               </a:ln>
               <a:extLst>
                 <a:ext uri="{91240B29-F687-4f45-9708-019B960494DF}">
-                  <a14:hiddenLine xmlns:a14="http://schemas.microsoft.com/office/drawing/2010/main" xmlns="" w="9525">
+                  <a14:hiddenLine xmlns="" xmlns:a14="http://schemas.microsoft.com/office/drawing/2010/main" w="9525">
                     <a:solidFill>
                       <a:srgbClr val="000000"/>
                     </a:solidFill>
@@ -9982,7 +9983,7 @@
               </a:ln>
               <a:extLst>
                 <a:ext uri="{91240B29-F687-4f45-9708-019B960494DF}">
-                  <a14:hiddenLine xmlns:a14="http://schemas.microsoft.com/office/drawing/2010/main" xmlns="" w="9525">
+                  <a14:hiddenLine xmlns="" xmlns:a14="http://schemas.microsoft.com/office/drawing/2010/main" w="9525">
                     <a:solidFill>
                       <a:srgbClr val="000000"/>
                     </a:solidFill>
@@ -10044,7 +10045,7 @@
               </a:ln>
               <a:extLst>
                 <a:ext uri="{91240B29-F687-4f45-9708-019B960494DF}">
-                  <a14:hiddenLine xmlns:a14="http://schemas.microsoft.com/office/drawing/2010/main" xmlns="" w="9525">
+                  <a14:hiddenLine xmlns="" xmlns:a14="http://schemas.microsoft.com/office/drawing/2010/main" w="9525">
                     <a:solidFill>
                       <a:srgbClr val="000000"/>
                     </a:solidFill>
@@ -10106,7 +10107,7 @@
               </a:ln>
               <a:extLst>
                 <a:ext uri="{91240B29-F687-4f45-9708-019B960494DF}">
-                  <a14:hiddenLine xmlns:a14="http://schemas.microsoft.com/office/drawing/2010/main" xmlns="" w="9525">
+                  <a14:hiddenLine xmlns="" xmlns:a14="http://schemas.microsoft.com/office/drawing/2010/main" w="9525">
                     <a:solidFill>
                       <a:srgbClr val="000000"/>
                     </a:solidFill>
@@ -10196,7 +10197,7 @@
               </a:ln>
               <a:extLst>
                 <a:ext uri="{91240B29-F687-4f45-9708-019B960494DF}">
-                  <a14:hiddenLine xmlns:a14="http://schemas.microsoft.com/office/drawing/2010/main" xmlns="" w="9525">
+                  <a14:hiddenLine xmlns="" xmlns:a14="http://schemas.microsoft.com/office/drawing/2010/main" w="9525">
                     <a:solidFill>
                       <a:srgbClr val="000000"/>
                     </a:solidFill>
@@ -10286,7 +10287,7 @@
               </a:ln>
               <a:extLst>
                 <a:ext uri="{91240B29-F687-4f45-9708-019B960494DF}">
-                  <a14:hiddenLine xmlns:a14="http://schemas.microsoft.com/office/drawing/2010/main" xmlns="" w="9525">
+                  <a14:hiddenLine xmlns="" xmlns:a14="http://schemas.microsoft.com/office/drawing/2010/main" w="9525">
                     <a:solidFill>
                       <a:srgbClr val="000000"/>
                     </a:solidFill>
@@ -10348,7 +10349,7 @@
               </a:ln>
               <a:extLst>
                 <a:ext uri="{91240B29-F687-4f45-9708-019B960494DF}">
-                  <a14:hiddenLine xmlns:a14="http://schemas.microsoft.com/office/drawing/2010/main" xmlns="" w="9525">
+                  <a14:hiddenLine xmlns="" xmlns:a14="http://schemas.microsoft.com/office/drawing/2010/main" w="9525">
                     <a:solidFill>
                       <a:srgbClr val="000000"/>
                     </a:solidFill>
@@ -10458,7 +10459,7 @@
               </a:ln>
               <a:extLst>
                 <a:ext uri="{91240B29-F687-4f45-9708-019B960494DF}">
-                  <a14:hiddenLine xmlns:a14="http://schemas.microsoft.com/office/drawing/2010/main" xmlns="" w="9525">
+                  <a14:hiddenLine xmlns="" xmlns:a14="http://schemas.microsoft.com/office/drawing/2010/main" w="9525">
                     <a:solidFill>
                       <a:srgbClr val="000000"/>
                     </a:solidFill>
@@ -10542,7 +10543,7 @@
               </a:ln>
               <a:extLst>
                 <a:ext uri="{91240B29-F687-4f45-9708-019B960494DF}">
-                  <a14:hiddenLine xmlns:a14="http://schemas.microsoft.com/office/drawing/2010/main" xmlns="" w="9525">
+                  <a14:hiddenLine xmlns="" xmlns:a14="http://schemas.microsoft.com/office/drawing/2010/main" w="9525">
                     <a:solidFill>
                       <a:srgbClr val="000000"/>
                     </a:solidFill>
@@ -10604,7 +10605,7 @@
               </a:ln>
               <a:extLst>
                 <a:ext uri="{91240B29-F687-4f45-9708-019B960494DF}">
-                  <a14:hiddenLine xmlns:a14="http://schemas.microsoft.com/office/drawing/2010/main" xmlns="" w="9525">
+                  <a14:hiddenLine xmlns="" xmlns:a14="http://schemas.microsoft.com/office/drawing/2010/main" w="9525">
                     <a:solidFill>
                       <a:srgbClr val="000000"/>
                     </a:solidFill>
@@ -10666,7 +10667,7 @@
               </a:ln>
               <a:extLst>
                 <a:ext uri="{91240B29-F687-4f45-9708-019B960494DF}">
-                  <a14:hiddenLine xmlns:a14="http://schemas.microsoft.com/office/drawing/2010/main" xmlns="" w="9525">
+                  <a14:hiddenLine xmlns="" xmlns:a14="http://schemas.microsoft.com/office/drawing/2010/main" w="9525">
                     <a:solidFill>
                       <a:srgbClr val="000000"/>
                     </a:solidFill>
@@ -10756,7 +10757,7 @@
               </a:ln>
               <a:extLst>
                 <a:ext uri="{91240B29-F687-4f45-9708-019B960494DF}">
-                  <a14:hiddenLine xmlns:a14="http://schemas.microsoft.com/office/drawing/2010/main" xmlns="" w="9525">
+                  <a14:hiddenLine xmlns="" xmlns:a14="http://schemas.microsoft.com/office/drawing/2010/main" w="9525">
                     <a:solidFill>
                       <a:srgbClr val="000000"/>
                     </a:solidFill>
@@ -10790,7 +10791,7 @@
               </a:ln>
               <a:extLst>
                 <a:ext uri="{91240B29-F687-4f45-9708-019B960494DF}">
-                  <a14:hiddenLine xmlns:a14="http://schemas.microsoft.com/office/drawing/2010/main" xmlns="" w="9525">
+                  <a14:hiddenLine xmlns="" xmlns:a14="http://schemas.microsoft.com/office/drawing/2010/main" w="9525">
                     <a:solidFill>
                       <a:srgbClr val="000000"/>
                     </a:solidFill>
@@ -10855,7 +10856,7 @@
               </a:ln>
               <a:extLst>
                 <a:ext uri="{91240B29-F687-4f45-9708-019B960494DF}">
-                  <a14:hiddenLine xmlns:a14="http://schemas.microsoft.com/office/drawing/2010/main" xmlns="" w="9525">
+                  <a14:hiddenLine xmlns="" xmlns:a14="http://schemas.microsoft.com/office/drawing/2010/main" w="9525">
                     <a:solidFill>
                       <a:srgbClr val="000000"/>
                     </a:solidFill>
@@ -10945,7 +10946,7 @@
               </a:ln>
               <a:extLst>
                 <a:ext uri="{91240B29-F687-4f45-9708-019B960494DF}">
-                  <a14:hiddenLine xmlns:a14="http://schemas.microsoft.com/office/drawing/2010/main" xmlns="" w="9525">
+                  <a14:hiddenLine xmlns="" xmlns:a14="http://schemas.microsoft.com/office/drawing/2010/main" w="9525">
                     <a:solidFill>
                       <a:srgbClr val="000000"/>
                     </a:solidFill>
@@ -11007,7 +11008,7 @@
               </a:ln>
               <a:extLst>
                 <a:ext uri="{91240B29-F687-4f45-9708-019B960494DF}">
-                  <a14:hiddenLine xmlns:a14="http://schemas.microsoft.com/office/drawing/2010/main" xmlns="" w="9525">
+                  <a14:hiddenLine xmlns="" xmlns:a14="http://schemas.microsoft.com/office/drawing/2010/main" w="9525">
                     <a:solidFill>
                       <a:srgbClr val="000000"/>
                     </a:solidFill>
@@ -11097,7 +11098,7 @@
               </a:ln>
               <a:extLst>
                 <a:ext uri="{91240B29-F687-4f45-9708-019B960494DF}">
-                  <a14:hiddenLine xmlns:a14="http://schemas.microsoft.com/office/drawing/2010/main" xmlns="" w="9525">
+                  <a14:hiddenLine xmlns="" xmlns:a14="http://schemas.microsoft.com/office/drawing/2010/main" w="9525">
                     <a:solidFill>
                       <a:srgbClr val="000000"/>
                     </a:solidFill>
@@ -11162,7 +11163,7 @@
               </a:ln>
               <a:extLst>
                 <a:ext uri="{91240B29-F687-4f45-9708-019B960494DF}">
-                  <a14:hiddenLine xmlns:a14="http://schemas.microsoft.com/office/drawing/2010/main" xmlns="" w="9525">
+                  <a14:hiddenLine xmlns="" xmlns:a14="http://schemas.microsoft.com/office/drawing/2010/main" w="9525">
                     <a:solidFill>
                       <a:srgbClr val="000000"/>
                     </a:solidFill>
@@ -11224,7 +11225,7 @@
               </a:ln>
               <a:extLst>
                 <a:ext uri="{91240B29-F687-4f45-9708-019B960494DF}">
-                  <a14:hiddenLine xmlns:a14="http://schemas.microsoft.com/office/drawing/2010/main" xmlns="" w="9525">
+                  <a14:hiddenLine xmlns="" xmlns:a14="http://schemas.microsoft.com/office/drawing/2010/main" w="9525">
                     <a:solidFill>
                       <a:srgbClr val="000000"/>
                     </a:solidFill>
@@ -11314,7 +11315,7 @@
               </a:ln>
               <a:extLst>
                 <a:ext uri="{91240B29-F687-4f45-9708-019B960494DF}">
-                  <a14:hiddenLine xmlns:a14="http://schemas.microsoft.com/office/drawing/2010/main" xmlns="" w="9525">
+                  <a14:hiddenLine xmlns="" xmlns:a14="http://schemas.microsoft.com/office/drawing/2010/main" w="9525">
                     <a:solidFill>
                       <a:srgbClr val="000000"/>
                     </a:solidFill>
@@ -11404,7 +11405,7 @@
               </a:ln>
               <a:extLst>
                 <a:ext uri="{91240B29-F687-4f45-9708-019B960494DF}">
-                  <a14:hiddenLine xmlns:a14="http://schemas.microsoft.com/office/drawing/2010/main" xmlns="" w="9525">
+                  <a14:hiddenLine xmlns="" xmlns:a14="http://schemas.microsoft.com/office/drawing/2010/main" w="9525">
                     <a:solidFill>
                       <a:srgbClr val="000000"/>
                     </a:solidFill>
@@ -11469,7 +11470,7 @@
               </a:ln>
               <a:extLst>
                 <a:ext uri="{91240B29-F687-4f45-9708-019B960494DF}">
-                  <a14:hiddenLine xmlns:a14="http://schemas.microsoft.com/office/drawing/2010/main" xmlns="" w="9525">
+                  <a14:hiddenLine xmlns="" xmlns:a14="http://schemas.microsoft.com/office/drawing/2010/main" w="9525">
                     <a:solidFill>
                       <a:srgbClr val="000000"/>
                     </a:solidFill>
@@ -11589,7 +11590,7 @@
               </a:ln>
               <a:extLst>
                 <a:ext uri="{91240B29-F687-4f45-9708-019B960494DF}">
-                  <a14:hiddenLine xmlns:a14="http://schemas.microsoft.com/office/drawing/2010/main" xmlns="" w="9525">
+                  <a14:hiddenLine xmlns="" xmlns:a14="http://schemas.microsoft.com/office/drawing/2010/main" w="9525">
                     <a:solidFill>
                       <a:srgbClr val="000000"/>
                     </a:solidFill>
@@ -11670,7 +11671,7 @@
               </a:ln>
               <a:extLst>
                 <a:ext uri="{91240B29-F687-4f45-9708-019B960494DF}">
-                  <a14:hiddenLine xmlns:a14="http://schemas.microsoft.com/office/drawing/2010/main" xmlns="" w="9525">
+                  <a14:hiddenLine xmlns="" xmlns:a14="http://schemas.microsoft.com/office/drawing/2010/main" w="9525">
                     <a:solidFill>
                       <a:srgbClr val="000000"/>
                     </a:solidFill>
@@ -11785,7 +11786,7 @@
               </a:ln>
               <a:extLst>
                 <a:ext uri="{91240B29-F687-4f45-9708-019B960494DF}">
-                  <a14:hiddenLine xmlns:a14="http://schemas.microsoft.com/office/drawing/2010/main" xmlns="" w="9525">
+                  <a14:hiddenLine xmlns="" xmlns:a14="http://schemas.microsoft.com/office/drawing/2010/main" w="9525">
                     <a:solidFill>
                       <a:srgbClr val="000000"/>
                     </a:solidFill>
@@ -11875,7 +11876,7 @@
               </a:ln>
               <a:extLst>
                 <a:ext uri="{91240B29-F687-4f45-9708-019B960494DF}">
-                  <a14:hiddenLine xmlns:a14="http://schemas.microsoft.com/office/drawing/2010/main" xmlns="" w="9525">
+                  <a14:hiddenLine xmlns="" xmlns:a14="http://schemas.microsoft.com/office/drawing/2010/main" w="9525">
                     <a:solidFill>
                       <a:srgbClr val="000000"/>
                     </a:solidFill>
@@ -11940,7 +11941,7 @@
               </a:ln>
               <a:extLst>
                 <a:ext uri="{91240B29-F687-4f45-9708-019B960494DF}">
-                  <a14:hiddenLine xmlns:a14="http://schemas.microsoft.com/office/drawing/2010/main" xmlns="" w="9525">
+                  <a14:hiddenLine xmlns="" xmlns:a14="http://schemas.microsoft.com/office/drawing/2010/main" w="9525">
                     <a:solidFill>
                       <a:srgbClr val="000000"/>
                     </a:solidFill>
@@ -12030,7 +12031,7 @@
               </a:ln>
               <a:extLst>
                 <a:ext uri="{91240B29-F687-4f45-9708-019B960494DF}">
-                  <a14:hiddenLine xmlns:a14="http://schemas.microsoft.com/office/drawing/2010/main" xmlns="" w="9525">
+                  <a14:hiddenLine xmlns="" xmlns:a14="http://schemas.microsoft.com/office/drawing/2010/main" w="9525">
                     <a:solidFill>
                       <a:srgbClr val="000000"/>
                     </a:solidFill>
@@ -12098,7 +12099,7 @@
               </a:ln>
               <a:extLst>
                 <a:ext uri="{91240B29-F687-4f45-9708-019B960494DF}">
-                  <a14:hiddenLine xmlns:a14="http://schemas.microsoft.com/office/drawing/2010/main" xmlns="" w="9525">
+                  <a14:hiddenLine xmlns="" xmlns:a14="http://schemas.microsoft.com/office/drawing/2010/main" w="9525">
                     <a:solidFill>
                       <a:srgbClr val="000000"/>
                     </a:solidFill>
@@ -12188,7 +12189,7 @@
               </a:ln>
               <a:extLst>
                 <a:ext uri="{91240B29-F687-4f45-9708-019B960494DF}">
-                  <a14:hiddenLine xmlns:a14="http://schemas.microsoft.com/office/drawing/2010/main" xmlns="" w="9525">
+                  <a14:hiddenLine xmlns="" xmlns:a14="http://schemas.microsoft.com/office/drawing/2010/main" w="9525">
                     <a:solidFill>
                       <a:srgbClr val="000000"/>
                     </a:solidFill>
@@ -12256,7 +12257,7 @@
               </a:ln>
               <a:extLst>
                 <a:ext uri="{91240B29-F687-4f45-9708-019B960494DF}">
-                  <a14:hiddenLine xmlns:a14="http://schemas.microsoft.com/office/drawing/2010/main" xmlns="" w="9525">
+                  <a14:hiddenLine xmlns="" xmlns:a14="http://schemas.microsoft.com/office/drawing/2010/main" w="9525">
                     <a:solidFill>
                       <a:srgbClr val="000000"/>
                     </a:solidFill>
@@ -12346,7 +12347,7 @@
               </a:ln>
               <a:extLst>
                 <a:ext uri="{91240B29-F687-4f45-9708-019B960494DF}">
-                  <a14:hiddenLine xmlns:a14="http://schemas.microsoft.com/office/drawing/2010/main" xmlns="" w="9525">
+                  <a14:hiddenLine xmlns="" xmlns:a14="http://schemas.microsoft.com/office/drawing/2010/main" w="9525">
                     <a:solidFill>
                       <a:srgbClr val="000000"/>
                     </a:solidFill>
@@ -12380,7 +12381,7 @@
               </a:ln>
               <a:extLst>
                 <a:ext uri="{91240B29-F687-4f45-9708-019B960494DF}">
-                  <a14:hiddenLine xmlns:a14="http://schemas.microsoft.com/office/drawing/2010/main" xmlns="" w="9525">
+                  <a14:hiddenLine xmlns="" xmlns:a14="http://schemas.microsoft.com/office/drawing/2010/main" w="9525">
                     <a:solidFill>
                       <a:srgbClr val="000000"/>
                     </a:solidFill>
@@ -13134,6 +13135,702 @@
 </p:sld>
 </file>
 
+<file path=ppt/slides/slide2.xml><?xml version="1.0" encoding="utf-8"?>
+<p:sld xmlns:a="http://schemas.openxmlformats.org/drawingml/2006/main" xmlns:r="http://schemas.openxmlformats.org/officeDocument/2006/relationships" xmlns:p="http://schemas.openxmlformats.org/presentationml/2006/main">
+  <p:cSld>
+    <p:spTree>
+      <p:nvGrpSpPr>
+        <p:cNvPr id="1" name=""/>
+        <p:cNvGrpSpPr/>
+        <p:nvPr/>
+      </p:nvGrpSpPr>
+      <p:grpSpPr>
+        <a:xfrm>
+          <a:off x="0" y="0"/>
+          <a:ext cx="0" cy="0"/>
+          <a:chOff x="0" y="0"/>
+          <a:chExt cx="0" cy="0"/>
+        </a:xfrm>
+      </p:grpSpPr>
+      <p:sp>
+        <p:nvSpPr>
+          <p:cNvPr id="2" name="Title 1"/>
+          <p:cNvSpPr>
+            <a:spLocks noGrp="1"/>
+          </p:cNvSpPr>
+          <p:nvPr>
+            <p:ph type="title"/>
+          </p:nvPr>
+        </p:nvSpPr>
+        <p:spPr>
+          <a:xfrm>
+            <a:off x="1233776" y="119754"/>
+            <a:ext cx="9905998" cy="1478570"/>
+          </a:xfrm>
+        </p:spPr>
+        <p:txBody>
+          <a:bodyPr/>
+          <a:lstStyle/>
+          <a:p>
+            <a:r>
+              <a:rPr lang="es-ES" dirty="0"/>
+              <a:t>Ejemplo de un sensor que se podría utilizar:</a:t>
+            </a:r>
+            <a:endParaRPr lang="en-US" dirty="0"/>
+          </a:p>
+        </p:txBody>
+      </p:sp>
+      <p:sp>
+        <p:nvSpPr>
+          <p:cNvPr id="3" name="Vertical Text Placeholder 2"/>
+          <p:cNvSpPr>
+            <a:spLocks noGrp="1"/>
+          </p:cNvSpPr>
+          <p:nvPr>
+            <p:ph type="body" orient="vert" idx="1"/>
+          </p:nvPr>
+        </p:nvSpPr>
+        <p:spPr>
+          <a:xfrm rot="16200000">
+            <a:off x="2600399" y="46755"/>
+            <a:ext cx="1902475" cy="4635721"/>
+          </a:xfrm>
+        </p:spPr>
+        <p:txBody>
+          <a:bodyPr>
+            <a:normAutofit lnSpcReduction="10000"/>
+          </a:bodyPr>
+          <a:lstStyle/>
+          <a:p>
+            <a:pPr marL="0" indent="0">
+              <a:buNone/>
+            </a:pPr>
+            <a:r>
+              <a:rPr lang="es-ES" dirty="0">
+                <a:solidFill>
+                  <a:schemeClr val="accent2">
+                    <a:lumMod val="75000"/>
+                  </a:schemeClr>
+                </a:solidFill>
+              </a:rPr>
+              <a:t>Sensores de polvo</a:t>
+            </a:r>
+            <a:r>
+              <a:rPr lang="es-ES" dirty="0"/>
+              <a:t>, </a:t>
+            </a:r>
+            <a:r>
+              <a:rPr lang="es-ES" dirty="0" smtClean="0"/>
+              <a:t>este tipo de sensores </a:t>
+            </a:r>
+            <a:r>
+              <a:rPr lang="es-ES" dirty="0"/>
+              <a:t>se utilizan para hacer un monitoreo de la calidad del aire</a:t>
+            </a:r>
+            <a:r>
+              <a:rPr lang="es-ES" dirty="0" smtClean="0"/>
+              <a:t>.</a:t>
+            </a:r>
+            <a:br>
+              <a:rPr lang="es-ES" dirty="0" smtClean="0"/>
+            </a:br>
+            <a:endParaRPr lang="es-ES" dirty="0" smtClean="0"/>
+          </a:p>
+          <a:p>
+            <a:pPr marL="0" indent="0">
+              <a:buNone/>
+            </a:pPr>
+            <a:endParaRPr lang="en-US" dirty="0"/>
+          </a:p>
+        </p:txBody>
+      </p:sp>
+      <p:pic>
+        <p:nvPicPr>
+          <p:cNvPr id="5" name="Picture 4"/>
+          <p:cNvPicPr>
+            <a:picLocks noChangeAspect="1"/>
+          </p:cNvPicPr>
+          <p:nvPr/>
+        </p:nvPicPr>
+        <p:blipFill>
+          <a:blip r:embed="rId2"/>
+          <a:stretch>
+            <a:fillRect/>
+          </a:stretch>
+        </p:blipFill>
+        <p:spPr>
+          <a:xfrm>
+            <a:off x="949758" y="2766395"/>
+            <a:ext cx="1787236" cy="1787236"/>
+          </a:xfrm>
+          <a:prstGeom prst="rect">
+            <a:avLst/>
+          </a:prstGeom>
+        </p:spPr>
+      </p:pic>
+      <p:sp>
+        <p:nvSpPr>
+          <p:cNvPr id="6" name="Vertical Text Placeholder 2"/>
+          <p:cNvSpPr txBox="1">
+            <a:spLocks/>
+          </p:cNvSpPr>
+          <p:nvPr/>
+        </p:nvSpPr>
+        <p:spPr>
+          <a:xfrm rot="16200000">
+            <a:off x="7629351" y="801244"/>
+            <a:ext cx="2230369" cy="4521211"/>
+          </a:xfrm>
+          <a:prstGeom prst="rect">
+            <a:avLst/>
+          </a:prstGeom>
+        </p:spPr>
+        <p:txBody>
+          <a:bodyPr vert="eaVert" lIns="91440" tIns="45720" rIns="91440" bIns="45720" rtlCol="0" anchor="t">
+            <a:normAutofit fontScale="77500" lnSpcReduction="20000"/>
+          </a:bodyPr>
+          <a:lstStyle>
+            <a:lvl1pPr marL="228600" indent="-228600" algn="l" defTabSz="914400" rtl="0" eaLnBrk="1" latinLnBrk="0" hangingPunct="1">
+              <a:lnSpc>
+                <a:spcPct val="120000"/>
+              </a:lnSpc>
+              <a:spcBef>
+                <a:spcPts val="1000"/>
+              </a:spcBef>
+              <a:buSzPct val="125000"/>
+              <a:buFont typeface="Arial" panose="020B0604020202020204" pitchFamily="34" charset="0"/>
+              <a:buChar char="•"/>
+              <a:defRPr sz="2400" kern="1200">
+                <a:solidFill>
+                  <a:schemeClr val="tx1"/>
+                </a:solidFill>
+                <a:latin typeface="+mn-lt"/>
+                <a:ea typeface="+mn-ea"/>
+                <a:cs typeface="+mn-cs"/>
+              </a:defRPr>
+            </a:lvl1pPr>
+            <a:lvl2pPr marL="685800" indent="-228600" algn="l" defTabSz="914400" rtl="0" eaLnBrk="1" latinLnBrk="0" hangingPunct="1">
+              <a:lnSpc>
+                <a:spcPct val="120000"/>
+              </a:lnSpc>
+              <a:spcBef>
+                <a:spcPts val="500"/>
+              </a:spcBef>
+              <a:buSzPct val="125000"/>
+              <a:buFont typeface="Arial" panose="020B0604020202020204" pitchFamily="34" charset="0"/>
+              <a:buChar char="•"/>
+              <a:defRPr sz="2000" kern="1200">
+                <a:solidFill>
+                  <a:schemeClr val="tx1"/>
+                </a:solidFill>
+                <a:latin typeface="+mn-lt"/>
+                <a:ea typeface="+mn-ea"/>
+                <a:cs typeface="+mn-cs"/>
+              </a:defRPr>
+            </a:lvl2pPr>
+            <a:lvl3pPr marL="1143000" indent="-228600" algn="l" defTabSz="914400" rtl="0" eaLnBrk="1" latinLnBrk="0" hangingPunct="1">
+              <a:lnSpc>
+                <a:spcPct val="120000"/>
+              </a:lnSpc>
+              <a:spcBef>
+                <a:spcPts val="500"/>
+              </a:spcBef>
+              <a:buSzPct val="125000"/>
+              <a:buFont typeface="Arial" panose="020B0604020202020204" pitchFamily="34" charset="0"/>
+              <a:buChar char="•"/>
+              <a:defRPr sz="1800" kern="1200">
+                <a:solidFill>
+                  <a:schemeClr val="tx1"/>
+                </a:solidFill>
+                <a:latin typeface="+mn-lt"/>
+                <a:ea typeface="+mn-ea"/>
+                <a:cs typeface="+mn-cs"/>
+              </a:defRPr>
+            </a:lvl3pPr>
+            <a:lvl4pPr marL="1600200" indent="-228600" algn="l" defTabSz="914400" rtl="0" eaLnBrk="1" latinLnBrk="0" hangingPunct="1">
+              <a:lnSpc>
+                <a:spcPct val="120000"/>
+              </a:lnSpc>
+              <a:spcBef>
+                <a:spcPts val="500"/>
+              </a:spcBef>
+              <a:buSzPct val="125000"/>
+              <a:buFont typeface="Arial" panose="020B0604020202020204" pitchFamily="34" charset="0"/>
+              <a:buChar char="•"/>
+              <a:defRPr sz="1600" kern="1200">
+                <a:solidFill>
+                  <a:schemeClr val="tx1"/>
+                </a:solidFill>
+                <a:latin typeface="+mn-lt"/>
+                <a:ea typeface="+mn-ea"/>
+                <a:cs typeface="+mn-cs"/>
+              </a:defRPr>
+            </a:lvl4pPr>
+            <a:lvl5pPr marL="2057400" indent="-228600" algn="l" defTabSz="914400" rtl="0" eaLnBrk="1" latinLnBrk="0" hangingPunct="1">
+              <a:lnSpc>
+                <a:spcPct val="120000"/>
+              </a:lnSpc>
+              <a:spcBef>
+                <a:spcPts val="500"/>
+              </a:spcBef>
+              <a:buSzPct val="125000"/>
+              <a:buFont typeface="Arial" panose="020B0604020202020204" pitchFamily="34" charset="0"/>
+              <a:buChar char="•"/>
+              <a:defRPr sz="1600" kern="1200">
+                <a:solidFill>
+                  <a:schemeClr val="tx1"/>
+                </a:solidFill>
+                <a:latin typeface="+mn-lt"/>
+                <a:ea typeface="+mn-ea"/>
+                <a:cs typeface="+mn-cs"/>
+              </a:defRPr>
+            </a:lvl5pPr>
+            <a:lvl6pPr marL="2514600" indent="-228600" algn="l" defTabSz="914400" rtl="0" eaLnBrk="1" latinLnBrk="0" hangingPunct="1">
+              <a:lnSpc>
+                <a:spcPct val="120000"/>
+              </a:lnSpc>
+              <a:spcBef>
+                <a:spcPts val="500"/>
+              </a:spcBef>
+              <a:buSzPct val="125000"/>
+              <a:buFont typeface="Arial" panose="020B0604020202020204" pitchFamily="34" charset="0"/>
+              <a:buChar char="•"/>
+              <a:defRPr sz="1400" kern="1200">
+                <a:solidFill>
+                  <a:schemeClr val="tx1"/>
+                </a:solidFill>
+                <a:latin typeface="+mn-lt"/>
+                <a:ea typeface="+mn-ea"/>
+                <a:cs typeface="+mn-cs"/>
+              </a:defRPr>
+            </a:lvl6pPr>
+            <a:lvl7pPr marL="2971800" indent="-228600" algn="l" defTabSz="914400" rtl="0" eaLnBrk="1" latinLnBrk="0" hangingPunct="1">
+              <a:lnSpc>
+                <a:spcPct val="120000"/>
+              </a:lnSpc>
+              <a:spcBef>
+                <a:spcPts val="500"/>
+              </a:spcBef>
+              <a:buSzPct val="125000"/>
+              <a:buFont typeface="Arial" panose="020B0604020202020204" pitchFamily="34" charset="0"/>
+              <a:buChar char="•"/>
+              <a:defRPr sz="1400" kern="1200">
+                <a:solidFill>
+                  <a:schemeClr val="tx1"/>
+                </a:solidFill>
+                <a:latin typeface="+mn-lt"/>
+                <a:ea typeface="+mn-ea"/>
+                <a:cs typeface="+mn-cs"/>
+              </a:defRPr>
+            </a:lvl7pPr>
+            <a:lvl8pPr marL="3429000" indent="-228600" algn="l" defTabSz="914400" rtl="0" eaLnBrk="1" latinLnBrk="0" hangingPunct="1">
+              <a:lnSpc>
+                <a:spcPct val="120000"/>
+              </a:lnSpc>
+              <a:spcBef>
+                <a:spcPts val="500"/>
+              </a:spcBef>
+              <a:buSzPct val="125000"/>
+              <a:buFont typeface="Arial" panose="020B0604020202020204" pitchFamily="34" charset="0"/>
+              <a:buChar char="•"/>
+              <a:defRPr sz="1400" kern="1200">
+                <a:solidFill>
+                  <a:schemeClr val="tx1"/>
+                </a:solidFill>
+                <a:latin typeface="+mn-lt"/>
+                <a:ea typeface="+mn-ea"/>
+                <a:cs typeface="+mn-cs"/>
+              </a:defRPr>
+            </a:lvl8pPr>
+            <a:lvl9pPr marL="3886200" indent="-228600" algn="l" defTabSz="914400" rtl="0" eaLnBrk="1" latinLnBrk="0" hangingPunct="1">
+              <a:lnSpc>
+                <a:spcPct val="120000"/>
+              </a:lnSpc>
+              <a:spcBef>
+                <a:spcPts val="500"/>
+              </a:spcBef>
+              <a:buSzPct val="125000"/>
+              <a:buFont typeface="Arial" panose="020B0604020202020204" pitchFamily="34" charset="0"/>
+              <a:buChar char="•"/>
+              <a:defRPr sz="1400" kern="1200">
+                <a:solidFill>
+                  <a:schemeClr val="tx1"/>
+                </a:solidFill>
+                <a:latin typeface="+mn-lt"/>
+                <a:ea typeface="+mn-ea"/>
+                <a:cs typeface="+mn-cs"/>
+              </a:defRPr>
+            </a:lvl9pPr>
+          </a:lstStyle>
+          <a:p>
+            <a:pPr marL="0" indent="0">
+              <a:buNone/>
+            </a:pPr>
+            <a:r>
+              <a:rPr lang="es-ES" dirty="0"/>
+              <a:t>Su funcionamiento es mediante el uso de un par de </a:t>
+            </a:r>
+            <a:r>
+              <a:rPr lang="es-ES" dirty="0">
+                <a:solidFill>
+                  <a:schemeClr val="accent2">
+                    <a:lumMod val="75000"/>
+                  </a:schemeClr>
+                </a:solidFill>
+              </a:rPr>
+              <a:t>diodos</a:t>
+            </a:r>
+            <a:r>
+              <a:rPr lang="es-ES" dirty="0"/>
+              <a:t> y un </a:t>
+            </a:r>
+            <a:r>
+              <a:rPr lang="es-ES" dirty="0">
+                <a:solidFill>
+                  <a:schemeClr val="accent2">
+                    <a:lumMod val="75000"/>
+                  </a:schemeClr>
+                </a:solidFill>
+              </a:rPr>
+              <a:t>fototransistor infrarrojo</a:t>
+            </a:r>
+            <a:r>
+              <a:rPr lang="es-ES" dirty="0"/>
+              <a:t> para detectar la luz que es reflejada por las partículas de polvo, estos pueden utilizar los patrones de la energía reflejada para distinguir entre el polvo del lugar y el humo. </a:t>
+            </a:r>
+            <a:r>
+              <a:rPr lang="es-ES" dirty="0" smtClean="0"/>
+              <a:t/>
+            </a:r>
+            <a:br>
+              <a:rPr lang="es-ES" dirty="0" smtClean="0"/>
+            </a:br>
+            <a:endParaRPr lang="es-ES" dirty="0" smtClean="0"/>
+          </a:p>
+          <a:p>
+            <a:pPr marL="0" indent="0">
+              <a:buFont typeface="Arial" panose="020B0604020202020204" pitchFamily="34" charset="0"/>
+              <a:buNone/>
+            </a:pPr>
+            <a:endParaRPr lang="en-US" dirty="0"/>
+          </a:p>
+        </p:txBody>
+      </p:sp>
+      <p:pic>
+        <p:nvPicPr>
+          <p:cNvPr id="7" name="Picture 6"/>
+          <p:cNvPicPr>
+            <a:picLocks noChangeAspect="1"/>
+          </p:cNvPicPr>
+          <p:nvPr/>
+        </p:nvPicPr>
+        <p:blipFill>
+          <a:blip r:embed="rId3"/>
+          <a:stretch>
+            <a:fillRect/>
+          </a:stretch>
+        </p:blipFill>
+        <p:spPr>
+          <a:xfrm>
+            <a:off x="7796192" y="4726374"/>
+            <a:ext cx="1666941" cy="1666941"/>
+          </a:xfrm>
+          <a:prstGeom prst="rect">
+            <a:avLst/>
+          </a:prstGeom>
+        </p:spPr>
+      </p:pic>
+      <p:pic>
+        <p:nvPicPr>
+          <p:cNvPr id="8" name="Picture 7"/>
+          <p:cNvPicPr>
+            <a:picLocks noChangeAspect="1"/>
+          </p:cNvPicPr>
+          <p:nvPr/>
+        </p:nvPicPr>
+        <p:blipFill>
+          <a:blip r:embed="rId4"/>
+          <a:stretch>
+            <a:fillRect/>
+          </a:stretch>
+        </p:blipFill>
+        <p:spPr>
+          <a:xfrm>
+            <a:off x="9556995" y="3892903"/>
+            <a:ext cx="1666941" cy="1666941"/>
+          </a:xfrm>
+          <a:prstGeom prst="rect">
+            <a:avLst/>
+          </a:prstGeom>
+        </p:spPr>
+      </p:pic>
+      <p:sp>
+        <p:nvSpPr>
+          <p:cNvPr id="9" name="Vertical Text Placeholder 2"/>
+          <p:cNvSpPr txBox="1">
+            <a:spLocks/>
+          </p:cNvSpPr>
+          <p:nvPr/>
+        </p:nvSpPr>
+        <p:spPr>
+          <a:xfrm rot="16200000">
+            <a:off x="4655491" y="3579671"/>
+            <a:ext cx="1902475" cy="4635721"/>
+          </a:xfrm>
+          <a:prstGeom prst="rect">
+            <a:avLst/>
+          </a:prstGeom>
+        </p:spPr>
+        <p:txBody>
+          <a:bodyPr vert="eaVert" lIns="91440" tIns="45720" rIns="91440" bIns="45720" rtlCol="0" anchor="t">
+            <a:normAutofit/>
+          </a:bodyPr>
+          <a:lstStyle>
+            <a:lvl1pPr marL="228600" indent="-228600" algn="l" defTabSz="914400" rtl="0" eaLnBrk="1" latinLnBrk="0" hangingPunct="1">
+              <a:lnSpc>
+                <a:spcPct val="120000"/>
+              </a:lnSpc>
+              <a:spcBef>
+                <a:spcPts val="1000"/>
+              </a:spcBef>
+              <a:buSzPct val="125000"/>
+              <a:buFont typeface="Arial" panose="020B0604020202020204" pitchFamily="34" charset="0"/>
+              <a:buChar char="•"/>
+              <a:defRPr sz="2400" kern="1200">
+                <a:solidFill>
+                  <a:schemeClr val="tx1"/>
+                </a:solidFill>
+                <a:latin typeface="+mn-lt"/>
+                <a:ea typeface="+mn-ea"/>
+                <a:cs typeface="+mn-cs"/>
+              </a:defRPr>
+            </a:lvl1pPr>
+            <a:lvl2pPr marL="685800" indent="-228600" algn="l" defTabSz="914400" rtl="0" eaLnBrk="1" latinLnBrk="0" hangingPunct="1">
+              <a:lnSpc>
+                <a:spcPct val="120000"/>
+              </a:lnSpc>
+              <a:spcBef>
+                <a:spcPts val="500"/>
+              </a:spcBef>
+              <a:buSzPct val="125000"/>
+              <a:buFont typeface="Arial" panose="020B0604020202020204" pitchFamily="34" charset="0"/>
+              <a:buChar char="•"/>
+              <a:defRPr sz="2000" kern="1200">
+                <a:solidFill>
+                  <a:schemeClr val="tx1"/>
+                </a:solidFill>
+                <a:latin typeface="+mn-lt"/>
+                <a:ea typeface="+mn-ea"/>
+                <a:cs typeface="+mn-cs"/>
+              </a:defRPr>
+            </a:lvl2pPr>
+            <a:lvl3pPr marL="1143000" indent="-228600" algn="l" defTabSz="914400" rtl="0" eaLnBrk="1" latinLnBrk="0" hangingPunct="1">
+              <a:lnSpc>
+                <a:spcPct val="120000"/>
+              </a:lnSpc>
+              <a:spcBef>
+                <a:spcPts val="500"/>
+              </a:spcBef>
+              <a:buSzPct val="125000"/>
+              <a:buFont typeface="Arial" panose="020B0604020202020204" pitchFamily="34" charset="0"/>
+              <a:buChar char="•"/>
+              <a:defRPr sz="1800" kern="1200">
+                <a:solidFill>
+                  <a:schemeClr val="tx1"/>
+                </a:solidFill>
+                <a:latin typeface="+mn-lt"/>
+                <a:ea typeface="+mn-ea"/>
+                <a:cs typeface="+mn-cs"/>
+              </a:defRPr>
+            </a:lvl3pPr>
+            <a:lvl4pPr marL="1600200" indent="-228600" algn="l" defTabSz="914400" rtl="0" eaLnBrk="1" latinLnBrk="0" hangingPunct="1">
+              <a:lnSpc>
+                <a:spcPct val="120000"/>
+              </a:lnSpc>
+              <a:spcBef>
+                <a:spcPts val="500"/>
+              </a:spcBef>
+              <a:buSzPct val="125000"/>
+              <a:buFont typeface="Arial" panose="020B0604020202020204" pitchFamily="34" charset="0"/>
+              <a:buChar char="•"/>
+              <a:defRPr sz="1600" kern="1200">
+                <a:solidFill>
+                  <a:schemeClr val="tx1"/>
+                </a:solidFill>
+                <a:latin typeface="+mn-lt"/>
+                <a:ea typeface="+mn-ea"/>
+                <a:cs typeface="+mn-cs"/>
+              </a:defRPr>
+            </a:lvl4pPr>
+            <a:lvl5pPr marL="2057400" indent="-228600" algn="l" defTabSz="914400" rtl="0" eaLnBrk="1" latinLnBrk="0" hangingPunct="1">
+              <a:lnSpc>
+                <a:spcPct val="120000"/>
+              </a:lnSpc>
+              <a:spcBef>
+                <a:spcPts val="500"/>
+              </a:spcBef>
+              <a:buSzPct val="125000"/>
+              <a:buFont typeface="Arial" panose="020B0604020202020204" pitchFamily="34" charset="0"/>
+              <a:buChar char="•"/>
+              <a:defRPr sz="1600" kern="1200">
+                <a:solidFill>
+                  <a:schemeClr val="tx1"/>
+                </a:solidFill>
+                <a:latin typeface="+mn-lt"/>
+                <a:ea typeface="+mn-ea"/>
+                <a:cs typeface="+mn-cs"/>
+              </a:defRPr>
+            </a:lvl5pPr>
+            <a:lvl6pPr marL="2514600" indent="-228600" algn="l" defTabSz="914400" rtl="0" eaLnBrk="1" latinLnBrk="0" hangingPunct="1">
+              <a:lnSpc>
+                <a:spcPct val="120000"/>
+              </a:lnSpc>
+              <a:spcBef>
+                <a:spcPts val="500"/>
+              </a:spcBef>
+              <a:buSzPct val="125000"/>
+              <a:buFont typeface="Arial" panose="020B0604020202020204" pitchFamily="34" charset="0"/>
+              <a:buChar char="•"/>
+              <a:defRPr sz="1400" kern="1200">
+                <a:solidFill>
+                  <a:schemeClr val="tx1"/>
+                </a:solidFill>
+                <a:latin typeface="+mn-lt"/>
+                <a:ea typeface="+mn-ea"/>
+                <a:cs typeface="+mn-cs"/>
+              </a:defRPr>
+            </a:lvl6pPr>
+            <a:lvl7pPr marL="2971800" indent="-228600" algn="l" defTabSz="914400" rtl="0" eaLnBrk="1" latinLnBrk="0" hangingPunct="1">
+              <a:lnSpc>
+                <a:spcPct val="120000"/>
+              </a:lnSpc>
+              <a:spcBef>
+                <a:spcPts val="500"/>
+              </a:spcBef>
+              <a:buSzPct val="125000"/>
+              <a:buFont typeface="Arial" panose="020B0604020202020204" pitchFamily="34" charset="0"/>
+              <a:buChar char="•"/>
+              <a:defRPr sz="1400" kern="1200">
+                <a:solidFill>
+                  <a:schemeClr val="tx1"/>
+                </a:solidFill>
+                <a:latin typeface="+mn-lt"/>
+                <a:ea typeface="+mn-ea"/>
+                <a:cs typeface="+mn-cs"/>
+              </a:defRPr>
+            </a:lvl7pPr>
+            <a:lvl8pPr marL="3429000" indent="-228600" algn="l" defTabSz="914400" rtl="0" eaLnBrk="1" latinLnBrk="0" hangingPunct="1">
+              <a:lnSpc>
+                <a:spcPct val="120000"/>
+              </a:lnSpc>
+              <a:spcBef>
+                <a:spcPts val="500"/>
+              </a:spcBef>
+              <a:buSzPct val="125000"/>
+              <a:buFont typeface="Arial" panose="020B0604020202020204" pitchFamily="34" charset="0"/>
+              <a:buChar char="•"/>
+              <a:defRPr sz="1400" kern="1200">
+                <a:solidFill>
+                  <a:schemeClr val="tx1"/>
+                </a:solidFill>
+                <a:latin typeface="+mn-lt"/>
+                <a:ea typeface="+mn-ea"/>
+                <a:cs typeface="+mn-cs"/>
+              </a:defRPr>
+            </a:lvl8pPr>
+            <a:lvl9pPr marL="3886200" indent="-228600" algn="l" defTabSz="914400" rtl="0" eaLnBrk="1" latinLnBrk="0" hangingPunct="1">
+              <a:lnSpc>
+                <a:spcPct val="120000"/>
+              </a:lnSpc>
+              <a:spcBef>
+                <a:spcPts val="500"/>
+              </a:spcBef>
+              <a:buSzPct val="125000"/>
+              <a:buFont typeface="Arial" panose="020B0604020202020204" pitchFamily="34" charset="0"/>
+              <a:buChar char="•"/>
+              <a:defRPr sz="1400" kern="1200">
+                <a:solidFill>
+                  <a:schemeClr val="tx1"/>
+                </a:solidFill>
+                <a:latin typeface="+mn-lt"/>
+                <a:ea typeface="+mn-ea"/>
+                <a:cs typeface="+mn-cs"/>
+              </a:defRPr>
+            </a:lvl9pPr>
+          </a:lstStyle>
+          <a:p>
+            <a:pPr marL="0" indent="0">
+              <a:buFont typeface="Arial" panose="020B0604020202020204" pitchFamily="34" charset="0"/>
+              <a:buNone/>
+            </a:pPr>
+            <a:r>
+              <a:rPr lang="es-ES" dirty="0" smtClean="0"/>
+              <a:t/>
+            </a:r>
+            <a:br>
+              <a:rPr lang="es-ES" dirty="0" smtClean="0"/>
+            </a:br>
+            <a:endParaRPr lang="es-ES" dirty="0" smtClean="0"/>
+          </a:p>
+          <a:p>
+            <a:pPr marL="0" indent="0">
+              <a:buFont typeface="Arial" panose="020B0604020202020204" pitchFamily="34" charset="0"/>
+              <a:buNone/>
+            </a:pPr>
+            <a:endParaRPr lang="en-US" dirty="0"/>
+          </a:p>
+        </p:txBody>
+      </p:sp>
+      <p:sp>
+        <p:nvSpPr>
+          <p:cNvPr id="10" name="Rectangle 9"/>
+          <p:cNvSpPr/>
+          <p:nvPr/>
+        </p:nvSpPr>
+        <p:spPr>
+          <a:xfrm>
+            <a:off x="1453157" y="5186494"/>
+            <a:ext cx="3671419" cy="1477328"/>
+          </a:xfrm>
+          <a:prstGeom prst="rect">
+            <a:avLst/>
+          </a:prstGeom>
+        </p:spPr>
+        <p:txBody>
+          <a:bodyPr wrap="square">
+            <a:spAutoFit/>
+          </a:bodyPr>
+          <a:lstStyle/>
+          <a:p>
+            <a:r>
+              <a:rPr lang="es-ES" dirty="0"/>
+              <a:t>Se </a:t>
+            </a:r>
+            <a:r>
+              <a:rPr lang="es-ES" dirty="0" smtClean="0"/>
+              <a:t>encuentran </a:t>
+            </a:r>
+            <a:r>
+              <a:rPr lang="es-ES" dirty="0"/>
+              <a:t>comúnmente en purificadores de aire, acondicionadores de aire y monitores, pero usualmente se utilizan como detectores de humo de cigarrillo.</a:t>
+            </a:r>
+            <a:endParaRPr lang="en-US" dirty="0"/>
+          </a:p>
+        </p:txBody>
+      </p:sp>
+    </p:spTree>
+    <p:extLst>
+      <p:ext uri="{BB962C8B-B14F-4D97-AF65-F5344CB8AC3E}">
+        <p14:creationId xmlns:p14="http://schemas.microsoft.com/office/powerpoint/2010/main" val="2012489219"/>
+      </p:ext>
+    </p:extLst>
+  </p:cSld>
+  <p:clrMapOvr>
+    <a:masterClrMapping/>
+  </p:clrMapOvr>
+</p:sld>
+</file>
+
 <file path=ppt/theme/theme1.xml><?xml version="1.0" encoding="utf-8"?>
 <a:theme xmlns:a="http://schemas.openxmlformats.org/drawingml/2006/main" name="Circuit">
   <a:themeElements>

</xml_diff>

<commit_message>
Ya estan mis referencias en la presentacion
</commit_message>
<xml_diff>
--- a/Proyecto Final CS.pptx
+++ b/Proyecto Final CS.pptx
@@ -7,6 +7,7 @@
   <p:sldIdLst>
     <p:sldId id="256" r:id="rId2"/>
     <p:sldId id="257" r:id="rId3"/>
+    <p:sldId id="258" r:id="rId4"/>
   </p:sldIdLst>
   <p:sldSz cx="12192000" cy="6858000"/>
   <p:notesSz cx="7772400" cy="10058400"/>
@@ -170,7 +171,7 @@
           <a:noFill/>
           <a:extLst>
             <a:ext uri="{909E8E84-426E-40dd-AFC4-6F175D3DCCD1}">
-              <a14:hiddenFill xmlns="" xmlns:a14="http://schemas.microsoft.com/office/drawing/2010/main">
+              <a14:hiddenFill xmlns:a14="http://schemas.microsoft.com/office/drawing/2010/main" xmlns="">
                 <a:solidFill>
                   <a:srgbClr val="FFFFFF"/>
                 </a:solidFill>
@@ -229,7 +230,7 @@
             </a:ln>
             <a:extLst>
               <a:ext uri="{91240B29-F687-4f45-9708-019B960494DF}">
-                <a14:hiddenLine xmlns="" xmlns:a14="http://schemas.microsoft.com/office/drawing/2010/main" w="9525">
+                <a14:hiddenLine xmlns:a14="http://schemas.microsoft.com/office/drawing/2010/main" xmlns="" w="9525">
                   <a:solidFill>
                     <a:srgbClr val="000000"/>
                   </a:solidFill>
@@ -319,7 +320,7 @@
             </a:ln>
             <a:extLst>
               <a:ext uri="{91240B29-F687-4f45-9708-019B960494DF}">
-                <a14:hiddenLine xmlns="" xmlns:a14="http://schemas.microsoft.com/office/drawing/2010/main" w="9525">
+                <a14:hiddenLine xmlns:a14="http://schemas.microsoft.com/office/drawing/2010/main" xmlns="" w="9525">
                   <a:solidFill>
                     <a:srgbClr val="000000"/>
                   </a:solidFill>
@@ -409,7 +410,7 @@
             </a:ln>
             <a:extLst>
               <a:ext uri="{91240B29-F687-4f45-9708-019B960494DF}">
-                <a14:hiddenLine xmlns="" xmlns:a14="http://schemas.microsoft.com/office/drawing/2010/main" w="9525">
+                <a14:hiddenLine xmlns:a14="http://schemas.microsoft.com/office/drawing/2010/main" xmlns="" w="9525">
                   <a:solidFill>
                     <a:srgbClr val="000000"/>
                   </a:solidFill>
@@ -443,7 +444,7 @@
             </a:ln>
             <a:extLst>
               <a:ext uri="{91240B29-F687-4f45-9708-019B960494DF}">
-                <a14:hiddenLine xmlns="" xmlns:a14="http://schemas.microsoft.com/office/drawing/2010/main" w="9525">
+                <a14:hiddenLine xmlns:a14="http://schemas.microsoft.com/office/drawing/2010/main" xmlns="" w="9525">
                   <a:solidFill>
                     <a:srgbClr val="000000"/>
                   </a:solidFill>
@@ -533,7 +534,7 @@
             </a:ln>
             <a:extLst>
               <a:ext uri="{91240B29-F687-4f45-9708-019B960494DF}">
-                <a14:hiddenLine xmlns="" xmlns:a14="http://schemas.microsoft.com/office/drawing/2010/main" w="9525">
+                <a14:hiddenLine xmlns:a14="http://schemas.microsoft.com/office/drawing/2010/main" xmlns="" w="9525">
                   <a:solidFill>
                     <a:srgbClr val="000000"/>
                   </a:solidFill>
@@ -595,7 +596,7 @@
             </a:ln>
             <a:extLst>
               <a:ext uri="{91240B29-F687-4f45-9708-019B960494DF}">
-                <a14:hiddenLine xmlns="" xmlns:a14="http://schemas.microsoft.com/office/drawing/2010/main" w="9525">
+                <a14:hiddenLine xmlns:a14="http://schemas.microsoft.com/office/drawing/2010/main" xmlns="" w="9525">
                   <a:solidFill>
                     <a:srgbClr val="000000"/>
                   </a:solidFill>
@@ -657,7 +658,7 @@
             </a:ln>
             <a:extLst>
               <a:ext uri="{91240B29-F687-4f45-9708-019B960494DF}">
-                <a14:hiddenLine xmlns="" xmlns:a14="http://schemas.microsoft.com/office/drawing/2010/main" w="9525">
+                <a14:hiddenLine xmlns:a14="http://schemas.microsoft.com/office/drawing/2010/main" xmlns="" w="9525">
                   <a:solidFill>
                     <a:srgbClr val="000000"/>
                   </a:solidFill>
@@ -747,7 +748,7 @@
             </a:ln>
             <a:extLst>
               <a:ext uri="{91240B29-F687-4f45-9708-019B960494DF}">
-                <a14:hiddenLine xmlns="" xmlns:a14="http://schemas.microsoft.com/office/drawing/2010/main" w="9525">
+                <a14:hiddenLine xmlns:a14="http://schemas.microsoft.com/office/drawing/2010/main" xmlns="" w="9525">
                   <a:solidFill>
                     <a:srgbClr val="000000"/>
                   </a:solidFill>
@@ -809,7 +810,7 @@
             </a:ln>
             <a:extLst>
               <a:ext uri="{91240B29-F687-4f45-9708-019B960494DF}">
-                <a14:hiddenLine xmlns="" xmlns:a14="http://schemas.microsoft.com/office/drawing/2010/main" w="9525">
+                <a14:hiddenLine xmlns:a14="http://schemas.microsoft.com/office/drawing/2010/main" xmlns="" w="9525">
                   <a:solidFill>
                     <a:srgbClr val="000000"/>
                   </a:solidFill>
@@ -871,7 +872,7 @@
             </a:ln>
             <a:extLst>
               <a:ext uri="{91240B29-F687-4f45-9708-019B960494DF}">
-                <a14:hiddenLine xmlns="" xmlns:a14="http://schemas.microsoft.com/office/drawing/2010/main" w="9525">
+                <a14:hiddenLine xmlns:a14="http://schemas.microsoft.com/office/drawing/2010/main" xmlns="" w="9525">
                   <a:solidFill>
                     <a:srgbClr val="000000"/>
                   </a:solidFill>
@@ -961,7 +962,7 @@
             </a:ln>
             <a:extLst>
               <a:ext uri="{91240B29-F687-4f45-9708-019B960494DF}">
-                <a14:hiddenLine xmlns="" xmlns:a14="http://schemas.microsoft.com/office/drawing/2010/main" w="9525">
+                <a14:hiddenLine xmlns:a14="http://schemas.microsoft.com/office/drawing/2010/main" xmlns="" w="9525">
                   <a:solidFill>
                     <a:srgbClr val="000000"/>
                   </a:solidFill>
@@ -1051,7 +1052,7 @@
             </a:ln>
             <a:extLst>
               <a:ext uri="{91240B29-F687-4f45-9708-019B960494DF}">
-                <a14:hiddenLine xmlns="" xmlns:a14="http://schemas.microsoft.com/office/drawing/2010/main" w="9525">
+                <a14:hiddenLine xmlns:a14="http://schemas.microsoft.com/office/drawing/2010/main" xmlns="" w="9525">
                   <a:solidFill>
                     <a:srgbClr val="000000"/>
                   </a:solidFill>
@@ -1113,7 +1114,7 @@
             </a:ln>
             <a:extLst>
               <a:ext uri="{91240B29-F687-4f45-9708-019B960494DF}">
-                <a14:hiddenLine xmlns="" xmlns:a14="http://schemas.microsoft.com/office/drawing/2010/main" w="9525">
+                <a14:hiddenLine xmlns:a14="http://schemas.microsoft.com/office/drawing/2010/main" xmlns="" w="9525">
                   <a:solidFill>
                     <a:srgbClr val="000000"/>
                   </a:solidFill>
@@ -1223,7 +1224,7 @@
             </a:ln>
             <a:extLst>
               <a:ext uri="{91240B29-F687-4f45-9708-019B960494DF}">
-                <a14:hiddenLine xmlns="" xmlns:a14="http://schemas.microsoft.com/office/drawing/2010/main" w="9525">
+                <a14:hiddenLine xmlns:a14="http://schemas.microsoft.com/office/drawing/2010/main" xmlns="" w="9525">
                   <a:solidFill>
                     <a:srgbClr val="000000"/>
                   </a:solidFill>
@@ -1285,7 +1286,7 @@
             </a:ln>
             <a:extLst>
               <a:ext uri="{91240B29-F687-4f45-9708-019B960494DF}">
-                <a14:hiddenLine xmlns="" xmlns:a14="http://schemas.microsoft.com/office/drawing/2010/main" w="9525">
+                <a14:hiddenLine xmlns:a14="http://schemas.microsoft.com/office/drawing/2010/main" xmlns="" w="9525">
                   <a:solidFill>
                     <a:srgbClr val="000000"/>
                   </a:solidFill>
@@ -1375,7 +1376,7 @@
             </a:ln>
             <a:extLst>
               <a:ext uri="{91240B29-F687-4f45-9708-019B960494DF}">
-                <a14:hiddenLine xmlns="" xmlns:a14="http://schemas.microsoft.com/office/drawing/2010/main" w="9525">
+                <a14:hiddenLine xmlns:a14="http://schemas.microsoft.com/office/drawing/2010/main" xmlns="" w="9525">
                   <a:solidFill>
                     <a:srgbClr val="000000"/>
                   </a:solidFill>
@@ -1465,7 +1466,7 @@
             </a:ln>
             <a:extLst>
               <a:ext uri="{91240B29-F687-4f45-9708-019B960494DF}">
-                <a14:hiddenLine xmlns="" xmlns:a14="http://schemas.microsoft.com/office/drawing/2010/main" w="9525">
+                <a14:hiddenLine xmlns:a14="http://schemas.microsoft.com/office/drawing/2010/main" xmlns="" w="9525">
                   <a:solidFill>
                     <a:srgbClr val="000000"/>
                   </a:solidFill>
@@ -1527,7 +1528,7 @@
             </a:ln>
             <a:extLst>
               <a:ext uri="{91240B29-F687-4f45-9708-019B960494DF}">
-                <a14:hiddenLine xmlns="" xmlns:a14="http://schemas.microsoft.com/office/drawing/2010/main" w="9525">
+                <a14:hiddenLine xmlns:a14="http://schemas.microsoft.com/office/drawing/2010/main" xmlns="" w="9525">
                   <a:solidFill>
                     <a:srgbClr val="000000"/>
                   </a:solidFill>
@@ -1617,7 +1618,7 @@
             </a:ln>
             <a:extLst>
               <a:ext uri="{91240B29-F687-4f45-9708-019B960494DF}">
-                <a14:hiddenLine xmlns="" xmlns:a14="http://schemas.microsoft.com/office/drawing/2010/main" w="9525">
+                <a14:hiddenLine xmlns:a14="http://schemas.microsoft.com/office/drawing/2010/main" xmlns="" w="9525">
                   <a:solidFill>
                     <a:srgbClr val="000000"/>
                   </a:solidFill>
@@ -1707,7 +1708,7 @@
             </a:ln>
             <a:extLst>
               <a:ext uri="{91240B29-F687-4f45-9708-019B960494DF}">
-                <a14:hiddenLine xmlns="" xmlns:a14="http://schemas.microsoft.com/office/drawing/2010/main" w="9525">
+                <a14:hiddenLine xmlns:a14="http://schemas.microsoft.com/office/drawing/2010/main" xmlns="" w="9525">
                   <a:solidFill>
                     <a:srgbClr val="000000"/>
                   </a:solidFill>
@@ -1763,7 +1764,7 @@
             </a:ln>
             <a:extLst>
               <a:ext uri="{91240B29-F687-4f45-9708-019B960494DF}">
-                <a14:hiddenLine xmlns="" xmlns:a14="http://schemas.microsoft.com/office/drawing/2010/main" w="9525">
+                <a14:hiddenLine xmlns:a14="http://schemas.microsoft.com/office/drawing/2010/main" xmlns="" w="9525">
                   <a:solidFill>
                     <a:srgbClr val="000000"/>
                   </a:solidFill>
@@ -1853,7 +1854,7 @@
             </a:ln>
             <a:extLst>
               <a:ext uri="{91240B29-F687-4f45-9708-019B960494DF}">
-                <a14:hiddenLine xmlns="" xmlns:a14="http://schemas.microsoft.com/office/drawing/2010/main" w="9525">
+                <a14:hiddenLine xmlns:a14="http://schemas.microsoft.com/office/drawing/2010/main" xmlns="" w="9525">
                   <a:solidFill>
                     <a:srgbClr val="000000"/>
                   </a:solidFill>
@@ -1909,7 +1910,7 @@
             </a:ln>
             <a:extLst>
               <a:ext uri="{91240B29-F687-4f45-9708-019B960494DF}">
-                <a14:hiddenLine xmlns="" xmlns:a14="http://schemas.microsoft.com/office/drawing/2010/main" w="9525">
+                <a14:hiddenLine xmlns:a14="http://schemas.microsoft.com/office/drawing/2010/main" xmlns="" w="9525">
                   <a:solidFill>
                     <a:srgbClr val="000000"/>
                   </a:solidFill>
@@ -1999,7 +2000,7 @@
             </a:ln>
             <a:extLst>
               <a:ext uri="{91240B29-F687-4f45-9708-019B960494DF}">
-                <a14:hiddenLine xmlns="" xmlns:a14="http://schemas.microsoft.com/office/drawing/2010/main" w="9525">
+                <a14:hiddenLine xmlns:a14="http://schemas.microsoft.com/office/drawing/2010/main" xmlns="" w="9525">
                   <a:solidFill>
                     <a:srgbClr val="000000"/>
                   </a:solidFill>
@@ -2067,7 +2068,7 @@
             </a:ln>
             <a:extLst>
               <a:ext uri="{91240B29-F687-4f45-9708-019B960494DF}">
-                <a14:hiddenLine xmlns="" xmlns:a14="http://schemas.microsoft.com/office/drawing/2010/main" w="9525">
+                <a14:hiddenLine xmlns:a14="http://schemas.microsoft.com/office/drawing/2010/main" xmlns="" w="9525">
                   <a:solidFill>
                     <a:srgbClr val="000000"/>
                   </a:solidFill>
@@ -2157,7 +2158,7 @@
             </a:ln>
             <a:extLst>
               <a:ext uri="{91240B29-F687-4f45-9708-019B960494DF}">
-                <a14:hiddenLine xmlns="" xmlns:a14="http://schemas.microsoft.com/office/drawing/2010/main" w="9525">
+                <a14:hiddenLine xmlns:a14="http://schemas.microsoft.com/office/drawing/2010/main" xmlns="" w="9525">
                   <a:solidFill>
                     <a:srgbClr val="000000"/>
                   </a:solidFill>
@@ -2225,7 +2226,7 @@
             </a:ln>
             <a:extLst>
               <a:ext uri="{91240B29-F687-4f45-9708-019B960494DF}">
-                <a14:hiddenLine xmlns="" xmlns:a14="http://schemas.microsoft.com/office/drawing/2010/main" w="9525">
+                <a14:hiddenLine xmlns:a14="http://schemas.microsoft.com/office/drawing/2010/main" xmlns="" w="9525">
                   <a:solidFill>
                     <a:srgbClr val="000000"/>
                   </a:solidFill>
@@ -2315,7 +2316,7 @@
             </a:ln>
             <a:extLst>
               <a:ext uri="{91240B29-F687-4f45-9708-019B960494DF}">
-                <a14:hiddenLine xmlns="" xmlns:a14="http://schemas.microsoft.com/office/drawing/2010/main" w="9525">
+                <a14:hiddenLine xmlns:a14="http://schemas.microsoft.com/office/drawing/2010/main" xmlns="" w="9525">
                   <a:solidFill>
                     <a:srgbClr val="000000"/>
                   </a:solidFill>
@@ -2349,7 +2350,7 @@
             </a:ln>
             <a:extLst>
               <a:ext uri="{91240B29-F687-4f45-9708-019B960494DF}">
-                <a14:hiddenLine xmlns="" xmlns:a14="http://schemas.microsoft.com/office/drawing/2010/main" w="9525">
+                <a14:hiddenLine xmlns:a14="http://schemas.microsoft.com/office/drawing/2010/main" xmlns="" w="9525">
                   <a:solidFill>
                     <a:srgbClr val="000000"/>
                   </a:solidFill>
@@ -2439,7 +2440,7 @@
             </a:ln>
             <a:extLst>
               <a:ext uri="{91240B29-F687-4f45-9708-019B960494DF}">
-                <a14:hiddenLine xmlns="" xmlns:a14="http://schemas.microsoft.com/office/drawing/2010/main" w="9525">
+                <a14:hiddenLine xmlns:a14="http://schemas.microsoft.com/office/drawing/2010/main" xmlns="" w="9525">
                   <a:solidFill>
                     <a:srgbClr val="000000"/>
                   </a:solidFill>
@@ -2501,7 +2502,7 @@
             </a:ln>
             <a:extLst>
               <a:ext uri="{91240B29-F687-4f45-9708-019B960494DF}">
-                <a14:hiddenLine xmlns="" xmlns:a14="http://schemas.microsoft.com/office/drawing/2010/main" w="9525">
+                <a14:hiddenLine xmlns:a14="http://schemas.microsoft.com/office/drawing/2010/main" xmlns="" w="9525">
                   <a:solidFill>
                     <a:srgbClr val="000000"/>
                   </a:solidFill>
@@ -2563,7 +2564,7 @@
             </a:ln>
             <a:extLst>
               <a:ext uri="{91240B29-F687-4f45-9708-019B960494DF}">
-                <a14:hiddenLine xmlns="" xmlns:a14="http://schemas.microsoft.com/office/drawing/2010/main" w="9525">
+                <a14:hiddenLine xmlns:a14="http://schemas.microsoft.com/office/drawing/2010/main" xmlns="" w="9525">
                   <a:solidFill>
                     <a:srgbClr val="000000"/>
                   </a:solidFill>
@@ -2653,7 +2654,7 @@
             </a:ln>
             <a:extLst>
               <a:ext uri="{91240B29-F687-4f45-9708-019B960494DF}">
-                <a14:hiddenLine xmlns="" xmlns:a14="http://schemas.microsoft.com/office/drawing/2010/main" w="9525">
+                <a14:hiddenLine xmlns:a14="http://schemas.microsoft.com/office/drawing/2010/main" xmlns="" w="9525">
                   <a:solidFill>
                     <a:srgbClr val="000000"/>
                   </a:solidFill>
@@ -2721,7 +2722,7 @@
             </a:ln>
             <a:extLst>
               <a:ext uri="{91240B29-F687-4f45-9708-019B960494DF}">
-                <a14:hiddenLine xmlns="" xmlns:a14="http://schemas.microsoft.com/office/drawing/2010/main" w="9525">
+                <a14:hiddenLine xmlns:a14="http://schemas.microsoft.com/office/drawing/2010/main" xmlns="" w="9525">
                   <a:solidFill>
                     <a:srgbClr val="000000"/>
                   </a:solidFill>
@@ -2783,7 +2784,7 @@
             </a:ln>
             <a:extLst>
               <a:ext uri="{91240B29-F687-4f45-9708-019B960494DF}">
-                <a14:hiddenLine xmlns="" xmlns:a14="http://schemas.microsoft.com/office/drawing/2010/main" w="9525">
+                <a14:hiddenLine xmlns:a14="http://schemas.microsoft.com/office/drawing/2010/main" xmlns="" w="9525">
                   <a:solidFill>
                     <a:srgbClr val="000000"/>
                   </a:solidFill>
@@ -2873,7 +2874,7 @@
             </a:ln>
             <a:extLst>
               <a:ext uri="{91240B29-F687-4f45-9708-019B960494DF}">
-                <a14:hiddenLine xmlns="" xmlns:a14="http://schemas.microsoft.com/office/drawing/2010/main" w="9525">
+                <a14:hiddenLine xmlns:a14="http://schemas.microsoft.com/office/drawing/2010/main" xmlns="" w="9525">
                   <a:solidFill>
                     <a:srgbClr val="000000"/>
                   </a:solidFill>
@@ -2935,7 +2936,7 @@
             </a:ln>
             <a:extLst>
               <a:ext uri="{91240B29-F687-4f45-9708-019B960494DF}">
-                <a14:hiddenLine xmlns="" xmlns:a14="http://schemas.microsoft.com/office/drawing/2010/main" w="9525">
+                <a14:hiddenLine xmlns:a14="http://schemas.microsoft.com/office/drawing/2010/main" xmlns="" w="9525">
                   <a:solidFill>
                     <a:srgbClr val="000000"/>
                   </a:solidFill>
@@ -3025,7 +3026,7 @@
             </a:ln>
             <a:extLst>
               <a:ext uri="{91240B29-F687-4f45-9708-019B960494DF}">
-                <a14:hiddenLine xmlns="" xmlns:a14="http://schemas.microsoft.com/office/drawing/2010/main" w="9525">
+                <a14:hiddenLine xmlns:a14="http://schemas.microsoft.com/office/drawing/2010/main" xmlns="" w="9525">
                   <a:solidFill>
                     <a:srgbClr val="000000"/>
                   </a:solidFill>
@@ -3087,7 +3088,7 @@
             </a:ln>
             <a:extLst>
               <a:ext uri="{91240B29-F687-4f45-9708-019B960494DF}">
-                <a14:hiddenLine xmlns="" xmlns:a14="http://schemas.microsoft.com/office/drawing/2010/main" w="9525">
+                <a14:hiddenLine xmlns:a14="http://schemas.microsoft.com/office/drawing/2010/main" xmlns="" w="9525">
                   <a:solidFill>
                     <a:srgbClr val="000000"/>
                   </a:solidFill>
@@ -3177,7 +3178,7 @@
             </a:ln>
             <a:extLst>
               <a:ext uri="{91240B29-F687-4f45-9708-019B960494DF}">
-                <a14:hiddenLine xmlns="" xmlns:a14="http://schemas.microsoft.com/office/drawing/2010/main" w="9525">
+                <a14:hiddenLine xmlns:a14="http://schemas.microsoft.com/office/drawing/2010/main" xmlns="" w="9525">
                   <a:solidFill>
                     <a:srgbClr val="000000"/>
                   </a:solidFill>
@@ -3211,7 +3212,7 @@
             </a:ln>
             <a:extLst>
               <a:ext uri="{91240B29-F687-4f45-9708-019B960494DF}">
-                <a14:hiddenLine xmlns="" xmlns:a14="http://schemas.microsoft.com/office/drawing/2010/main" w="9525">
+                <a14:hiddenLine xmlns:a14="http://schemas.microsoft.com/office/drawing/2010/main" xmlns="" w="9525">
                   <a:solidFill>
                     <a:srgbClr val="000000"/>
                   </a:solidFill>
@@ -3276,7 +3277,7 @@
             </a:ln>
             <a:extLst>
               <a:ext uri="{91240B29-F687-4f45-9708-019B960494DF}">
-                <a14:hiddenLine xmlns="" xmlns:a14="http://schemas.microsoft.com/office/drawing/2010/main" w="9525">
+                <a14:hiddenLine xmlns:a14="http://schemas.microsoft.com/office/drawing/2010/main" xmlns="" w="9525">
                   <a:solidFill>
                     <a:srgbClr val="000000"/>
                   </a:solidFill>
@@ -3366,7 +3367,7 @@
             </a:ln>
             <a:extLst>
               <a:ext uri="{91240B29-F687-4f45-9708-019B960494DF}">
-                <a14:hiddenLine xmlns="" xmlns:a14="http://schemas.microsoft.com/office/drawing/2010/main" w="9525">
+                <a14:hiddenLine xmlns:a14="http://schemas.microsoft.com/office/drawing/2010/main" xmlns="" w="9525">
                   <a:solidFill>
                     <a:srgbClr val="000000"/>
                   </a:solidFill>
@@ -3428,7 +3429,7 @@
             </a:ln>
             <a:extLst>
               <a:ext uri="{91240B29-F687-4f45-9708-019B960494DF}">
-                <a14:hiddenLine xmlns="" xmlns:a14="http://schemas.microsoft.com/office/drawing/2010/main" w="9525">
+                <a14:hiddenLine xmlns:a14="http://schemas.microsoft.com/office/drawing/2010/main" xmlns="" w="9525">
                   <a:solidFill>
                     <a:srgbClr val="000000"/>
                   </a:solidFill>
@@ -3518,7 +3519,7 @@
             </a:ln>
             <a:extLst>
               <a:ext uri="{91240B29-F687-4f45-9708-019B960494DF}">
-                <a14:hiddenLine xmlns="" xmlns:a14="http://schemas.microsoft.com/office/drawing/2010/main" w="9525">
+                <a14:hiddenLine xmlns:a14="http://schemas.microsoft.com/office/drawing/2010/main" xmlns="" w="9525">
                   <a:solidFill>
                     <a:srgbClr val="000000"/>
                   </a:solidFill>
@@ -3608,7 +3609,7 @@
             </a:ln>
             <a:extLst>
               <a:ext uri="{91240B29-F687-4f45-9708-019B960494DF}">
-                <a14:hiddenLine xmlns="" xmlns:a14="http://schemas.microsoft.com/office/drawing/2010/main" w="9525">
+                <a14:hiddenLine xmlns:a14="http://schemas.microsoft.com/office/drawing/2010/main" xmlns="" w="9525">
                   <a:solidFill>
                     <a:srgbClr val="000000"/>
                   </a:solidFill>
@@ -3673,7 +3674,7 @@
             </a:ln>
             <a:extLst>
               <a:ext uri="{91240B29-F687-4f45-9708-019B960494DF}">
-                <a14:hiddenLine xmlns="" xmlns:a14="http://schemas.microsoft.com/office/drawing/2010/main" w="9525">
+                <a14:hiddenLine xmlns:a14="http://schemas.microsoft.com/office/drawing/2010/main" xmlns="" w="9525">
                   <a:solidFill>
                     <a:srgbClr val="000000"/>
                   </a:solidFill>
@@ -3735,7 +3736,7 @@
             </a:ln>
             <a:extLst>
               <a:ext uri="{91240B29-F687-4f45-9708-019B960494DF}">
-                <a14:hiddenLine xmlns="" xmlns:a14="http://schemas.microsoft.com/office/drawing/2010/main" w="9525">
+                <a14:hiddenLine xmlns:a14="http://schemas.microsoft.com/office/drawing/2010/main" xmlns="" w="9525">
                   <a:solidFill>
                     <a:srgbClr val="000000"/>
                   </a:solidFill>
@@ -3825,7 +3826,7 @@
             </a:ln>
             <a:extLst>
               <a:ext uri="{91240B29-F687-4f45-9708-019B960494DF}">
-                <a14:hiddenLine xmlns="" xmlns:a14="http://schemas.microsoft.com/office/drawing/2010/main" w="9525">
+                <a14:hiddenLine xmlns:a14="http://schemas.microsoft.com/office/drawing/2010/main" xmlns="" w="9525">
                   <a:solidFill>
                     <a:srgbClr val="000000"/>
                   </a:solidFill>
@@ -3915,7 +3916,7 @@
             </a:ln>
             <a:extLst>
               <a:ext uri="{91240B29-F687-4f45-9708-019B960494DF}">
-                <a14:hiddenLine xmlns="" xmlns:a14="http://schemas.microsoft.com/office/drawing/2010/main" w="9525">
+                <a14:hiddenLine xmlns:a14="http://schemas.microsoft.com/office/drawing/2010/main" xmlns="" w="9525">
                   <a:solidFill>
                     <a:srgbClr val="000000"/>
                   </a:solidFill>
@@ -3977,7 +3978,7 @@
             </a:ln>
             <a:extLst>
               <a:ext uri="{91240B29-F687-4f45-9708-019B960494DF}">
-                <a14:hiddenLine xmlns="" xmlns:a14="http://schemas.microsoft.com/office/drawing/2010/main" w="9525">
+                <a14:hiddenLine xmlns:a14="http://schemas.microsoft.com/office/drawing/2010/main" xmlns="" w="9525">
                   <a:solidFill>
                     <a:srgbClr val="000000"/>
                   </a:solidFill>
@@ -4097,7 +4098,7 @@
             </a:ln>
             <a:extLst>
               <a:ext uri="{91240B29-F687-4f45-9708-019B960494DF}">
-                <a14:hiddenLine xmlns="" xmlns:a14="http://schemas.microsoft.com/office/drawing/2010/main" w="9525">
+                <a14:hiddenLine xmlns:a14="http://schemas.microsoft.com/office/drawing/2010/main" xmlns="" w="9525">
                   <a:solidFill>
                     <a:srgbClr val="000000"/>
                   </a:solidFill>
@@ -4165,7 +4166,7 @@
             </a:ln>
             <a:extLst>
               <a:ext uri="{91240B29-F687-4f45-9708-019B960494DF}">
-                <a14:hiddenLine xmlns="" xmlns:a14="http://schemas.microsoft.com/office/drawing/2010/main" w="9525">
+                <a14:hiddenLine xmlns:a14="http://schemas.microsoft.com/office/drawing/2010/main" xmlns="" w="9525">
                   <a:solidFill>
                     <a:srgbClr val="000000"/>
                   </a:solidFill>
@@ -4255,7 +4256,7 @@
             </a:ln>
             <a:extLst>
               <a:ext uri="{91240B29-F687-4f45-9708-019B960494DF}">
-                <a14:hiddenLine xmlns="" xmlns:a14="http://schemas.microsoft.com/office/drawing/2010/main" w="9525">
+                <a14:hiddenLine xmlns:a14="http://schemas.microsoft.com/office/drawing/2010/main" xmlns="" w="9525">
                   <a:solidFill>
                     <a:srgbClr val="000000"/>
                   </a:solidFill>
@@ -9577,7 +9578,7 @@
           <a:noFill/>
           <a:extLst>
             <a:ext uri="{909E8E84-426E-40dd-AFC4-6F175D3DCCD1}">
-              <a14:hiddenFill xmlns="" xmlns:a14="http://schemas.microsoft.com/office/drawing/2010/main">
+              <a14:hiddenFill xmlns:a14="http://schemas.microsoft.com/office/drawing/2010/main" xmlns="">
                 <a:solidFill>
                   <a:srgbClr val="FFFFFF"/>
                 </a:solidFill>
@@ -9651,7 +9652,7 @@
               </a:ln>
               <a:extLst>
                 <a:ext uri="{91240B29-F687-4f45-9708-019B960494DF}">
-                  <a14:hiddenLine xmlns="" xmlns:a14="http://schemas.microsoft.com/office/drawing/2010/main" w="9525">
+                  <a14:hiddenLine xmlns:a14="http://schemas.microsoft.com/office/drawing/2010/main" xmlns="" w="9525">
                     <a:solidFill>
                       <a:srgbClr val="000000"/>
                     </a:solidFill>
@@ -9741,7 +9742,7 @@
               </a:ln>
               <a:extLst>
                 <a:ext uri="{91240B29-F687-4f45-9708-019B960494DF}">
-                  <a14:hiddenLine xmlns="" xmlns:a14="http://schemas.microsoft.com/office/drawing/2010/main" w="9525">
+                  <a14:hiddenLine xmlns:a14="http://schemas.microsoft.com/office/drawing/2010/main" xmlns="" w="9525">
                     <a:solidFill>
                       <a:srgbClr val="000000"/>
                     </a:solidFill>
@@ -9831,7 +9832,7 @@
               </a:ln>
               <a:extLst>
                 <a:ext uri="{91240B29-F687-4f45-9708-019B960494DF}">
-                  <a14:hiddenLine xmlns="" xmlns:a14="http://schemas.microsoft.com/office/drawing/2010/main" w="9525">
+                  <a14:hiddenLine xmlns:a14="http://schemas.microsoft.com/office/drawing/2010/main" xmlns="" w="9525">
                     <a:solidFill>
                       <a:srgbClr val="000000"/>
                     </a:solidFill>
@@ -9893,7 +9894,7 @@
               </a:ln>
               <a:extLst>
                 <a:ext uri="{91240B29-F687-4f45-9708-019B960494DF}">
-                  <a14:hiddenLine xmlns="" xmlns:a14="http://schemas.microsoft.com/office/drawing/2010/main" w="9525">
+                  <a14:hiddenLine xmlns:a14="http://schemas.microsoft.com/office/drawing/2010/main" xmlns="" w="9525">
                     <a:solidFill>
                       <a:srgbClr val="000000"/>
                     </a:solidFill>
@@ -9983,7 +9984,7 @@
               </a:ln>
               <a:extLst>
                 <a:ext uri="{91240B29-F687-4f45-9708-019B960494DF}">
-                  <a14:hiddenLine xmlns="" xmlns:a14="http://schemas.microsoft.com/office/drawing/2010/main" w="9525">
+                  <a14:hiddenLine xmlns:a14="http://schemas.microsoft.com/office/drawing/2010/main" xmlns="" w="9525">
                     <a:solidFill>
                       <a:srgbClr val="000000"/>
                     </a:solidFill>
@@ -10045,7 +10046,7 @@
               </a:ln>
               <a:extLst>
                 <a:ext uri="{91240B29-F687-4f45-9708-019B960494DF}">
-                  <a14:hiddenLine xmlns="" xmlns:a14="http://schemas.microsoft.com/office/drawing/2010/main" w="9525">
+                  <a14:hiddenLine xmlns:a14="http://schemas.microsoft.com/office/drawing/2010/main" xmlns="" w="9525">
                     <a:solidFill>
                       <a:srgbClr val="000000"/>
                     </a:solidFill>
@@ -10107,7 +10108,7 @@
               </a:ln>
               <a:extLst>
                 <a:ext uri="{91240B29-F687-4f45-9708-019B960494DF}">
-                  <a14:hiddenLine xmlns="" xmlns:a14="http://schemas.microsoft.com/office/drawing/2010/main" w="9525">
+                  <a14:hiddenLine xmlns:a14="http://schemas.microsoft.com/office/drawing/2010/main" xmlns="" w="9525">
                     <a:solidFill>
                       <a:srgbClr val="000000"/>
                     </a:solidFill>
@@ -10197,7 +10198,7 @@
               </a:ln>
               <a:extLst>
                 <a:ext uri="{91240B29-F687-4f45-9708-019B960494DF}">
-                  <a14:hiddenLine xmlns="" xmlns:a14="http://schemas.microsoft.com/office/drawing/2010/main" w="9525">
+                  <a14:hiddenLine xmlns:a14="http://schemas.microsoft.com/office/drawing/2010/main" xmlns="" w="9525">
                     <a:solidFill>
                       <a:srgbClr val="000000"/>
                     </a:solidFill>
@@ -10287,7 +10288,7 @@
               </a:ln>
               <a:extLst>
                 <a:ext uri="{91240B29-F687-4f45-9708-019B960494DF}">
-                  <a14:hiddenLine xmlns="" xmlns:a14="http://schemas.microsoft.com/office/drawing/2010/main" w="9525">
+                  <a14:hiddenLine xmlns:a14="http://schemas.microsoft.com/office/drawing/2010/main" xmlns="" w="9525">
                     <a:solidFill>
                       <a:srgbClr val="000000"/>
                     </a:solidFill>
@@ -10349,7 +10350,7 @@
               </a:ln>
               <a:extLst>
                 <a:ext uri="{91240B29-F687-4f45-9708-019B960494DF}">
-                  <a14:hiddenLine xmlns="" xmlns:a14="http://schemas.microsoft.com/office/drawing/2010/main" w="9525">
+                  <a14:hiddenLine xmlns:a14="http://schemas.microsoft.com/office/drawing/2010/main" xmlns="" w="9525">
                     <a:solidFill>
                       <a:srgbClr val="000000"/>
                     </a:solidFill>
@@ -10459,7 +10460,7 @@
               </a:ln>
               <a:extLst>
                 <a:ext uri="{91240B29-F687-4f45-9708-019B960494DF}">
-                  <a14:hiddenLine xmlns="" xmlns:a14="http://schemas.microsoft.com/office/drawing/2010/main" w="9525">
+                  <a14:hiddenLine xmlns:a14="http://schemas.microsoft.com/office/drawing/2010/main" xmlns="" w="9525">
                     <a:solidFill>
                       <a:srgbClr val="000000"/>
                     </a:solidFill>
@@ -10543,7 +10544,7 @@
               </a:ln>
               <a:extLst>
                 <a:ext uri="{91240B29-F687-4f45-9708-019B960494DF}">
-                  <a14:hiddenLine xmlns="" xmlns:a14="http://schemas.microsoft.com/office/drawing/2010/main" w="9525">
+                  <a14:hiddenLine xmlns:a14="http://schemas.microsoft.com/office/drawing/2010/main" xmlns="" w="9525">
                     <a:solidFill>
                       <a:srgbClr val="000000"/>
                     </a:solidFill>
@@ -10605,7 +10606,7 @@
               </a:ln>
               <a:extLst>
                 <a:ext uri="{91240B29-F687-4f45-9708-019B960494DF}">
-                  <a14:hiddenLine xmlns="" xmlns:a14="http://schemas.microsoft.com/office/drawing/2010/main" w="9525">
+                  <a14:hiddenLine xmlns:a14="http://schemas.microsoft.com/office/drawing/2010/main" xmlns="" w="9525">
                     <a:solidFill>
                       <a:srgbClr val="000000"/>
                     </a:solidFill>
@@ -10667,7 +10668,7 @@
               </a:ln>
               <a:extLst>
                 <a:ext uri="{91240B29-F687-4f45-9708-019B960494DF}">
-                  <a14:hiddenLine xmlns="" xmlns:a14="http://schemas.microsoft.com/office/drawing/2010/main" w="9525">
+                  <a14:hiddenLine xmlns:a14="http://schemas.microsoft.com/office/drawing/2010/main" xmlns="" w="9525">
                     <a:solidFill>
                       <a:srgbClr val="000000"/>
                     </a:solidFill>
@@ -10757,7 +10758,7 @@
               </a:ln>
               <a:extLst>
                 <a:ext uri="{91240B29-F687-4f45-9708-019B960494DF}">
-                  <a14:hiddenLine xmlns="" xmlns:a14="http://schemas.microsoft.com/office/drawing/2010/main" w="9525">
+                  <a14:hiddenLine xmlns:a14="http://schemas.microsoft.com/office/drawing/2010/main" xmlns="" w="9525">
                     <a:solidFill>
                       <a:srgbClr val="000000"/>
                     </a:solidFill>
@@ -10791,7 +10792,7 @@
               </a:ln>
               <a:extLst>
                 <a:ext uri="{91240B29-F687-4f45-9708-019B960494DF}">
-                  <a14:hiddenLine xmlns="" xmlns:a14="http://schemas.microsoft.com/office/drawing/2010/main" w="9525">
+                  <a14:hiddenLine xmlns:a14="http://schemas.microsoft.com/office/drawing/2010/main" xmlns="" w="9525">
                     <a:solidFill>
                       <a:srgbClr val="000000"/>
                     </a:solidFill>
@@ -10856,7 +10857,7 @@
               </a:ln>
               <a:extLst>
                 <a:ext uri="{91240B29-F687-4f45-9708-019B960494DF}">
-                  <a14:hiddenLine xmlns="" xmlns:a14="http://schemas.microsoft.com/office/drawing/2010/main" w="9525">
+                  <a14:hiddenLine xmlns:a14="http://schemas.microsoft.com/office/drawing/2010/main" xmlns="" w="9525">
                     <a:solidFill>
                       <a:srgbClr val="000000"/>
                     </a:solidFill>
@@ -10946,7 +10947,7 @@
               </a:ln>
               <a:extLst>
                 <a:ext uri="{91240B29-F687-4f45-9708-019B960494DF}">
-                  <a14:hiddenLine xmlns="" xmlns:a14="http://schemas.microsoft.com/office/drawing/2010/main" w="9525">
+                  <a14:hiddenLine xmlns:a14="http://schemas.microsoft.com/office/drawing/2010/main" xmlns="" w="9525">
                     <a:solidFill>
                       <a:srgbClr val="000000"/>
                     </a:solidFill>
@@ -11008,7 +11009,7 @@
               </a:ln>
               <a:extLst>
                 <a:ext uri="{91240B29-F687-4f45-9708-019B960494DF}">
-                  <a14:hiddenLine xmlns="" xmlns:a14="http://schemas.microsoft.com/office/drawing/2010/main" w="9525">
+                  <a14:hiddenLine xmlns:a14="http://schemas.microsoft.com/office/drawing/2010/main" xmlns="" w="9525">
                     <a:solidFill>
                       <a:srgbClr val="000000"/>
                     </a:solidFill>
@@ -11098,7 +11099,7 @@
               </a:ln>
               <a:extLst>
                 <a:ext uri="{91240B29-F687-4f45-9708-019B960494DF}">
-                  <a14:hiddenLine xmlns="" xmlns:a14="http://schemas.microsoft.com/office/drawing/2010/main" w="9525">
+                  <a14:hiddenLine xmlns:a14="http://schemas.microsoft.com/office/drawing/2010/main" xmlns="" w="9525">
                     <a:solidFill>
                       <a:srgbClr val="000000"/>
                     </a:solidFill>
@@ -11163,7 +11164,7 @@
               </a:ln>
               <a:extLst>
                 <a:ext uri="{91240B29-F687-4f45-9708-019B960494DF}">
-                  <a14:hiddenLine xmlns="" xmlns:a14="http://schemas.microsoft.com/office/drawing/2010/main" w="9525">
+                  <a14:hiddenLine xmlns:a14="http://schemas.microsoft.com/office/drawing/2010/main" xmlns="" w="9525">
                     <a:solidFill>
                       <a:srgbClr val="000000"/>
                     </a:solidFill>
@@ -11225,7 +11226,7 @@
               </a:ln>
               <a:extLst>
                 <a:ext uri="{91240B29-F687-4f45-9708-019B960494DF}">
-                  <a14:hiddenLine xmlns="" xmlns:a14="http://schemas.microsoft.com/office/drawing/2010/main" w="9525">
+                  <a14:hiddenLine xmlns:a14="http://schemas.microsoft.com/office/drawing/2010/main" xmlns="" w="9525">
                     <a:solidFill>
                       <a:srgbClr val="000000"/>
                     </a:solidFill>
@@ -11315,7 +11316,7 @@
               </a:ln>
               <a:extLst>
                 <a:ext uri="{91240B29-F687-4f45-9708-019B960494DF}">
-                  <a14:hiddenLine xmlns="" xmlns:a14="http://schemas.microsoft.com/office/drawing/2010/main" w="9525">
+                  <a14:hiddenLine xmlns:a14="http://schemas.microsoft.com/office/drawing/2010/main" xmlns="" w="9525">
                     <a:solidFill>
                       <a:srgbClr val="000000"/>
                     </a:solidFill>
@@ -11405,7 +11406,7 @@
               </a:ln>
               <a:extLst>
                 <a:ext uri="{91240B29-F687-4f45-9708-019B960494DF}">
-                  <a14:hiddenLine xmlns="" xmlns:a14="http://schemas.microsoft.com/office/drawing/2010/main" w="9525">
+                  <a14:hiddenLine xmlns:a14="http://schemas.microsoft.com/office/drawing/2010/main" xmlns="" w="9525">
                     <a:solidFill>
                       <a:srgbClr val="000000"/>
                     </a:solidFill>
@@ -11470,7 +11471,7 @@
               </a:ln>
               <a:extLst>
                 <a:ext uri="{91240B29-F687-4f45-9708-019B960494DF}">
-                  <a14:hiddenLine xmlns="" xmlns:a14="http://schemas.microsoft.com/office/drawing/2010/main" w="9525">
+                  <a14:hiddenLine xmlns:a14="http://schemas.microsoft.com/office/drawing/2010/main" xmlns="" w="9525">
                     <a:solidFill>
                       <a:srgbClr val="000000"/>
                     </a:solidFill>
@@ -11590,7 +11591,7 @@
               </a:ln>
               <a:extLst>
                 <a:ext uri="{91240B29-F687-4f45-9708-019B960494DF}">
-                  <a14:hiddenLine xmlns="" xmlns:a14="http://schemas.microsoft.com/office/drawing/2010/main" w="9525">
+                  <a14:hiddenLine xmlns:a14="http://schemas.microsoft.com/office/drawing/2010/main" xmlns="" w="9525">
                     <a:solidFill>
                       <a:srgbClr val="000000"/>
                     </a:solidFill>
@@ -11671,7 +11672,7 @@
               </a:ln>
               <a:extLst>
                 <a:ext uri="{91240B29-F687-4f45-9708-019B960494DF}">
-                  <a14:hiddenLine xmlns="" xmlns:a14="http://schemas.microsoft.com/office/drawing/2010/main" w="9525">
+                  <a14:hiddenLine xmlns:a14="http://schemas.microsoft.com/office/drawing/2010/main" xmlns="" w="9525">
                     <a:solidFill>
                       <a:srgbClr val="000000"/>
                     </a:solidFill>
@@ -11786,7 +11787,7 @@
               </a:ln>
               <a:extLst>
                 <a:ext uri="{91240B29-F687-4f45-9708-019B960494DF}">
-                  <a14:hiddenLine xmlns="" xmlns:a14="http://schemas.microsoft.com/office/drawing/2010/main" w="9525">
+                  <a14:hiddenLine xmlns:a14="http://schemas.microsoft.com/office/drawing/2010/main" xmlns="" w="9525">
                     <a:solidFill>
                       <a:srgbClr val="000000"/>
                     </a:solidFill>
@@ -11876,7 +11877,7 @@
               </a:ln>
               <a:extLst>
                 <a:ext uri="{91240B29-F687-4f45-9708-019B960494DF}">
-                  <a14:hiddenLine xmlns="" xmlns:a14="http://schemas.microsoft.com/office/drawing/2010/main" w="9525">
+                  <a14:hiddenLine xmlns:a14="http://schemas.microsoft.com/office/drawing/2010/main" xmlns="" w="9525">
                     <a:solidFill>
                       <a:srgbClr val="000000"/>
                     </a:solidFill>
@@ -11941,7 +11942,7 @@
               </a:ln>
               <a:extLst>
                 <a:ext uri="{91240B29-F687-4f45-9708-019B960494DF}">
-                  <a14:hiddenLine xmlns="" xmlns:a14="http://schemas.microsoft.com/office/drawing/2010/main" w="9525">
+                  <a14:hiddenLine xmlns:a14="http://schemas.microsoft.com/office/drawing/2010/main" xmlns="" w="9525">
                     <a:solidFill>
                       <a:srgbClr val="000000"/>
                     </a:solidFill>
@@ -12031,7 +12032,7 @@
               </a:ln>
               <a:extLst>
                 <a:ext uri="{91240B29-F687-4f45-9708-019B960494DF}">
-                  <a14:hiddenLine xmlns="" xmlns:a14="http://schemas.microsoft.com/office/drawing/2010/main" w="9525">
+                  <a14:hiddenLine xmlns:a14="http://schemas.microsoft.com/office/drawing/2010/main" xmlns="" w="9525">
                     <a:solidFill>
                       <a:srgbClr val="000000"/>
                     </a:solidFill>
@@ -12099,7 +12100,7 @@
               </a:ln>
               <a:extLst>
                 <a:ext uri="{91240B29-F687-4f45-9708-019B960494DF}">
-                  <a14:hiddenLine xmlns="" xmlns:a14="http://schemas.microsoft.com/office/drawing/2010/main" w="9525">
+                  <a14:hiddenLine xmlns:a14="http://schemas.microsoft.com/office/drawing/2010/main" xmlns="" w="9525">
                     <a:solidFill>
                       <a:srgbClr val="000000"/>
                     </a:solidFill>
@@ -12189,7 +12190,7 @@
               </a:ln>
               <a:extLst>
                 <a:ext uri="{91240B29-F687-4f45-9708-019B960494DF}">
-                  <a14:hiddenLine xmlns="" xmlns:a14="http://schemas.microsoft.com/office/drawing/2010/main" w="9525">
+                  <a14:hiddenLine xmlns:a14="http://schemas.microsoft.com/office/drawing/2010/main" xmlns="" w="9525">
                     <a:solidFill>
                       <a:srgbClr val="000000"/>
                     </a:solidFill>
@@ -12257,7 +12258,7 @@
               </a:ln>
               <a:extLst>
                 <a:ext uri="{91240B29-F687-4f45-9708-019B960494DF}">
-                  <a14:hiddenLine xmlns="" xmlns:a14="http://schemas.microsoft.com/office/drawing/2010/main" w="9525">
+                  <a14:hiddenLine xmlns:a14="http://schemas.microsoft.com/office/drawing/2010/main" xmlns="" w="9525">
                     <a:solidFill>
                       <a:srgbClr val="000000"/>
                     </a:solidFill>
@@ -12347,7 +12348,7 @@
               </a:ln>
               <a:extLst>
                 <a:ext uri="{91240B29-F687-4f45-9708-019B960494DF}">
-                  <a14:hiddenLine xmlns="" xmlns:a14="http://schemas.microsoft.com/office/drawing/2010/main" w="9525">
+                  <a14:hiddenLine xmlns:a14="http://schemas.microsoft.com/office/drawing/2010/main" xmlns="" w="9525">
                     <a:solidFill>
                       <a:srgbClr val="000000"/>
                     </a:solidFill>
@@ -12381,7 +12382,7 @@
               </a:ln>
               <a:extLst>
                 <a:ext uri="{91240B29-F687-4f45-9708-019B960494DF}">
-                  <a14:hiddenLine xmlns="" xmlns:a14="http://schemas.microsoft.com/office/drawing/2010/main" w="9525">
+                  <a14:hiddenLine xmlns:a14="http://schemas.microsoft.com/office/drawing/2010/main" xmlns="" w="9525">
                     <a:solidFill>
                       <a:srgbClr val="000000"/>
                     </a:solidFill>
@@ -13831,6 +13832,101 @@
 </p:sld>
 </file>
 
+<file path=ppt/slides/slide3.xml><?xml version="1.0" encoding="utf-8"?>
+<p:sld xmlns:a="http://schemas.openxmlformats.org/drawingml/2006/main" xmlns:r="http://schemas.openxmlformats.org/officeDocument/2006/relationships" xmlns:p="http://schemas.openxmlformats.org/presentationml/2006/main">
+  <p:cSld>
+    <p:spTree>
+      <p:nvGrpSpPr>
+        <p:cNvPr id="1" name=""/>
+        <p:cNvGrpSpPr/>
+        <p:nvPr/>
+      </p:nvGrpSpPr>
+      <p:grpSpPr>
+        <a:xfrm>
+          <a:off x="0" y="0"/>
+          <a:ext cx="0" cy="0"/>
+          <a:chOff x="0" y="0"/>
+          <a:chExt cx="0" cy="0"/>
+        </a:xfrm>
+      </p:grpSpPr>
+      <p:sp>
+        <p:nvSpPr>
+          <p:cNvPr id="2" name="Title 1"/>
+          <p:cNvSpPr>
+            <a:spLocks noGrp="1"/>
+          </p:cNvSpPr>
+          <p:nvPr>
+            <p:ph type="title"/>
+          </p:nvPr>
+        </p:nvSpPr>
+        <p:spPr/>
+        <p:txBody>
+          <a:bodyPr/>
+          <a:lstStyle/>
+          <a:p>
+            <a:r>
+              <a:rPr lang="en-US" dirty="0" err="1" smtClean="0"/>
+              <a:t>Referencias</a:t>
+            </a:r>
+            <a:endParaRPr lang="en-US" dirty="0"/>
+          </a:p>
+        </p:txBody>
+      </p:sp>
+      <p:sp>
+        <p:nvSpPr>
+          <p:cNvPr id="3" name="TextBox 2"/>
+          <p:cNvSpPr txBox="1"/>
+          <p:nvPr/>
+        </p:nvSpPr>
+        <p:spPr>
+          <a:xfrm>
+            <a:off x="1413164" y="2235200"/>
+            <a:ext cx="7379854" cy="923330"/>
+          </a:xfrm>
+          <a:prstGeom prst="rect">
+            <a:avLst/>
+          </a:prstGeom>
+          <a:noFill/>
+        </p:spPr>
+        <p:txBody>
+          <a:bodyPr wrap="square" rtlCol="0">
+            <a:spAutoFit/>
+          </a:bodyPr>
+          <a:lstStyle/>
+          <a:p>
+            <a:r>
+              <a:rPr lang="es-ES" dirty="0" smtClean="0"/>
+              <a:t>* Desconocido</a:t>
+            </a:r>
+            <a:r>
+              <a:rPr lang="es-ES" dirty="0"/>
+              <a:t>. (2021). Sensores de calidad de aire. 18/03/2021, de </a:t>
+            </a:r>
+            <a:r>
+              <a:rPr lang="es-ES" dirty="0" err="1"/>
+              <a:t>Arrow</a:t>
+            </a:r>
+            <a:r>
+              <a:rPr lang="es-ES" dirty="0"/>
+              <a:t> Sitio web: https://www.arrow.com/es-mx/categories/sensors/air-quality-sensors</a:t>
+            </a:r>
+            <a:endParaRPr lang="en-US" dirty="0"/>
+          </a:p>
+        </p:txBody>
+      </p:sp>
+    </p:spTree>
+    <p:extLst>
+      <p:ext uri="{BB962C8B-B14F-4D97-AF65-F5344CB8AC3E}">
+        <p14:creationId xmlns:p14="http://schemas.microsoft.com/office/powerpoint/2010/main" val="2001969038"/>
+      </p:ext>
+    </p:extLst>
+  </p:cSld>
+  <p:clrMapOvr>
+    <a:masterClrMapping/>
+  </p:clrMapOvr>
+</p:sld>
+</file>
+
 <file path=ppt/theme/theme1.xml><?xml version="1.0" encoding="utf-8"?>
 <a:theme xmlns:a="http://schemas.openxmlformats.org/drawingml/2006/main" name="Circuit">
   <a:themeElements>

</xml_diff>

<commit_message>
Agregue mi nombre y conclusión - Matheo
</commit_message>
<xml_diff>
--- a/Proyecto Final CS.pptx
+++ b/Proyecto Final CS.pptx
@@ -8,6 +8,7 @@
     <p:sldId id="256" r:id="rId2"/>
     <p:sldId id="257" r:id="rId3"/>
     <p:sldId id="258" r:id="rId4"/>
+    <p:sldId id="259" r:id="rId5"/>
   </p:sldIdLst>
   <p:sldSz cx="12192000" cy="6858000"/>
   <p:notesSz cx="7772400" cy="10058400"/>
@@ -171,7 +172,7 @@
           <a:noFill/>
           <a:extLst>
             <a:ext uri="{909E8E84-426E-40dd-AFC4-6F175D3DCCD1}">
-              <a14:hiddenFill xmlns:a14="http://schemas.microsoft.com/office/drawing/2010/main" xmlns="">
+              <a14:hiddenFill xmlns="" xmlns:a14="http://schemas.microsoft.com/office/drawing/2010/main">
                 <a:solidFill>
                   <a:srgbClr val="FFFFFF"/>
                 </a:solidFill>
@@ -230,7 +231,7 @@
             </a:ln>
             <a:extLst>
               <a:ext uri="{91240B29-F687-4f45-9708-019B960494DF}">
-                <a14:hiddenLine xmlns:a14="http://schemas.microsoft.com/office/drawing/2010/main" xmlns="" w="9525">
+                <a14:hiddenLine xmlns="" xmlns:a14="http://schemas.microsoft.com/office/drawing/2010/main" w="9525">
                   <a:solidFill>
                     <a:srgbClr val="000000"/>
                   </a:solidFill>
@@ -320,7 +321,7 @@
             </a:ln>
             <a:extLst>
               <a:ext uri="{91240B29-F687-4f45-9708-019B960494DF}">
-                <a14:hiddenLine xmlns:a14="http://schemas.microsoft.com/office/drawing/2010/main" xmlns="" w="9525">
+                <a14:hiddenLine xmlns="" xmlns:a14="http://schemas.microsoft.com/office/drawing/2010/main" w="9525">
                   <a:solidFill>
                     <a:srgbClr val="000000"/>
                   </a:solidFill>
@@ -410,7 +411,7 @@
             </a:ln>
             <a:extLst>
               <a:ext uri="{91240B29-F687-4f45-9708-019B960494DF}">
-                <a14:hiddenLine xmlns:a14="http://schemas.microsoft.com/office/drawing/2010/main" xmlns="" w="9525">
+                <a14:hiddenLine xmlns="" xmlns:a14="http://schemas.microsoft.com/office/drawing/2010/main" w="9525">
                   <a:solidFill>
                     <a:srgbClr val="000000"/>
                   </a:solidFill>
@@ -444,7 +445,7 @@
             </a:ln>
             <a:extLst>
               <a:ext uri="{91240B29-F687-4f45-9708-019B960494DF}">
-                <a14:hiddenLine xmlns:a14="http://schemas.microsoft.com/office/drawing/2010/main" xmlns="" w="9525">
+                <a14:hiddenLine xmlns="" xmlns:a14="http://schemas.microsoft.com/office/drawing/2010/main" w="9525">
                   <a:solidFill>
                     <a:srgbClr val="000000"/>
                   </a:solidFill>
@@ -534,7 +535,7 @@
             </a:ln>
             <a:extLst>
               <a:ext uri="{91240B29-F687-4f45-9708-019B960494DF}">
-                <a14:hiddenLine xmlns:a14="http://schemas.microsoft.com/office/drawing/2010/main" xmlns="" w="9525">
+                <a14:hiddenLine xmlns="" xmlns:a14="http://schemas.microsoft.com/office/drawing/2010/main" w="9525">
                   <a:solidFill>
                     <a:srgbClr val="000000"/>
                   </a:solidFill>
@@ -596,7 +597,7 @@
             </a:ln>
             <a:extLst>
               <a:ext uri="{91240B29-F687-4f45-9708-019B960494DF}">
-                <a14:hiddenLine xmlns:a14="http://schemas.microsoft.com/office/drawing/2010/main" xmlns="" w="9525">
+                <a14:hiddenLine xmlns="" xmlns:a14="http://schemas.microsoft.com/office/drawing/2010/main" w="9525">
                   <a:solidFill>
                     <a:srgbClr val="000000"/>
                   </a:solidFill>
@@ -658,7 +659,7 @@
             </a:ln>
             <a:extLst>
               <a:ext uri="{91240B29-F687-4f45-9708-019B960494DF}">
-                <a14:hiddenLine xmlns:a14="http://schemas.microsoft.com/office/drawing/2010/main" xmlns="" w="9525">
+                <a14:hiddenLine xmlns="" xmlns:a14="http://schemas.microsoft.com/office/drawing/2010/main" w="9525">
                   <a:solidFill>
                     <a:srgbClr val="000000"/>
                   </a:solidFill>
@@ -748,7 +749,7 @@
             </a:ln>
             <a:extLst>
               <a:ext uri="{91240B29-F687-4f45-9708-019B960494DF}">
-                <a14:hiddenLine xmlns:a14="http://schemas.microsoft.com/office/drawing/2010/main" xmlns="" w="9525">
+                <a14:hiddenLine xmlns="" xmlns:a14="http://schemas.microsoft.com/office/drawing/2010/main" w="9525">
                   <a:solidFill>
                     <a:srgbClr val="000000"/>
                   </a:solidFill>
@@ -810,7 +811,7 @@
             </a:ln>
             <a:extLst>
               <a:ext uri="{91240B29-F687-4f45-9708-019B960494DF}">
-                <a14:hiddenLine xmlns:a14="http://schemas.microsoft.com/office/drawing/2010/main" xmlns="" w="9525">
+                <a14:hiddenLine xmlns="" xmlns:a14="http://schemas.microsoft.com/office/drawing/2010/main" w="9525">
                   <a:solidFill>
                     <a:srgbClr val="000000"/>
                   </a:solidFill>
@@ -872,7 +873,7 @@
             </a:ln>
             <a:extLst>
               <a:ext uri="{91240B29-F687-4f45-9708-019B960494DF}">
-                <a14:hiddenLine xmlns:a14="http://schemas.microsoft.com/office/drawing/2010/main" xmlns="" w="9525">
+                <a14:hiddenLine xmlns="" xmlns:a14="http://schemas.microsoft.com/office/drawing/2010/main" w="9525">
                   <a:solidFill>
                     <a:srgbClr val="000000"/>
                   </a:solidFill>
@@ -962,7 +963,7 @@
             </a:ln>
             <a:extLst>
               <a:ext uri="{91240B29-F687-4f45-9708-019B960494DF}">
-                <a14:hiddenLine xmlns:a14="http://schemas.microsoft.com/office/drawing/2010/main" xmlns="" w="9525">
+                <a14:hiddenLine xmlns="" xmlns:a14="http://schemas.microsoft.com/office/drawing/2010/main" w="9525">
                   <a:solidFill>
                     <a:srgbClr val="000000"/>
                   </a:solidFill>
@@ -1052,7 +1053,7 @@
             </a:ln>
             <a:extLst>
               <a:ext uri="{91240B29-F687-4f45-9708-019B960494DF}">
-                <a14:hiddenLine xmlns:a14="http://schemas.microsoft.com/office/drawing/2010/main" xmlns="" w="9525">
+                <a14:hiddenLine xmlns="" xmlns:a14="http://schemas.microsoft.com/office/drawing/2010/main" w="9525">
                   <a:solidFill>
                     <a:srgbClr val="000000"/>
                   </a:solidFill>
@@ -1114,7 +1115,7 @@
             </a:ln>
             <a:extLst>
               <a:ext uri="{91240B29-F687-4f45-9708-019B960494DF}">
-                <a14:hiddenLine xmlns:a14="http://schemas.microsoft.com/office/drawing/2010/main" xmlns="" w="9525">
+                <a14:hiddenLine xmlns="" xmlns:a14="http://schemas.microsoft.com/office/drawing/2010/main" w="9525">
                   <a:solidFill>
                     <a:srgbClr val="000000"/>
                   </a:solidFill>
@@ -1224,7 +1225,7 @@
             </a:ln>
             <a:extLst>
               <a:ext uri="{91240B29-F687-4f45-9708-019B960494DF}">
-                <a14:hiddenLine xmlns:a14="http://schemas.microsoft.com/office/drawing/2010/main" xmlns="" w="9525">
+                <a14:hiddenLine xmlns="" xmlns:a14="http://schemas.microsoft.com/office/drawing/2010/main" w="9525">
                   <a:solidFill>
                     <a:srgbClr val="000000"/>
                   </a:solidFill>
@@ -1286,7 +1287,7 @@
             </a:ln>
             <a:extLst>
               <a:ext uri="{91240B29-F687-4f45-9708-019B960494DF}">
-                <a14:hiddenLine xmlns:a14="http://schemas.microsoft.com/office/drawing/2010/main" xmlns="" w="9525">
+                <a14:hiddenLine xmlns="" xmlns:a14="http://schemas.microsoft.com/office/drawing/2010/main" w="9525">
                   <a:solidFill>
                     <a:srgbClr val="000000"/>
                   </a:solidFill>
@@ -1376,7 +1377,7 @@
             </a:ln>
             <a:extLst>
               <a:ext uri="{91240B29-F687-4f45-9708-019B960494DF}">
-                <a14:hiddenLine xmlns:a14="http://schemas.microsoft.com/office/drawing/2010/main" xmlns="" w="9525">
+                <a14:hiddenLine xmlns="" xmlns:a14="http://schemas.microsoft.com/office/drawing/2010/main" w="9525">
                   <a:solidFill>
                     <a:srgbClr val="000000"/>
                   </a:solidFill>
@@ -1466,7 +1467,7 @@
             </a:ln>
             <a:extLst>
               <a:ext uri="{91240B29-F687-4f45-9708-019B960494DF}">
-                <a14:hiddenLine xmlns:a14="http://schemas.microsoft.com/office/drawing/2010/main" xmlns="" w="9525">
+                <a14:hiddenLine xmlns="" xmlns:a14="http://schemas.microsoft.com/office/drawing/2010/main" w="9525">
                   <a:solidFill>
                     <a:srgbClr val="000000"/>
                   </a:solidFill>
@@ -1528,7 +1529,7 @@
             </a:ln>
             <a:extLst>
               <a:ext uri="{91240B29-F687-4f45-9708-019B960494DF}">
-                <a14:hiddenLine xmlns:a14="http://schemas.microsoft.com/office/drawing/2010/main" xmlns="" w="9525">
+                <a14:hiddenLine xmlns="" xmlns:a14="http://schemas.microsoft.com/office/drawing/2010/main" w="9525">
                   <a:solidFill>
                     <a:srgbClr val="000000"/>
                   </a:solidFill>
@@ -1618,7 +1619,7 @@
             </a:ln>
             <a:extLst>
               <a:ext uri="{91240B29-F687-4f45-9708-019B960494DF}">
-                <a14:hiddenLine xmlns:a14="http://schemas.microsoft.com/office/drawing/2010/main" xmlns="" w="9525">
+                <a14:hiddenLine xmlns="" xmlns:a14="http://schemas.microsoft.com/office/drawing/2010/main" w="9525">
                   <a:solidFill>
                     <a:srgbClr val="000000"/>
                   </a:solidFill>
@@ -1708,7 +1709,7 @@
             </a:ln>
             <a:extLst>
               <a:ext uri="{91240B29-F687-4f45-9708-019B960494DF}">
-                <a14:hiddenLine xmlns:a14="http://schemas.microsoft.com/office/drawing/2010/main" xmlns="" w="9525">
+                <a14:hiddenLine xmlns="" xmlns:a14="http://schemas.microsoft.com/office/drawing/2010/main" w="9525">
                   <a:solidFill>
                     <a:srgbClr val="000000"/>
                   </a:solidFill>
@@ -1764,7 +1765,7 @@
             </a:ln>
             <a:extLst>
               <a:ext uri="{91240B29-F687-4f45-9708-019B960494DF}">
-                <a14:hiddenLine xmlns:a14="http://schemas.microsoft.com/office/drawing/2010/main" xmlns="" w="9525">
+                <a14:hiddenLine xmlns="" xmlns:a14="http://schemas.microsoft.com/office/drawing/2010/main" w="9525">
                   <a:solidFill>
                     <a:srgbClr val="000000"/>
                   </a:solidFill>
@@ -1854,7 +1855,7 @@
             </a:ln>
             <a:extLst>
               <a:ext uri="{91240B29-F687-4f45-9708-019B960494DF}">
-                <a14:hiddenLine xmlns:a14="http://schemas.microsoft.com/office/drawing/2010/main" xmlns="" w="9525">
+                <a14:hiddenLine xmlns="" xmlns:a14="http://schemas.microsoft.com/office/drawing/2010/main" w="9525">
                   <a:solidFill>
                     <a:srgbClr val="000000"/>
                   </a:solidFill>
@@ -1910,7 +1911,7 @@
             </a:ln>
             <a:extLst>
               <a:ext uri="{91240B29-F687-4f45-9708-019B960494DF}">
-                <a14:hiddenLine xmlns:a14="http://schemas.microsoft.com/office/drawing/2010/main" xmlns="" w="9525">
+                <a14:hiddenLine xmlns="" xmlns:a14="http://schemas.microsoft.com/office/drawing/2010/main" w="9525">
                   <a:solidFill>
                     <a:srgbClr val="000000"/>
                   </a:solidFill>
@@ -2000,7 +2001,7 @@
             </a:ln>
             <a:extLst>
               <a:ext uri="{91240B29-F687-4f45-9708-019B960494DF}">
-                <a14:hiddenLine xmlns:a14="http://schemas.microsoft.com/office/drawing/2010/main" xmlns="" w="9525">
+                <a14:hiddenLine xmlns="" xmlns:a14="http://schemas.microsoft.com/office/drawing/2010/main" w="9525">
                   <a:solidFill>
                     <a:srgbClr val="000000"/>
                   </a:solidFill>
@@ -2068,7 +2069,7 @@
             </a:ln>
             <a:extLst>
               <a:ext uri="{91240B29-F687-4f45-9708-019B960494DF}">
-                <a14:hiddenLine xmlns:a14="http://schemas.microsoft.com/office/drawing/2010/main" xmlns="" w="9525">
+                <a14:hiddenLine xmlns="" xmlns:a14="http://schemas.microsoft.com/office/drawing/2010/main" w="9525">
                   <a:solidFill>
                     <a:srgbClr val="000000"/>
                   </a:solidFill>
@@ -2158,7 +2159,7 @@
             </a:ln>
             <a:extLst>
               <a:ext uri="{91240B29-F687-4f45-9708-019B960494DF}">
-                <a14:hiddenLine xmlns:a14="http://schemas.microsoft.com/office/drawing/2010/main" xmlns="" w="9525">
+                <a14:hiddenLine xmlns="" xmlns:a14="http://schemas.microsoft.com/office/drawing/2010/main" w="9525">
                   <a:solidFill>
                     <a:srgbClr val="000000"/>
                   </a:solidFill>
@@ -2226,7 +2227,7 @@
             </a:ln>
             <a:extLst>
               <a:ext uri="{91240B29-F687-4f45-9708-019B960494DF}">
-                <a14:hiddenLine xmlns:a14="http://schemas.microsoft.com/office/drawing/2010/main" xmlns="" w="9525">
+                <a14:hiddenLine xmlns="" xmlns:a14="http://schemas.microsoft.com/office/drawing/2010/main" w="9525">
                   <a:solidFill>
                     <a:srgbClr val="000000"/>
                   </a:solidFill>
@@ -2316,7 +2317,7 @@
             </a:ln>
             <a:extLst>
               <a:ext uri="{91240B29-F687-4f45-9708-019B960494DF}">
-                <a14:hiddenLine xmlns:a14="http://schemas.microsoft.com/office/drawing/2010/main" xmlns="" w="9525">
+                <a14:hiddenLine xmlns="" xmlns:a14="http://schemas.microsoft.com/office/drawing/2010/main" w="9525">
                   <a:solidFill>
                     <a:srgbClr val="000000"/>
                   </a:solidFill>
@@ -2350,7 +2351,7 @@
             </a:ln>
             <a:extLst>
               <a:ext uri="{91240B29-F687-4f45-9708-019B960494DF}">
-                <a14:hiddenLine xmlns:a14="http://schemas.microsoft.com/office/drawing/2010/main" xmlns="" w="9525">
+                <a14:hiddenLine xmlns="" xmlns:a14="http://schemas.microsoft.com/office/drawing/2010/main" w="9525">
                   <a:solidFill>
                     <a:srgbClr val="000000"/>
                   </a:solidFill>
@@ -2440,7 +2441,7 @@
             </a:ln>
             <a:extLst>
               <a:ext uri="{91240B29-F687-4f45-9708-019B960494DF}">
-                <a14:hiddenLine xmlns:a14="http://schemas.microsoft.com/office/drawing/2010/main" xmlns="" w="9525">
+                <a14:hiddenLine xmlns="" xmlns:a14="http://schemas.microsoft.com/office/drawing/2010/main" w="9525">
                   <a:solidFill>
                     <a:srgbClr val="000000"/>
                   </a:solidFill>
@@ -2502,7 +2503,7 @@
             </a:ln>
             <a:extLst>
               <a:ext uri="{91240B29-F687-4f45-9708-019B960494DF}">
-                <a14:hiddenLine xmlns:a14="http://schemas.microsoft.com/office/drawing/2010/main" xmlns="" w="9525">
+                <a14:hiddenLine xmlns="" xmlns:a14="http://schemas.microsoft.com/office/drawing/2010/main" w="9525">
                   <a:solidFill>
                     <a:srgbClr val="000000"/>
                   </a:solidFill>
@@ -2564,7 +2565,7 @@
             </a:ln>
             <a:extLst>
               <a:ext uri="{91240B29-F687-4f45-9708-019B960494DF}">
-                <a14:hiddenLine xmlns:a14="http://schemas.microsoft.com/office/drawing/2010/main" xmlns="" w="9525">
+                <a14:hiddenLine xmlns="" xmlns:a14="http://schemas.microsoft.com/office/drawing/2010/main" w="9525">
                   <a:solidFill>
                     <a:srgbClr val="000000"/>
                   </a:solidFill>
@@ -2654,7 +2655,7 @@
             </a:ln>
             <a:extLst>
               <a:ext uri="{91240B29-F687-4f45-9708-019B960494DF}">
-                <a14:hiddenLine xmlns:a14="http://schemas.microsoft.com/office/drawing/2010/main" xmlns="" w="9525">
+                <a14:hiddenLine xmlns="" xmlns:a14="http://schemas.microsoft.com/office/drawing/2010/main" w="9525">
                   <a:solidFill>
                     <a:srgbClr val="000000"/>
                   </a:solidFill>
@@ -2722,7 +2723,7 @@
             </a:ln>
             <a:extLst>
               <a:ext uri="{91240B29-F687-4f45-9708-019B960494DF}">
-                <a14:hiddenLine xmlns:a14="http://schemas.microsoft.com/office/drawing/2010/main" xmlns="" w="9525">
+                <a14:hiddenLine xmlns="" xmlns:a14="http://schemas.microsoft.com/office/drawing/2010/main" w="9525">
                   <a:solidFill>
                     <a:srgbClr val="000000"/>
                   </a:solidFill>
@@ -2784,7 +2785,7 @@
             </a:ln>
             <a:extLst>
               <a:ext uri="{91240B29-F687-4f45-9708-019B960494DF}">
-                <a14:hiddenLine xmlns:a14="http://schemas.microsoft.com/office/drawing/2010/main" xmlns="" w="9525">
+                <a14:hiddenLine xmlns="" xmlns:a14="http://schemas.microsoft.com/office/drawing/2010/main" w="9525">
                   <a:solidFill>
                     <a:srgbClr val="000000"/>
                   </a:solidFill>
@@ -2874,7 +2875,7 @@
             </a:ln>
             <a:extLst>
               <a:ext uri="{91240B29-F687-4f45-9708-019B960494DF}">
-                <a14:hiddenLine xmlns:a14="http://schemas.microsoft.com/office/drawing/2010/main" xmlns="" w="9525">
+                <a14:hiddenLine xmlns="" xmlns:a14="http://schemas.microsoft.com/office/drawing/2010/main" w="9525">
                   <a:solidFill>
                     <a:srgbClr val="000000"/>
                   </a:solidFill>
@@ -2936,7 +2937,7 @@
             </a:ln>
             <a:extLst>
               <a:ext uri="{91240B29-F687-4f45-9708-019B960494DF}">
-                <a14:hiddenLine xmlns:a14="http://schemas.microsoft.com/office/drawing/2010/main" xmlns="" w="9525">
+                <a14:hiddenLine xmlns="" xmlns:a14="http://schemas.microsoft.com/office/drawing/2010/main" w="9525">
                   <a:solidFill>
                     <a:srgbClr val="000000"/>
                   </a:solidFill>
@@ -3026,7 +3027,7 @@
             </a:ln>
             <a:extLst>
               <a:ext uri="{91240B29-F687-4f45-9708-019B960494DF}">
-                <a14:hiddenLine xmlns:a14="http://schemas.microsoft.com/office/drawing/2010/main" xmlns="" w="9525">
+                <a14:hiddenLine xmlns="" xmlns:a14="http://schemas.microsoft.com/office/drawing/2010/main" w="9525">
                   <a:solidFill>
                     <a:srgbClr val="000000"/>
                   </a:solidFill>
@@ -3088,7 +3089,7 @@
             </a:ln>
             <a:extLst>
               <a:ext uri="{91240B29-F687-4f45-9708-019B960494DF}">
-                <a14:hiddenLine xmlns:a14="http://schemas.microsoft.com/office/drawing/2010/main" xmlns="" w="9525">
+                <a14:hiddenLine xmlns="" xmlns:a14="http://schemas.microsoft.com/office/drawing/2010/main" w="9525">
                   <a:solidFill>
                     <a:srgbClr val="000000"/>
                   </a:solidFill>
@@ -3178,7 +3179,7 @@
             </a:ln>
             <a:extLst>
               <a:ext uri="{91240B29-F687-4f45-9708-019B960494DF}">
-                <a14:hiddenLine xmlns:a14="http://schemas.microsoft.com/office/drawing/2010/main" xmlns="" w="9525">
+                <a14:hiddenLine xmlns="" xmlns:a14="http://schemas.microsoft.com/office/drawing/2010/main" w="9525">
                   <a:solidFill>
                     <a:srgbClr val="000000"/>
                   </a:solidFill>
@@ -3212,7 +3213,7 @@
             </a:ln>
             <a:extLst>
               <a:ext uri="{91240B29-F687-4f45-9708-019B960494DF}">
-                <a14:hiddenLine xmlns:a14="http://schemas.microsoft.com/office/drawing/2010/main" xmlns="" w="9525">
+                <a14:hiddenLine xmlns="" xmlns:a14="http://schemas.microsoft.com/office/drawing/2010/main" w="9525">
                   <a:solidFill>
                     <a:srgbClr val="000000"/>
                   </a:solidFill>
@@ -3277,7 +3278,7 @@
             </a:ln>
             <a:extLst>
               <a:ext uri="{91240B29-F687-4f45-9708-019B960494DF}">
-                <a14:hiddenLine xmlns:a14="http://schemas.microsoft.com/office/drawing/2010/main" xmlns="" w="9525">
+                <a14:hiddenLine xmlns="" xmlns:a14="http://schemas.microsoft.com/office/drawing/2010/main" w="9525">
                   <a:solidFill>
                     <a:srgbClr val="000000"/>
                   </a:solidFill>
@@ -3367,7 +3368,7 @@
             </a:ln>
             <a:extLst>
               <a:ext uri="{91240B29-F687-4f45-9708-019B960494DF}">
-                <a14:hiddenLine xmlns:a14="http://schemas.microsoft.com/office/drawing/2010/main" xmlns="" w="9525">
+                <a14:hiddenLine xmlns="" xmlns:a14="http://schemas.microsoft.com/office/drawing/2010/main" w="9525">
                   <a:solidFill>
                     <a:srgbClr val="000000"/>
                   </a:solidFill>
@@ -3429,7 +3430,7 @@
             </a:ln>
             <a:extLst>
               <a:ext uri="{91240B29-F687-4f45-9708-019B960494DF}">
-                <a14:hiddenLine xmlns:a14="http://schemas.microsoft.com/office/drawing/2010/main" xmlns="" w="9525">
+                <a14:hiddenLine xmlns="" xmlns:a14="http://schemas.microsoft.com/office/drawing/2010/main" w="9525">
                   <a:solidFill>
                     <a:srgbClr val="000000"/>
                   </a:solidFill>
@@ -3519,7 +3520,7 @@
             </a:ln>
             <a:extLst>
               <a:ext uri="{91240B29-F687-4f45-9708-019B960494DF}">
-                <a14:hiddenLine xmlns:a14="http://schemas.microsoft.com/office/drawing/2010/main" xmlns="" w="9525">
+                <a14:hiddenLine xmlns="" xmlns:a14="http://schemas.microsoft.com/office/drawing/2010/main" w="9525">
                   <a:solidFill>
                     <a:srgbClr val="000000"/>
                   </a:solidFill>
@@ -3609,7 +3610,7 @@
             </a:ln>
             <a:extLst>
               <a:ext uri="{91240B29-F687-4f45-9708-019B960494DF}">
-                <a14:hiddenLine xmlns:a14="http://schemas.microsoft.com/office/drawing/2010/main" xmlns="" w="9525">
+                <a14:hiddenLine xmlns="" xmlns:a14="http://schemas.microsoft.com/office/drawing/2010/main" w="9525">
                   <a:solidFill>
                     <a:srgbClr val="000000"/>
                   </a:solidFill>
@@ -3674,7 +3675,7 @@
             </a:ln>
             <a:extLst>
               <a:ext uri="{91240B29-F687-4f45-9708-019B960494DF}">
-                <a14:hiddenLine xmlns:a14="http://schemas.microsoft.com/office/drawing/2010/main" xmlns="" w="9525">
+                <a14:hiddenLine xmlns="" xmlns:a14="http://schemas.microsoft.com/office/drawing/2010/main" w="9525">
                   <a:solidFill>
                     <a:srgbClr val="000000"/>
                   </a:solidFill>
@@ -3736,7 +3737,7 @@
             </a:ln>
             <a:extLst>
               <a:ext uri="{91240B29-F687-4f45-9708-019B960494DF}">
-                <a14:hiddenLine xmlns:a14="http://schemas.microsoft.com/office/drawing/2010/main" xmlns="" w="9525">
+                <a14:hiddenLine xmlns="" xmlns:a14="http://schemas.microsoft.com/office/drawing/2010/main" w="9525">
                   <a:solidFill>
                     <a:srgbClr val="000000"/>
                   </a:solidFill>
@@ -3826,7 +3827,7 @@
             </a:ln>
             <a:extLst>
               <a:ext uri="{91240B29-F687-4f45-9708-019B960494DF}">
-                <a14:hiddenLine xmlns:a14="http://schemas.microsoft.com/office/drawing/2010/main" xmlns="" w="9525">
+                <a14:hiddenLine xmlns="" xmlns:a14="http://schemas.microsoft.com/office/drawing/2010/main" w="9525">
                   <a:solidFill>
                     <a:srgbClr val="000000"/>
                   </a:solidFill>
@@ -3916,7 +3917,7 @@
             </a:ln>
             <a:extLst>
               <a:ext uri="{91240B29-F687-4f45-9708-019B960494DF}">
-                <a14:hiddenLine xmlns:a14="http://schemas.microsoft.com/office/drawing/2010/main" xmlns="" w="9525">
+                <a14:hiddenLine xmlns="" xmlns:a14="http://schemas.microsoft.com/office/drawing/2010/main" w="9525">
                   <a:solidFill>
                     <a:srgbClr val="000000"/>
                   </a:solidFill>
@@ -3978,7 +3979,7 @@
             </a:ln>
             <a:extLst>
               <a:ext uri="{91240B29-F687-4f45-9708-019B960494DF}">
-                <a14:hiddenLine xmlns:a14="http://schemas.microsoft.com/office/drawing/2010/main" xmlns="" w="9525">
+                <a14:hiddenLine xmlns="" xmlns:a14="http://schemas.microsoft.com/office/drawing/2010/main" w="9525">
                   <a:solidFill>
                     <a:srgbClr val="000000"/>
                   </a:solidFill>
@@ -4098,7 +4099,7 @@
             </a:ln>
             <a:extLst>
               <a:ext uri="{91240B29-F687-4f45-9708-019B960494DF}">
-                <a14:hiddenLine xmlns:a14="http://schemas.microsoft.com/office/drawing/2010/main" xmlns="" w="9525">
+                <a14:hiddenLine xmlns="" xmlns:a14="http://schemas.microsoft.com/office/drawing/2010/main" w="9525">
                   <a:solidFill>
                     <a:srgbClr val="000000"/>
                   </a:solidFill>
@@ -4166,7 +4167,7 @@
             </a:ln>
             <a:extLst>
               <a:ext uri="{91240B29-F687-4f45-9708-019B960494DF}">
-                <a14:hiddenLine xmlns:a14="http://schemas.microsoft.com/office/drawing/2010/main" xmlns="" w="9525">
+                <a14:hiddenLine xmlns="" xmlns:a14="http://schemas.microsoft.com/office/drawing/2010/main" w="9525">
                   <a:solidFill>
                     <a:srgbClr val="000000"/>
                   </a:solidFill>
@@ -4256,7 +4257,7 @@
             </a:ln>
             <a:extLst>
               <a:ext uri="{91240B29-F687-4f45-9708-019B960494DF}">
-                <a14:hiddenLine xmlns:a14="http://schemas.microsoft.com/office/drawing/2010/main" xmlns="" w="9525">
+                <a14:hiddenLine xmlns="" xmlns:a14="http://schemas.microsoft.com/office/drawing/2010/main" w="9525">
                   <a:solidFill>
                     <a:srgbClr val="000000"/>
                   </a:solidFill>
@@ -4296,7 +4297,7 @@
           </a:lstStyle>
           <a:p>
             <a:r>
-              <a:rPr lang="en-US" smtClean="0"/>
+              <a:rPr lang="en-US"/>
               <a:t>Click to edit Master title style</a:t>
             </a:r>
             <a:endParaRPr lang="en-US" dirty="0"/>
@@ -4367,7 +4368,7 @@
           </a:lstStyle>
           <a:p>
             <a:r>
-              <a:rPr lang="en-US" smtClean="0"/>
+              <a:rPr lang="en-US"/>
               <a:t>Click to edit Master subtitle style</a:t>
             </a:r>
             <a:endParaRPr lang="en-US" dirty="0"/>
@@ -4472,7 +4473,7 @@
                 </a:solidFill>
                 <a:latin typeface="Calibri"/>
               </a:rPr>
-              <a:t>‹#›</a:t>
+              <a:t>‹Nº›</a:t>
             </a:fld>
             <a:endParaRPr lang="en-US" sz="1200" b="0" strike="noStrike" spc="-1">
               <a:latin typeface="Times New Roman"/>
@@ -4537,7 +4538,7 @@
           </a:lstStyle>
           <a:p>
             <a:r>
-              <a:rPr lang="en-US" smtClean="0"/>
+              <a:rPr lang="en-US"/>
               <a:t>Click to edit Master title style</a:t>
             </a:r>
             <a:endParaRPr lang="en-US" dirty="0"/>
@@ -4598,7 +4599,7 @@
               <a:buNone/>
             </a:pPr>
             <a:r>
-              <a:rPr lang="en-US" smtClean="0"/>
+              <a:rPr lang="en-US"/>
               <a:t>Click icon to add picture</a:t>
             </a:r>
             <a:endParaRPr lang="en-US" dirty="0"/>
@@ -4666,7 +4667,7 @@
           <a:p>
             <a:pPr lvl="0"/>
             <a:r>
-              <a:rPr lang="en-US" smtClean="0"/>
+              <a:rPr lang="en-US"/>
               <a:t>Edit Master text styles</a:t>
             </a:r>
           </a:p>
@@ -4755,7 +4756,7 @@
                 </a:solidFill>
                 <a:latin typeface="Calibri"/>
               </a:rPr>
-              <a:t>‹#›</a:t>
+              <a:t>‹Nº›</a:t>
             </a:fld>
             <a:endParaRPr lang="en-US" sz="1200" b="0" strike="noStrike" spc="-1">
               <a:latin typeface="Times New Roman"/>
@@ -4820,7 +4821,7 @@
           </a:lstStyle>
           <a:p>
             <a:r>
-              <a:rPr lang="en-US" smtClean="0"/>
+              <a:rPr lang="en-US"/>
               <a:t>Click to edit Master title style</a:t>
             </a:r>
             <a:endParaRPr lang="en-US" dirty="0"/>
@@ -4888,7 +4889,7 @@
           <a:p>
             <a:pPr lvl="0"/>
             <a:r>
-              <a:rPr lang="en-US" smtClean="0"/>
+              <a:rPr lang="en-US"/>
               <a:t>Edit Master text styles</a:t>
             </a:r>
           </a:p>
@@ -4977,7 +4978,7 @@
                 </a:solidFill>
                 <a:latin typeface="Calibri"/>
               </a:rPr>
-              <a:t>‹#›</a:t>
+              <a:t>‹Nº›</a:t>
             </a:fld>
             <a:endParaRPr lang="en-US" sz="1200" b="0" strike="noStrike" spc="-1">
               <a:latin typeface="Times New Roman"/>
@@ -5042,7 +5043,7 @@
           </a:lstStyle>
           <a:p>
             <a:r>
-              <a:rPr lang="en-US" smtClean="0"/>
+              <a:rPr lang="en-US"/>
               <a:t>Click to edit Master title style</a:t>
             </a:r>
             <a:endParaRPr lang="en-US" dirty="0"/>
@@ -5110,7 +5111,7 @@
           <a:p>
             <a:pPr lvl="0"/>
             <a:r>
-              <a:rPr lang="en-US" smtClean="0"/>
+              <a:rPr lang="en-US"/>
               <a:t>Edit Master text styles</a:t>
             </a:r>
           </a:p>
@@ -5177,7 +5178,7 @@
           <a:p>
             <a:pPr lvl="0"/>
             <a:r>
-              <a:rPr lang="en-US" smtClean="0"/>
+              <a:rPr lang="en-US"/>
               <a:t>Edit Master text styles</a:t>
             </a:r>
           </a:p>
@@ -5266,7 +5267,7 @@
                 </a:solidFill>
                 <a:latin typeface="Calibri"/>
               </a:rPr>
-              <a:t>‹#›</a:t>
+              <a:t>‹Nº›</a:t>
             </a:fld>
             <a:endParaRPr lang="en-US" sz="1200" b="0" strike="noStrike" spc="-1">
               <a:latin typeface="Times New Roman"/>
@@ -5569,7 +5570,7 @@
           </a:lstStyle>
           <a:p>
             <a:r>
-              <a:rPr lang="en-US" smtClean="0"/>
+              <a:rPr lang="en-US"/>
               <a:t>Click to edit Master title style</a:t>
             </a:r>
             <a:endParaRPr lang="en-US" dirty="0"/>
@@ -5637,7 +5638,7 @@
           <a:p>
             <a:pPr lvl="0"/>
             <a:r>
-              <a:rPr lang="en-US" smtClean="0"/>
+              <a:rPr lang="en-US"/>
               <a:t>Edit Master text styles</a:t>
             </a:r>
           </a:p>
@@ -5726,7 +5727,7 @@
                 </a:solidFill>
                 <a:latin typeface="Calibri"/>
               </a:rPr>
-              <a:t>‹#›</a:t>
+              <a:t>‹Nº›</a:t>
             </a:fld>
             <a:endParaRPr lang="en-US" sz="1200" b="0" strike="noStrike" spc="-1">
               <a:latin typeface="Times New Roman"/>
@@ -5785,7 +5786,7 @@
           <a:lstStyle/>
           <a:p>
             <a:r>
-              <a:rPr lang="en-US" smtClean="0"/>
+              <a:rPr lang="en-US"/>
               <a:t>Click to edit Master title style</a:t>
             </a:r>
             <a:endParaRPr lang="en-US" dirty="0"/>
@@ -5860,7 +5861,7 @@
           <a:p>
             <a:pPr lvl="0"/>
             <a:r>
-              <a:rPr lang="en-US" smtClean="0"/>
+              <a:rPr lang="en-US"/>
               <a:t>Edit Master text styles</a:t>
             </a:r>
           </a:p>
@@ -5927,7 +5928,7 @@
           <a:p>
             <a:pPr lvl="0"/>
             <a:r>
-              <a:rPr lang="en-US" smtClean="0"/>
+              <a:rPr lang="en-US"/>
               <a:t>Edit Master text styles</a:t>
             </a:r>
           </a:p>
@@ -6001,7 +6002,7 @@
           <a:p>
             <a:pPr lvl="0"/>
             <a:r>
-              <a:rPr lang="en-US" smtClean="0"/>
+              <a:rPr lang="en-US"/>
               <a:t>Edit Master text styles</a:t>
             </a:r>
           </a:p>
@@ -6068,7 +6069,7 @@
           <a:p>
             <a:pPr lvl="0"/>
             <a:r>
-              <a:rPr lang="en-US" smtClean="0"/>
+              <a:rPr lang="en-US"/>
               <a:t>Edit Master text styles</a:t>
             </a:r>
           </a:p>
@@ -6142,7 +6143,7 @@
           <a:p>
             <a:pPr lvl="0"/>
             <a:r>
-              <a:rPr lang="en-US" smtClean="0"/>
+              <a:rPr lang="en-US"/>
               <a:t>Edit Master text styles</a:t>
             </a:r>
           </a:p>
@@ -6209,7 +6210,7 @@
           <a:p>
             <a:pPr lvl="0"/>
             <a:r>
-              <a:rPr lang="en-US" smtClean="0"/>
+              <a:rPr lang="en-US"/>
               <a:t>Edit Master text styles</a:t>
             </a:r>
           </a:p>
@@ -6298,7 +6299,7 @@
                 </a:solidFill>
                 <a:latin typeface="Calibri"/>
               </a:rPr>
-              <a:t>‹#›</a:t>
+              <a:t>‹Nº›</a:t>
             </a:fld>
             <a:endParaRPr lang="en-US" sz="1200" b="0" strike="noStrike" spc="-1">
               <a:latin typeface="Times New Roman"/>
@@ -6357,7 +6358,7 @@
           <a:lstStyle/>
           <a:p>
             <a:r>
-              <a:rPr lang="en-US" smtClean="0"/>
+              <a:rPr lang="en-US"/>
               <a:t>Click to edit Master title style</a:t>
             </a:r>
             <a:endParaRPr lang="en-US" dirty="0"/>
@@ -6432,7 +6433,7 @@
           <a:p>
             <a:pPr lvl="0"/>
             <a:r>
-              <a:rPr lang="en-US" smtClean="0"/>
+              <a:rPr lang="en-US"/>
               <a:t>Edit Master text styles</a:t>
             </a:r>
           </a:p>
@@ -6489,7 +6490,7 @@
               <a:buNone/>
             </a:pPr>
             <a:r>
-              <a:rPr lang="en-US" smtClean="0"/>
+              <a:rPr lang="en-US"/>
               <a:t>Click icon to add picture</a:t>
             </a:r>
             <a:endParaRPr lang="en-US" dirty="0"/>
@@ -6557,7 +6558,7 @@
           <a:p>
             <a:pPr lvl="0"/>
             <a:r>
-              <a:rPr lang="en-US" smtClean="0"/>
+              <a:rPr lang="en-US"/>
               <a:t>Edit Master text styles</a:t>
             </a:r>
           </a:p>
@@ -6631,7 +6632,7 @@
           <a:p>
             <a:pPr lvl="0"/>
             <a:r>
-              <a:rPr lang="en-US" smtClean="0"/>
+              <a:rPr lang="en-US"/>
               <a:t>Edit Master text styles</a:t>
             </a:r>
           </a:p>
@@ -6688,7 +6689,7 @@
               <a:buNone/>
             </a:pPr>
             <a:r>
-              <a:rPr lang="en-US" smtClean="0"/>
+              <a:rPr lang="en-US"/>
               <a:t>Click icon to add picture</a:t>
             </a:r>
             <a:endParaRPr lang="en-US" dirty="0"/>
@@ -6756,7 +6757,7 @@
           <a:p>
             <a:pPr lvl="0"/>
             <a:r>
-              <a:rPr lang="en-US" smtClean="0"/>
+              <a:rPr lang="en-US"/>
               <a:t>Edit Master text styles</a:t>
             </a:r>
           </a:p>
@@ -6830,7 +6831,7 @@
           <a:p>
             <a:pPr lvl="0"/>
             <a:r>
-              <a:rPr lang="en-US" smtClean="0"/>
+              <a:rPr lang="en-US"/>
               <a:t>Edit Master text styles</a:t>
             </a:r>
           </a:p>
@@ -6887,7 +6888,7 @@
               <a:buNone/>
             </a:pPr>
             <a:r>
-              <a:rPr lang="en-US" smtClean="0"/>
+              <a:rPr lang="en-US"/>
               <a:t>Click icon to add picture</a:t>
             </a:r>
             <a:endParaRPr lang="en-US" dirty="0"/>
@@ -6955,7 +6956,7 @@
           <a:p>
             <a:pPr lvl="0"/>
             <a:r>
-              <a:rPr lang="en-US" smtClean="0"/>
+              <a:rPr lang="en-US"/>
               <a:t>Edit Master text styles</a:t>
             </a:r>
           </a:p>
@@ -7044,7 +7045,7 @@
                 </a:solidFill>
                 <a:latin typeface="Calibri"/>
               </a:rPr>
-              <a:t>‹#›</a:t>
+              <a:t>‹Nº›</a:t>
             </a:fld>
             <a:endParaRPr lang="en-US" sz="1200" b="0" strike="noStrike" spc="-1">
               <a:latin typeface="Times New Roman"/>
@@ -7098,7 +7099,7 @@
           <a:lstStyle/>
           <a:p>
             <a:r>
-              <a:rPr lang="en-US" smtClean="0"/>
+              <a:rPr lang="en-US"/>
               <a:t>Click to edit Master title style</a:t>
             </a:r>
             <a:endParaRPr lang="en-US" dirty="0"/>
@@ -7122,35 +7123,35 @@
           <a:p>
             <a:pPr lvl="0"/>
             <a:r>
-              <a:rPr lang="en-US" smtClean="0"/>
+              <a:rPr lang="en-US"/>
               <a:t>Edit Master text styles</a:t>
             </a:r>
           </a:p>
           <a:p>
             <a:pPr lvl="1"/>
             <a:r>
-              <a:rPr lang="en-US" smtClean="0"/>
+              <a:rPr lang="en-US"/>
               <a:t>Second level</a:t>
             </a:r>
           </a:p>
           <a:p>
             <a:pPr lvl="2"/>
             <a:r>
-              <a:rPr lang="en-US" smtClean="0"/>
+              <a:rPr lang="en-US"/>
               <a:t>Third level</a:t>
             </a:r>
           </a:p>
           <a:p>
             <a:pPr lvl="3"/>
             <a:r>
-              <a:rPr lang="en-US" smtClean="0"/>
+              <a:rPr lang="en-US"/>
               <a:t>Fourth level</a:t>
             </a:r>
           </a:p>
           <a:p>
             <a:pPr lvl="4"/>
             <a:r>
-              <a:rPr lang="en-US" smtClean="0"/>
+              <a:rPr lang="en-US"/>
               <a:t>Fifth level</a:t>
             </a:r>
             <a:endParaRPr lang="en-US" dirty="0"/>
@@ -7240,7 +7241,7 @@
                 </a:solidFill>
                 <a:latin typeface="Calibri"/>
               </a:rPr>
-              <a:t>‹#›</a:t>
+              <a:t>‹Nº›</a:t>
             </a:fld>
             <a:endParaRPr lang="en-US" sz="1200" b="0" strike="noStrike" spc="-1">
               <a:latin typeface="Times New Roman"/>
@@ -7299,7 +7300,7 @@
           <a:lstStyle/>
           <a:p>
             <a:r>
-              <a:rPr lang="en-US" smtClean="0"/>
+              <a:rPr lang="en-US"/>
               <a:t>Click to edit Master title style</a:t>
             </a:r>
             <a:endParaRPr lang="en-US" dirty="0"/>
@@ -7328,35 +7329,35 @@
           <a:p>
             <a:pPr lvl="0"/>
             <a:r>
-              <a:rPr lang="en-US" smtClean="0"/>
+              <a:rPr lang="en-US"/>
               <a:t>Edit Master text styles</a:t>
             </a:r>
           </a:p>
           <a:p>
             <a:pPr lvl="1"/>
             <a:r>
-              <a:rPr lang="en-US" smtClean="0"/>
+              <a:rPr lang="en-US"/>
               <a:t>Second level</a:t>
             </a:r>
           </a:p>
           <a:p>
             <a:pPr lvl="2"/>
             <a:r>
-              <a:rPr lang="en-US" smtClean="0"/>
+              <a:rPr lang="en-US"/>
               <a:t>Third level</a:t>
             </a:r>
           </a:p>
           <a:p>
             <a:pPr lvl="3"/>
             <a:r>
-              <a:rPr lang="en-US" smtClean="0"/>
+              <a:rPr lang="en-US"/>
               <a:t>Fourth level</a:t>
             </a:r>
           </a:p>
           <a:p>
             <a:pPr lvl="4"/>
             <a:r>
-              <a:rPr lang="en-US" smtClean="0"/>
+              <a:rPr lang="en-US"/>
               <a:t>Fifth level</a:t>
             </a:r>
             <a:endParaRPr lang="en-US" dirty="0"/>
@@ -7446,7 +7447,7 @@
                 </a:solidFill>
                 <a:latin typeface="Calibri"/>
               </a:rPr>
-              <a:t>‹#›</a:t>
+              <a:t>‹Nº›</a:t>
             </a:fld>
             <a:endParaRPr lang="en-US" sz="1200" b="0" strike="noStrike" spc="-1">
               <a:latin typeface="Times New Roman"/>
@@ -7592,7 +7593,7 @@
           <a:lstStyle/>
           <a:p>
             <a:r>
-              <a:rPr lang="en-US" smtClean="0"/>
+              <a:rPr lang="en-US"/>
               <a:t>Click to edit Master title style</a:t>
             </a:r>
             <a:endParaRPr lang="en-US" dirty="0"/>
@@ -7616,35 +7617,35 @@
           <a:p>
             <a:pPr lvl="0"/>
             <a:r>
-              <a:rPr lang="en-US" smtClean="0"/>
+              <a:rPr lang="en-US"/>
               <a:t>Edit Master text styles</a:t>
             </a:r>
           </a:p>
           <a:p>
             <a:pPr lvl="1"/>
             <a:r>
-              <a:rPr lang="en-US" smtClean="0"/>
+              <a:rPr lang="en-US"/>
               <a:t>Second level</a:t>
             </a:r>
           </a:p>
           <a:p>
             <a:pPr lvl="2"/>
             <a:r>
-              <a:rPr lang="en-US" smtClean="0"/>
+              <a:rPr lang="en-US"/>
               <a:t>Third level</a:t>
             </a:r>
           </a:p>
           <a:p>
             <a:pPr lvl="3"/>
             <a:r>
-              <a:rPr lang="en-US" smtClean="0"/>
+              <a:rPr lang="en-US"/>
               <a:t>Fourth level</a:t>
             </a:r>
           </a:p>
           <a:p>
             <a:pPr lvl="4"/>
             <a:r>
-              <a:rPr lang="en-US" smtClean="0"/>
+              <a:rPr lang="en-US"/>
               <a:t>Fifth level</a:t>
             </a:r>
             <a:endParaRPr lang="en-US" dirty="0"/>
@@ -7734,7 +7735,7 @@
                 </a:solidFill>
                 <a:latin typeface="Calibri"/>
               </a:rPr>
-              <a:t>‹#›</a:t>
+              <a:t>‹Nº›</a:t>
             </a:fld>
             <a:endParaRPr lang="en-US" sz="1200" b="0" strike="noStrike" spc="-1">
               <a:latin typeface="Times New Roman"/>
@@ -7799,7 +7800,7 @@
           </a:lstStyle>
           <a:p>
             <a:r>
-              <a:rPr lang="en-US" smtClean="0"/>
+              <a:rPr lang="en-US"/>
               <a:t>Click to edit Master title style</a:t>
             </a:r>
             <a:endParaRPr lang="en-US" dirty="0"/>
@@ -7921,7 +7922,7 @@
           <a:p>
             <a:pPr lvl="0"/>
             <a:r>
-              <a:rPr lang="en-US" smtClean="0"/>
+              <a:rPr lang="en-US"/>
               <a:t>Edit Master text styles</a:t>
             </a:r>
           </a:p>
@@ -8010,7 +8011,7 @@
                 </a:solidFill>
                 <a:latin typeface="Calibri"/>
               </a:rPr>
-              <a:t>‹#›</a:t>
+              <a:t>‹Nº›</a:t>
             </a:fld>
             <a:endParaRPr lang="en-US" sz="1200" b="0" strike="noStrike" spc="-1">
               <a:latin typeface="Times New Roman"/>
@@ -8064,7 +8065,7 @@
           <a:lstStyle/>
           <a:p>
             <a:r>
-              <a:rPr lang="en-US" smtClean="0"/>
+              <a:rPr lang="en-US"/>
               <a:t>Click to edit Master title style</a:t>
             </a:r>
             <a:endParaRPr lang="en-US" dirty="0"/>
@@ -8093,35 +8094,35 @@
           <a:p>
             <a:pPr lvl="0"/>
             <a:r>
-              <a:rPr lang="en-US" smtClean="0"/>
+              <a:rPr lang="en-US"/>
               <a:t>Edit Master text styles</a:t>
             </a:r>
           </a:p>
           <a:p>
             <a:pPr lvl="1"/>
             <a:r>
-              <a:rPr lang="en-US" smtClean="0"/>
+              <a:rPr lang="en-US"/>
               <a:t>Second level</a:t>
             </a:r>
           </a:p>
           <a:p>
             <a:pPr lvl="2"/>
             <a:r>
-              <a:rPr lang="en-US" smtClean="0"/>
+              <a:rPr lang="en-US"/>
               <a:t>Third level</a:t>
             </a:r>
           </a:p>
           <a:p>
             <a:pPr lvl="3"/>
             <a:r>
-              <a:rPr lang="en-US" smtClean="0"/>
+              <a:rPr lang="en-US"/>
               <a:t>Fourth level</a:t>
             </a:r>
           </a:p>
           <a:p>
             <a:pPr lvl="4"/>
             <a:r>
-              <a:rPr lang="en-US" smtClean="0"/>
+              <a:rPr lang="en-US"/>
               <a:t>Fifth level</a:t>
             </a:r>
             <a:endParaRPr lang="en-US" dirty="0"/>
@@ -8150,35 +8151,35 @@
           <a:p>
             <a:pPr lvl="0"/>
             <a:r>
-              <a:rPr lang="en-US" smtClean="0"/>
+              <a:rPr lang="en-US"/>
               <a:t>Edit Master text styles</a:t>
             </a:r>
           </a:p>
           <a:p>
             <a:pPr lvl="1"/>
             <a:r>
-              <a:rPr lang="en-US" smtClean="0"/>
+              <a:rPr lang="en-US"/>
               <a:t>Second level</a:t>
             </a:r>
           </a:p>
           <a:p>
             <a:pPr lvl="2"/>
             <a:r>
-              <a:rPr lang="en-US" smtClean="0"/>
+              <a:rPr lang="en-US"/>
               <a:t>Third level</a:t>
             </a:r>
           </a:p>
           <a:p>
             <a:pPr lvl="3"/>
             <a:r>
-              <a:rPr lang="en-US" smtClean="0"/>
+              <a:rPr lang="en-US"/>
               <a:t>Fourth level</a:t>
             </a:r>
           </a:p>
           <a:p>
             <a:pPr lvl="4"/>
             <a:r>
-              <a:rPr lang="en-US" smtClean="0"/>
+              <a:rPr lang="en-US"/>
               <a:t>Fifth level</a:t>
             </a:r>
             <a:endParaRPr lang="en-US" dirty="0"/>
@@ -8268,7 +8269,7 @@
                 </a:solidFill>
                 <a:latin typeface="Calibri"/>
               </a:rPr>
-              <a:t>‹#›</a:t>
+              <a:t>‹Nº›</a:t>
             </a:fld>
             <a:endParaRPr lang="en-US" sz="1200" b="0" strike="noStrike" spc="-1">
               <a:latin typeface="Times New Roman"/>
@@ -8327,7 +8328,7 @@
           <a:lstStyle/>
           <a:p>
             <a:r>
-              <a:rPr lang="en-US" smtClean="0"/>
+              <a:rPr lang="en-US"/>
               <a:t>Click to edit Master title style</a:t>
             </a:r>
             <a:endParaRPr lang="en-US" dirty="0"/>
@@ -8400,7 +8401,7 @@
           <a:p>
             <a:pPr lvl="0"/>
             <a:r>
-              <a:rPr lang="en-US" smtClean="0"/>
+              <a:rPr lang="en-US"/>
               <a:t>Edit Master text styles</a:t>
             </a:r>
           </a:p>
@@ -8428,35 +8429,35 @@
           <a:p>
             <a:pPr lvl="0"/>
             <a:r>
-              <a:rPr lang="en-US" smtClean="0"/>
+              <a:rPr lang="en-US"/>
               <a:t>Edit Master text styles</a:t>
             </a:r>
           </a:p>
           <a:p>
             <a:pPr lvl="1"/>
             <a:r>
-              <a:rPr lang="en-US" smtClean="0"/>
+              <a:rPr lang="en-US"/>
               <a:t>Second level</a:t>
             </a:r>
           </a:p>
           <a:p>
             <a:pPr lvl="2"/>
             <a:r>
-              <a:rPr lang="en-US" smtClean="0"/>
+              <a:rPr lang="en-US"/>
               <a:t>Third level</a:t>
             </a:r>
           </a:p>
           <a:p>
             <a:pPr lvl="3"/>
             <a:r>
-              <a:rPr lang="en-US" smtClean="0"/>
+              <a:rPr lang="en-US"/>
               <a:t>Fourth level</a:t>
             </a:r>
           </a:p>
           <a:p>
             <a:pPr lvl="4"/>
             <a:r>
-              <a:rPr lang="en-US" smtClean="0"/>
+              <a:rPr lang="en-US"/>
               <a:t>Fifth level</a:t>
             </a:r>
             <a:endParaRPr lang="en-US" dirty="0"/>
@@ -8529,7 +8530,7 @@
           <a:p>
             <a:pPr lvl="0"/>
             <a:r>
-              <a:rPr lang="en-US" smtClean="0"/>
+              <a:rPr lang="en-US"/>
               <a:t>Edit Master text styles</a:t>
             </a:r>
           </a:p>
@@ -8557,35 +8558,35 @@
           <a:p>
             <a:pPr lvl="0"/>
             <a:r>
-              <a:rPr lang="en-US" smtClean="0"/>
+              <a:rPr lang="en-US"/>
               <a:t>Edit Master text styles</a:t>
             </a:r>
           </a:p>
           <a:p>
             <a:pPr lvl="1"/>
             <a:r>
-              <a:rPr lang="en-US" smtClean="0"/>
+              <a:rPr lang="en-US"/>
               <a:t>Second level</a:t>
             </a:r>
           </a:p>
           <a:p>
             <a:pPr lvl="2"/>
             <a:r>
-              <a:rPr lang="en-US" smtClean="0"/>
+              <a:rPr lang="en-US"/>
               <a:t>Third level</a:t>
             </a:r>
           </a:p>
           <a:p>
             <a:pPr lvl="3"/>
             <a:r>
-              <a:rPr lang="en-US" smtClean="0"/>
+              <a:rPr lang="en-US"/>
               <a:t>Fourth level</a:t>
             </a:r>
           </a:p>
           <a:p>
             <a:pPr lvl="4"/>
             <a:r>
-              <a:rPr lang="en-US" smtClean="0"/>
+              <a:rPr lang="en-US"/>
               <a:t>Fifth level</a:t>
             </a:r>
             <a:endParaRPr lang="en-US" dirty="0"/>
@@ -8675,7 +8676,7 @@
                 </a:solidFill>
                 <a:latin typeface="Calibri"/>
               </a:rPr>
-              <a:t>‹#›</a:t>
+              <a:t>‹Nº›</a:t>
             </a:fld>
             <a:endParaRPr lang="en-US" sz="1200" b="0" strike="noStrike" spc="-1">
               <a:latin typeface="Times New Roman"/>
@@ -8729,7 +8730,7 @@
           <a:lstStyle/>
           <a:p>
             <a:r>
-              <a:rPr lang="en-US" smtClean="0"/>
+              <a:rPr lang="en-US"/>
               <a:t>Click to edit Master title style</a:t>
             </a:r>
             <a:endParaRPr lang="en-US" dirty="0"/>
@@ -8795,7 +8796,7 @@
           <a:p>
             <a:fld id="{6D22F896-40B5-4ADD-8801-0D06FADFA095}" type="slidenum">
               <a:rPr lang="en-US" smtClean="0"/>
-              <a:t>‹#›</a:t>
+              <a:t>‹Nº›</a:t>
             </a:fld>
             <a:endParaRPr lang="en-US" dirty="0"/>
           </a:p>
@@ -8914,7 +8915,7 @@
                 </a:solidFill>
                 <a:latin typeface="Calibri"/>
               </a:rPr>
-              <a:t>‹#›</a:t>
+              <a:t>‹Nº›</a:t>
             </a:fld>
             <a:endParaRPr lang="en-US" sz="1200" b="0" strike="noStrike" spc="-1">
               <a:latin typeface="Times New Roman"/>
@@ -8977,7 +8978,7 @@
           </a:lstStyle>
           <a:p>
             <a:r>
-              <a:rPr lang="en-US" smtClean="0"/>
+              <a:rPr lang="en-US"/>
               <a:t>Click to edit Master title style</a:t>
             </a:r>
             <a:endParaRPr lang="en-US" dirty="0"/>
@@ -9006,35 +9007,35 @@
           <a:p>
             <a:pPr lvl="0"/>
             <a:r>
-              <a:rPr lang="en-US" smtClean="0"/>
+              <a:rPr lang="en-US"/>
               <a:t>Edit Master text styles</a:t>
             </a:r>
           </a:p>
           <a:p>
             <a:pPr lvl="1"/>
             <a:r>
-              <a:rPr lang="en-US" smtClean="0"/>
+              <a:rPr lang="en-US"/>
               <a:t>Second level</a:t>
             </a:r>
           </a:p>
           <a:p>
             <a:pPr lvl="2"/>
             <a:r>
-              <a:rPr lang="en-US" smtClean="0"/>
+              <a:rPr lang="en-US"/>
               <a:t>Third level</a:t>
             </a:r>
           </a:p>
           <a:p>
             <a:pPr lvl="3"/>
             <a:r>
-              <a:rPr lang="en-US" smtClean="0"/>
+              <a:rPr lang="en-US"/>
               <a:t>Fourth level</a:t>
             </a:r>
           </a:p>
           <a:p>
             <a:pPr lvl="4"/>
             <a:r>
-              <a:rPr lang="en-US" smtClean="0"/>
+              <a:rPr lang="en-US"/>
               <a:t>Fifth level</a:t>
             </a:r>
             <a:endParaRPr lang="en-US" dirty="0"/>
@@ -9100,7 +9101,7 @@
           <a:p>
             <a:pPr lvl="0"/>
             <a:r>
-              <a:rPr lang="en-US" smtClean="0"/>
+              <a:rPr lang="en-US"/>
               <a:t>Edit Master text styles</a:t>
             </a:r>
           </a:p>
@@ -9189,7 +9190,7 @@
                 </a:solidFill>
                 <a:latin typeface="Calibri"/>
               </a:rPr>
-              <a:t>‹#›</a:t>
+              <a:t>‹Nº›</a:t>
             </a:fld>
             <a:endParaRPr lang="en-US" sz="1200" b="0" strike="noStrike" spc="-1">
               <a:latin typeface="Times New Roman"/>
@@ -9252,7 +9253,7 @@
           </a:lstStyle>
           <a:p>
             <a:r>
-              <a:rPr lang="en-US" smtClean="0"/>
+              <a:rPr lang="en-US"/>
               <a:t>Click to edit Master title style</a:t>
             </a:r>
             <a:endParaRPr lang="en-US" dirty="0"/>
@@ -9340,7 +9341,7 @@
           </a:lstStyle>
           <a:p>
             <a:r>
-              <a:rPr lang="en-US" smtClean="0"/>
+              <a:rPr lang="en-US"/>
               <a:t>Click icon to add picture</a:t>
             </a:r>
             <a:endParaRPr lang="en-US" dirty="0"/>
@@ -9406,7 +9407,7 @@
           <a:p>
             <a:pPr lvl="0"/>
             <a:r>
-              <a:rPr lang="en-US" smtClean="0"/>
+              <a:rPr lang="en-US"/>
               <a:t>Edit Master text styles</a:t>
             </a:r>
           </a:p>
@@ -9495,7 +9496,7 @@
                 </a:solidFill>
                 <a:latin typeface="Calibri"/>
               </a:rPr>
-              <a:t>‹#›</a:t>
+              <a:t>‹Nº›</a:t>
             </a:fld>
             <a:endParaRPr lang="en-US" sz="1200" b="0" strike="noStrike" spc="-1">
               <a:latin typeface="Times New Roman"/>
@@ -9578,7 +9579,7 @@
           <a:noFill/>
           <a:extLst>
             <a:ext uri="{909E8E84-426E-40dd-AFC4-6F175D3DCCD1}">
-              <a14:hiddenFill xmlns:a14="http://schemas.microsoft.com/office/drawing/2010/main" xmlns="">
+              <a14:hiddenFill xmlns="" xmlns:a14="http://schemas.microsoft.com/office/drawing/2010/main">
                 <a:solidFill>
                   <a:srgbClr val="FFFFFF"/>
                 </a:solidFill>
@@ -9652,7 +9653,7 @@
               </a:ln>
               <a:extLst>
                 <a:ext uri="{91240B29-F687-4f45-9708-019B960494DF}">
-                  <a14:hiddenLine xmlns:a14="http://schemas.microsoft.com/office/drawing/2010/main" xmlns="" w="9525">
+                  <a14:hiddenLine xmlns="" xmlns:a14="http://schemas.microsoft.com/office/drawing/2010/main" w="9525">
                     <a:solidFill>
                       <a:srgbClr val="000000"/>
                     </a:solidFill>
@@ -9742,7 +9743,7 @@
               </a:ln>
               <a:extLst>
                 <a:ext uri="{91240B29-F687-4f45-9708-019B960494DF}">
-                  <a14:hiddenLine xmlns:a14="http://schemas.microsoft.com/office/drawing/2010/main" xmlns="" w="9525">
+                  <a14:hiddenLine xmlns="" xmlns:a14="http://schemas.microsoft.com/office/drawing/2010/main" w="9525">
                     <a:solidFill>
                       <a:srgbClr val="000000"/>
                     </a:solidFill>
@@ -9832,7 +9833,7 @@
               </a:ln>
               <a:extLst>
                 <a:ext uri="{91240B29-F687-4f45-9708-019B960494DF}">
-                  <a14:hiddenLine xmlns:a14="http://schemas.microsoft.com/office/drawing/2010/main" xmlns="" w="9525">
+                  <a14:hiddenLine xmlns="" xmlns:a14="http://schemas.microsoft.com/office/drawing/2010/main" w="9525">
                     <a:solidFill>
                       <a:srgbClr val="000000"/>
                     </a:solidFill>
@@ -9894,7 +9895,7 @@
               </a:ln>
               <a:extLst>
                 <a:ext uri="{91240B29-F687-4f45-9708-019B960494DF}">
-                  <a14:hiddenLine xmlns:a14="http://schemas.microsoft.com/office/drawing/2010/main" xmlns="" w="9525">
+                  <a14:hiddenLine xmlns="" xmlns:a14="http://schemas.microsoft.com/office/drawing/2010/main" w="9525">
                     <a:solidFill>
                       <a:srgbClr val="000000"/>
                     </a:solidFill>
@@ -9984,7 +9985,7 @@
               </a:ln>
               <a:extLst>
                 <a:ext uri="{91240B29-F687-4f45-9708-019B960494DF}">
-                  <a14:hiddenLine xmlns:a14="http://schemas.microsoft.com/office/drawing/2010/main" xmlns="" w="9525">
+                  <a14:hiddenLine xmlns="" xmlns:a14="http://schemas.microsoft.com/office/drawing/2010/main" w="9525">
                     <a:solidFill>
                       <a:srgbClr val="000000"/>
                     </a:solidFill>
@@ -10046,7 +10047,7 @@
               </a:ln>
               <a:extLst>
                 <a:ext uri="{91240B29-F687-4f45-9708-019B960494DF}">
-                  <a14:hiddenLine xmlns:a14="http://schemas.microsoft.com/office/drawing/2010/main" xmlns="" w="9525">
+                  <a14:hiddenLine xmlns="" xmlns:a14="http://schemas.microsoft.com/office/drawing/2010/main" w="9525">
                     <a:solidFill>
                       <a:srgbClr val="000000"/>
                     </a:solidFill>
@@ -10108,7 +10109,7 @@
               </a:ln>
               <a:extLst>
                 <a:ext uri="{91240B29-F687-4f45-9708-019B960494DF}">
-                  <a14:hiddenLine xmlns:a14="http://schemas.microsoft.com/office/drawing/2010/main" xmlns="" w="9525">
+                  <a14:hiddenLine xmlns="" xmlns:a14="http://schemas.microsoft.com/office/drawing/2010/main" w="9525">
                     <a:solidFill>
                       <a:srgbClr val="000000"/>
                     </a:solidFill>
@@ -10198,7 +10199,7 @@
               </a:ln>
               <a:extLst>
                 <a:ext uri="{91240B29-F687-4f45-9708-019B960494DF}">
-                  <a14:hiddenLine xmlns:a14="http://schemas.microsoft.com/office/drawing/2010/main" xmlns="" w="9525">
+                  <a14:hiddenLine xmlns="" xmlns:a14="http://schemas.microsoft.com/office/drawing/2010/main" w="9525">
                     <a:solidFill>
                       <a:srgbClr val="000000"/>
                     </a:solidFill>
@@ -10288,7 +10289,7 @@
               </a:ln>
               <a:extLst>
                 <a:ext uri="{91240B29-F687-4f45-9708-019B960494DF}">
-                  <a14:hiddenLine xmlns:a14="http://schemas.microsoft.com/office/drawing/2010/main" xmlns="" w="9525">
+                  <a14:hiddenLine xmlns="" xmlns:a14="http://schemas.microsoft.com/office/drawing/2010/main" w="9525">
                     <a:solidFill>
                       <a:srgbClr val="000000"/>
                     </a:solidFill>
@@ -10350,7 +10351,7 @@
               </a:ln>
               <a:extLst>
                 <a:ext uri="{91240B29-F687-4f45-9708-019B960494DF}">
-                  <a14:hiddenLine xmlns:a14="http://schemas.microsoft.com/office/drawing/2010/main" xmlns="" w="9525">
+                  <a14:hiddenLine xmlns="" xmlns:a14="http://schemas.microsoft.com/office/drawing/2010/main" w="9525">
                     <a:solidFill>
                       <a:srgbClr val="000000"/>
                     </a:solidFill>
@@ -10460,7 +10461,7 @@
               </a:ln>
               <a:extLst>
                 <a:ext uri="{91240B29-F687-4f45-9708-019B960494DF}">
-                  <a14:hiddenLine xmlns:a14="http://schemas.microsoft.com/office/drawing/2010/main" xmlns="" w="9525">
+                  <a14:hiddenLine xmlns="" xmlns:a14="http://schemas.microsoft.com/office/drawing/2010/main" w="9525">
                     <a:solidFill>
                       <a:srgbClr val="000000"/>
                     </a:solidFill>
@@ -10544,7 +10545,7 @@
               </a:ln>
               <a:extLst>
                 <a:ext uri="{91240B29-F687-4f45-9708-019B960494DF}">
-                  <a14:hiddenLine xmlns:a14="http://schemas.microsoft.com/office/drawing/2010/main" xmlns="" w="9525">
+                  <a14:hiddenLine xmlns="" xmlns:a14="http://schemas.microsoft.com/office/drawing/2010/main" w="9525">
                     <a:solidFill>
                       <a:srgbClr val="000000"/>
                     </a:solidFill>
@@ -10606,7 +10607,7 @@
               </a:ln>
               <a:extLst>
                 <a:ext uri="{91240B29-F687-4f45-9708-019B960494DF}">
-                  <a14:hiddenLine xmlns:a14="http://schemas.microsoft.com/office/drawing/2010/main" xmlns="" w="9525">
+                  <a14:hiddenLine xmlns="" xmlns:a14="http://schemas.microsoft.com/office/drawing/2010/main" w="9525">
                     <a:solidFill>
                       <a:srgbClr val="000000"/>
                     </a:solidFill>
@@ -10668,7 +10669,7 @@
               </a:ln>
               <a:extLst>
                 <a:ext uri="{91240B29-F687-4f45-9708-019B960494DF}">
-                  <a14:hiddenLine xmlns:a14="http://schemas.microsoft.com/office/drawing/2010/main" xmlns="" w="9525">
+                  <a14:hiddenLine xmlns="" xmlns:a14="http://schemas.microsoft.com/office/drawing/2010/main" w="9525">
                     <a:solidFill>
                       <a:srgbClr val="000000"/>
                     </a:solidFill>
@@ -10758,7 +10759,7 @@
               </a:ln>
               <a:extLst>
                 <a:ext uri="{91240B29-F687-4f45-9708-019B960494DF}">
-                  <a14:hiddenLine xmlns:a14="http://schemas.microsoft.com/office/drawing/2010/main" xmlns="" w="9525">
+                  <a14:hiddenLine xmlns="" xmlns:a14="http://schemas.microsoft.com/office/drawing/2010/main" w="9525">
                     <a:solidFill>
                       <a:srgbClr val="000000"/>
                     </a:solidFill>
@@ -10792,7 +10793,7 @@
               </a:ln>
               <a:extLst>
                 <a:ext uri="{91240B29-F687-4f45-9708-019B960494DF}">
-                  <a14:hiddenLine xmlns:a14="http://schemas.microsoft.com/office/drawing/2010/main" xmlns="" w="9525">
+                  <a14:hiddenLine xmlns="" xmlns:a14="http://schemas.microsoft.com/office/drawing/2010/main" w="9525">
                     <a:solidFill>
                       <a:srgbClr val="000000"/>
                     </a:solidFill>
@@ -10857,7 +10858,7 @@
               </a:ln>
               <a:extLst>
                 <a:ext uri="{91240B29-F687-4f45-9708-019B960494DF}">
-                  <a14:hiddenLine xmlns:a14="http://schemas.microsoft.com/office/drawing/2010/main" xmlns="" w="9525">
+                  <a14:hiddenLine xmlns="" xmlns:a14="http://schemas.microsoft.com/office/drawing/2010/main" w="9525">
                     <a:solidFill>
                       <a:srgbClr val="000000"/>
                     </a:solidFill>
@@ -10947,7 +10948,7 @@
               </a:ln>
               <a:extLst>
                 <a:ext uri="{91240B29-F687-4f45-9708-019B960494DF}">
-                  <a14:hiddenLine xmlns:a14="http://schemas.microsoft.com/office/drawing/2010/main" xmlns="" w="9525">
+                  <a14:hiddenLine xmlns="" xmlns:a14="http://schemas.microsoft.com/office/drawing/2010/main" w="9525">
                     <a:solidFill>
                       <a:srgbClr val="000000"/>
                     </a:solidFill>
@@ -11009,7 +11010,7 @@
               </a:ln>
               <a:extLst>
                 <a:ext uri="{91240B29-F687-4f45-9708-019B960494DF}">
-                  <a14:hiddenLine xmlns:a14="http://schemas.microsoft.com/office/drawing/2010/main" xmlns="" w="9525">
+                  <a14:hiddenLine xmlns="" xmlns:a14="http://schemas.microsoft.com/office/drawing/2010/main" w="9525">
                     <a:solidFill>
                       <a:srgbClr val="000000"/>
                     </a:solidFill>
@@ -11099,7 +11100,7 @@
               </a:ln>
               <a:extLst>
                 <a:ext uri="{91240B29-F687-4f45-9708-019B960494DF}">
-                  <a14:hiddenLine xmlns:a14="http://schemas.microsoft.com/office/drawing/2010/main" xmlns="" w="9525">
+                  <a14:hiddenLine xmlns="" xmlns:a14="http://schemas.microsoft.com/office/drawing/2010/main" w="9525">
                     <a:solidFill>
                       <a:srgbClr val="000000"/>
                     </a:solidFill>
@@ -11164,7 +11165,7 @@
               </a:ln>
               <a:extLst>
                 <a:ext uri="{91240B29-F687-4f45-9708-019B960494DF}">
-                  <a14:hiddenLine xmlns:a14="http://schemas.microsoft.com/office/drawing/2010/main" xmlns="" w="9525">
+                  <a14:hiddenLine xmlns="" xmlns:a14="http://schemas.microsoft.com/office/drawing/2010/main" w="9525">
                     <a:solidFill>
                       <a:srgbClr val="000000"/>
                     </a:solidFill>
@@ -11226,7 +11227,7 @@
               </a:ln>
               <a:extLst>
                 <a:ext uri="{91240B29-F687-4f45-9708-019B960494DF}">
-                  <a14:hiddenLine xmlns:a14="http://schemas.microsoft.com/office/drawing/2010/main" xmlns="" w="9525">
+                  <a14:hiddenLine xmlns="" xmlns:a14="http://schemas.microsoft.com/office/drawing/2010/main" w="9525">
                     <a:solidFill>
                       <a:srgbClr val="000000"/>
                     </a:solidFill>
@@ -11316,7 +11317,7 @@
               </a:ln>
               <a:extLst>
                 <a:ext uri="{91240B29-F687-4f45-9708-019B960494DF}">
-                  <a14:hiddenLine xmlns:a14="http://schemas.microsoft.com/office/drawing/2010/main" xmlns="" w="9525">
+                  <a14:hiddenLine xmlns="" xmlns:a14="http://schemas.microsoft.com/office/drawing/2010/main" w="9525">
                     <a:solidFill>
                       <a:srgbClr val="000000"/>
                     </a:solidFill>
@@ -11406,7 +11407,7 @@
               </a:ln>
               <a:extLst>
                 <a:ext uri="{91240B29-F687-4f45-9708-019B960494DF}">
-                  <a14:hiddenLine xmlns:a14="http://schemas.microsoft.com/office/drawing/2010/main" xmlns="" w="9525">
+                  <a14:hiddenLine xmlns="" xmlns:a14="http://schemas.microsoft.com/office/drawing/2010/main" w="9525">
                     <a:solidFill>
                       <a:srgbClr val="000000"/>
                     </a:solidFill>
@@ -11471,7 +11472,7 @@
               </a:ln>
               <a:extLst>
                 <a:ext uri="{91240B29-F687-4f45-9708-019B960494DF}">
-                  <a14:hiddenLine xmlns:a14="http://schemas.microsoft.com/office/drawing/2010/main" xmlns="" w="9525">
+                  <a14:hiddenLine xmlns="" xmlns:a14="http://schemas.microsoft.com/office/drawing/2010/main" w="9525">
                     <a:solidFill>
                       <a:srgbClr val="000000"/>
                     </a:solidFill>
@@ -11591,7 +11592,7 @@
               </a:ln>
               <a:extLst>
                 <a:ext uri="{91240B29-F687-4f45-9708-019B960494DF}">
-                  <a14:hiddenLine xmlns:a14="http://schemas.microsoft.com/office/drawing/2010/main" xmlns="" w="9525">
+                  <a14:hiddenLine xmlns="" xmlns:a14="http://schemas.microsoft.com/office/drawing/2010/main" w="9525">
                     <a:solidFill>
                       <a:srgbClr val="000000"/>
                     </a:solidFill>
@@ -11672,7 +11673,7 @@
               </a:ln>
               <a:extLst>
                 <a:ext uri="{91240B29-F687-4f45-9708-019B960494DF}">
-                  <a14:hiddenLine xmlns:a14="http://schemas.microsoft.com/office/drawing/2010/main" xmlns="" w="9525">
+                  <a14:hiddenLine xmlns="" xmlns:a14="http://schemas.microsoft.com/office/drawing/2010/main" w="9525">
                     <a:solidFill>
                       <a:srgbClr val="000000"/>
                     </a:solidFill>
@@ -11787,7 +11788,7 @@
               </a:ln>
               <a:extLst>
                 <a:ext uri="{91240B29-F687-4f45-9708-019B960494DF}">
-                  <a14:hiddenLine xmlns:a14="http://schemas.microsoft.com/office/drawing/2010/main" xmlns="" w="9525">
+                  <a14:hiddenLine xmlns="" xmlns:a14="http://schemas.microsoft.com/office/drawing/2010/main" w="9525">
                     <a:solidFill>
                       <a:srgbClr val="000000"/>
                     </a:solidFill>
@@ -11877,7 +11878,7 @@
               </a:ln>
               <a:extLst>
                 <a:ext uri="{91240B29-F687-4f45-9708-019B960494DF}">
-                  <a14:hiddenLine xmlns:a14="http://schemas.microsoft.com/office/drawing/2010/main" xmlns="" w="9525">
+                  <a14:hiddenLine xmlns="" xmlns:a14="http://schemas.microsoft.com/office/drawing/2010/main" w="9525">
                     <a:solidFill>
                       <a:srgbClr val="000000"/>
                     </a:solidFill>
@@ -11942,7 +11943,7 @@
               </a:ln>
               <a:extLst>
                 <a:ext uri="{91240B29-F687-4f45-9708-019B960494DF}">
-                  <a14:hiddenLine xmlns:a14="http://schemas.microsoft.com/office/drawing/2010/main" xmlns="" w="9525">
+                  <a14:hiddenLine xmlns="" xmlns:a14="http://schemas.microsoft.com/office/drawing/2010/main" w="9525">
                     <a:solidFill>
                       <a:srgbClr val="000000"/>
                     </a:solidFill>
@@ -12032,7 +12033,7 @@
               </a:ln>
               <a:extLst>
                 <a:ext uri="{91240B29-F687-4f45-9708-019B960494DF}">
-                  <a14:hiddenLine xmlns:a14="http://schemas.microsoft.com/office/drawing/2010/main" xmlns="" w="9525">
+                  <a14:hiddenLine xmlns="" xmlns:a14="http://schemas.microsoft.com/office/drawing/2010/main" w="9525">
                     <a:solidFill>
                       <a:srgbClr val="000000"/>
                     </a:solidFill>
@@ -12100,7 +12101,7 @@
               </a:ln>
               <a:extLst>
                 <a:ext uri="{91240B29-F687-4f45-9708-019B960494DF}">
-                  <a14:hiddenLine xmlns:a14="http://schemas.microsoft.com/office/drawing/2010/main" xmlns="" w="9525">
+                  <a14:hiddenLine xmlns="" xmlns:a14="http://schemas.microsoft.com/office/drawing/2010/main" w="9525">
                     <a:solidFill>
                       <a:srgbClr val="000000"/>
                     </a:solidFill>
@@ -12190,7 +12191,7 @@
               </a:ln>
               <a:extLst>
                 <a:ext uri="{91240B29-F687-4f45-9708-019B960494DF}">
-                  <a14:hiddenLine xmlns:a14="http://schemas.microsoft.com/office/drawing/2010/main" xmlns="" w="9525">
+                  <a14:hiddenLine xmlns="" xmlns:a14="http://schemas.microsoft.com/office/drawing/2010/main" w="9525">
                     <a:solidFill>
                       <a:srgbClr val="000000"/>
                     </a:solidFill>
@@ -12258,7 +12259,7 @@
               </a:ln>
               <a:extLst>
                 <a:ext uri="{91240B29-F687-4f45-9708-019B960494DF}">
-                  <a14:hiddenLine xmlns:a14="http://schemas.microsoft.com/office/drawing/2010/main" xmlns="" w="9525">
+                  <a14:hiddenLine xmlns="" xmlns:a14="http://schemas.microsoft.com/office/drawing/2010/main" w="9525">
                     <a:solidFill>
                       <a:srgbClr val="000000"/>
                     </a:solidFill>
@@ -12348,7 +12349,7 @@
               </a:ln>
               <a:extLst>
                 <a:ext uri="{91240B29-F687-4f45-9708-019B960494DF}">
-                  <a14:hiddenLine xmlns:a14="http://schemas.microsoft.com/office/drawing/2010/main" xmlns="" w="9525">
+                  <a14:hiddenLine xmlns="" xmlns:a14="http://schemas.microsoft.com/office/drawing/2010/main" w="9525">
                     <a:solidFill>
                       <a:srgbClr val="000000"/>
                     </a:solidFill>
@@ -12382,7 +12383,7 @@
               </a:ln>
               <a:extLst>
                 <a:ext uri="{91240B29-F687-4f45-9708-019B960494DF}">
-                  <a14:hiddenLine xmlns:a14="http://schemas.microsoft.com/office/drawing/2010/main" xmlns="" w="9525">
+                  <a14:hiddenLine xmlns="" xmlns:a14="http://schemas.microsoft.com/office/drawing/2010/main" w="9525">
                     <a:solidFill>
                       <a:srgbClr val="000000"/>
                     </a:solidFill>
@@ -12452,35 +12453,35 @@
           <a:p>
             <a:pPr lvl="0"/>
             <a:r>
-              <a:rPr lang="en-US" smtClean="0"/>
+              <a:rPr lang="en-US"/>
               <a:t>Edit Master text styles</a:t>
             </a:r>
           </a:p>
           <a:p>
             <a:pPr lvl="1"/>
             <a:r>
-              <a:rPr lang="en-US" smtClean="0"/>
+              <a:rPr lang="en-US"/>
               <a:t>Second level</a:t>
             </a:r>
           </a:p>
           <a:p>
             <a:pPr lvl="2"/>
             <a:r>
-              <a:rPr lang="en-US" smtClean="0"/>
+              <a:rPr lang="en-US"/>
               <a:t>Third level</a:t>
             </a:r>
           </a:p>
           <a:p>
             <a:pPr lvl="3"/>
             <a:r>
-              <a:rPr lang="en-US" smtClean="0"/>
+              <a:rPr lang="en-US"/>
               <a:t>Fourth level</a:t>
             </a:r>
           </a:p>
           <a:p>
             <a:pPr lvl="4"/>
             <a:r>
-              <a:rPr lang="en-US" smtClean="0"/>
+              <a:rPr lang="en-US"/>
               <a:t>Fifth level</a:t>
             </a:r>
             <a:endParaRPr lang="en-US" dirty="0"/>
@@ -12624,7 +12625,7 @@
                 </a:solidFill>
                 <a:latin typeface="Calibri"/>
               </a:rPr>
-              <a:t>‹#›</a:t>
+              <a:t>‹Nº›</a:t>
             </a:fld>
             <a:endParaRPr lang="en-US" sz="1200" b="0" strike="noStrike" spc="-1">
               <a:latin typeface="Times New Roman"/>
@@ -13099,6 +13100,15 @@
               <a:t> – A01177189</a:t>
             </a:r>
           </a:p>
+          <a:p>
+            <a:pPr algn="ctr"/>
+            <a:r>
+              <a:rPr lang="en-US" sz="3200" b="0" strike="noStrike" spc="-1" dirty="0">
+                <a:latin typeface="Arial"/>
+              </a:rPr>
+              <a:t>Matheo Pinzón Woloski – A01024477</a:t>
+            </a:r>
+          </a:p>
         </p:txBody>
       </p:sp>
     </p:spTree>
@@ -13218,24 +13228,12 @@
             </a:r>
             <a:r>
               <a:rPr lang="es-ES" dirty="0"/>
-              <a:t>, </a:t>
-            </a:r>
-            <a:r>
-              <a:rPr lang="es-ES" dirty="0" smtClean="0"/>
-              <a:t>este tipo de sensores </a:t>
-            </a:r>
-            <a:r>
-              <a:rPr lang="es-ES" dirty="0"/>
-              <a:t>se utilizan para hacer un monitoreo de la calidad del aire</a:t>
-            </a:r>
-            <a:r>
-              <a:rPr lang="es-ES" dirty="0" smtClean="0"/>
-              <a:t>.</a:t>
+              <a:t>, este tipo de sensores se utilizan para hacer un monitoreo de la calidad del aire.</a:t>
             </a:r>
             <a:br>
-              <a:rPr lang="es-ES" dirty="0" smtClean="0"/>
+              <a:rPr lang="es-ES" dirty="0"/>
             </a:br>
-            <a:endParaRPr lang="es-ES" dirty="0" smtClean="0"/>
+            <a:endParaRPr lang="es-ES" dirty="0"/>
           </a:p>
           <a:p>
             <a:pPr marL="0" indent="0">
@@ -13499,14 +13497,10 @@
               <a:rPr lang="es-ES" dirty="0"/>
               <a:t> para detectar la luz que es reflejada por las partículas de polvo, estos pueden utilizar los patrones de la energía reflejada para distinguir entre el polvo del lugar y el humo. </a:t>
             </a:r>
-            <a:r>
-              <a:rPr lang="es-ES" dirty="0" smtClean="0"/>
-              <a:t/>
-            </a:r>
             <a:br>
-              <a:rPr lang="es-ES" dirty="0" smtClean="0"/>
+              <a:rPr lang="es-ES" dirty="0"/>
             </a:br>
-            <a:endParaRPr lang="es-ES" dirty="0" smtClean="0"/>
+            <a:endParaRPr lang="es-ES" dirty="0"/>
           </a:p>
           <a:p>
             <a:pPr marL="0" indent="0">
@@ -13764,14 +13758,10 @@
               <a:buFont typeface="Arial" panose="020B0604020202020204" pitchFamily="34" charset="0"/>
               <a:buNone/>
             </a:pPr>
-            <a:r>
-              <a:rPr lang="es-ES" dirty="0" smtClean="0"/>
-              <a:t/>
-            </a:r>
             <a:br>
-              <a:rPr lang="es-ES" dirty="0" smtClean="0"/>
+              <a:rPr lang="es-ES" dirty="0"/>
             </a:br>
-            <a:endParaRPr lang="es-ES" dirty="0" smtClean="0"/>
+            <a:endParaRPr lang="es-ES" dirty="0"/>
           </a:p>
           <a:p>
             <a:pPr marL="0" indent="0">
@@ -13805,15 +13795,7 @@
           <a:p>
             <a:r>
               <a:rPr lang="es-ES" dirty="0"/>
-              <a:t>Se </a:t>
-            </a:r>
-            <a:r>
-              <a:rPr lang="es-ES" dirty="0" smtClean="0"/>
-              <a:t>encuentran </a:t>
-            </a:r>
-            <a:r>
-              <a:rPr lang="es-ES" dirty="0"/>
-              <a:t>comúnmente en purificadores de aire, acondicionadores de aire y monitores, pero usualmente se utilizan como detectores de humo de cigarrillo.</a:t>
+              <a:t>Se encuentran comúnmente en purificadores de aire, acondicionadores de aire y monitores, pero usualmente se utilizan como detectores de humo de cigarrillo.</a:t>
             </a:r>
             <a:endParaRPr lang="en-US" dirty="0"/>
           </a:p>
@@ -13865,7 +13847,7 @@
           <a:lstStyle/>
           <a:p>
             <a:r>
-              <a:rPr lang="en-US" dirty="0" err="1" smtClean="0"/>
+              <a:rPr lang="en-US" dirty="0" err="1"/>
               <a:t>Referencias</a:t>
             </a:r>
             <a:endParaRPr lang="en-US" dirty="0"/>
@@ -13895,12 +13877,8 @@
           <a:lstStyle/>
           <a:p>
             <a:r>
-              <a:rPr lang="es-ES" dirty="0" smtClean="0"/>
-              <a:t>* Desconocido</a:t>
-            </a:r>
-            <a:r>
               <a:rPr lang="es-ES" dirty="0"/>
-              <a:t>. (2021). Sensores de calidad de aire. 18/03/2021, de </a:t>
+              <a:t>* Desconocido. (2021). Sensores de calidad de aire. 18/03/2021, de </a:t>
             </a:r>
             <a:r>
               <a:rPr lang="es-ES" dirty="0" err="1"/>
@@ -13918,6 +13896,121 @@
     <p:extLst>
       <p:ext uri="{BB962C8B-B14F-4D97-AF65-F5344CB8AC3E}">
         <p14:creationId xmlns:p14="http://schemas.microsoft.com/office/powerpoint/2010/main" val="2001969038"/>
+      </p:ext>
+    </p:extLst>
+  </p:cSld>
+  <p:clrMapOvr>
+    <a:masterClrMapping/>
+  </p:clrMapOvr>
+</p:sld>
+</file>
+
+<file path=ppt/slides/slide4.xml><?xml version="1.0" encoding="utf-8"?>
+<p:sld xmlns:a="http://schemas.openxmlformats.org/drawingml/2006/main" xmlns:r="http://schemas.openxmlformats.org/officeDocument/2006/relationships" xmlns:p="http://schemas.openxmlformats.org/presentationml/2006/main">
+  <p:cSld>
+    <p:spTree>
+      <p:nvGrpSpPr>
+        <p:cNvPr id="1" name=""/>
+        <p:cNvGrpSpPr/>
+        <p:nvPr/>
+      </p:nvGrpSpPr>
+      <p:grpSpPr>
+        <a:xfrm>
+          <a:off x="0" y="0"/>
+          <a:ext cx="0" cy="0"/>
+          <a:chOff x="0" y="0"/>
+          <a:chExt cx="0" cy="0"/>
+        </a:xfrm>
+      </p:grpSpPr>
+      <p:sp>
+        <p:nvSpPr>
+          <p:cNvPr id="2" name="Título 1">
+            <a:extLst>
+              <a:ext uri="{FF2B5EF4-FFF2-40B4-BE49-F238E27FC236}">
+                <a16:creationId xmlns:a16="http://schemas.microsoft.com/office/drawing/2014/main" id="{98466061-449A-4E43-B59A-6A4F367FB8D0}"/>
+              </a:ext>
+            </a:extLst>
+          </p:cNvPr>
+          <p:cNvSpPr>
+            <a:spLocks noGrp="1"/>
+          </p:cNvSpPr>
+          <p:nvPr>
+            <p:ph type="title"/>
+          </p:nvPr>
+        </p:nvSpPr>
+        <p:spPr/>
+        <p:txBody>
+          <a:bodyPr/>
+          <a:lstStyle/>
+          <a:p>
+            <a:r>
+              <a:rPr lang="es-MX" dirty="0"/>
+              <a:t>Conclusión</a:t>
+            </a:r>
+            <a:endParaRPr lang="en-US" dirty="0"/>
+          </a:p>
+        </p:txBody>
+      </p:sp>
+      <p:sp>
+        <p:nvSpPr>
+          <p:cNvPr id="3" name="Marcador de contenido 2">
+            <a:extLst>
+              <a:ext uri="{FF2B5EF4-FFF2-40B4-BE49-F238E27FC236}">
+                <a16:creationId xmlns:a16="http://schemas.microsoft.com/office/drawing/2014/main" id="{3459D694-5812-400D-A464-A7040A37740D}"/>
+              </a:ext>
+            </a:extLst>
+          </p:cNvPr>
+          <p:cNvSpPr>
+            <a:spLocks noGrp="1"/>
+          </p:cNvSpPr>
+          <p:nvPr>
+            <p:ph idx="1"/>
+          </p:nvPr>
+        </p:nvSpPr>
+        <p:spPr>
+          <a:xfrm>
+            <a:off x="1141413" y="1788687"/>
+            <a:ext cx="9905999" cy="3541714"/>
+          </a:xfrm>
+        </p:spPr>
+        <p:txBody>
+          <a:bodyPr>
+            <a:noAutofit/>
+          </a:bodyPr>
+          <a:lstStyle/>
+          <a:p>
+            <a:pPr marL="0" indent="0" algn="just">
+              <a:buNone/>
+            </a:pPr>
+            <a:r>
+              <a:rPr lang="es-ES" dirty="0"/>
+              <a:t>A modo de conclusión, detectar la contaminación del aire por medio de un sensor de polvo permite tomar decisiones por el bien de una población. Previniendo enfermedades respiratorias relacionadas con la contaminación. Además de tener parámetros para tener una mejor planeación ambiental a futuro. Sin </a:t>
+            </a:r>
+            <a:r>
+              <a:rPr lang="es-ES" dirty="0" err="1"/>
+              <a:t>IoT</a:t>
+            </a:r>
+            <a:r>
+              <a:rPr lang="es-ES" dirty="0"/>
+              <a:t>, la captura, visualización y análisis de datos para la toma de decisiones sería muy lenta.</a:t>
+            </a:r>
+          </a:p>
+          <a:p>
+            <a:pPr marL="0" indent="0" algn="just">
+              <a:buNone/>
+            </a:pPr>
+            <a:r>
+              <a:rPr lang="es-ES" dirty="0"/>
+              <a:t>El uso de Git y GitHub nos permitió tener documentos colaborativos junto con mayor control de versiones. Por lo que nuestra organización y entendimiento fue mayor.</a:t>
+            </a:r>
+            <a:endParaRPr lang="en-US" dirty="0"/>
+          </a:p>
+        </p:txBody>
+      </p:sp>
+    </p:spTree>
+    <p:extLst>
+      <p:ext uri="{BB962C8B-B14F-4D97-AF65-F5344CB8AC3E}">
+        <p14:creationId xmlns:p14="http://schemas.microsoft.com/office/powerpoint/2010/main" val="2897461968"/>
       </p:ext>
     </p:extLst>
   </p:cSld>

</xml_diff>

<commit_message>
Añadí la introducción a la presentación y al documento
</commit_message>
<xml_diff>
--- a/Proyecto Final CS.pptx
+++ b/Proyecto Final CS.pptx
@@ -6,9 +6,10 @@
   </p:sldMasterIdLst>
   <p:sldIdLst>
     <p:sldId id="256" r:id="rId2"/>
-    <p:sldId id="257" r:id="rId3"/>
-    <p:sldId id="258" r:id="rId4"/>
-    <p:sldId id="259" r:id="rId5"/>
+    <p:sldId id="260" r:id="rId3"/>
+    <p:sldId id="257" r:id="rId4"/>
+    <p:sldId id="258" r:id="rId5"/>
+    <p:sldId id="259" r:id="rId6"/>
   </p:sldIdLst>
   <p:sldSz cx="12192000" cy="6858000"/>
   <p:notesSz cx="7772400" cy="10058400"/>
@@ -115,6 +116,14 @@
 </p:presentation>
 </file>
 
+<file path=ppt/revisionInfo.xml><?xml version="1.0" encoding="utf-8"?>
+<p1510:revInfo xmlns:a="http://schemas.openxmlformats.org/drawingml/2006/main" xmlns:r="http://schemas.openxmlformats.org/officeDocument/2006/relationships" xmlns:p1510="http://schemas.microsoft.com/office/powerpoint/2015/10/main">
+  <p1510:revLst>
+    <p1510:client id="{B91E4452-960C-3161-841E-C113D4F31C9D}" v="82" dt="2021-03-19T02:45:39.309"/>
+  </p1510:revLst>
+</p1510:revInfo>
+</file>
+
 <file path=ppt/slideLayouts/slideLayout1.xml><?xml version="1.0" encoding="utf-8"?>
 <p:sldLayout xmlns:a="http://schemas.openxmlformats.org/drawingml/2006/main" xmlns:r="http://schemas.openxmlformats.org/officeDocument/2006/relationships" xmlns:p="http://schemas.openxmlformats.org/presentationml/2006/main" showMasterSp="0" type="title" preserve="1">
   <p:cSld name="Title Slide">
@@ -172,7 +181,7 @@
           <a:noFill/>
           <a:extLst>
             <a:ext uri="{909E8E84-426E-40dd-AFC4-6F175D3DCCD1}">
-              <a14:hiddenFill xmlns="" xmlns:a14="http://schemas.microsoft.com/office/drawing/2010/main">
+              <a14:hiddenFill xmlns:a14="http://schemas.microsoft.com/office/drawing/2010/main" xmlns="">
                 <a:solidFill>
                   <a:srgbClr val="FFFFFF"/>
                 </a:solidFill>
@@ -231,7 +240,7 @@
             </a:ln>
             <a:extLst>
               <a:ext uri="{91240B29-F687-4f45-9708-019B960494DF}">
-                <a14:hiddenLine xmlns="" xmlns:a14="http://schemas.microsoft.com/office/drawing/2010/main" w="9525">
+                <a14:hiddenLine xmlns:a14="http://schemas.microsoft.com/office/drawing/2010/main" xmlns="" w="9525">
                   <a:solidFill>
                     <a:srgbClr val="000000"/>
                   </a:solidFill>
@@ -321,7 +330,7 @@
             </a:ln>
             <a:extLst>
               <a:ext uri="{91240B29-F687-4f45-9708-019B960494DF}">
-                <a14:hiddenLine xmlns="" xmlns:a14="http://schemas.microsoft.com/office/drawing/2010/main" w="9525">
+                <a14:hiddenLine xmlns:a14="http://schemas.microsoft.com/office/drawing/2010/main" xmlns="" w="9525">
                   <a:solidFill>
                     <a:srgbClr val="000000"/>
                   </a:solidFill>
@@ -411,7 +420,7 @@
             </a:ln>
             <a:extLst>
               <a:ext uri="{91240B29-F687-4f45-9708-019B960494DF}">
-                <a14:hiddenLine xmlns="" xmlns:a14="http://schemas.microsoft.com/office/drawing/2010/main" w="9525">
+                <a14:hiddenLine xmlns:a14="http://schemas.microsoft.com/office/drawing/2010/main" xmlns="" w="9525">
                   <a:solidFill>
                     <a:srgbClr val="000000"/>
                   </a:solidFill>
@@ -445,7 +454,7 @@
             </a:ln>
             <a:extLst>
               <a:ext uri="{91240B29-F687-4f45-9708-019B960494DF}">
-                <a14:hiddenLine xmlns="" xmlns:a14="http://schemas.microsoft.com/office/drawing/2010/main" w="9525">
+                <a14:hiddenLine xmlns:a14="http://schemas.microsoft.com/office/drawing/2010/main" xmlns="" w="9525">
                   <a:solidFill>
                     <a:srgbClr val="000000"/>
                   </a:solidFill>
@@ -535,7 +544,7 @@
             </a:ln>
             <a:extLst>
               <a:ext uri="{91240B29-F687-4f45-9708-019B960494DF}">
-                <a14:hiddenLine xmlns="" xmlns:a14="http://schemas.microsoft.com/office/drawing/2010/main" w="9525">
+                <a14:hiddenLine xmlns:a14="http://schemas.microsoft.com/office/drawing/2010/main" xmlns="" w="9525">
                   <a:solidFill>
                     <a:srgbClr val="000000"/>
                   </a:solidFill>
@@ -597,7 +606,7 @@
             </a:ln>
             <a:extLst>
               <a:ext uri="{91240B29-F687-4f45-9708-019B960494DF}">
-                <a14:hiddenLine xmlns="" xmlns:a14="http://schemas.microsoft.com/office/drawing/2010/main" w="9525">
+                <a14:hiddenLine xmlns:a14="http://schemas.microsoft.com/office/drawing/2010/main" xmlns="" w="9525">
                   <a:solidFill>
                     <a:srgbClr val="000000"/>
                   </a:solidFill>
@@ -659,7 +668,7 @@
             </a:ln>
             <a:extLst>
               <a:ext uri="{91240B29-F687-4f45-9708-019B960494DF}">
-                <a14:hiddenLine xmlns="" xmlns:a14="http://schemas.microsoft.com/office/drawing/2010/main" w="9525">
+                <a14:hiddenLine xmlns:a14="http://schemas.microsoft.com/office/drawing/2010/main" xmlns="" w="9525">
                   <a:solidFill>
                     <a:srgbClr val="000000"/>
                   </a:solidFill>
@@ -749,7 +758,7 @@
             </a:ln>
             <a:extLst>
               <a:ext uri="{91240B29-F687-4f45-9708-019B960494DF}">
-                <a14:hiddenLine xmlns="" xmlns:a14="http://schemas.microsoft.com/office/drawing/2010/main" w="9525">
+                <a14:hiddenLine xmlns:a14="http://schemas.microsoft.com/office/drawing/2010/main" xmlns="" w="9525">
                   <a:solidFill>
                     <a:srgbClr val="000000"/>
                   </a:solidFill>
@@ -811,7 +820,7 @@
             </a:ln>
             <a:extLst>
               <a:ext uri="{91240B29-F687-4f45-9708-019B960494DF}">
-                <a14:hiddenLine xmlns="" xmlns:a14="http://schemas.microsoft.com/office/drawing/2010/main" w="9525">
+                <a14:hiddenLine xmlns:a14="http://schemas.microsoft.com/office/drawing/2010/main" xmlns="" w="9525">
                   <a:solidFill>
                     <a:srgbClr val="000000"/>
                   </a:solidFill>
@@ -873,7 +882,7 @@
             </a:ln>
             <a:extLst>
               <a:ext uri="{91240B29-F687-4f45-9708-019B960494DF}">
-                <a14:hiddenLine xmlns="" xmlns:a14="http://schemas.microsoft.com/office/drawing/2010/main" w="9525">
+                <a14:hiddenLine xmlns:a14="http://schemas.microsoft.com/office/drawing/2010/main" xmlns="" w="9525">
                   <a:solidFill>
                     <a:srgbClr val="000000"/>
                   </a:solidFill>
@@ -963,7 +972,7 @@
             </a:ln>
             <a:extLst>
               <a:ext uri="{91240B29-F687-4f45-9708-019B960494DF}">
-                <a14:hiddenLine xmlns="" xmlns:a14="http://schemas.microsoft.com/office/drawing/2010/main" w="9525">
+                <a14:hiddenLine xmlns:a14="http://schemas.microsoft.com/office/drawing/2010/main" xmlns="" w="9525">
                   <a:solidFill>
                     <a:srgbClr val="000000"/>
                   </a:solidFill>
@@ -1053,7 +1062,7 @@
             </a:ln>
             <a:extLst>
               <a:ext uri="{91240B29-F687-4f45-9708-019B960494DF}">
-                <a14:hiddenLine xmlns="" xmlns:a14="http://schemas.microsoft.com/office/drawing/2010/main" w="9525">
+                <a14:hiddenLine xmlns:a14="http://schemas.microsoft.com/office/drawing/2010/main" xmlns="" w="9525">
                   <a:solidFill>
                     <a:srgbClr val="000000"/>
                   </a:solidFill>
@@ -1115,7 +1124,7 @@
             </a:ln>
             <a:extLst>
               <a:ext uri="{91240B29-F687-4f45-9708-019B960494DF}">
-                <a14:hiddenLine xmlns="" xmlns:a14="http://schemas.microsoft.com/office/drawing/2010/main" w="9525">
+                <a14:hiddenLine xmlns:a14="http://schemas.microsoft.com/office/drawing/2010/main" xmlns="" w="9525">
                   <a:solidFill>
                     <a:srgbClr val="000000"/>
                   </a:solidFill>
@@ -1225,7 +1234,7 @@
             </a:ln>
             <a:extLst>
               <a:ext uri="{91240B29-F687-4f45-9708-019B960494DF}">
-                <a14:hiddenLine xmlns="" xmlns:a14="http://schemas.microsoft.com/office/drawing/2010/main" w="9525">
+                <a14:hiddenLine xmlns:a14="http://schemas.microsoft.com/office/drawing/2010/main" xmlns="" w="9525">
                   <a:solidFill>
                     <a:srgbClr val="000000"/>
                   </a:solidFill>
@@ -1287,7 +1296,7 @@
             </a:ln>
             <a:extLst>
               <a:ext uri="{91240B29-F687-4f45-9708-019B960494DF}">
-                <a14:hiddenLine xmlns="" xmlns:a14="http://schemas.microsoft.com/office/drawing/2010/main" w="9525">
+                <a14:hiddenLine xmlns:a14="http://schemas.microsoft.com/office/drawing/2010/main" xmlns="" w="9525">
                   <a:solidFill>
                     <a:srgbClr val="000000"/>
                   </a:solidFill>
@@ -1377,7 +1386,7 @@
             </a:ln>
             <a:extLst>
               <a:ext uri="{91240B29-F687-4f45-9708-019B960494DF}">
-                <a14:hiddenLine xmlns="" xmlns:a14="http://schemas.microsoft.com/office/drawing/2010/main" w="9525">
+                <a14:hiddenLine xmlns:a14="http://schemas.microsoft.com/office/drawing/2010/main" xmlns="" w="9525">
                   <a:solidFill>
                     <a:srgbClr val="000000"/>
                   </a:solidFill>
@@ -1467,7 +1476,7 @@
             </a:ln>
             <a:extLst>
               <a:ext uri="{91240B29-F687-4f45-9708-019B960494DF}">
-                <a14:hiddenLine xmlns="" xmlns:a14="http://schemas.microsoft.com/office/drawing/2010/main" w="9525">
+                <a14:hiddenLine xmlns:a14="http://schemas.microsoft.com/office/drawing/2010/main" xmlns="" w="9525">
                   <a:solidFill>
                     <a:srgbClr val="000000"/>
                   </a:solidFill>
@@ -1529,7 +1538,7 @@
             </a:ln>
             <a:extLst>
               <a:ext uri="{91240B29-F687-4f45-9708-019B960494DF}">
-                <a14:hiddenLine xmlns="" xmlns:a14="http://schemas.microsoft.com/office/drawing/2010/main" w="9525">
+                <a14:hiddenLine xmlns:a14="http://schemas.microsoft.com/office/drawing/2010/main" xmlns="" w="9525">
                   <a:solidFill>
                     <a:srgbClr val="000000"/>
                   </a:solidFill>
@@ -1619,7 +1628,7 @@
             </a:ln>
             <a:extLst>
               <a:ext uri="{91240B29-F687-4f45-9708-019B960494DF}">
-                <a14:hiddenLine xmlns="" xmlns:a14="http://schemas.microsoft.com/office/drawing/2010/main" w="9525">
+                <a14:hiddenLine xmlns:a14="http://schemas.microsoft.com/office/drawing/2010/main" xmlns="" w="9525">
                   <a:solidFill>
                     <a:srgbClr val="000000"/>
                   </a:solidFill>
@@ -1709,7 +1718,7 @@
             </a:ln>
             <a:extLst>
               <a:ext uri="{91240B29-F687-4f45-9708-019B960494DF}">
-                <a14:hiddenLine xmlns="" xmlns:a14="http://schemas.microsoft.com/office/drawing/2010/main" w="9525">
+                <a14:hiddenLine xmlns:a14="http://schemas.microsoft.com/office/drawing/2010/main" xmlns="" w="9525">
                   <a:solidFill>
                     <a:srgbClr val="000000"/>
                   </a:solidFill>
@@ -1765,7 +1774,7 @@
             </a:ln>
             <a:extLst>
               <a:ext uri="{91240B29-F687-4f45-9708-019B960494DF}">
-                <a14:hiddenLine xmlns="" xmlns:a14="http://schemas.microsoft.com/office/drawing/2010/main" w="9525">
+                <a14:hiddenLine xmlns:a14="http://schemas.microsoft.com/office/drawing/2010/main" xmlns="" w="9525">
                   <a:solidFill>
                     <a:srgbClr val="000000"/>
                   </a:solidFill>
@@ -1855,7 +1864,7 @@
             </a:ln>
             <a:extLst>
               <a:ext uri="{91240B29-F687-4f45-9708-019B960494DF}">
-                <a14:hiddenLine xmlns="" xmlns:a14="http://schemas.microsoft.com/office/drawing/2010/main" w="9525">
+                <a14:hiddenLine xmlns:a14="http://schemas.microsoft.com/office/drawing/2010/main" xmlns="" w="9525">
                   <a:solidFill>
                     <a:srgbClr val="000000"/>
                   </a:solidFill>
@@ -1911,7 +1920,7 @@
             </a:ln>
             <a:extLst>
               <a:ext uri="{91240B29-F687-4f45-9708-019B960494DF}">
-                <a14:hiddenLine xmlns="" xmlns:a14="http://schemas.microsoft.com/office/drawing/2010/main" w="9525">
+                <a14:hiddenLine xmlns:a14="http://schemas.microsoft.com/office/drawing/2010/main" xmlns="" w="9525">
                   <a:solidFill>
                     <a:srgbClr val="000000"/>
                   </a:solidFill>
@@ -2001,7 +2010,7 @@
             </a:ln>
             <a:extLst>
               <a:ext uri="{91240B29-F687-4f45-9708-019B960494DF}">
-                <a14:hiddenLine xmlns="" xmlns:a14="http://schemas.microsoft.com/office/drawing/2010/main" w="9525">
+                <a14:hiddenLine xmlns:a14="http://schemas.microsoft.com/office/drawing/2010/main" xmlns="" w="9525">
                   <a:solidFill>
                     <a:srgbClr val="000000"/>
                   </a:solidFill>
@@ -2069,7 +2078,7 @@
             </a:ln>
             <a:extLst>
               <a:ext uri="{91240B29-F687-4f45-9708-019B960494DF}">
-                <a14:hiddenLine xmlns="" xmlns:a14="http://schemas.microsoft.com/office/drawing/2010/main" w="9525">
+                <a14:hiddenLine xmlns:a14="http://schemas.microsoft.com/office/drawing/2010/main" xmlns="" w="9525">
                   <a:solidFill>
                     <a:srgbClr val="000000"/>
                   </a:solidFill>
@@ -2159,7 +2168,7 @@
             </a:ln>
             <a:extLst>
               <a:ext uri="{91240B29-F687-4f45-9708-019B960494DF}">
-                <a14:hiddenLine xmlns="" xmlns:a14="http://schemas.microsoft.com/office/drawing/2010/main" w="9525">
+                <a14:hiddenLine xmlns:a14="http://schemas.microsoft.com/office/drawing/2010/main" xmlns="" w="9525">
                   <a:solidFill>
                     <a:srgbClr val="000000"/>
                   </a:solidFill>
@@ -2227,7 +2236,7 @@
             </a:ln>
             <a:extLst>
               <a:ext uri="{91240B29-F687-4f45-9708-019B960494DF}">
-                <a14:hiddenLine xmlns="" xmlns:a14="http://schemas.microsoft.com/office/drawing/2010/main" w="9525">
+                <a14:hiddenLine xmlns:a14="http://schemas.microsoft.com/office/drawing/2010/main" xmlns="" w="9525">
                   <a:solidFill>
                     <a:srgbClr val="000000"/>
                   </a:solidFill>
@@ -2317,7 +2326,7 @@
             </a:ln>
             <a:extLst>
               <a:ext uri="{91240B29-F687-4f45-9708-019B960494DF}">
-                <a14:hiddenLine xmlns="" xmlns:a14="http://schemas.microsoft.com/office/drawing/2010/main" w="9525">
+                <a14:hiddenLine xmlns:a14="http://schemas.microsoft.com/office/drawing/2010/main" xmlns="" w="9525">
                   <a:solidFill>
                     <a:srgbClr val="000000"/>
                   </a:solidFill>
@@ -2351,7 +2360,7 @@
             </a:ln>
             <a:extLst>
               <a:ext uri="{91240B29-F687-4f45-9708-019B960494DF}">
-                <a14:hiddenLine xmlns="" xmlns:a14="http://schemas.microsoft.com/office/drawing/2010/main" w="9525">
+                <a14:hiddenLine xmlns:a14="http://schemas.microsoft.com/office/drawing/2010/main" xmlns="" w="9525">
                   <a:solidFill>
                     <a:srgbClr val="000000"/>
                   </a:solidFill>
@@ -2441,7 +2450,7 @@
             </a:ln>
             <a:extLst>
               <a:ext uri="{91240B29-F687-4f45-9708-019B960494DF}">
-                <a14:hiddenLine xmlns="" xmlns:a14="http://schemas.microsoft.com/office/drawing/2010/main" w="9525">
+                <a14:hiddenLine xmlns:a14="http://schemas.microsoft.com/office/drawing/2010/main" xmlns="" w="9525">
                   <a:solidFill>
                     <a:srgbClr val="000000"/>
                   </a:solidFill>
@@ -2503,7 +2512,7 @@
             </a:ln>
             <a:extLst>
               <a:ext uri="{91240B29-F687-4f45-9708-019B960494DF}">
-                <a14:hiddenLine xmlns="" xmlns:a14="http://schemas.microsoft.com/office/drawing/2010/main" w="9525">
+                <a14:hiddenLine xmlns:a14="http://schemas.microsoft.com/office/drawing/2010/main" xmlns="" w="9525">
                   <a:solidFill>
                     <a:srgbClr val="000000"/>
                   </a:solidFill>
@@ -2565,7 +2574,7 @@
             </a:ln>
             <a:extLst>
               <a:ext uri="{91240B29-F687-4f45-9708-019B960494DF}">
-                <a14:hiddenLine xmlns="" xmlns:a14="http://schemas.microsoft.com/office/drawing/2010/main" w="9525">
+                <a14:hiddenLine xmlns:a14="http://schemas.microsoft.com/office/drawing/2010/main" xmlns="" w="9525">
                   <a:solidFill>
                     <a:srgbClr val="000000"/>
                   </a:solidFill>
@@ -2655,7 +2664,7 @@
             </a:ln>
             <a:extLst>
               <a:ext uri="{91240B29-F687-4f45-9708-019B960494DF}">
-                <a14:hiddenLine xmlns="" xmlns:a14="http://schemas.microsoft.com/office/drawing/2010/main" w="9525">
+                <a14:hiddenLine xmlns:a14="http://schemas.microsoft.com/office/drawing/2010/main" xmlns="" w="9525">
                   <a:solidFill>
                     <a:srgbClr val="000000"/>
                   </a:solidFill>
@@ -2723,7 +2732,7 @@
             </a:ln>
             <a:extLst>
               <a:ext uri="{91240B29-F687-4f45-9708-019B960494DF}">
-                <a14:hiddenLine xmlns="" xmlns:a14="http://schemas.microsoft.com/office/drawing/2010/main" w="9525">
+                <a14:hiddenLine xmlns:a14="http://schemas.microsoft.com/office/drawing/2010/main" xmlns="" w="9525">
                   <a:solidFill>
                     <a:srgbClr val="000000"/>
                   </a:solidFill>
@@ -2785,7 +2794,7 @@
             </a:ln>
             <a:extLst>
               <a:ext uri="{91240B29-F687-4f45-9708-019B960494DF}">
-                <a14:hiddenLine xmlns="" xmlns:a14="http://schemas.microsoft.com/office/drawing/2010/main" w="9525">
+                <a14:hiddenLine xmlns:a14="http://schemas.microsoft.com/office/drawing/2010/main" xmlns="" w="9525">
                   <a:solidFill>
                     <a:srgbClr val="000000"/>
                   </a:solidFill>
@@ -2875,7 +2884,7 @@
             </a:ln>
             <a:extLst>
               <a:ext uri="{91240B29-F687-4f45-9708-019B960494DF}">
-                <a14:hiddenLine xmlns="" xmlns:a14="http://schemas.microsoft.com/office/drawing/2010/main" w="9525">
+                <a14:hiddenLine xmlns:a14="http://schemas.microsoft.com/office/drawing/2010/main" xmlns="" w="9525">
                   <a:solidFill>
                     <a:srgbClr val="000000"/>
                   </a:solidFill>
@@ -2937,7 +2946,7 @@
             </a:ln>
             <a:extLst>
               <a:ext uri="{91240B29-F687-4f45-9708-019B960494DF}">
-                <a14:hiddenLine xmlns="" xmlns:a14="http://schemas.microsoft.com/office/drawing/2010/main" w="9525">
+                <a14:hiddenLine xmlns:a14="http://schemas.microsoft.com/office/drawing/2010/main" xmlns="" w="9525">
                   <a:solidFill>
                     <a:srgbClr val="000000"/>
                   </a:solidFill>
@@ -3027,7 +3036,7 @@
             </a:ln>
             <a:extLst>
               <a:ext uri="{91240B29-F687-4f45-9708-019B960494DF}">
-                <a14:hiddenLine xmlns="" xmlns:a14="http://schemas.microsoft.com/office/drawing/2010/main" w="9525">
+                <a14:hiddenLine xmlns:a14="http://schemas.microsoft.com/office/drawing/2010/main" xmlns="" w="9525">
                   <a:solidFill>
                     <a:srgbClr val="000000"/>
                   </a:solidFill>
@@ -3089,7 +3098,7 @@
             </a:ln>
             <a:extLst>
               <a:ext uri="{91240B29-F687-4f45-9708-019B960494DF}">
-                <a14:hiddenLine xmlns="" xmlns:a14="http://schemas.microsoft.com/office/drawing/2010/main" w="9525">
+                <a14:hiddenLine xmlns:a14="http://schemas.microsoft.com/office/drawing/2010/main" xmlns="" w="9525">
                   <a:solidFill>
                     <a:srgbClr val="000000"/>
                   </a:solidFill>
@@ -3179,7 +3188,7 @@
             </a:ln>
             <a:extLst>
               <a:ext uri="{91240B29-F687-4f45-9708-019B960494DF}">
-                <a14:hiddenLine xmlns="" xmlns:a14="http://schemas.microsoft.com/office/drawing/2010/main" w="9525">
+                <a14:hiddenLine xmlns:a14="http://schemas.microsoft.com/office/drawing/2010/main" xmlns="" w="9525">
                   <a:solidFill>
                     <a:srgbClr val="000000"/>
                   </a:solidFill>
@@ -3213,7 +3222,7 @@
             </a:ln>
             <a:extLst>
               <a:ext uri="{91240B29-F687-4f45-9708-019B960494DF}">
-                <a14:hiddenLine xmlns="" xmlns:a14="http://schemas.microsoft.com/office/drawing/2010/main" w="9525">
+                <a14:hiddenLine xmlns:a14="http://schemas.microsoft.com/office/drawing/2010/main" xmlns="" w="9525">
                   <a:solidFill>
                     <a:srgbClr val="000000"/>
                   </a:solidFill>
@@ -3278,7 +3287,7 @@
             </a:ln>
             <a:extLst>
               <a:ext uri="{91240B29-F687-4f45-9708-019B960494DF}">
-                <a14:hiddenLine xmlns="" xmlns:a14="http://schemas.microsoft.com/office/drawing/2010/main" w="9525">
+                <a14:hiddenLine xmlns:a14="http://schemas.microsoft.com/office/drawing/2010/main" xmlns="" w="9525">
                   <a:solidFill>
                     <a:srgbClr val="000000"/>
                   </a:solidFill>
@@ -3368,7 +3377,7 @@
             </a:ln>
             <a:extLst>
               <a:ext uri="{91240B29-F687-4f45-9708-019B960494DF}">
-                <a14:hiddenLine xmlns="" xmlns:a14="http://schemas.microsoft.com/office/drawing/2010/main" w="9525">
+                <a14:hiddenLine xmlns:a14="http://schemas.microsoft.com/office/drawing/2010/main" xmlns="" w="9525">
                   <a:solidFill>
                     <a:srgbClr val="000000"/>
                   </a:solidFill>
@@ -3430,7 +3439,7 @@
             </a:ln>
             <a:extLst>
               <a:ext uri="{91240B29-F687-4f45-9708-019B960494DF}">
-                <a14:hiddenLine xmlns="" xmlns:a14="http://schemas.microsoft.com/office/drawing/2010/main" w="9525">
+                <a14:hiddenLine xmlns:a14="http://schemas.microsoft.com/office/drawing/2010/main" xmlns="" w="9525">
                   <a:solidFill>
                     <a:srgbClr val="000000"/>
                   </a:solidFill>
@@ -3520,7 +3529,7 @@
             </a:ln>
             <a:extLst>
               <a:ext uri="{91240B29-F687-4f45-9708-019B960494DF}">
-                <a14:hiddenLine xmlns="" xmlns:a14="http://schemas.microsoft.com/office/drawing/2010/main" w="9525">
+                <a14:hiddenLine xmlns:a14="http://schemas.microsoft.com/office/drawing/2010/main" xmlns="" w="9525">
                   <a:solidFill>
                     <a:srgbClr val="000000"/>
                   </a:solidFill>
@@ -3610,7 +3619,7 @@
             </a:ln>
             <a:extLst>
               <a:ext uri="{91240B29-F687-4f45-9708-019B960494DF}">
-                <a14:hiddenLine xmlns="" xmlns:a14="http://schemas.microsoft.com/office/drawing/2010/main" w="9525">
+                <a14:hiddenLine xmlns:a14="http://schemas.microsoft.com/office/drawing/2010/main" xmlns="" w="9525">
                   <a:solidFill>
                     <a:srgbClr val="000000"/>
                   </a:solidFill>
@@ -3675,7 +3684,7 @@
             </a:ln>
             <a:extLst>
               <a:ext uri="{91240B29-F687-4f45-9708-019B960494DF}">
-                <a14:hiddenLine xmlns="" xmlns:a14="http://schemas.microsoft.com/office/drawing/2010/main" w="9525">
+                <a14:hiddenLine xmlns:a14="http://schemas.microsoft.com/office/drawing/2010/main" xmlns="" w="9525">
                   <a:solidFill>
                     <a:srgbClr val="000000"/>
                   </a:solidFill>
@@ -3737,7 +3746,7 @@
             </a:ln>
             <a:extLst>
               <a:ext uri="{91240B29-F687-4f45-9708-019B960494DF}">
-                <a14:hiddenLine xmlns="" xmlns:a14="http://schemas.microsoft.com/office/drawing/2010/main" w="9525">
+                <a14:hiddenLine xmlns:a14="http://schemas.microsoft.com/office/drawing/2010/main" xmlns="" w="9525">
                   <a:solidFill>
                     <a:srgbClr val="000000"/>
                   </a:solidFill>
@@ -3827,7 +3836,7 @@
             </a:ln>
             <a:extLst>
               <a:ext uri="{91240B29-F687-4f45-9708-019B960494DF}">
-                <a14:hiddenLine xmlns="" xmlns:a14="http://schemas.microsoft.com/office/drawing/2010/main" w="9525">
+                <a14:hiddenLine xmlns:a14="http://schemas.microsoft.com/office/drawing/2010/main" xmlns="" w="9525">
                   <a:solidFill>
                     <a:srgbClr val="000000"/>
                   </a:solidFill>
@@ -3917,7 +3926,7 @@
             </a:ln>
             <a:extLst>
               <a:ext uri="{91240B29-F687-4f45-9708-019B960494DF}">
-                <a14:hiddenLine xmlns="" xmlns:a14="http://schemas.microsoft.com/office/drawing/2010/main" w="9525">
+                <a14:hiddenLine xmlns:a14="http://schemas.microsoft.com/office/drawing/2010/main" xmlns="" w="9525">
                   <a:solidFill>
                     <a:srgbClr val="000000"/>
                   </a:solidFill>
@@ -3979,7 +3988,7 @@
             </a:ln>
             <a:extLst>
               <a:ext uri="{91240B29-F687-4f45-9708-019B960494DF}">
-                <a14:hiddenLine xmlns="" xmlns:a14="http://schemas.microsoft.com/office/drawing/2010/main" w="9525">
+                <a14:hiddenLine xmlns:a14="http://schemas.microsoft.com/office/drawing/2010/main" xmlns="" w="9525">
                   <a:solidFill>
                     <a:srgbClr val="000000"/>
                   </a:solidFill>
@@ -4099,7 +4108,7 @@
             </a:ln>
             <a:extLst>
               <a:ext uri="{91240B29-F687-4f45-9708-019B960494DF}">
-                <a14:hiddenLine xmlns="" xmlns:a14="http://schemas.microsoft.com/office/drawing/2010/main" w="9525">
+                <a14:hiddenLine xmlns:a14="http://schemas.microsoft.com/office/drawing/2010/main" xmlns="" w="9525">
                   <a:solidFill>
                     <a:srgbClr val="000000"/>
                   </a:solidFill>
@@ -4167,7 +4176,7 @@
             </a:ln>
             <a:extLst>
               <a:ext uri="{91240B29-F687-4f45-9708-019B960494DF}">
-                <a14:hiddenLine xmlns="" xmlns:a14="http://schemas.microsoft.com/office/drawing/2010/main" w="9525">
+                <a14:hiddenLine xmlns:a14="http://schemas.microsoft.com/office/drawing/2010/main" xmlns="" w="9525">
                   <a:solidFill>
                     <a:srgbClr val="000000"/>
                   </a:solidFill>
@@ -4257,7 +4266,7 @@
             </a:ln>
             <a:extLst>
               <a:ext uri="{91240B29-F687-4f45-9708-019B960494DF}">
-                <a14:hiddenLine xmlns="" xmlns:a14="http://schemas.microsoft.com/office/drawing/2010/main" w="9525">
+                <a14:hiddenLine xmlns:a14="http://schemas.microsoft.com/office/drawing/2010/main" xmlns="" w="9525">
                   <a:solidFill>
                     <a:srgbClr val="000000"/>
                   </a:solidFill>
@@ -4473,7 +4482,7 @@
                 </a:solidFill>
                 <a:latin typeface="Calibri"/>
               </a:rPr>
-              <a:t>‹Nº›</a:t>
+              <a:t>‹#›</a:t>
             </a:fld>
             <a:endParaRPr lang="en-US" sz="1200" b="0" strike="noStrike" spc="-1">
               <a:latin typeface="Times New Roman"/>
@@ -4756,7 +4765,7 @@
                 </a:solidFill>
                 <a:latin typeface="Calibri"/>
               </a:rPr>
-              <a:t>‹Nº›</a:t>
+              <a:t>‹#›</a:t>
             </a:fld>
             <a:endParaRPr lang="en-US" sz="1200" b="0" strike="noStrike" spc="-1">
               <a:latin typeface="Times New Roman"/>
@@ -4978,7 +4987,7 @@
                 </a:solidFill>
                 <a:latin typeface="Calibri"/>
               </a:rPr>
-              <a:t>‹Nº›</a:t>
+              <a:t>‹#›</a:t>
             </a:fld>
             <a:endParaRPr lang="en-US" sz="1200" b="0" strike="noStrike" spc="-1">
               <a:latin typeface="Times New Roman"/>
@@ -5267,7 +5276,7 @@
                 </a:solidFill>
                 <a:latin typeface="Calibri"/>
               </a:rPr>
-              <a:t>‹Nº›</a:t>
+              <a:t>‹#›</a:t>
             </a:fld>
             <a:endParaRPr lang="en-US" sz="1200" b="0" strike="noStrike" spc="-1">
               <a:latin typeface="Times New Roman"/>
@@ -5727,7 +5736,7 @@
                 </a:solidFill>
                 <a:latin typeface="Calibri"/>
               </a:rPr>
-              <a:t>‹Nº›</a:t>
+              <a:t>‹#›</a:t>
             </a:fld>
             <a:endParaRPr lang="en-US" sz="1200" b="0" strike="noStrike" spc="-1">
               <a:latin typeface="Times New Roman"/>
@@ -6299,7 +6308,7 @@
                 </a:solidFill>
                 <a:latin typeface="Calibri"/>
               </a:rPr>
-              <a:t>‹Nº›</a:t>
+              <a:t>‹#›</a:t>
             </a:fld>
             <a:endParaRPr lang="en-US" sz="1200" b="0" strike="noStrike" spc="-1">
               <a:latin typeface="Times New Roman"/>
@@ -7045,7 +7054,7 @@
                 </a:solidFill>
                 <a:latin typeface="Calibri"/>
               </a:rPr>
-              <a:t>‹Nº›</a:t>
+              <a:t>‹#›</a:t>
             </a:fld>
             <a:endParaRPr lang="en-US" sz="1200" b="0" strike="noStrike" spc="-1">
               <a:latin typeface="Times New Roman"/>
@@ -7241,7 +7250,7 @@
                 </a:solidFill>
                 <a:latin typeface="Calibri"/>
               </a:rPr>
-              <a:t>‹Nº›</a:t>
+              <a:t>‹#›</a:t>
             </a:fld>
             <a:endParaRPr lang="en-US" sz="1200" b="0" strike="noStrike" spc="-1">
               <a:latin typeface="Times New Roman"/>
@@ -7447,7 +7456,7 @@
                 </a:solidFill>
                 <a:latin typeface="Calibri"/>
               </a:rPr>
-              <a:t>‹Nº›</a:t>
+              <a:t>‹#›</a:t>
             </a:fld>
             <a:endParaRPr lang="en-US" sz="1200" b="0" strike="noStrike" spc="-1">
               <a:latin typeface="Times New Roman"/>
@@ -7735,7 +7744,7 @@
                 </a:solidFill>
                 <a:latin typeface="Calibri"/>
               </a:rPr>
-              <a:t>‹Nº›</a:t>
+              <a:t>‹#›</a:t>
             </a:fld>
             <a:endParaRPr lang="en-US" sz="1200" b="0" strike="noStrike" spc="-1">
               <a:latin typeface="Times New Roman"/>
@@ -8011,7 +8020,7 @@
                 </a:solidFill>
                 <a:latin typeface="Calibri"/>
               </a:rPr>
-              <a:t>‹Nº›</a:t>
+              <a:t>‹#›</a:t>
             </a:fld>
             <a:endParaRPr lang="en-US" sz="1200" b="0" strike="noStrike" spc="-1">
               <a:latin typeface="Times New Roman"/>
@@ -8269,7 +8278,7 @@
                 </a:solidFill>
                 <a:latin typeface="Calibri"/>
               </a:rPr>
-              <a:t>‹Nº›</a:t>
+              <a:t>‹#›</a:t>
             </a:fld>
             <a:endParaRPr lang="en-US" sz="1200" b="0" strike="noStrike" spc="-1">
               <a:latin typeface="Times New Roman"/>
@@ -8676,7 +8685,7 @@
                 </a:solidFill>
                 <a:latin typeface="Calibri"/>
               </a:rPr>
-              <a:t>‹Nº›</a:t>
+              <a:t>‹#›</a:t>
             </a:fld>
             <a:endParaRPr lang="en-US" sz="1200" b="0" strike="noStrike" spc="-1">
               <a:latin typeface="Times New Roman"/>
@@ -8796,7 +8805,7 @@
           <a:p>
             <a:fld id="{6D22F896-40B5-4ADD-8801-0D06FADFA095}" type="slidenum">
               <a:rPr lang="en-US" smtClean="0"/>
-              <a:t>‹Nº›</a:t>
+              <a:t>‹#›</a:t>
             </a:fld>
             <a:endParaRPr lang="en-US" dirty="0"/>
           </a:p>
@@ -8915,7 +8924,7 @@
                 </a:solidFill>
                 <a:latin typeface="Calibri"/>
               </a:rPr>
-              <a:t>‹Nº›</a:t>
+              <a:t>‹#›</a:t>
             </a:fld>
             <a:endParaRPr lang="en-US" sz="1200" b="0" strike="noStrike" spc="-1">
               <a:latin typeface="Times New Roman"/>
@@ -9190,7 +9199,7 @@
                 </a:solidFill>
                 <a:latin typeface="Calibri"/>
               </a:rPr>
-              <a:t>‹Nº›</a:t>
+              <a:t>‹#›</a:t>
             </a:fld>
             <a:endParaRPr lang="en-US" sz="1200" b="0" strike="noStrike" spc="-1">
               <a:latin typeface="Times New Roman"/>
@@ -9496,7 +9505,7 @@
                 </a:solidFill>
                 <a:latin typeface="Calibri"/>
               </a:rPr>
-              <a:t>‹Nº›</a:t>
+              <a:t>‹#›</a:t>
             </a:fld>
             <a:endParaRPr lang="en-US" sz="1200" b="0" strike="noStrike" spc="-1">
               <a:latin typeface="Times New Roman"/>
@@ -9579,7 +9588,7 @@
           <a:noFill/>
           <a:extLst>
             <a:ext uri="{909E8E84-426E-40dd-AFC4-6F175D3DCCD1}">
-              <a14:hiddenFill xmlns="" xmlns:a14="http://schemas.microsoft.com/office/drawing/2010/main">
+              <a14:hiddenFill xmlns:a14="http://schemas.microsoft.com/office/drawing/2010/main" xmlns="">
                 <a:solidFill>
                   <a:srgbClr val="FFFFFF"/>
                 </a:solidFill>
@@ -9653,7 +9662,7 @@
               </a:ln>
               <a:extLst>
                 <a:ext uri="{91240B29-F687-4f45-9708-019B960494DF}">
-                  <a14:hiddenLine xmlns="" xmlns:a14="http://schemas.microsoft.com/office/drawing/2010/main" w="9525">
+                  <a14:hiddenLine xmlns:a14="http://schemas.microsoft.com/office/drawing/2010/main" xmlns="" w="9525">
                     <a:solidFill>
                       <a:srgbClr val="000000"/>
                     </a:solidFill>
@@ -9743,7 +9752,7 @@
               </a:ln>
               <a:extLst>
                 <a:ext uri="{91240B29-F687-4f45-9708-019B960494DF}">
-                  <a14:hiddenLine xmlns="" xmlns:a14="http://schemas.microsoft.com/office/drawing/2010/main" w="9525">
+                  <a14:hiddenLine xmlns:a14="http://schemas.microsoft.com/office/drawing/2010/main" xmlns="" w="9525">
                     <a:solidFill>
                       <a:srgbClr val="000000"/>
                     </a:solidFill>
@@ -9833,7 +9842,7 @@
               </a:ln>
               <a:extLst>
                 <a:ext uri="{91240B29-F687-4f45-9708-019B960494DF}">
-                  <a14:hiddenLine xmlns="" xmlns:a14="http://schemas.microsoft.com/office/drawing/2010/main" w="9525">
+                  <a14:hiddenLine xmlns:a14="http://schemas.microsoft.com/office/drawing/2010/main" xmlns="" w="9525">
                     <a:solidFill>
                       <a:srgbClr val="000000"/>
                     </a:solidFill>
@@ -9895,7 +9904,7 @@
               </a:ln>
               <a:extLst>
                 <a:ext uri="{91240B29-F687-4f45-9708-019B960494DF}">
-                  <a14:hiddenLine xmlns="" xmlns:a14="http://schemas.microsoft.com/office/drawing/2010/main" w="9525">
+                  <a14:hiddenLine xmlns:a14="http://schemas.microsoft.com/office/drawing/2010/main" xmlns="" w="9525">
                     <a:solidFill>
                       <a:srgbClr val="000000"/>
                     </a:solidFill>
@@ -9985,7 +9994,7 @@
               </a:ln>
               <a:extLst>
                 <a:ext uri="{91240B29-F687-4f45-9708-019B960494DF}">
-                  <a14:hiddenLine xmlns="" xmlns:a14="http://schemas.microsoft.com/office/drawing/2010/main" w="9525">
+                  <a14:hiddenLine xmlns:a14="http://schemas.microsoft.com/office/drawing/2010/main" xmlns="" w="9525">
                     <a:solidFill>
                       <a:srgbClr val="000000"/>
                     </a:solidFill>
@@ -10047,7 +10056,7 @@
               </a:ln>
               <a:extLst>
                 <a:ext uri="{91240B29-F687-4f45-9708-019B960494DF}">
-                  <a14:hiddenLine xmlns="" xmlns:a14="http://schemas.microsoft.com/office/drawing/2010/main" w="9525">
+                  <a14:hiddenLine xmlns:a14="http://schemas.microsoft.com/office/drawing/2010/main" xmlns="" w="9525">
                     <a:solidFill>
                       <a:srgbClr val="000000"/>
                     </a:solidFill>
@@ -10109,7 +10118,7 @@
               </a:ln>
               <a:extLst>
                 <a:ext uri="{91240B29-F687-4f45-9708-019B960494DF}">
-                  <a14:hiddenLine xmlns="" xmlns:a14="http://schemas.microsoft.com/office/drawing/2010/main" w="9525">
+                  <a14:hiddenLine xmlns:a14="http://schemas.microsoft.com/office/drawing/2010/main" xmlns="" w="9525">
                     <a:solidFill>
                       <a:srgbClr val="000000"/>
                     </a:solidFill>
@@ -10199,7 +10208,7 @@
               </a:ln>
               <a:extLst>
                 <a:ext uri="{91240B29-F687-4f45-9708-019B960494DF}">
-                  <a14:hiddenLine xmlns="" xmlns:a14="http://schemas.microsoft.com/office/drawing/2010/main" w="9525">
+                  <a14:hiddenLine xmlns:a14="http://schemas.microsoft.com/office/drawing/2010/main" xmlns="" w="9525">
                     <a:solidFill>
                       <a:srgbClr val="000000"/>
                     </a:solidFill>
@@ -10289,7 +10298,7 @@
               </a:ln>
               <a:extLst>
                 <a:ext uri="{91240B29-F687-4f45-9708-019B960494DF}">
-                  <a14:hiddenLine xmlns="" xmlns:a14="http://schemas.microsoft.com/office/drawing/2010/main" w="9525">
+                  <a14:hiddenLine xmlns:a14="http://schemas.microsoft.com/office/drawing/2010/main" xmlns="" w="9525">
                     <a:solidFill>
                       <a:srgbClr val="000000"/>
                     </a:solidFill>
@@ -10351,7 +10360,7 @@
               </a:ln>
               <a:extLst>
                 <a:ext uri="{91240B29-F687-4f45-9708-019B960494DF}">
-                  <a14:hiddenLine xmlns="" xmlns:a14="http://schemas.microsoft.com/office/drawing/2010/main" w="9525">
+                  <a14:hiddenLine xmlns:a14="http://schemas.microsoft.com/office/drawing/2010/main" xmlns="" w="9525">
                     <a:solidFill>
                       <a:srgbClr val="000000"/>
                     </a:solidFill>
@@ -10461,7 +10470,7 @@
               </a:ln>
               <a:extLst>
                 <a:ext uri="{91240B29-F687-4f45-9708-019B960494DF}">
-                  <a14:hiddenLine xmlns="" xmlns:a14="http://schemas.microsoft.com/office/drawing/2010/main" w="9525">
+                  <a14:hiddenLine xmlns:a14="http://schemas.microsoft.com/office/drawing/2010/main" xmlns="" w="9525">
                     <a:solidFill>
                       <a:srgbClr val="000000"/>
                     </a:solidFill>
@@ -10545,7 +10554,7 @@
               </a:ln>
               <a:extLst>
                 <a:ext uri="{91240B29-F687-4f45-9708-019B960494DF}">
-                  <a14:hiddenLine xmlns="" xmlns:a14="http://schemas.microsoft.com/office/drawing/2010/main" w="9525">
+                  <a14:hiddenLine xmlns:a14="http://schemas.microsoft.com/office/drawing/2010/main" xmlns="" w="9525">
                     <a:solidFill>
                       <a:srgbClr val="000000"/>
                     </a:solidFill>
@@ -10607,7 +10616,7 @@
               </a:ln>
               <a:extLst>
                 <a:ext uri="{91240B29-F687-4f45-9708-019B960494DF}">
-                  <a14:hiddenLine xmlns="" xmlns:a14="http://schemas.microsoft.com/office/drawing/2010/main" w="9525">
+                  <a14:hiddenLine xmlns:a14="http://schemas.microsoft.com/office/drawing/2010/main" xmlns="" w="9525">
                     <a:solidFill>
                       <a:srgbClr val="000000"/>
                     </a:solidFill>
@@ -10669,7 +10678,7 @@
               </a:ln>
               <a:extLst>
                 <a:ext uri="{91240B29-F687-4f45-9708-019B960494DF}">
-                  <a14:hiddenLine xmlns="" xmlns:a14="http://schemas.microsoft.com/office/drawing/2010/main" w="9525">
+                  <a14:hiddenLine xmlns:a14="http://schemas.microsoft.com/office/drawing/2010/main" xmlns="" w="9525">
                     <a:solidFill>
                       <a:srgbClr val="000000"/>
                     </a:solidFill>
@@ -10759,7 +10768,7 @@
               </a:ln>
               <a:extLst>
                 <a:ext uri="{91240B29-F687-4f45-9708-019B960494DF}">
-                  <a14:hiddenLine xmlns="" xmlns:a14="http://schemas.microsoft.com/office/drawing/2010/main" w="9525">
+                  <a14:hiddenLine xmlns:a14="http://schemas.microsoft.com/office/drawing/2010/main" xmlns="" w="9525">
                     <a:solidFill>
                       <a:srgbClr val="000000"/>
                     </a:solidFill>
@@ -10793,7 +10802,7 @@
               </a:ln>
               <a:extLst>
                 <a:ext uri="{91240B29-F687-4f45-9708-019B960494DF}">
-                  <a14:hiddenLine xmlns="" xmlns:a14="http://schemas.microsoft.com/office/drawing/2010/main" w="9525">
+                  <a14:hiddenLine xmlns:a14="http://schemas.microsoft.com/office/drawing/2010/main" xmlns="" w="9525">
                     <a:solidFill>
                       <a:srgbClr val="000000"/>
                     </a:solidFill>
@@ -10858,7 +10867,7 @@
               </a:ln>
               <a:extLst>
                 <a:ext uri="{91240B29-F687-4f45-9708-019B960494DF}">
-                  <a14:hiddenLine xmlns="" xmlns:a14="http://schemas.microsoft.com/office/drawing/2010/main" w="9525">
+                  <a14:hiddenLine xmlns:a14="http://schemas.microsoft.com/office/drawing/2010/main" xmlns="" w="9525">
                     <a:solidFill>
                       <a:srgbClr val="000000"/>
                     </a:solidFill>
@@ -10948,7 +10957,7 @@
               </a:ln>
               <a:extLst>
                 <a:ext uri="{91240B29-F687-4f45-9708-019B960494DF}">
-                  <a14:hiddenLine xmlns="" xmlns:a14="http://schemas.microsoft.com/office/drawing/2010/main" w="9525">
+                  <a14:hiddenLine xmlns:a14="http://schemas.microsoft.com/office/drawing/2010/main" xmlns="" w="9525">
                     <a:solidFill>
                       <a:srgbClr val="000000"/>
                     </a:solidFill>
@@ -11010,7 +11019,7 @@
               </a:ln>
               <a:extLst>
                 <a:ext uri="{91240B29-F687-4f45-9708-019B960494DF}">
-                  <a14:hiddenLine xmlns="" xmlns:a14="http://schemas.microsoft.com/office/drawing/2010/main" w="9525">
+                  <a14:hiddenLine xmlns:a14="http://schemas.microsoft.com/office/drawing/2010/main" xmlns="" w="9525">
                     <a:solidFill>
                       <a:srgbClr val="000000"/>
                     </a:solidFill>
@@ -11100,7 +11109,7 @@
               </a:ln>
               <a:extLst>
                 <a:ext uri="{91240B29-F687-4f45-9708-019B960494DF}">
-                  <a14:hiddenLine xmlns="" xmlns:a14="http://schemas.microsoft.com/office/drawing/2010/main" w="9525">
+                  <a14:hiddenLine xmlns:a14="http://schemas.microsoft.com/office/drawing/2010/main" xmlns="" w="9525">
                     <a:solidFill>
                       <a:srgbClr val="000000"/>
                     </a:solidFill>
@@ -11165,7 +11174,7 @@
               </a:ln>
               <a:extLst>
                 <a:ext uri="{91240B29-F687-4f45-9708-019B960494DF}">
-                  <a14:hiddenLine xmlns="" xmlns:a14="http://schemas.microsoft.com/office/drawing/2010/main" w="9525">
+                  <a14:hiddenLine xmlns:a14="http://schemas.microsoft.com/office/drawing/2010/main" xmlns="" w="9525">
                     <a:solidFill>
                       <a:srgbClr val="000000"/>
                     </a:solidFill>
@@ -11227,7 +11236,7 @@
               </a:ln>
               <a:extLst>
                 <a:ext uri="{91240B29-F687-4f45-9708-019B960494DF}">
-                  <a14:hiddenLine xmlns="" xmlns:a14="http://schemas.microsoft.com/office/drawing/2010/main" w="9525">
+                  <a14:hiddenLine xmlns:a14="http://schemas.microsoft.com/office/drawing/2010/main" xmlns="" w="9525">
                     <a:solidFill>
                       <a:srgbClr val="000000"/>
                     </a:solidFill>
@@ -11317,7 +11326,7 @@
               </a:ln>
               <a:extLst>
                 <a:ext uri="{91240B29-F687-4f45-9708-019B960494DF}">
-                  <a14:hiddenLine xmlns="" xmlns:a14="http://schemas.microsoft.com/office/drawing/2010/main" w="9525">
+                  <a14:hiddenLine xmlns:a14="http://schemas.microsoft.com/office/drawing/2010/main" xmlns="" w="9525">
                     <a:solidFill>
                       <a:srgbClr val="000000"/>
                     </a:solidFill>
@@ -11407,7 +11416,7 @@
               </a:ln>
               <a:extLst>
                 <a:ext uri="{91240B29-F687-4f45-9708-019B960494DF}">
-                  <a14:hiddenLine xmlns="" xmlns:a14="http://schemas.microsoft.com/office/drawing/2010/main" w="9525">
+                  <a14:hiddenLine xmlns:a14="http://schemas.microsoft.com/office/drawing/2010/main" xmlns="" w="9525">
                     <a:solidFill>
                       <a:srgbClr val="000000"/>
                     </a:solidFill>
@@ -11472,7 +11481,7 @@
               </a:ln>
               <a:extLst>
                 <a:ext uri="{91240B29-F687-4f45-9708-019B960494DF}">
-                  <a14:hiddenLine xmlns="" xmlns:a14="http://schemas.microsoft.com/office/drawing/2010/main" w="9525">
+                  <a14:hiddenLine xmlns:a14="http://schemas.microsoft.com/office/drawing/2010/main" xmlns="" w="9525">
                     <a:solidFill>
                       <a:srgbClr val="000000"/>
                     </a:solidFill>
@@ -11592,7 +11601,7 @@
               </a:ln>
               <a:extLst>
                 <a:ext uri="{91240B29-F687-4f45-9708-019B960494DF}">
-                  <a14:hiddenLine xmlns="" xmlns:a14="http://schemas.microsoft.com/office/drawing/2010/main" w="9525">
+                  <a14:hiddenLine xmlns:a14="http://schemas.microsoft.com/office/drawing/2010/main" xmlns="" w="9525">
                     <a:solidFill>
                       <a:srgbClr val="000000"/>
                     </a:solidFill>
@@ -11673,7 +11682,7 @@
               </a:ln>
               <a:extLst>
                 <a:ext uri="{91240B29-F687-4f45-9708-019B960494DF}">
-                  <a14:hiddenLine xmlns="" xmlns:a14="http://schemas.microsoft.com/office/drawing/2010/main" w="9525">
+                  <a14:hiddenLine xmlns:a14="http://schemas.microsoft.com/office/drawing/2010/main" xmlns="" w="9525">
                     <a:solidFill>
                       <a:srgbClr val="000000"/>
                     </a:solidFill>
@@ -11788,7 +11797,7 @@
               </a:ln>
               <a:extLst>
                 <a:ext uri="{91240B29-F687-4f45-9708-019B960494DF}">
-                  <a14:hiddenLine xmlns="" xmlns:a14="http://schemas.microsoft.com/office/drawing/2010/main" w="9525">
+                  <a14:hiddenLine xmlns:a14="http://schemas.microsoft.com/office/drawing/2010/main" xmlns="" w="9525">
                     <a:solidFill>
                       <a:srgbClr val="000000"/>
                     </a:solidFill>
@@ -11878,7 +11887,7 @@
               </a:ln>
               <a:extLst>
                 <a:ext uri="{91240B29-F687-4f45-9708-019B960494DF}">
-                  <a14:hiddenLine xmlns="" xmlns:a14="http://schemas.microsoft.com/office/drawing/2010/main" w="9525">
+                  <a14:hiddenLine xmlns:a14="http://schemas.microsoft.com/office/drawing/2010/main" xmlns="" w="9525">
                     <a:solidFill>
                       <a:srgbClr val="000000"/>
                     </a:solidFill>
@@ -11943,7 +11952,7 @@
               </a:ln>
               <a:extLst>
                 <a:ext uri="{91240B29-F687-4f45-9708-019B960494DF}">
-                  <a14:hiddenLine xmlns="" xmlns:a14="http://schemas.microsoft.com/office/drawing/2010/main" w="9525">
+                  <a14:hiddenLine xmlns:a14="http://schemas.microsoft.com/office/drawing/2010/main" xmlns="" w="9525">
                     <a:solidFill>
                       <a:srgbClr val="000000"/>
                     </a:solidFill>
@@ -12033,7 +12042,7 @@
               </a:ln>
               <a:extLst>
                 <a:ext uri="{91240B29-F687-4f45-9708-019B960494DF}">
-                  <a14:hiddenLine xmlns="" xmlns:a14="http://schemas.microsoft.com/office/drawing/2010/main" w="9525">
+                  <a14:hiddenLine xmlns:a14="http://schemas.microsoft.com/office/drawing/2010/main" xmlns="" w="9525">
                     <a:solidFill>
                       <a:srgbClr val="000000"/>
                     </a:solidFill>
@@ -12101,7 +12110,7 @@
               </a:ln>
               <a:extLst>
                 <a:ext uri="{91240B29-F687-4f45-9708-019B960494DF}">
-                  <a14:hiddenLine xmlns="" xmlns:a14="http://schemas.microsoft.com/office/drawing/2010/main" w="9525">
+                  <a14:hiddenLine xmlns:a14="http://schemas.microsoft.com/office/drawing/2010/main" xmlns="" w="9525">
                     <a:solidFill>
                       <a:srgbClr val="000000"/>
                     </a:solidFill>
@@ -12191,7 +12200,7 @@
               </a:ln>
               <a:extLst>
                 <a:ext uri="{91240B29-F687-4f45-9708-019B960494DF}">
-                  <a14:hiddenLine xmlns="" xmlns:a14="http://schemas.microsoft.com/office/drawing/2010/main" w="9525">
+                  <a14:hiddenLine xmlns:a14="http://schemas.microsoft.com/office/drawing/2010/main" xmlns="" w="9525">
                     <a:solidFill>
                       <a:srgbClr val="000000"/>
                     </a:solidFill>
@@ -12259,7 +12268,7 @@
               </a:ln>
               <a:extLst>
                 <a:ext uri="{91240B29-F687-4f45-9708-019B960494DF}">
-                  <a14:hiddenLine xmlns="" xmlns:a14="http://schemas.microsoft.com/office/drawing/2010/main" w="9525">
+                  <a14:hiddenLine xmlns:a14="http://schemas.microsoft.com/office/drawing/2010/main" xmlns="" w="9525">
                     <a:solidFill>
                       <a:srgbClr val="000000"/>
                     </a:solidFill>
@@ -12349,7 +12358,7 @@
               </a:ln>
               <a:extLst>
                 <a:ext uri="{91240B29-F687-4f45-9708-019B960494DF}">
-                  <a14:hiddenLine xmlns="" xmlns:a14="http://schemas.microsoft.com/office/drawing/2010/main" w="9525">
+                  <a14:hiddenLine xmlns:a14="http://schemas.microsoft.com/office/drawing/2010/main" xmlns="" w="9525">
                     <a:solidFill>
                       <a:srgbClr val="000000"/>
                     </a:solidFill>
@@ -12383,7 +12392,7 @@
               </a:ln>
               <a:extLst>
                 <a:ext uri="{91240B29-F687-4f45-9708-019B960494DF}">
-                  <a14:hiddenLine xmlns="" xmlns:a14="http://schemas.microsoft.com/office/drawing/2010/main" w="9525">
+                  <a14:hiddenLine xmlns:a14="http://schemas.microsoft.com/office/drawing/2010/main" xmlns="" w="9525">
                     <a:solidFill>
                       <a:srgbClr val="000000"/>
                     </a:solidFill>
@@ -12625,7 +12634,7 @@
                 </a:solidFill>
                 <a:latin typeface="Calibri"/>
               </a:rPr>
-              <a:t>‹Nº›</a:t>
+              <a:t>‹#›</a:t>
             </a:fld>
             <a:endParaRPr lang="en-US" sz="1200" b="0" strike="noStrike" spc="-1">
               <a:latin typeface="Times New Roman"/>
@@ -13165,6 +13174,438 @@
       </p:grpSpPr>
       <p:sp>
         <p:nvSpPr>
+          <p:cNvPr id="2" name="Title 1">
+            <a:extLst>
+              <a:ext uri="{FF2B5EF4-FFF2-40B4-BE49-F238E27FC236}">
+                <a16:creationId xmlns:a16="http://schemas.microsoft.com/office/drawing/2014/main" id="{94626DC2-02CA-4B85-9C00-568FF286EB8C}"/>
+              </a:ext>
+            </a:extLst>
+          </p:cNvPr>
+          <p:cNvSpPr>
+            <a:spLocks noGrp="1"/>
+          </p:cNvSpPr>
+          <p:nvPr>
+            <p:ph type="title"/>
+          </p:nvPr>
+        </p:nvSpPr>
+        <p:spPr>
+          <a:xfrm>
+            <a:off x="1141413" y="618518"/>
+            <a:ext cx="9905998" cy="730425"/>
+          </a:xfrm>
+        </p:spPr>
+        <p:txBody>
+          <a:bodyPr/>
+          <a:lstStyle/>
+          <a:p>
+            <a:r>
+              <a:rPr lang="en-US" dirty="0" err="1"/>
+              <a:t>Introducción</a:t>
+            </a:r>
+          </a:p>
+        </p:txBody>
+      </p:sp>
+      <p:sp>
+        <p:nvSpPr>
+          <p:cNvPr id="5" name="TextBox 4">
+            <a:extLst>
+              <a:ext uri="{FF2B5EF4-FFF2-40B4-BE49-F238E27FC236}">
+                <a16:creationId xmlns:a16="http://schemas.microsoft.com/office/drawing/2014/main" id="{E66A28A5-CB41-4C5E-A6BA-0186C5C8E998}"/>
+              </a:ext>
+            </a:extLst>
+          </p:cNvPr>
+          <p:cNvSpPr txBox="1"/>
+          <p:nvPr/>
+        </p:nvSpPr>
+        <p:spPr>
+          <a:xfrm>
+            <a:off x="1191491" y="1648691"/>
+            <a:ext cx="5583381" cy="923330"/>
+          </a:xfrm>
+          <a:prstGeom prst="rect">
+            <a:avLst/>
+          </a:prstGeom>
+          <a:noFill/>
+        </p:spPr>
+        <p:txBody>
+          <a:bodyPr rot="0" spcFirstLastPara="0" vertOverflow="overflow" horzOverflow="overflow" vert="horz" wrap="square" lIns="91440" tIns="45720" rIns="91440" bIns="45720" numCol="1" spcCol="0" rtlCol="0" fromWordArt="0" anchor="t" anchorCtr="0" forceAA="0" compatLnSpc="1">
+            <a:prstTxWarp prst="textNoShape">
+              <a:avLst/>
+            </a:prstTxWarp>
+            <a:spAutoFit/>
+          </a:bodyPr>
+          <a:lstStyle/>
+          <a:p>
+            <a:r>
+              <a:rPr lang="en-US" dirty="0" err="1"/>
+              <a:t>Creemos</a:t>
+            </a:r>
+            <a:r>
+              <a:rPr lang="en-US" dirty="0"/>
+              <a:t> que es de vital </a:t>
+            </a:r>
+            <a:r>
+              <a:rPr lang="en-US" dirty="0" err="1"/>
+              <a:t>importancia</a:t>
+            </a:r>
+            <a:r>
+              <a:rPr lang="en-US" dirty="0"/>
+              <a:t> que las personas </a:t>
+            </a:r>
+            <a:r>
+              <a:rPr lang="en-US" dirty="0" err="1"/>
+              <a:t>conozcan</a:t>
+            </a:r>
+            <a:r>
+              <a:rPr lang="en-US" dirty="0"/>
+              <a:t> en </a:t>
+            </a:r>
+            <a:r>
+              <a:rPr lang="en-US" dirty="0" err="1"/>
+              <a:t>qué</a:t>
+            </a:r>
+            <a:r>
+              <a:rPr lang="en-US" dirty="0"/>
+              <a:t> </a:t>
+            </a:r>
+            <a:r>
+              <a:rPr lang="en-US" dirty="0" err="1"/>
+              <a:t>partes</a:t>
+            </a:r>
+            <a:r>
+              <a:rPr lang="en-US" dirty="0"/>
+              <a:t> de la ciudad, en </a:t>
+            </a:r>
+            <a:r>
+              <a:rPr lang="en-US" dirty="0" err="1"/>
+              <a:t>tiempo</a:t>
+            </a:r>
+            <a:r>
+              <a:rPr lang="en-US" dirty="0"/>
+              <a:t> real, hay una </a:t>
+            </a:r>
+            <a:r>
+              <a:rPr lang="en-US" dirty="0" err="1"/>
+              <a:t>mejor</a:t>
+            </a:r>
+            <a:r>
+              <a:rPr lang="en-US" dirty="0"/>
+              <a:t> o </a:t>
+            </a:r>
+            <a:r>
+              <a:rPr lang="en-US" dirty="0" err="1"/>
+              <a:t>peor</a:t>
+            </a:r>
+            <a:r>
+              <a:rPr lang="en-US" dirty="0"/>
+              <a:t> </a:t>
+            </a:r>
+            <a:r>
+              <a:rPr lang="en-US" dirty="0" err="1"/>
+              <a:t>calidad</a:t>
+            </a:r>
+            <a:r>
+              <a:rPr lang="en-US" dirty="0"/>
+              <a:t> del </a:t>
+            </a:r>
+            <a:r>
+              <a:rPr lang="en-US" dirty="0" err="1"/>
+              <a:t>aire</a:t>
+            </a:r>
+            <a:r>
+              <a:rPr lang="en-US" dirty="0"/>
+              <a:t>.</a:t>
+            </a:r>
+          </a:p>
+        </p:txBody>
+      </p:sp>
+      <p:sp>
+        <p:nvSpPr>
+          <p:cNvPr id="6" name="TextBox 5">
+            <a:extLst>
+              <a:ext uri="{FF2B5EF4-FFF2-40B4-BE49-F238E27FC236}">
+                <a16:creationId xmlns:a16="http://schemas.microsoft.com/office/drawing/2014/main" id="{0B9C7B90-D8E6-47EE-952D-EEF66C20C13F}"/>
+              </a:ext>
+            </a:extLst>
+          </p:cNvPr>
+          <p:cNvSpPr txBox="1"/>
+          <p:nvPr/>
+        </p:nvSpPr>
+        <p:spPr>
+          <a:xfrm>
+            <a:off x="1191491" y="2646218"/>
+            <a:ext cx="5527962" cy="923330"/>
+          </a:xfrm>
+          <a:prstGeom prst="rect">
+            <a:avLst/>
+          </a:prstGeom>
+          <a:noFill/>
+        </p:spPr>
+        <p:txBody>
+          <a:bodyPr rot="0" spcFirstLastPara="0" vertOverflow="overflow" horzOverflow="overflow" vert="horz" wrap="square" lIns="91440" tIns="45720" rIns="91440" bIns="45720" numCol="1" spcCol="0" rtlCol="0" fromWordArt="0" anchor="t" anchorCtr="0" forceAA="0" compatLnSpc="1">
+            <a:prstTxWarp prst="textNoShape">
+              <a:avLst/>
+            </a:prstTxWarp>
+            <a:spAutoFit/>
+          </a:bodyPr>
+          <a:lstStyle/>
+          <a:p>
+            <a:r>
+              <a:rPr lang="en-US" dirty="0"/>
+              <a:t>Para </a:t>
+            </a:r>
+            <a:r>
+              <a:rPr lang="en-US" dirty="0" err="1"/>
+              <a:t>eso</a:t>
+            </a:r>
+            <a:r>
+              <a:rPr lang="en-US" dirty="0"/>
+              <a:t> </a:t>
+            </a:r>
+            <a:r>
+              <a:rPr lang="en-US" dirty="0" err="1"/>
+              <a:t>planteamos</a:t>
+            </a:r>
+            <a:r>
+              <a:rPr lang="en-US" dirty="0"/>
+              <a:t> </a:t>
+            </a:r>
+            <a:r>
+              <a:rPr lang="en-US" dirty="0" err="1"/>
+              <a:t>conectar</a:t>
+            </a:r>
+            <a:r>
+              <a:rPr lang="en-US" dirty="0"/>
+              <a:t> una gran </a:t>
+            </a:r>
+            <a:r>
+              <a:rPr lang="en-US" dirty="0" err="1"/>
+              <a:t>cantidad</a:t>
+            </a:r>
+            <a:r>
+              <a:rPr lang="en-US" dirty="0"/>
+              <a:t> de </a:t>
+            </a:r>
+            <a:r>
+              <a:rPr lang="en-US" dirty="0" err="1"/>
+              <a:t>dispositivos</a:t>
+            </a:r>
+            <a:r>
+              <a:rPr lang="en-US" dirty="0"/>
+              <a:t> </a:t>
+            </a:r>
+            <a:r>
+              <a:rPr lang="en-US" dirty="0" err="1"/>
+              <a:t>detectores</a:t>
+            </a:r>
+            <a:r>
+              <a:rPr lang="en-US" dirty="0"/>
+              <a:t> de </a:t>
+            </a:r>
+            <a:r>
+              <a:rPr lang="en-US" dirty="0" err="1"/>
+              <a:t>calidad</a:t>
+            </a:r>
+            <a:r>
+              <a:rPr lang="en-US" dirty="0"/>
+              <a:t> de </a:t>
+            </a:r>
+            <a:r>
+              <a:rPr lang="en-US" dirty="0" err="1"/>
+              <a:t>aire</a:t>
+            </a:r>
+            <a:r>
+              <a:rPr lang="en-US" dirty="0"/>
+              <a:t> </a:t>
+            </a:r>
+            <a:r>
+              <a:rPr lang="en-US" dirty="0" err="1"/>
+              <a:t>esparcidos</a:t>
+            </a:r>
+            <a:r>
+              <a:rPr lang="en-US" dirty="0"/>
+              <a:t> a lo largo de la </a:t>
+            </a:r>
+            <a:r>
+              <a:rPr lang="en-US" dirty="0" err="1"/>
+              <a:t>misma</a:t>
+            </a:r>
+            <a:r>
+              <a:rPr lang="en-US" dirty="0"/>
+              <a:t> a internet.</a:t>
+            </a:r>
+          </a:p>
+        </p:txBody>
+      </p:sp>
+      <p:pic>
+        <p:nvPicPr>
+          <p:cNvPr id="7" name="Picture 7" descr="Diagram, engineering drawing&#10;&#10;Description automatically generated">
+            <a:extLst>
+              <a:ext uri="{FF2B5EF4-FFF2-40B4-BE49-F238E27FC236}">
+                <a16:creationId xmlns:a16="http://schemas.microsoft.com/office/drawing/2014/main" id="{74D77457-56FC-4CE3-8C34-4FB9F3B96B74}"/>
+              </a:ext>
+            </a:extLst>
+          </p:cNvPr>
+          <p:cNvPicPr>
+            <a:picLocks noChangeAspect="1"/>
+          </p:cNvPicPr>
+          <p:nvPr/>
+        </p:nvPicPr>
+        <p:blipFill>
+          <a:blip r:embed="rId2"/>
+          <a:stretch>
+            <a:fillRect/>
+          </a:stretch>
+        </p:blipFill>
+        <p:spPr>
+          <a:xfrm>
+            <a:off x="1191491" y="3350737"/>
+            <a:ext cx="5001490" cy="2913582"/>
+          </a:xfrm>
+          <a:prstGeom prst="rect">
+            <a:avLst/>
+          </a:prstGeom>
+        </p:spPr>
+      </p:pic>
+      <p:pic>
+        <p:nvPicPr>
+          <p:cNvPr id="8" name="Picture 8">
+            <a:extLst>
+              <a:ext uri="{FF2B5EF4-FFF2-40B4-BE49-F238E27FC236}">
+                <a16:creationId xmlns:a16="http://schemas.microsoft.com/office/drawing/2014/main" id="{BCB734B9-BD65-4803-BC16-7D27C72429B8}"/>
+              </a:ext>
+            </a:extLst>
+          </p:cNvPr>
+          <p:cNvPicPr>
+            <a:picLocks noChangeAspect="1"/>
+          </p:cNvPicPr>
+          <p:nvPr/>
+        </p:nvPicPr>
+        <p:blipFill>
+          <a:blip r:embed="rId3"/>
+          <a:stretch>
+            <a:fillRect/>
+          </a:stretch>
+        </p:blipFill>
+        <p:spPr>
+          <a:xfrm>
+            <a:off x="8739858" y="166255"/>
+            <a:ext cx="2055192" cy="4378037"/>
+          </a:xfrm>
+          <a:prstGeom prst="rect">
+            <a:avLst/>
+          </a:prstGeom>
+        </p:spPr>
+      </p:pic>
+      <p:cxnSp>
+        <p:nvCxnSpPr>
+          <p:cNvPr id="9" name="Straight Arrow Connector 8">
+            <a:extLst>
+              <a:ext uri="{FF2B5EF4-FFF2-40B4-BE49-F238E27FC236}">
+                <a16:creationId xmlns:a16="http://schemas.microsoft.com/office/drawing/2014/main" id="{B028665A-2840-4303-AAAF-11CE4549BC16}"/>
+              </a:ext>
+            </a:extLst>
+          </p:cNvPr>
+          <p:cNvCxnSpPr/>
+          <p:nvPr/>
+        </p:nvCxnSpPr>
+        <p:spPr>
+          <a:xfrm flipV="1">
+            <a:off x="6331527" y="4163291"/>
+            <a:ext cx="2119745" cy="595746"/>
+          </a:xfrm>
+          <a:prstGeom prst="straightConnector1">
+            <a:avLst/>
+          </a:prstGeom>
+          <a:ln w="57150">
+            <a:tailEnd type="triangle"/>
+          </a:ln>
+        </p:spPr>
+        <p:style>
+          <a:lnRef idx="1">
+            <a:schemeClr val="accent1"/>
+          </a:lnRef>
+          <a:fillRef idx="0">
+            <a:schemeClr val="accent1"/>
+          </a:fillRef>
+          <a:effectRef idx="0">
+            <a:schemeClr val="accent1"/>
+          </a:effectRef>
+          <a:fontRef idx="minor">
+            <a:schemeClr val="tx1"/>
+          </a:fontRef>
+        </p:style>
+      </p:cxnSp>
+      <p:sp>
+        <p:nvSpPr>
+          <p:cNvPr id="10" name="TextBox 9">
+            <a:extLst>
+              <a:ext uri="{FF2B5EF4-FFF2-40B4-BE49-F238E27FC236}">
+                <a16:creationId xmlns:a16="http://schemas.microsoft.com/office/drawing/2014/main" id="{C832A9FC-8694-4CA3-B509-74492F1BA27D}"/>
+              </a:ext>
+            </a:extLst>
+          </p:cNvPr>
+          <p:cNvSpPr txBox="1"/>
+          <p:nvPr/>
+        </p:nvSpPr>
+        <p:spPr>
+          <a:xfrm>
+            <a:off x="7384473" y="4668982"/>
+            <a:ext cx="4225636" cy="1754326"/>
+          </a:xfrm>
+          <a:prstGeom prst="rect">
+            <a:avLst/>
+          </a:prstGeom>
+          <a:noFill/>
+        </p:spPr>
+        <p:txBody>
+          <a:bodyPr rot="0" spcFirstLastPara="0" vertOverflow="overflow" horzOverflow="overflow" vert="horz" wrap="square" lIns="91440" tIns="45720" rIns="91440" bIns="45720" numCol="1" spcCol="0" rtlCol="0" fromWordArt="0" anchor="t" anchorCtr="0" forceAA="0" compatLnSpc="1">
+            <a:prstTxWarp prst="textNoShape">
+              <a:avLst/>
+            </a:prstTxWarp>
+            <a:spAutoFit/>
+          </a:bodyPr>
+          <a:lstStyle/>
+          <a:p>
+            <a:r>
+              <a:rPr lang="en-US"/>
+              <a:t>Luego, crearíamos una aplicación que, utilizando los datos generados y subidos a internet por los sensores, muestre de manera gráfica e intuitiva en un mapa qué calles o partes de la ciudad tienen una mejor o peor calidad del aire.</a:t>
+            </a:r>
+          </a:p>
+        </p:txBody>
+      </p:sp>
+    </p:spTree>
+    <p:extLst>
+      <p:ext uri="{BB962C8B-B14F-4D97-AF65-F5344CB8AC3E}">
+        <p14:creationId xmlns:p14="http://schemas.microsoft.com/office/powerpoint/2010/main" val="372122150"/>
+      </p:ext>
+    </p:extLst>
+  </p:cSld>
+  <p:clrMapOvr>
+    <a:masterClrMapping/>
+  </p:clrMapOvr>
+</p:sld>
+</file>
+
+<file path=ppt/slides/slide3.xml><?xml version="1.0" encoding="utf-8"?>
+<p:sld xmlns:a="http://schemas.openxmlformats.org/drawingml/2006/main" xmlns:r="http://schemas.openxmlformats.org/officeDocument/2006/relationships" xmlns:p="http://schemas.openxmlformats.org/presentationml/2006/main">
+  <p:cSld>
+    <p:spTree>
+      <p:nvGrpSpPr>
+        <p:cNvPr id="1" name=""/>
+        <p:cNvGrpSpPr/>
+        <p:nvPr/>
+      </p:nvGrpSpPr>
+      <p:grpSpPr>
+        <a:xfrm>
+          <a:off x="0" y="0"/>
+          <a:ext cx="0" cy="0"/>
+          <a:chOff x="0" y="0"/>
+          <a:chExt cx="0" cy="0"/>
+        </a:xfrm>
+      </p:grpSpPr>
+      <p:sp>
+        <p:nvSpPr>
           <p:cNvPr id="2" name="Title 1"/>
           <p:cNvSpPr>
             <a:spLocks noGrp="1"/>
@@ -13814,7 +14255,7 @@
 </p:sld>
 </file>
 
-<file path=ppt/slides/slide3.xml><?xml version="1.0" encoding="utf-8"?>
+<file path=ppt/slides/slide4.xml><?xml version="1.0" encoding="utf-8"?>
 <p:sld xmlns:a="http://schemas.openxmlformats.org/drawingml/2006/main" xmlns:r="http://schemas.openxmlformats.org/officeDocument/2006/relationships" xmlns:p="http://schemas.openxmlformats.org/presentationml/2006/main">
   <p:cSld>
     <p:spTree>
@@ -13905,7 +14346,7 @@
 </p:sld>
 </file>
 
-<file path=ppt/slides/slide4.xml><?xml version="1.0" encoding="utf-8"?>
+<file path=ppt/slides/slide5.xml><?xml version="1.0" encoding="utf-8"?>
 <p:sld xmlns:a="http://schemas.openxmlformats.org/drawingml/2006/main" xmlns:r="http://schemas.openxmlformats.org/officeDocument/2006/relationships" xmlns:p="http://schemas.openxmlformats.org/presentationml/2006/main">
   <p:cSld>
     <p:spTree>

</xml_diff>

<commit_message>
Edición del docx y pptx por Iker
</commit_message>
<xml_diff>
--- a/Proyecto Final CS.pptx
+++ b/Proyecto Final CS.pptx
@@ -7,9 +7,12 @@
   <p:sldIdLst>
     <p:sldId id="256" r:id="rId2"/>
     <p:sldId id="260" r:id="rId3"/>
-    <p:sldId id="257" r:id="rId4"/>
-    <p:sldId id="258" r:id="rId5"/>
-    <p:sldId id="259" r:id="rId6"/>
+    <p:sldId id="263" r:id="rId4"/>
+    <p:sldId id="257" r:id="rId5"/>
+    <p:sldId id="261" r:id="rId6"/>
+    <p:sldId id="262" r:id="rId7"/>
+    <p:sldId id="259" r:id="rId8"/>
+    <p:sldId id="258" r:id="rId9"/>
   </p:sldIdLst>
   <p:sldSz cx="12192000" cy="6858000"/>
   <p:notesSz cx="7772400" cy="10058400"/>
@@ -181,7 +184,7 @@
           <a:noFill/>
           <a:extLst>
             <a:ext uri="{909E8E84-426E-40dd-AFC4-6F175D3DCCD1}">
-              <a14:hiddenFill xmlns:a14="http://schemas.microsoft.com/office/drawing/2010/main" xmlns="">
+              <a14:hiddenFill xmlns="" xmlns:a14="http://schemas.microsoft.com/office/drawing/2010/main">
                 <a:solidFill>
                   <a:srgbClr val="FFFFFF"/>
                 </a:solidFill>
@@ -240,7 +243,7 @@
             </a:ln>
             <a:extLst>
               <a:ext uri="{91240B29-F687-4f45-9708-019B960494DF}">
-                <a14:hiddenLine xmlns:a14="http://schemas.microsoft.com/office/drawing/2010/main" xmlns="" w="9525">
+                <a14:hiddenLine xmlns="" xmlns:a14="http://schemas.microsoft.com/office/drawing/2010/main" w="9525">
                   <a:solidFill>
                     <a:srgbClr val="000000"/>
                   </a:solidFill>
@@ -330,7 +333,7 @@
             </a:ln>
             <a:extLst>
               <a:ext uri="{91240B29-F687-4f45-9708-019B960494DF}">
-                <a14:hiddenLine xmlns:a14="http://schemas.microsoft.com/office/drawing/2010/main" xmlns="" w="9525">
+                <a14:hiddenLine xmlns="" xmlns:a14="http://schemas.microsoft.com/office/drawing/2010/main" w="9525">
                   <a:solidFill>
                     <a:srgbClr val="000000"/>
                   </a:solidFill>
@@ -420,7 +423,7 @@
             </a:ln>
             <a:extLst>
               <a:ext uri="{91240B29-F687-4f45-9708-019B960494DF}">
-                <a14:hiddenLine xmlns:a14="http://schemas.microsoft.com/office/drawing/2010/main" xmlns="" w="9525">
+                <a14:hiddenLine xmlns="" xmlns:a14="http://schemas.microsoft.com/office/drawing/2010/main" w="9525">
                   <a:solidFill>
                     <a:srgbClr val="000000"/>
                   </a:solidFill>
@@ -454,7 +457,7 @@
             </a:ln>
             <a:extLst>
               <a:ext uri="{91240B29-F687-4f45-9708-019B960494DF}">
-                <a14:hiddenLine xmlns:a14="http://schemas.microsoft.com/office/drawing/2010/main" xmlns="" w="9525">
+                <a14:hiddenLine xmlns="" xmlns:a14="http://schemas.microsoft.com/office/drawing/2010/main" w="9525">
                   <a:solidFill>
                     <a:srgbClr val="000000"/>
                   </a:solidFill>
@@ -544,7 +547,7 @@
             </a:ln>
             <a:extLst>
               <a:ext uri="{91240B29-F687-4f45-9708-019B960494DF}">
-                <a14:hiddenLine xmlns:a14="http://schemas.microsoft.com/office/drawing/2010/main" xmlns="" w="9525">
+                <a14:hiddenLine xmlns="" xmlns:a14="http://schemas.microsoft.com/office/drawing/2010/main" w="9525">
                   <a:solidFill>
                     <a:srgbClr val="000000"/>
                   </a:solidFill>
@@ -606,7 +609,7 @@
             </a:ln>
             <a:extLst>
               <a:ext uri="{91240B29-F687-4f45-9708-019B960494DF}">
-                <a14:hiddenLine xmlns:a14="http://schemas.microsoft.com/office/drawing/2010/main" xmlns="" w="9525">
+                <a14:hiddenLine xmlns="" xmlns:a14="http://schemas.microsoft.com/office/drawing/2010/main" w="9525">
                   <a:solidFill>
                     <a:srgbClr val="000000"/>
                   </a:solidFill>
@@ -668,7 +671,7 @@
             </a:ln>
             <a:extLst>
               <a:ext uri="{91240B29-F687-4f45-9708-019B960494DF}">
-                <a14:hiddenLine xmlns:a14="http://schemas.microsoft.com/office/drawing/2010/main" xmlns="" w="9525">
+                <a14:hiddenLine xmlns="" xmlns:a14="http://schemas.microsoft.com/office/drawing/2010/main" w="9525">
                   <a:solidFill>
                     <a:srgbClr val="000000"/>
                   </a:solidFill>
@@ -758,7 +761,7 @@
             </a:ln>
             <a:extLst>
               <a:ext uri="{91240B29-F687-4f45-9708-019B960494DF}">
-                <a14:hiddenLine xmlns:a14="http://schemas.microsoft.com/office/drawing/2010/main" xmlns="" w="9525">
+                <a14:hiddenLine xmlns="" xmlns:a14="http://schemas.microsoft.com/office/drawing/2010/main" w="9525">
                   <a:solidFill>
                     <a:srgbClr val="000000"/>
                   </a:solidFill>
@@ -820,7 +823,7 @@
             </a:ln>
             <a:extLst>
               <a:ext uri="{91240B29-F687-4f45-9708-019B960494DF}">
-                <a14:hiddenLine xmlns:a14="http://schemas.microsoft.com/office/drawing/2010/main" xmlns="" w="9525">
+                <a14:hiddenLine xmlns="" xmlns:a14="http://schemas.microsoft.com/office/drawing/2010/main" w="9525">
                   <a:solidFill>
                     <a:srgbClr val="000000"/>
                   </a:solidFill>
@@ -882,7 +885,7 @@
             </a:ln>
             <a:extLst>
               <a:ext uri="{91240B29-F687-4f45-9708-019B960494DF}">
-                <a14:hiddenLine xmlns:a14="http://schemas.microsoft.com/office/drawing/2010/main" xmlns="" w="9525">
+                <a14:hiddenLine xmlns="" xmlns:a14="http://schemas.microsoft.com/office/drawing/2010/main" w="9525">
                   <a:solidFill>
                     <a:srgbClr val="000000"/>
                   </a:solidFill>
@@ -972,7 +975,7 @@
             </a:ln>
             <a:extLst>
               <a:ext uri="{91240B29-F687-4f45-9708-019B960494DF}">
-                <a14:hiddenLine xmlns:a14="http://schemas.microsoft.com/office/drawing/2010/main" xmlns="" w="9525">
+                <a14:hiddenLine xmlns="" xmlns:a14="http://schemas.microsoft.com/office/drawing/2010/main" w="9525">
                   <a:solidFill>
                     <a:srgbClr val="000000"/>
                   </a:solidFill>
@@ -1062,7 +1065,7 @@
             </a:ln>
             <a:extLst>
               <a:ext uri="{91240B29-F687-4f45-9708-019B960494DF}">
-                <a14:hiddenLine xmlns:a14="http://schemas.microsoft.com/office/drawing/2010/main" xmlns="" w="9525">
+                <a14:hiddenLine xmlns="" xmlns:a14="http://schemas.microsoft.com/office/drawing/2010/main" w="9525">
                   <a:solidFill>
                     <a:srgbClr val="000000"/>
                   </a:solidFill>
@@ -1124,7 +1127,7 @@
             </a:ln>
             <a:extLst>
               <a:ext uri="{91240B29-F687-4f45-9708-019B960494DF}">
-                <a14:hiddenLine xmlns:a14="http://schemas.microsoft.com/office/drawing/2010/main" xmlns="" w="9525">
+                <a14:hiddenLine xmlns="" xmlns:a14="http://schemas.microsoft.com/office/drawing/2010/main" w="9525">
                   <a:solidFill>
                     <a:srgbClr val="000000"/>
                   </a:solidFill>
@@ -1234,7 +1237,7 @@
             </a:ln>
             <a:extLst>
               <a:ext uri="{91240B29-F687-4f45-9708-019B960494DF}">
-                <a14:hiddenLine xmlns:a14="http://schemas.microsoft.com/office/drawing/2010/main" xmlns="" w="9525">
+                <a14:hiddenLine xmlns="" xmlns:a14="http://schemas.microsoft.com/office/drawing/2010/main" w="9525">
                   <a:solidFill>
                     <a:srgbClr val="000000"/>
                   </a:solidFill>
@@ -1296,7 +1299,7 @@
             </a:ln>
             <a:extLst>
               <a:ext uri="{91240B29-F687-4f45-9708-019B960494DF}">
-                <a14:hiddenLine xmlns:a14="http://schemas.microsoft.com/office/drawing/2010/main" xmlns="" w="9525">
+                <a14:hiddenLine xmlns="" xmlns:a14="http://schemas.microsoft.com/office/drawing/2010/main" w="9525">
                   <a:solidFill>
                     <a:srgbClr val="000000"/>
                   </a:solidFill>
@@ -1386,7 +1389,7 @@
             </a:ln>
             <a:extLst>
               <a:ext uri="{91240B29-F687-4f45-9708-019B960494DF}">
-                <a14:hiddenLine xmlns:a14="http://schemas.microsoft.com/office/drawing/2010/main" xmlns="" w="9525">
+                <a14:hiddenLine xmlns="" xmlns:a14="http://schemas.microsoft.com/office/drawing/2010/main" w="9525">
                   <a:solidFill>
                     <a:srgbClr val="000000"/>
                   </a:solidFill>
@@ -1476,7 +1479,7 @@
             </a:ln>
             <a:extLst>
               <a:ext uri="{91240B29-F687-4f45-9708-019B960494DF}">
-                <a14:hiddenLine xmlns:a14="http://schemas.microsoft.com/office/drawing/2010/main" xmlns="" w="9525">
+                <a14:hiddenLine xmlns="" xmlns:a14="http://schemas.microsoft.com/office/drawing/2010/main" w="9525">
                   <a:solidFill>
                     <a:srgbClr val="000000"/>
                   </a:solidFill>
@@ -1538,7 +1541,7 @@
             </a:ln>
             <a:extLst>
               <a:ext uri="{91240B29-F687-4f45-9708-019B960494DF}">
-                <a14:hiddenLine xmlns:a14="http://schemas.microsoft.com/office/drawing/2010/main" xmlns="" w="9525">
+                <a14:hiddenLine xmlns="" xmlns:a14="http://schemas.microsoft.com/office/drawing/2010/main" w="9525">
                   <a:solidFill>
                     <a:srgbClr val="000000"/>
                   </a:solidFill>
@@ -1628,7 +1631,7 @@
             </a:ln>
             <a:extLst>
               <a:ext uri="{91240B29-F687-4f45-9708-019B960494DF}">
-                <a14:hiddenLine xmlns:a14="http://schemas.microsoft.com/office/drawing/2010/main" xmlns="" w="9525">
+                <a14:hiddenLine xmlns="" xmlns:a14="http://schemas.microsoft.com/office/drawing/2010/main" w="9525">
                   <a:solidFill>
                     <a:srgbClr val="000000"/>
                   </a:solidFill>
@@ -1718,7 +1721,7 @@
             </a:ln>
             <a:extLst>
               <a:ext uri="{91240B29-F687-4f45-9708-019B960494DF}">
-                <a14:hiddenLine xmlns:a14="http://schemas.microsoft.com/office/drawing/2010/main" xmlns="" w="9525">
+                <a14:hiddenLine xmlns="" xmlns:a14="http://schemas.microsoft.com/office/drawing/2010/main" w="9525">
                   <a:solidFill>
                     <a:srgbClr val="000000"/>
                   </a:solidFill>
@@ -1774,7 +1777,7 @@
             </a:ln>
             <a:extLst>
               <a:ext uri="{91240B29-F687-4f45-9708-019B960494DF}">
-                <a14:hiddenLine xmlns:a14="http://schemas.microsoft.com/office/drawing/2010/main" xmlns="" w="9525">
+                <a14:hiddenLine xmlns="" xmlns:a14="http://schemas.microsoft.com/office/drawing/2010/main" w="9525">
                   <a:solidFill>
                     <a:srgbClr val="000000"/>
                   </a:solidFill>
@@ -1864,7 +1867,7 @@
             </a:ln>
             <a:extLst>
               <a:ext uri="{91240B29-F687-4f45-9708-019B960494DF}">
-                <a14:hiddenLine xmlns:a14="http://schemas.microsoft.com/office/drawing/2010/main" xmlns="" w="9525">
+                <a14:hiddenLine xmlns="" xmlns:a14="http://schemas.microsoft.com/office/drawing/2010/main" w="9525">
                   <a:solidFill>
                     <a:srgbClr val="000000"/>
                   </a:solidFill>
@@ -1920,7 +1923,7 @@
             </a:ln>
             <a:extLst>
               <a:ext uri="{91240B29-F687-4f45-9708-019B960494DF}">
-                <a14:hiddenLine xmlns:a14="http://schemas.microsoft.com/office/drawing/2010/main" xmlns="" w="9525">
+                <a14:hiddenLine xmlns="" xmlns:a14="http://schemas.microsoft.com/office/drawing/2010/main" w="9525">
                   <a:solidFill>
                     <a:srgbClr val="000000"/>
                   </a:solidFill>
@@ -2010,7 +2013,7 @@
             </a:ln>
             <a:extLst>
               <a:ext uri="{91240B29-F687-4f45-9708-019B960494DF}">
-                <a14:hiddenLine xmlns:a14="http://schemas.microsoft.com/office/drawing/2010/main" xmlns="" w="9525">
+                <a14:hiddenLine xmlns="" xmlns:a14="http://schemas.microsoft.com/office/drawing/2010/main" w="9525">
                   <a:solidFill>
                     <a:srgbClr val="000000"/>
                   </a:solidFill>
@@ -2078,7 +2081,7 @@
             </a:ln>
             <a:extLst>
               <a:ext uri="{91240B29-F687-4f45-9708-019B960494DF}">
-                <a14:hiddenLine xmlns:a14="http://schemas.microsoft.com/office/drawing/2010/main" xmlns="" w="9525">
+                <a14:hiddenLine xmlns="" xmlns:a14="http://schemas.microsoft.com/office/drawing/2010/main" w="9525">
                   <a:solidFill>
                     <a:srgbClr val="000000"/>
                   </a:solidFill>
@@ -2168,7 +2171,7 @@
             </a:ln>
             <a:extLst>
               <a:ext uri="{91240B29-F687-4f45-9708-019B960494DF}">
-                <a14:hiddenLine xmlns:a14="http://schemas.microsoft.com/office/drawing/2010/main" xmlns="" w="9525">
+                <a14:hiddenLine xmlns="" xmlns:a14="http://schemas.microsoft.com/office/drawing/2010/main" w="9525">
                   <a:solidFill>
                     <a:srgbClr val="000000"/>
                   </a:solidFill>
@@ -2236,7 +2239,7 @@
             </a:ln>
             <a:extLst>
               <a:ext uri="{91240B29-F687-4f45-9708-019B960494DF}">
-                <a14:hiddenLine xmlns:a14="http://schemas.microsoft.com/office/drawing/2010/main" xmlns="" w="9525">
+                <a14:hiddenLine xmlns="" xmlns:a14="http://schemas.microsoft.com/office/drawing/2010/main" w="9525">
                   <a:solidFill>
                     <a:srgbClr val="000000"/>
                   </a:solidFill>
@@ -2326,7 +2329,7 @@
             </a:ln>
             <a:extLst>
               <a:ext uri="{91240B29-F687-4f45-9708-019B960494DF}">
-                <a14:hiddenLine xmlns:a14="http://schemas.microsoft.com/office/drawing/2010/main" xmlns="" w="9525">
+                <a14:hiddenLine xmlns="" xmlns:a14="http://schemas.microsoft.com/office/drawing/2010/main" w="9525">
                   <a:solidFill>
                     <a:srgbClr val="000000"/>
                   </a:solidFill>
@@ -2360,7 +2363,7 @@
             </a:ln>
             <a:extLst>
               <a:ext uri="{91240B29-F687-4f45-9708-019B960494DF}">
-                <a14:hiddenLine xmlns:a14="http://schemas.microsoft.com/office/drawing/2010/main" xmlns="" w="9525">
+                <a14:hiddenLine xmlns="" xmlns:a14="http://schemas.microsoft.com/office/drawing/2010/main" w="9525">
                   <a:solidFill>
                     <a:srgbClr val="000000"/>
                   </a:solidFill>
@@ -2450,7 +2453,7 @@
             </a:ln>
             <a:extLst>
               <a:ext uri="{91240B29-F687-4f45-9708-019B960494DF}">
-                <a14:hiddenLine xmlns:a14="http://schemas.microsoft.com/office/drawing/2010/main" xmlns="" w="9525">
+                <a14:hiddenLine xmlns="" xmlns:a14="http://schemas.microsoft.com/office/drawing/2010/main" w="9525">
                   <a:solidFill>
                     <a:srgbClr val="000000"/>
                   </a:solidFill>
@@ -2512,7 +2515,7 @@
             </a:ln>
             <a:extLst>
               <a:ext uri="{91240B29-F687-4f45-9708-019B960494DF}">
-                <a14:hiddenLine xmlns:a14="http://schemas.microsoft.com/office/drawing/2010/main" xmlns="" w="9525">
+                <a14:hiddenLine xmlns="" xmlns:a14="http://schemas.microsoft.com/office/drawing/2010/main" w="9525">
                   <a:solidFill>
                     <a:srgbClr val="000000"/>
                   </a:solidFill>
@@ -2574,7 +2577,7 @@
             </a:ln>
             <a:extLst>
               <a:ext uri="{91240B29-F687-4f45-9708-019B960494DF}">
-                <a14:hiddenLine xmlns:a14="http://schemas.microsoft.com/office/drawing/2010/main" xmlns="" w="9525">
+                <a14:hiddenLine xmlns="" xmlns:a14="http://schemas.microsoft.com/office/drawing/2010/main" w="9525">
                   <a:solidFill>
                     <a:srgbClr val="000000"/>
                   </a:solidFill>
@@ -2664,7 +2667,7 @@
             </a:ln>
             <a:extLst>
               <a:ext uri="{91240B29-F687-4f45-9708-019B960494DF}">
-                <a14:hiddenLine xmlns:a14="http://schemas.microsoft.com/office/drawing/2010/main" xmlns="" w="9525">
+                <a14:hiddenLine xmlns="" xmlns:a14="http://schemas.microsoft.com/office/drawing/2010/main" w="9525">
                   <a:solidFill>
                     <a:srgbClr val="000000"/>
                   </a:solidFill>
@@ -2732,7 +2735,7 @@
             </a:ln>
             <a:extLst>
               <a:ext uri="{91240B29-F687-4f45-9708-019B960494DF}">
-                <a14:hiddenLine xmlns:a14="http://schemas.microsoft.com/office/drawing/2010/main" xmlns="" w="9525">
+                <a14:hiddenLine xmlns="" xmlns:a14="http://schemas.microsoft.com/office/drawing/2010/main" w="9525">
                   <a:solidFill>
                     <a:srgbClr val="000000"/>
                   </a:solidFill>
@@ -2794,7 +2797,7 @@
             </a:ln>
             <a:extLst>
               <a:ext uri="{91240B29-F687-4f45-9708-019B960494DF}">
-                <a14:hiddenLine xmlns:a14="http://schemas.microsoft.com/office/drawing/2010/main" xmlns="" w="9525">
+                <a14:hiddenLine xmlns="" xmlns:a14="http://schemas.microsoft.com/office/drawing/2010/main" w="9525">
                   <a:solidFill>
                     <a:srgbClr val="000000"/>
                   </a:solidFill>
@@ -2884,7 +2887,7 @@
             </a:ln>
             <a:extLst>
               <a:ext uri="{91240B29-F687-4f45-9708-019B960494DF}">
-                <a14:hiddenLine xmlns:a14="http://schemas.microsoft.com/office/drawing/2010/main" xmlns="" w="9525">
+                <a14:hiddenLine xmlns="" xmlns:a14="http://schemas.microsoft.com/office/drawing/2010/main" w="9525">
                   <a:solidFill>
                     <a:srgbClr val="000000"/>
                   </a:solidFill>
@@ -2946,7 +2949,7 @@
             </a:ln>
             <a:extLst>
               <a:ext uri="{91240B29-F687-4f45-9708-019B960494DF}">
-                <a14:hiddenLine xmlns:a14="http://schemas.microsoft.com/office/drawing/2010/main" xmlns="" w="9525">
+                <a14:hiddenLine xmlns="" xmlns:a14="http://schemas.microsoft.com/office/drawing/2010/main" w="9525">
                   <a:solidFill>
                     <a:srgbClr val="000000"/>
                   </a:solidFill>
@@ -3036,7 +3039,7 @@
             </a:ln>
             <a:extLst>
               <a:ext uri="{91240B29-F687-4f45-9708-019B960494DF}">
-                <a14:hiddenLine xmlns:a14="http://schemas.microsoft.com/office/drawing/2010/main" xmlns="" w="9525">
+                <a14:hiddenLine xmlns="" xmlns:a14="http://schemas.microsoft.com/office/drawing/2010/main" w="9525">
                   <a:solidFill>
                     <a:srgbClr val="000000"/>
                   </a:solidFill>
@@ -3098,7 +3101,7 @@
             </a:ln>
             <a:extLst>
               <a:ext uri="{91240B29-F687-4f45-9708-019B960494DF}">
-                <a14:hiddenLine xmlns:a14="http://schemas.microsoft.com/office/drawing/2010/main" xmlns="" w="9525">
+                <a14:hiddenLine xmlns="" xmlns:a14="http://schemas.microsoft.com/office/drawing/2010/main" w="9525">
                   <a:solidFill>
                     <a:srgbClr val="000000"/>
                   </a:solidFill>
@@ -3188,7 +3191,7 @@
             </a:ln>
             <a:extLst>
               <a:ext uri="{91240B29-F687-4f45-9708-019B960494DF}">
-                <a14:hiddenLine xmlns:a14="http://schemas.microsoft.com/office/drawing/2010/main" xmlns="" w="9525">
+                <a14:hiddenLine xmlns="" xmlns:a14="http://schemas.microsoft.com/office/drawing/2010/main" w="9525">
                   <a:solidFill>
                     <a:srgbClr val="000000"/>
                   </a:solidFill>
@@ -3222,7 +3225,7 @@
             </a:ln>
             <a:extLst>
               <a:ext uri="{91240B29-F687-4f45-9708-019B960494DF}">
-                <a14:hiddenLine xmlns:a14="http://schemas.microsoft.com/office/drawing/2010/main" xmlns="" w="9525">
+                <a14:hiddenLine xmlns="" xmlns:a14="http://schemas.microsoft.com/office/drawing/2010/main" w="9525">
                   <a:solidFill>
                     <a:srgbClr val="000000"/>
                   </a:solidFill>
@@ -3287,7 +3290,7 @@
             </a:ln>
             <a:extLst>
               <a:ext uri="{91240B29-F687-4f45-9708-019B960494DF}">
-                <a14:hiddenLine xmlns:a14="http://schemas.microsoft.com/office/drawing/2010/main" xmlns="" w="9525">
+                <a14:hiddenLine xmlns="" xmlns:a14="http://schemas.microsoft.com/office/drawing/2010/main" w="9525">
                   <a:solidFill>
                     <a:srgbClr val="000000"/>
                   </a:solidFill>
@@ -3377,7 +3380,7 @@
             </a:ln>
             <a:extLst>
               <a:ext uri="{91240B29-F687-4f45-9708-019B960494DF}">
-                <a14:hiddenLine xmlns:a14="http://schemas.microsoft.com/office/drawing/2010/main" xmlns="" w="9525">
+                <a14:hiddenLine xmlns="" xmlns:a14="http://schemas.microsoft.com/office/drawing/2010/main" w="9525">
                   <a:solidFill>
                     <a:srgbClr val="000000"/>
                   </a:solidFill>
@@ -3439,7 +3442,7 @@
             </a:ln>
             <a:extLst>
               <a:ext uri="{91240B29-F687-4f45-9708-019B960494DF}">
-                <a14:hiddenLine xmlns:a14="http://schemas.microsoft.com/office/drawing/2010/main" xmlns="" w="9525">
+                <a14:hiddenLine xmlns="" xmlns:a14="http://schemas.microsoft.com/office/drawing/2010/main" w="9525">
                   <a:solidFill>
                     <a:srgbClr val="000000"/>
                   </a:solidFill>
@@ -3529,7 +3532,7 @@
             </a:ln>
             <a:extLst>
               <a:ext uri="{91240B29-F687-4f45-9708-019B960494DF}">
-                <a14:hiddenLine xmlns:a14="http://schemas.microsoft.com/office/drawing/2010/main" xmlns="" w="9525">
+                <a14:hiddenLine xmlns="" xmlns:a14="http://schemas.microsoft.com/office/drawing/2010/main" w="9525">
                   <a:solidFill>
                     <a:srgbClr val="000000"/>
                   </a:solidFill>
@@ -3619,7 +3622,7 @@
             </a:ln>
             <a:extLst>
               <a:ext uri="{91240B29-F687-4f45-9708-019B960494DF}">
-                <a14:hiddenLine xmlns:a14="http://schemas.microsoft.com/office/drawing/2010/main" xmlns="" w="9525">
+                <a14:hiddenLine xmlns="" xmlns:a14="http://schemas.microsoft.com/office/drawing/2010/main" w="9525">
                   <a:solidFill>
                     <a:srgbClr val="000000"/>
                   </a:solidFill>
@@ -3684,7 +3687,7 @@
             </a:ln>
             <a:extLst>
               <a:ext uri="{91240B29-F687-4f45-9708-019B960494DF}">
-                <a14:hiddenLine xmlns:a14="http://schemas.microsoft.com/office/drawing/2010/main" xmlns="" w="9525">
+                <a14:hiddenLine xmlns="" xmlns:a14="http://schemas.microsoft.com/office/drawing/2010/main" w="9525">
                   <a:solidFill>
                     <a:srgbClr val="000000"/>
                   </a:solidFill>
@@ -3746,7 +3749,7 @@
             </a:ln>
             <a:extLst>
               <a:ext uri="{91240B29-F687-4f45-9708-019B960494DF}">
-                <a14:hiddenLine xmlns:a14="http://schemas.microsoft.com/office/drawing/2010/main" xmlns="" w="9525">
+                <a14:hiddenLine xmlns="" xmlns:a14="http://schemas.microsoft.com/office/drawing/2010/main" w="9525">
                   <a:solidFill>
                     <a:srgbClr val="000000"/>
                   </a:solidFill>
@@ -3836,7 +3839,7 @@
             </a:ln>
             <a:extLst>
               <a:ext uri="{91240B29-F687-4f45-9708-019B960494DF}">
-                <a14:hiddenLine xmlns:a14="http://schemas.microsoft.com/office/drawing/2010/main" xmlns="" w="9525">
+                <a14:hiddenLine xmlns="" xmlns:a14="http://schemas.microsoft.com/office/drawing/2010/main" w="9525">
                   <a:solidFill>
                     <a:srgbClr val="000000"/>
                   </a:solidFill>
@@ -3926,7 +3929,7 @@
             </a:ln>
             <a:extLst>
               <a:ext uri="{91240B29-F687-4f45-9708-019B960494DF}">
-                <a14:hiddenLine xmlns:a14="http://schemas.microsoft.com/office/drawing/2010/main" xmlns="" w="9525">
+                <a14:hiddenLine xmlns="" xmlns:a14="http://schemas.microsoft.com/office/drawing/2010/main" w="9525">
                   <a:solidFill>
                     <a:srgbClr val="000000"/>
                   </a:solidFill>
@@ -3988,7 +3991,7 @@
             </a:ln>
             <a:extLst>
               <a:ext uri="{91240B29-F687-4f45-9708-019B960494DF}">
-                <a14:hiddenLine xmlns:a14="http://schemas.microsoft.com/office/drawing/2010/main" xmlns="" w="9525">
+                <a14:hiddenLine xmlns="" xmlns:a14="http://schemas.microsoft.com/office/drawing/2010/main" w="9525">
                   <a:solidFill>
                     <a:srgbClr val="000000"/>
                   </a:solidFill>
@@ -4108,7 +4111,7 @@
             </a:ln>
             <a:extLst>
               <a:ext uri="{91240B29-F687-4f45-9708-019B960494DF}">
-                <a14:hiddenLine xmlns:a14="http://schemas.microsoft.com/office/drawing/2010/main" xmlns="" w="9525">
+                <a14:hiddenLine xmlns="" xmlns:a14="http://schemas.microsoft.com/office/drawing/2010/main" w="9525">
                   <a:solidFill>
                     <a:srgbClr val="000000"/>
                   </a:solidFill>
@@ -4176,7 +4179,7 @@
             </a:ln>
             <a:extLst>
               <a:ext uri="{91240B29-F687-4f45-9708-019B960494DF}">
-                <a14:hiddenLine xmlns:a14="http://schemas.microsoft.com/office/drawing/2010/main" xmlns="" w="9525">
+                <a14:hiddenLine xmlns="" xmlns:a14="http://schemas.microsoft.com/office/drawing/2010/main" w="9525">
                   <a:solidFill>
                     <a:srgbClr val="000000"/>
                   </a:solidFill>
@@ -4266,7 +4269,7 @@
             </a:ln>
             <a:extLst>
               <a:ext uri="{91240B29-F687-4f45-9708-019B960494DF}">
-                <a14:hiddenLine xmlns:a14="http://schemas.microsoft.com/office/drawing/2010/main" xmlns="" w="9525">
+                <a14:hiddenLine xmlns="" xmlns:a14="http://schemas.microsoft.com/office/drawing/2010/main" w="9525">
                   <a:solidFill>
                     <a:srgbClr val="000000"/>
                   </a:solidFill>
@@ -4416,7 +4419,7 @@
                 </a:solidFill>
                 <a:latin typeface="Calibri"/>
               </a:rPr>
-              <a:t>3/18/2021</a:t>
+              <a:t>3/18/21</a:t>
             </a:fld>
             <a:endParaRPr lang="en-US" sz="1200" b="0" strike="noStrike" spc="-1">
               <a:latin typeface="Times New Roman"/>
@@ -4709,7 +4712,7 @@
                 </a:solidFill>
                 <a:latin typeface="Calibri"/>
               </a:rPr>
-              <a:t>3/18/2021</a:t>
+              <a:t>3/18/21</a:t>
             </a:fld>
             <a:endParaRPr lang="en-US" sz="1200" b="0" strike="noStrike" spc="-1">
               <a:latin typeface="Times New Roman"/>
@@ -4931,7 +4934,7 @@
                 </a:solidFill>
                 <a:latin typeface="Calibri"/>
               </a:rPr>
-              <a:t>3/18/2021</a:t>
+              <a:t>3/18/21</a:t>
             </a:fld>
             <a:endParaRPr lang="en-US" sz="1200" b="0" strike="noStrike" spc="-1">
               <a:latin typeface="Times New Roman"/>
@@ -5220,7 +5223,7 @@
                 </a:solidFill>
                 <a:latin typeface="Calibri"/>
               </a:rPr>
-              <a:t>3/18/2021</a:t>
+              <a:t>3/18/21</a:t>
             </a:fld>
             <a:endParaRPr lang="en-US" sz="1200" b="0" strike="noStrike" spc="-1">
               <a:latin typeface="Times New Roman"/>
@@ -5680,7 +5683,7 @@
                 </a:solidFill>
                 <a:latin typeface="Calibri"/>
               </a:rPr>
-              <a:t>3/18/2021</a:t>
+              <a:t>3/18/21</a:t>
             </a:fld>
             <a:endParaRPr lang="en-US" sz="1200" b="0" strike="noStrike" spc="-1">
               <a:latin typeface="Times New Roman"/>
@@ -6252,7 +6255,7 @@
                 </a:solidFill>
                 <a:latin typeface="Calibri"/>
               </a:rPr>
-              <a:t>3/18/2021</a:t>
+              <a:t>3/18/21</a:t>
             </a:fld>
             <a:endParaRPr lang="en-US" sz="1200" b="0" strike="noStrike" spc="-1">
               <a:latin typeface="Times New Roman"/>
@@ -6998,7 +7001,7 @@
                 </a:solidFill>
                 <a:latin typeface="Calibri"/>
               </a:rPr>
-              <a:t>3/18/2021</a:t>
+              <a:t>3/18/21</a:t>
             </a:fld>
             <a:endParaRPr lang="en-US" sz="1200" b="0" strike="noStrike" spc="-1">
               <a:latin typeface="Times New Roman"/>
@@ -7194,7 +7197,7 @@
                 </a:solidFill>
                 <a:latin typeface="Calibri"/>
               </a:rPr>
-              <a:t>3/18/2021</a:t>
+              <a:t>3/18/21</a:t>
             </a:fld>
             <a:endParaRPr lang="en-US" sz="1200" b="0" strike="noStrike" spc="-1">
               <a:latin typeface="Times New Roman"/>
@@ -7400,7 +7403,7 @@
                 </a:solidFill>
                 <a:latin typeface="Calibri"/>
               </a:rPr>
-              <a:t>3/18/2021</a:t>
+              <a:t>3/18/21</a:t>
             </a:fld>
             <a:endParaRPr lang="en-US" sz="1200" b="0" strike="noStrike" spc="-1">
               <a:latin typeface="Times New Roman"/>
@@ -7688,7 +7691,7 @@
                 </a:solidFill>
                 <a:latin typeface="Calibri"/>
               </a:rPr>
-              <a:t>3/18/2021</a:t>
+              <a:t>3/18/21</a:t>
             </a:fld>
             <a:endParaRPr lang="en-US" sz="1200" b="0" strike="noStrike" spc="-1">
               <a:latin typeface="Times New Roman"/>
@@ -7964,7 +7967,7 @@
                 </a:solidFill>
                 <a:latin typeface="Calibri"/>
               </a:rPr>
-              <a:t>3/18/2021</a:t>
+              <a:t>3/18/21</a:t>
             </a:fld>
             <a:endParaRPr lang="en-US" sz="1200" b="0" strike="noStrike" spc="-1">
               <a:latin typeface="Times New Roman"/>
@@ -8222,7 +8225,7 @@
                 </a:solidFill>
                 <a:latin typeface="Calibri"/>
               </a:rPr>
-              <a:t>3/18/2021</a:t>
+              <a:t>3/18/21</a:t>
             </a:fld>
             <a:endParaRPr lang="en-US" sz="1200" b="0" strike="noStrike" spc="-1">
               <a:latin typeface="Times New Roman"/>
@@ -8629,7 +8632,7 @@
                 </a:solidFill>
                 <a:latin typeface="Calibri"/>
               </a:rPr>
-              <a:t>3/18/2021</a:t>
+              <a:t>3/18/21</a:t>
             </a:fld>
             <a:endParaRPr lang="en-US" sz="1200" b="0" strike="noStrike" spc="-1">
               <a:latin typeface="Times New Roman"/>
@@ -8763,7 +8766,7 @@
           <a:p>
             <a:fld id="{48A87A34-81AB-432B-8DAE-1953F412C126}" type="datetimeFigureOut">
               <a:rPr lang="en-US" smtClean="0"/>
-              <a:t>3/18/2021</a:t>
+              <a:t>3/18/21</a:t>
             </a:fld>
             <a:endParaRPr lang="en-US" dirty="0"/>
           </a:p>
@@ -8868,7 +8871,7 @@
                 </a:solidFill>
                 <a:latin typeface="Calibri"/>
               </a:rPr>
-              <a:t>3/18/2021</a:t>
+              <a:t>3/18/21</a:t>
             </a:fld>
             <a:endParaRPr lang="en-US" sz="1200" b="0" strike="noStrike" spc="-1">
               <a:latin typeface="Times New Roman"/>
@@ -9143,7 +9146,7 @@
                 </a:solidFill>
                 <a:latin typeface="Calibri"/>
               </a:rPr>
-              <a:t>3/18/2021</a:t>
+              <a:t>3/18/21</a:t>
             </a:fld>
             <a:endParaRPr lang="en-US" sz="1200" b="0" strike="noStrike" spc="-1">
               <a:latin typeface="Times New Roman"/>
@@ -9449,7 +9452,7 @@
                 </a:solidFill>
                 <a:latin typeface="Calibri"/>
               </a:rPr>
-              <a:t>3/18/2021</a:t>
+              <a:t>3/18/21</a:t>
             </a:fld>
             <a:endParaRPr lang="en-US" sz="1200" b="0" strike="noStrike" spc="-1">
               <a:latin typeface="Times New Roman"/>
@@ -9588,7 +9591,7 @@
           <a:noFill/>
           <a:extLst>
             <a:ext uri="{909E8E84-426E-40dd-AFC4-6F175D3DCCD1}">
-              <a14:hiddenFill xmlns:a14="http://schemas.microsoft.com/office/drawing/2010/main" xmlns="">
+              <a14:hiddenFill xmlns="" xmlns:a14="http://schemas.microsoft.com/office/drawing/2010/main">
                 <a:solidFill>
                   <a:srgbClr val="FFFFFF"/>
                 </a:solidFill>
@@ -9662,7 +9665,7 @@
               </a:ln>
               <a:extLst>
                 <a:ext uri="{91240B29-F687-4f45-9708-019B960494DF}">
-                  <a14:hiddenLine xmlns:a14="http://schemas.microsoft.com/office/drawing/2010/main" xmlns="" w="9525">
+                  <a14:hiddenLine xmlns="" xmlns:a14="http://schemas.microsoft.com/office/drawing/2010/main" w="9525">
                     <a:solidFill>
                       <a:srgbClr val="000000"/>
                     </a:solidFill>
@@ -9752,7 +9755,7 @@
               </a:ln>
               <a:extLst>
                 <a:ext uri="{91240B29-F687-4f45-9708-019B960494DF}">
-                  <a14:hiddenLine xmlns:a14="http://schemas.microsoft.com/office/drawing/2010/main" xmlns="" w="9525">
+                  <a14:hiddenLine xmlns="" xmlns:a14="http://schemas.microsoft.com/office/drawing/2010/main" w="9525">
                     <a:solidFill>
                       <a:srgbClr val="000000"/>
                     </a:solidFill>
@@ -9842,7 +9845,7 @@
               </a:ln>
               <a:extLst>
                 <a:ext uri="{91240B29-F687-4f45-9708-019B960494DF}">
-                  <a14:hiddenLine xmlns:a14="http://schemas.microsoft.com/office/drawing/2010/main" xmlns="" w="9525">
+                  <a14:hiddenLine xmlns="" xmlns:a14="http://schemas.microsoft.com/office/drawing/2010/main" w="9525">
                     <a:solidFill>
                       <a:srgbClr val="000000"/>
                     </a:solidFill>
@@ -9904,7 +9907,7 @@
               </a:ln>
               <a:extLst>
                 <a:ext uri="{91240B29-F687-4f45-9708-019B960494DF}">
-                  <a14:hiddenLine xmlns:a14="http://schemas.microsoft.com/office/drawing/2010/main" xmlns="" w="9525">
+                  <a14:hiddenLine xmlns="" xmlns:a14="http://schemas.microsoft.com/office/drawing/2010/main" w="9525">
                     <a:solidFill>
                       <a:srgbClr val="000000"/>
                     </a:solidFill>
@@ -9994,7 +9997,7 @@
               </a:ln>
               <a:extLst>
                 <a:ext uri="{91240B29-F687-4f45-9708-019B960494DF}">
-                  <a14:hiddenLine xmlns:a14="http://schemas.microsoft.com/office/drawing/2010/main" xmlns="" w="9525">
+                  <a14:hiddenLine xmlns="" xmlns:a14="http://schemas.microsoft.com/office/drawing/2010/main" w="9525">
                     <a:solidFill>
                       <a:srgbClr val="000000"/>
                     </a:solidFill>
@@ -10056,7 +10059,7 @@
               </a:ln>
               <a:extLst>
                 <a:ext uri="{91240B29-F687-4f45-9708-019B960494DF}">
-                  <a14:hiddenLine xmlns:a14="http://schemas.microsoft.com/office/drawing/2010/main" xmlns="" w="9525">
+                  <a14:hiddenLine xmlns="" xmlns:a14="http://schemas.microsoft.com/office/drawing/2010/main" w="9525">
                     <a:solidFill>
                       <a:srgbClr val="000000"/>
                     </a:solidFill>
@@ -10118,7 +10121,7 @@
               </a:ln>
               <a:extLst>
                 <a:ext uri="{91240B29-F687-4f45-9708-019B960494DF}">
-                  <a14:hiddenLine xmlns:a14="http://schemas.microsoft.com/office/drawing/2010/main" xmlns="" w="9525">
+                  <a14:hiddenLine xmlns="" xmlns:a14="http://schemas.microsoft.com/office/drawing/2010/main" w="9525">
                     <a:solidFill>
                       <a:srgbClr val="000000"/>
                     </a:solidFill>
@@ -10208,7 +10211,7 @@
               </a:ln>
               <a:extLst>
                 <a:ext uri="{91240B29-F687-4f45-9708-019B960494DF}">
-                  <a14:hiddenLine xmlns:a14="http://schemas.microsoft.com/office/drawing/2010/main" xmlns="" w="9525">
+                  <a14:hiddenLine xmlns="" xmlns:a14="http://schemas.microsoft.com/office/drawing/2010/main" w="9525">
                     <a:solidFill>
                       <a:srgbClr val="000000"/>
                     </a:solidFill>
@@ -10298,7 +10301,7 @@
               </a:ln>
               <a:extLst>
                 <a:ext uri="{91240B29-F687-4f45-9708-019B960494DF}">
-                  <a14:hiddenLine xmlns:a14="http://schemas.microsoft.com/office/drawing/2010/main" xmlns="" w="9525">
+                  <a14:hiddenLine xmlns="" xmlns:a14="http://schemas.microsoft.com/office/drawing/2010/main" w="9525">
                     <a:solidFill>
                       <a:srgbClr val="000000"/>
                     </a:solidFill>
@@ -10360,7 +10363,7 @@
               </a:ln>
               <a:extLst>
                 <a:ext uri="{91240B29-F687-4f45-9708-019B960494DF}">
-                  <a14:hiddenLine xmlns:a14="http://schemas.microsoft.com/office/drawing/2010/main" xmlns="" w="9525">
+                  <a14:hiddenLine xmlns="" xmlns:a14="http://schemas.microsoft.com/office/drawing/2010/main" w="9525">
                     <a:solidFill>
                       <a:srgbClr val="000000"/>
                     </a:solidFill>
@@ -10470,7 +10473,7 @@
               </a:ln>
               <a:extLst>
                 <a:ext uri="{91240B29-F687-4f45-9708-019B960494DF}">
-                  <a14:hiddenLine xmlns:a14="http://schemas.microsoft.com/office/drawing/2010/main" xmlns="" w="9525">
+                  <a14:hiddenLine xmlns="" xmlns:a14="http://schemas.microsoft.com/office/drawing/2010/main" w="9525">
                     <a:solidFill>
                       <a:srgbClr val="000000"/>
                     </a:solidFill>
@@ -10554,7 +10557,7 @@
               </a:ln>
               <a:extLst>
                 <a:ext uri="{91240B29-F687-4f45-9708-019B960494DF}">
-                  <a14:hiddenLine xmlns:a14="http://schemas.microsoft.com/office/drawing/2010/main" xmlns="" w="9525">
+                  <a14:hiddenLine xmlns="" xmlns:a14="http://schemas.microsoft.com/office/drawing/2010/main" w="9525">
                     <a:solidFill>
                       <a:srgbClr val="000000"/>
                     </a:solidFill>
@@ -10616,7 +10619,7 @@
               </a:ln>
               <a:extLst>
                 <a:ext uri="{91240B29-F687-4f45-9708-019B960494DF}">
-                  <a14:hiddenLine xmlns:a14="http://schemas.microsoft.com/office/drawing/2010/main" xmlns="" w="9525">
+                  <a14:hiddenLine xmlns="" xmlns:a14="http://schemas.microsoft.com/office/drawing/2010/main" w="9525">
                     <a:solidFill>
                       <a:srgbClr val="000000"/>
                     </a:solidFill>
@@ -10678,7 +10681,7 @@
               </a:ln>
               <a:extLst>
                 <a:ext uri="{91240B29-F687-4f45-9708-019B960494DF}">
-                  <a14:hiddenLine xmlns:a14="http://schemas.microsoft.com/office/drawing/2010/main" xmlns="" w="9525">
+                  <a14:hiddenLine xmlns="" xmlns:a14="http://schemas.microsoft.com/office/drawing/2010/main" w="9525">
                     <a:solidFill>
                       <a:srgbClr val="000000"/>
                     </a:solidFill>
@@ -10768,7 +10771,7 @@
               </a:ln>
               <a:extLst>
                 <a:ext uri="{91240B29-F687-4f45-9708-019B960494DF}">
-                  <a14:hiddenLine xmlns:a14="http://schemas.microsoft.com/office/drawing/2010/main" xmlns="" w="9525">
+                  <a14:hiddenLine xmlns="" xmlns:a14="http://schemas.microsoft.com/office/drawing/2010/main" w="9525">
                     <a:solidFill>
                       <a:srgbClr val="000000"/>
                     </a:solidFill>
@@ -10802,7 +10805,7 @@
               </a:ln>
               <a:extLst>
                 <a:ext uri="{91240B29-F687-4f45-9708-019B960494DF}">
-                  <a14:hiddenLine xmlns:a14="http://schemas.microsoft.com/office/drawing/2010/main" xmlns="" w="9525">
+                  <a14:hiddenLine xmlns="" xmlns:a14="http://schemas.microsoft.com/office/drawing/2010/main" w="9525">
                     <a:solidFill>
                       <a:srgbClr val="000000"/>
                     </a:solidFill>
@@ -10867,7 +10870,7 @@
               </a:ln>
               <a:extLst>
                 <a:ext uri="{91240B29-F687-4f45-9708-019B960494DF}">
-                  <a14:hiddenLine xmlns:a14="http://schemas.microsoft.com/office/drawing/2010/main" xmlns="" w="9525">
+                  <a14:hiddenLine xmlns="" xmlns:a14="http://schemas.microsoft.com/office/drawing/2010/main" w="9525">
                     <a:solidFill>
                       <a:srgbClr val="000000"/>
                     </a:solidFill>
@@ -10957,7 +10960,7 @@
               </a:ln>
               <a:extLst>
                 <a:ext uri="{91240B29-F687-4f45-9708-019B960494DF}">
-                  <a14:hiddenLine xmlns:a14="http://schemas.microsoft.com/office/drawing/2010/main" xmlns="" w="9525">
+                  <a14:hiddenLine xmlns="" xmlns:a14="http://schemas.microsoft.com/office/drawing/2010/main" w="9525">
                     <a:solidFill>
                       <a:srgbClr val="000000"/>
                     </a:solidFill>
@@ -11019,7 +11022,7 @@
               </a:ln>
               <a:extLst>
                 <a:ext uri="{91240B29-F687-4f45-9708-019B960494DF}">
-                  <a14:hiddenLine xmlns:a14="http://schemas.microsoft.com/office/drawing/2010/main" xmlns="" w="9525">
+                  <a14:hiddenLine xmlns="" xmlns:a14="http://schemas.microsoft.com/office/drawing/2010/main" w="9525">
                     <a:solidFill>
                       <a:srgbClr val="000000"/>
                     </a:solidFill>
@@ -11109,7 +11112,7 @@
               </a:ln>
               <a:extLst>
                 <a:ext uri="{91240B29-F687-4f45-9708-019B960494DF}">
-                  <a14:hiddenLine xmlns:a14="http://schemas.microsoft.com/office/drawing/2010/main" xmlns="" w="9525">
+                  <a14:hiddenLine xmlns="" xmlns:a14="http://schemas.microsoft.com/office/drawing/2010/main" w="9525">
                     <a:solidFill>
                       <a:srgbClr val="000000"/>
                     </a:solidFill>
@@ -11174,7 +11177,7 @@
               </a:ln>
               <a:extLst>
                 <a:ext uri="{91240B29-F687-4f45-9708-019B960494DF}">
-                  <a14:hiddenLine xmlns:a14="http://schemas.microsoft.com/office/drawing/2010/main" xmlns="" w="9525">
+                  <a14:hiddenLine xmlns="" xmlns:a14="http://schemas.microsoft.com/office/drawing/2010/main" w="9525">
                     <a:solidFill>
                       <a:srgbClr val="000000"/>
                     </a:solidFill>
@@ -11236,7 +11239,7 @@
               </a:ln>
               <a:extLst>
                 <a:ext uri="{91240B29-F687-4f45-9708-019B960494DF}">
-                  <a14:hiddenLine xmlns:a14="http://schemas.microsoft.com/office/drawing/2010/main" xmlns="" w="9525">
+                  <a14:hiddenLine xmlns="" xmlns:a14="http://schemas.microsoft.com/office/drawing/2010/main" w="9525">
                     <a:solidFill>
                       <a:srgbClr val="000000"/>
                     </a:solidFill>
@@ -11326,7 +11329,7 @@
               </a:ln>
               <a:extLst>
                 <a:ext uri="{91240B29-F687-4f45-9708-019B960494DF}">
-                  <a14:hiddenLine xmlns:a14="http://schemas.microsoft.com/office/drawing/2010/main" xmlns="" w="9525">
+                  <a14:hiddenLine xmlns="" xmlns:a14="http://schemas.microsoft.com/office/drawing/2010/main" w="9525">
                     <a:solidFill>
                       <a:srgbClr val="000000"/>
                     </a:solidFill>
@@ -11416,7 +11419,7 @@
               </a:ln>
               <a:extLst>
                 <a:ext uri="{91240B29-F687-4f45-9708-019B960494DF}">
-                  <a14:hiddenLine xmlns:a14="http://schemas.microsoft.com/office/drawing/2010/main" xmlns="" w="9525">
+                  <a14:hiddenLine xmlns="" xmlns:a14="http://schemas.microsoft.com/office/drawing/2010/main" w="9525">
                     <a:solidFill>
                       <a:srgbClr val="000000"/>
                     </a:solidFill>
@@ -11481,7 +11484,7 @@
               </a:ln>
               <a:extLst>
                 <a:ext uri="{91240B29-F687-4f45-9708-019B960494DF}">
-                  <a14:hiddenLine xmlns:a14="http://schemas.microsoft.com/office/drawing/2010/main" xmlns="" w="9525">
+                  <a14:hiddenLine xmlns="" xmlns:a14="http://schemas.microsoft.com/office/drawing/2010/main" w="9525">
                     <a:solidFill>
                       <a:srgbClr val="000000"/>
                     </a:solidFill>
@@ -11601,7 +11604,7 @@
               </a:ln>
               <a:extLst>
                 <a:ext uri="{91240B29-F687-4f45-9708-019B960494DF}">
-                  <a14:hiddenLine xmlns:a14="http://schemas.microsoft.com/office/drawing/2010/main" xmlns="" w="9525">
+                  <a14:hiddenLine xmlns="" xmlns:a14="http://schemas.microsoft.com/office/drawing/2010/main" w="9525">
                     <a:solidFill>
                       <a:srgbClr val="000000"/>
                     </a:solidFill>
@@ -11682,7 +11685,7 @@
               </a:ln>
               <a:extLst>
                 <a:ext uri="{91240B29-F687-4f45-9708-019B960494DF}">
-                  <a14:hiddenLine xmlns:a14="http://schemas.microsoft.com/office/drawing/2010/main" xmlns="" w="9525">
+                  <a14:hiddenLine xmlns="" xmlns:a14="http://schemas.microsoft.com/office/drawing/2010/main" w="9525">
                     <a:solidFill>
                       <a:srgbClr val="000000"/>
                     </a:solidFill>
@@ -11797,7 +11800,7 @@
               </a:ln>
               <a:extLst>
                 <a:ext uri="{91240B29-F687-4f45-9708-019B960494DF}">
-                  <a14:hiddenLine xmlns:a14="http://schemas.microsoft.com/office/drawing/2010/main" xmlns="" w="9525">
+                  <a14:hiddenLine xmlns="" xmlns:a14="http://schemas.microsoft.com/office/drawing/2010/main" w="9525">
                     <a:solidFill>
                       <a:srgbClr val="000000"/>
                     </a:solidFill>
@@ -11887,7 +11890,7 @@
               </a:ln>
               <a:extLst>
                 <a:ext uri="{91240B29-F687-4f45-9708-019B960494DF}">
-                  <a14:hiddenLine xmlns:a14="http://schemas.microsoft.com/office/drawing/2010/main" xmlns="" w="9525">
+                  <a14:hiddenLine xmlns="" xmlns:a14="http://schemas.microsoft.com/office/drawing/2010/main" w="9525">
                     <a:solidFill>
                       <a:srgbClr val="000000"/>
                     </a:solidFill>
@@ -11952,7 +11955,7 @@
               </a:ln>
               <a:extLst>
                 <a:ext uri="{91240B29-F687-4f45-9708-019B960494DF}">
-                  <a14:hiddenLine xmlns:a14="http://schemas.microsoft.com/office/drawing/2010/main" xmlns="" w="9525">
+                  <a14:hiddenLine xmlns="" xmlns:a14="http://schemas.microsoft.com/office/drawing/2010/main" w="9525">
                     <a:solidFill>
                       <a:srgbClr val="000000"/>
                     </a:solidFill>
@@ -12042,7 +12045,7 @@
               </a:ln>
               <a:extLst>
                 <a:ext uri="{91240B29-F687-4f45-9708-019B960494DF}">
-                  <a14:hiddenLine xmlns:a14="http://schemas.microsoft.com/office/drawing/2010/main" xmlns="" w="9525">
+                  <a14:hiddenLine xmlns="" xmlns:a14="http://schemas.microsoft.com/office/drawing/2010/main" w="9525">
                     <a:solidFill>
                       <a:srgbClr val="000000"/>
                     </a:solidFill>
@@ -12110,7 +12113,7 @@
               </a:ln>
               <a:extLst>
                 <a:ext uri="{91240B29-F687-4f45-9708-019B960494DF}">
-                  <a14:hiddenLine xmlns:a14="http://schemas.microsoft.com/office/drawing/2010/main" xmlns="" w="9525">
+                  <a14:hiddenLine xmlns="" xmlns:a14="http://schemas.microsoft.com/office/drawing/2010/main" w="9525">
                     <a:solidFill>
                       <a:srgbClr val="000000"/>
                     </a:solidFill>
@@ -12200,7 +12203,7 @@
               </a:ln>
               <a:extLst>
                 <a:ext uri="{91240B29-F687-4f45-9708-019B960494DF}">
-                  <a14:hiddenLine xmlns:a14="http://schemas.microsoft.com/office/drawing/2010/main" xmlns="" w="9525">
+                  <a14:hiddenLine xmlns="" xmlns:a14="http://schemas.microsoft.com/office/drawing/2010/main" w="9525">
                     <a:solidFill>
                       <a:srgbClr val="000000"/>
                     </a:solidFill>
@@ -12268,7 +12271,7 @@
               </a:ln>
               <a:extLst>
                 <a:ext uri="{91240B29-F687-4f45-9708-019B960494DF}">
-                  <a14:hiddenLine xmlns:a14="http://schemas.microsoft.com/office/drawing/2010/main" xmlns="" w="9525">
+                  <a14:hiddenLine xmlns="" xmlns:a14="http://schemas.microsoft.com/office/drawing/2010/main" w="9525">
                     <a:solidFill>
                       <a:srgbClr val="000000"/>
                     </a:solidFill>
@@ -12358,7 +12361,7 @@
               </a:ln>
               <a:extLst>
                 <a:ext uri="{91240B29-F687-4f45-9708-019B960494DF}">
-                  <a14:hiddenLine xmlns:a14="http://schemas.microsoft.com/office/drawing/2010/main" xmlns="" w="9525">
+                  <a14:hiddenLine xmlns="" xmlns:a14="http://schemas.microsoft.com/office/drawing/2010/main" w="9525">
                     <a:solidFill>
                       <a:srgbClr val="000000"/>
                     </a:solidFill>
@@ -12392,7 +12395,7 @@
               </a:ln>
               <a:extLst>
                 <a:ext uri="{91240B29-F687-4f45-9708-019B960494DF}">
-                  <a14:hiddenLine xmlns:a14="http://schemas.microsoft.com/office/drawing/2010/main" xmlns="" w="9525">
+                  <a14:hiddenLine xmlns="" xmlns:a14="http://schemas.microsoft.com/office/drawing/2010/main" w="9525">
                     <a:solidFill>
                       <a:srgbClr val="000000"/>
                     </a:solidFill>
@@ -12542,7 +12545,7 @@
                 </a:solidFill>
                 <a:latin typeface="Calibri"/>
               </a:rPr>
-              <a:t>3/18/2021</a:t>
+              <a:t>3/18/21</a:t>
             </a:fld>
             <a:endParaRPr lang="en-US" sz="1200" b="0" strike="noStrike" spc="-1">
               <a:latin typeface="Times New Roman"/>
@@ -13008,20 +13011,14 @@
               </a:lnSpc>
             </a:pPr>
             <a:r>
-              <a:rPr lang="en-US" sz="8000" b="0" strike="noStrike" spc="-1">
+              <a:rPr lang="en-US" sz="8000" b="0" strike="noStrike" spc="-1" dirty="0">
                 <a:solidFill>
                   <a:srgbClr val="000000"/>
                 </a:solidFill>
-                <a:latin typeface="Calibri Light"/>
+                <a:latin typeface="Algerian" pitchFamily="82" charset="77"/>
               </a:rPr>
               <a:t>Proyecto CS</a:t>
             </a:r>
-            <a:endParaRPr lang="en-US" sz="8000" b="0" strike="noStrike" spc="-1">
-              <a:solidFill>
-                <a:srgbClr val="000000"/>
-              </a:solidFill>
-              <a:latin typeface="Calibri"/>
-            </a:endParaRPr>
           </a:p>
         </p:txBody>
       </p:sp>
@@ -13033,8 +13030,8 @@
         </p:nvSpPr>
         <p:spPr>
           <a:xfrm>
-            <a:off x="1523880" y="3602160"/>
-            <a:ext cx="9143640" cy="1655280"/>
+            <a:off x="2823522" y="4089042"/>
+            <a:ext cx="6544355" cy="2133360"/>
           </a:xfrm>
           <a:prstGeom prst="rect">
             <a:avLst/>
@@ -13050,7 +13047,7 @@
           <a:p>
             <a:pPr algn="ctr"/>
             <a:r>
-              <a:rPr lang="en-US" sz="3200" b="0" strike="noStrike" spc="-1" dirty="0">
+              <a:rPr lang="en-US" sz="2400" b="0" strike="noStrike" spc="-1" dirty="0">
                 <a:latin typeface="Arial"/>
               </a:rPr>
               <a:t>Santiago Andrés Serrano Vacca - A01734988</a:t>
@@ -13059,64 +13056,78 @@
           <a:p>
             <a:pPr algn="ctr"/>
             <a:r>
-              <a:rPr lang="en-US" sz="3200" spc="-1" dirty="0">
+              <a:rPr lang="en-US" sz="2400" spc="-1" dirty="0">
                 <a:latin typeface="Arial"/>
               </a:rPr>
               <a:t>Iker Martinez Parra – A01770097</a:t>
             </a:r>
             <a:br>
-              <a:rPr lang="en-US" sz="3200" spc="-1" dirty="0">
+              <a:rPr lang="en-US" sz="2400" spc="-1" dirty="0">
                 <a:latin typeface="Arial"/>
               </a:rPr>
             </a:br>
             <a:r>
-              <a:rPr lang="en-US" sz="3200" spc="-1" dirty="0">
+              <a:rPr lang="en-US" sz="2400" spc="-1" dirty="0">
                 <a:latin typeface="Arial"/>
               </a:rPr>
-              <a:t>Diana Laura </a:t>
-            </a:r>
-            <a:r>
-              <a:rPr lang="en-US" sz="3200" spc="-1" dirty="0" err="1">
+              <a:t>Diana Laura Hdz Villarreal – A01570679</a:t>
+            </a:r>
+          </a:p>
+          <a:p>
+            <a:pPr algn="ctr"/>
+            <a:r>
+              <a:rPr lang="en-US" sz="2400" b="0" strike="noStrike" spc="-1" dirty="0">
                 <a:latin typeface="Arial"/>
               </a:rPr>
-              <a:t>Hdz</a:t>
-            </a:r>
-            <a:r>
-              <a:rPr lang="en-US" sz="3200" spc="-1" dirty="0">
-                <a:latin typeface="Arial"/>
-              </a:rPr>
-              <a:t> Villarreal – A01570679</a:t>
+              <a:t>Ricardo Andrés Cavazos Cantú – A01177189</a:t>
             </a:r>
           </a:p>
           <a:p>
             <a:pPr algn="ctr"/>
             <a:r>
-              <a:rPr lang="en-US" sz="3200" b="0" strike="noStrike" spc="-1" dirty="0">
-                <a:latin typeface="Arial"/>
-              </a:rPr>
-              <a:t>Ricardo Andrés Cavazos </a:t>
-            </a:r>
-            <a:r>
-              <a:rPr lang="en-US" sz="3200" b="0" strike="noStrike" spc="-1" dirty="0" err="1">
-                <a:latin typeface="Arial"/>
-              </a:rPr>
-              <a:t>Cantú</a:t>
-            </a:r>
-            <a:r>
-              <a:rPr lang="en-US" sz="3200" b="0" strike="noStrike" spc="-1" dirty="0">
-                <a:latin typeface="Arial"/>
-              </a:rPr>
-              <a:t> – A01177189</a:t>
-            </a:r>
-          </a:p>
-          <a:p>
-            <a:pPr algn="ctr"/>
-            <a:r>
-              <a:rPr lang="en-US" sz="3200" b="0" strike="noStrike" spc="-1" dirty="0">
+              <a:rPr lang="en-US" sz="2400" b="0" strike="noStrike" spc="-1" dirty="0">
                 <a:latin typeface="Arial"/>
               </a:rPr>
               <a:t>Matheo Pinzón Woloski – A01024477</a:t>
             </a:r>
+          </a:p>
+        </p:txBody>
+      </p:sp>
+      <p:sp>
+        <p:nvSpPr>
+          <p:cNvPr id="2" name="TextBox 1">
+            <a:extLst>
+              <a:ext uri="{FF2B5EF4-FFF2-40B4-BE49-F238E27FC236}">
+                <a16:creationId xmlns:a16="http://schemas.microsoft.com/office/drawing/2014/main" id="{BE30C886-5F80-854B-9209-696C7A241B89}"/>
+              </a:ext>
+            </a:extLst>
+          </p:cNvPr>
+          <p:cNvSpPr txBox="1"/>
+          <p:nvPr/>
+        </p:nvSpPr>
+        <p:spPr>
+          <a:xfrm>
+            <a:off x="3199040" y="6478638"/>
+            <a:ext cx="5793317" cy="646331"/>
+          </a:xfrm>
+          <a:prstGeom prst="rect">
+            <a:avLst/>
+          </a:prstGeom>
+          <a:noFill/>
+        </p:spPr>
+        <p:txBody>
+          <a:bodyPr wrap="none" rtlCol="0">
+            <a:spAutoFit/>
+          </a:bodyPr>
+          <a:lstStyle/>
+          <a:p>
+            <a:r>
+              <a:rPr lang="es-ES_tradnl" b="1"/>
+              <a:t>Herramientas computacionales: el arte de la programación</a:t>
+            </a:r>
+          </a:p>
+          <a:p>
+            <a:endParaRPr lang="es-ES_tradnl"/>
           </a:p>
         </p:txBody>
       </p:sp>
@@ -13588,6 +13599,89 @@
 </file>
 
 <file path=ppt/slides/slide3.xml><?xml version="1.0" encoding="utf-8"?>
+<p:sld xmlns:a="http://schemas.openxmlformats.org/drawingml/2006/main" xmlns:r="http://schemas.openxmlformats.org/officeDocument/2006/relationships" xmlns:p="http://schemas.openxmlformats.org/presentationml/2006/main">
+  <p:cSld>
+    <p:spTree>
+      <p:nvGrpSpPr>
+        <p:cNvPr id="1" name=""/>
+        <p:cNvGrpSpPr/>
+        <p:nvPr/>
+      </p:nvGrpSpPr>
+      <p:grpSpPr>
+        <a:xfrm>
+          <a:off x="0" y="0"/>
+          <a:ext cx="0" cy="0"/>
+          <a:chOff x="0" y="0"/>
+          <a:chExt cx="0" cy="0"/>
+        </a:xfrm>
+      </p:grpSpPr>
+      <p:sp>
+        <p:nvSpPr>
+          <p:cNvPr id="2" name="Title 1"/>
+          <p:cNvSpPr>
+            <a:spLocks noGrp="1"/>
+          </p:cNvSpPr>
+          <p:nvPr>
+            <p:ph type="title"/>
+          </p:nvPr>
+        </p:nvSpPr>
+        <p:spPr>
+          <a:xfrm>
+            <a:off x="1233776" y="119754"/>
+            <a:ext cx="9905998" cy="1478570"/>
+          </a:xfrm>
+        </p:spPr>
+        <p:txBody>
+          <a:bodyPr/>
+          <a:lstStyle/>
+          <a:p>
+            <a:r>
+              <a:rPr lang="es-ES" dirty="0"/>
+              <a:t>Efectos de la Calidad del aire</a:t>
+            </a:r>
+            <a:endParaRPr lang="en-US" dirty="0"/>
+          </a:p>
+        </p:txBody>
+      </p:sp>
+      <p:sp>
+        <p:nvSpPr>
+          <p:cNvPr id="5" name="Text Placeholder 4">
+            <a:extLst>
+              <a:ext uri="{FF2B5EF4-FFF2-40B4-BE49-F238E27FC236}">
+                <a16:creationId xmlns:a16="http://schemas.microsoft.com/office/drawing/2014/main" id="{B7135544-2C3F-A946-BBC5-31438AD444BA}"/>
+              </a:ext>
+            </a:extLst>
+          </p:cNvPr>
+          <p:cNvSpPr>
+            <a:spLocks noGrp="1"/>
+          </p:cNvSpPr>
+          <p:nvPr>
+            <p:ph type="body" idx="1"/>
+          </p:nvPr>
+        </p:nvSpPr>
+        <p:spPr/>
+        <p:txBody>
+          <a:bodyPr/>
+          <a:lstStyle/>
+          <a:p>
+            <a:endParaRPr lang="es-ES_tradnl" dirty="0"/>
+          </a:p>
+        </p:txBody>
+      </p:sp>
+    </p:spTree>
+    <p:extLst>
+      <p:ext uri="{BB962C8B-B14F-4D97-AF65-F5344CB8AC3E}">
+        <p14:creationId xmlns:p14="http://schemas.microsoft.com/office/powerpoint/2010/main" val="1340456089"/>
+      </p:ext>
+    </p:extLst>
+  </p:cSld>
+  <p:clrMapOvr>
+    <a:masterClrMapping/>
+  </p:clrMapOvr>
+</p:sld>
+</file>
+
+<file path=ppt/slides/slide4.xml><?xml version="1.0" encoding="utf-8"?>
 <p:sld xmlns:a="http://schemas.openxmlformats.org/drawingml/2006/main" xmlns:r="http://schemas.openxmlformats.org/officeDocument/2006/relationships" xmlns:p="http://schemas.openxmlformats.org/presentationml/2006/main">
   <p:cSld>
     <p:spTree>
@@ -14255,7 +14349,7 @@
 </p:sld>
 </file>
 
-<file path=ppt/slides/slide4.xml><?xml version="1.0" encoding="utf-8"?>
+<file path=ppt/slides/slide5.xml><?xml version="1.0" encoding="utf-8"?>
 <p:sld xmlns:a="http://schemas.openxmlformats.org/drawingml/2006/main" xmlns:r="http://schemas.openxmlformats.org/officeDocument/2006/relationships" xmlns:p="http://schemas.openxmlformats.org/presentationml/2006/main">
   <p:cSld>
     <p:spTree>
@@ -14282,14 +14376,19 @@
             <p:ph type="title"/>
           </p:nvPr>
         </p:nvSpPr>
-        <p:spPr/>
+        <p:spPr>
+          <a:xfrm>
+            <a:off x="1233776" y="119754"/>
+            <a:ext cx="9905998" cy="1478570"/>
+          </a:xfrm>
+        </p:spPr>
         <p:txBody>
           <a:bodyPr/>
           <a:lstStyle/>
           <a:p>
             <a:r>
-              <a:rPr lang="en-US" dirty="0" err="1"/>
-              <a:t>Referencias</a:t>
+              <a:rPr lang="es-ES" dirty="0"/>
+              <a:t>Materiales y  cambio de estaciones a sensores Iot</a:t>
             </a:r>
             <a:endParaRPr lang="en-US" dirty="0"/>
           </a:p>
@@ -14297,46 +14396,576 @@
       </p:sp>
       <p:sp>
         <p:nvSpPr>
-          <p:cNvPr id="3" name="TextBox 2"/>
-          <p:cNvSpPr txBox="1"/>
+          <p:cNvPr id="3" name="Vertical Text Placeholder 2"/>
+          <p:cNvSpPr>
+            <a:spLocks noGrp="1"/>
+          </p:cNvSpPr>
+          <p:nvPr>
+            <p:ph type="body" orient="vert" idx="1"/>
+          </p:nvPr>
+        </p:nvSpPr>
+        <p:spPr>
+          <a:xfrm rot="16200000">
+            <a:off x="3521327" y="-736144"/>
+            <a:ext cx="2230371" cy="6899306"/>
+          </a:xfrm>
+        </p:spPr>
+        <p:txBody>
+          <a:bodyPr>
+            <a:normAutofit lnSpcReduction="10000"/>
+          </a:bodyPr>
+          <a:lstStyle/>
+          <a:p>
+            <a:pPr marL="0" indent="0" algn="just">
+              <a:buNone/>
+            </a:pPr>
+            <a:r>
+              <a:rPr lang="es-ES" dirty="0"/>
+              <a:t>El dióxido de nitrógeno (NO2), el ozono troposférico (O3), los óxidos de azufre (SOX) y el material particulado, más conocido como PM  son algunos de los contaminantes que afectan a la calidad del aire</a:t>
+            </a:r>
+            <a:br>
+              <a:rPr lang="es-ES" dirty="0"/>
+            </a:br>
+            <a:endParaRPr lang="es-ES" dirty="0"/>
+          </a:p>
+          <a:p>
+            <a:pPr marL="0" indent="0" algn="just">
+              <a:buNone/>
+            </a:pPr>
+            <a:endParaRPr lang="en-US" dirty="0"/>
+          </a:p>
+        </p:txBody>
+      </p:sp>
+      <p:sp>
+        <p:nvSpPr>
+          <p:cNvPr id="6" name="Vertical Text Placeholder 2"/>
+          <p:cNvSpPr txBox="1">
+            <a:spLocks/>
+          </p:cNvSpPr>
           <p:nvPr/>
         </p:nvSpPr>
         <p:spPr>
+          <a:xfrm rot="16200000">
+            <a:off x="7629351" y="801244"/>
+            <a:ext cx="2230369" cy="4521211"/>
+          </a:xfrm>
+          <a:prstGeom prst="rect">
+            <a:avLst/>
+          </a:prstGeom>
+        </p:spPr>
+        <p:txBody>
+          <a:bodyPr vert="eaVert" lIns="91440" tIns="45720" rIns="91440" bIns="45720" rtlCol="0" anchor="t">
+            <a:normAutofit/>
+          </a:bodyPr>
+          <a:lstStyle>
+            <a:lvl1pPr marL="228600" indent="-228600" algn="l" defTabSz="914400" rtl="0" eaLnBrk="1" latinLnBrk="0" hangingPunct="1">
+              <a:lnSpc>
+                <a:spcPct val="120000"/>
+              </a:lnSpc>
+              <a:spcBef>
+                <a:spcPts val="1000"/>
+              </a:spcBef>
+              <a:buSzPct val="125000"/>
+              <a:buFont typeface="Arial" panose="020B0604020202020204" pitchFamily="34" charset="0"/>
+              <a:buChar char="•"/>
+              <a:defRPr sz="2400" kern="1200">
+                <a:solidFill>
+                  <a:schemeClr val="tx1"/>
+                </a:solidFill>
+                <a:latin typeface="+mn-lt"/>
+                <a:ea typeface="+mn-ea"/>
+                <a:cs typeface="+mn-cs"/>
+              </a:defRPr>
+            </a:lvl1pPr>
+            <a:lvl2pPr marL="685800" indent="-228600" algn="l" defTabSz="914400" rtl="0" eaLnBrk="1" latinLnBrk="0" hangingPunct="1">
+              <a:lnSpc>
+                <a:spcPct val="120000"/>
+              </a:lnSpc>
+              <a:spcBef>
+                <a:spcPts val="500"/>
+              </a:spcBef>
+              <a:buSzPct val="125000"/>
+              <a:buFont typeface="Arial" panose="020B0604020202020204" pitchFamily="34" charset="0"/>
+              <a:buChar char="•"/>
+              <a:defRPr sz="2000" kern="1200">
+                <a:solidFill>
+                  <a:schemeClr val="tx1"/>
+                </a:solidFill>
+                <a:latin typeface="+mn-lt"/>
+                <a:ea typeface="+mn-ea"/>
+                <a:cs typeface="+mn-cs"/>
+              </a:defRPr>
+            </a:lvl2pPr>
+            <a:lvl3pPr marL="1143000" indent="-228600" algn="l" defTabSz="914400" rtl="0" eaLnBrk="1" latinLnBrk="0" hangingPunct="1">
+              <a:lnSpc>
+                <a:spcPct val="120000"/>
+              </a:lnSpc>
+              <a:spcBef>
+                <a:spcPts val="500"/>
+              </a:spcBef>
+              <a:buSzPct val="125000"/>
+              <a:buFont typeface="Arial" panose="020B0604020202020204" pitchFamily="34" charset="0"/>
+              <a:buChar char="•"/>
+              <a:defRPr sz="1800" kern="1200">
+                <a:solidFill>
+                  <a:schemeClr val="tx1"/>
+                </a:solidFill>
+                <a:latin typeface="+mn-lt"/>
+                <a:ea typeface="+mn-ea"/>
+                <a:cs typeface="+mn-cs"/>
+              </a:defRPr>
+            </a:lvl3pPr>
+            <a:lvl4pPr marL="1600200" indent="-228600" algn="l" defTabSz="914400" rtl="0" eaLnBrk="1" latinLnBrk="0" hangingPunct="1">
+              <a:lnSpc>
+                <a:spcPct val="120000"/>
+              </a:lnSpc>
+              <a:spcBef>
+                <a:spcPts val="500"/>
+              </a:spcBef>
+              <a:buSzPct val="125000"/>
+              <a:buFont typeface="Arial" panose="020B0604020202020204" pitchFamily="34" charset="0"/>
+              <a:buChar char="•"/>
+              <a:defRPr sz="1600" kern="1200">
+                <a:solidFill>
+                  <a:schemeClr val="tx1"/>
+                </a:solidFill>
+                <a:latin typeface="+mn-lt"/>
+                <a:ea typeface="+mn-ea"/>
+                <a:cs typeface="+mn-cs"/>
+              </a:defRPr>
+            </a:lvl4pPr>
+            <a:lvl5pPr marL="2057400" indent="-228600" algn="l" defTabSz="914400" rtl="0" eaLnBrk="1" latinLnBrk="0" hangingPunct="1">
+              <a:lnSpc>
+                <a:spcPct val="120000"/>
+              </a:lnSpc>
+              <a:spcBef>
+                <a:spcPts val="500"/>
+              </a:spcBef>
+              <a:buSzPct val="125000"/>
+              <a:buFont typeface="Arial" panose="020B0604020202020204" pitchFamily="34" charset="0"/>
+              <a:buChar char="•"/>
+              <a:defRPr sz="1600" kern="1200">
+                <a:solidFill>
+                  <a:schemeClr val="tx1"/>
+                </a:solidFill>
+                <a:latin typeface="+mn-lt"/>
+                <a:ea typeface="+mn-ea"/>
+                <a:cs typeface="+mn-cs"/>
+              </a:defRPr>
+            </a:lvl5pPr>
+            <a:lvl6pPr marL="2514600" indent="-228600" algn="l" defTabSz="914400" rtl="0" eaLnBrk="1" latinLnBrk="0" hangingPunct="1">
+              <a:lnSpc>
+                <a:spcPct val="120000"/>
+              </a:lnSpc>
+              <a:spcBef>
+                <a:spcPts val="500"/>
+              </a:spcBef>
+              <a:buSzPct val="125000"/>
+              <a:buFont typeface="Arial" panose="020B0604020202020204" pitchFamily="34" charset="0"/>
+              <a:buChar char="•"/>
+              <a:defRPr sz="1400" kern="1200">
+                <a:solidFill>
+                  <a:schemeClr val="tx1"/>
+                </a:solidFill>
+                <a:latin typeface="+mn-lt"/>
+                <a:ea typeface="+mn-ea"/>
+                <a:cs typeface="+mn-cs"/>
+              </a:defRPr>
+            </a:lvl6pPr>
+            <a:lvl7pPr marL="2971800" indent="-228600" algn="l" defTabSz="914400" rtl="0" eaLnBrk="1" latinLnBrk="0" hangingPunct="1">
+              <a:lnSpc>
+                <a:spcPct val="120000"/>
+              </a:lnSpc>
+              <a:spcBef>
+                <a:spcPts val="500"/>
+              </a:spcBef>
+              <a:buSzPct val="125000"/>
+              <a:buFont typeface="Arial" panose="020B0604020202020204" pitchFamily="34" charset="0"/>
+              <a:buChar char="•"/>
+              <a:defRPr sz="1400" kern="1200">
+                <a:solidFill>
+                  <a:schemeClr val="tx1"/>
+                </a:solidFill>
+                <a:latin typeface="+mn-lt"/>
+                <a:ea typeface="+mn-ea"/>
+                <a:cs typeface="+mn-cs"/>
+              </a:defRPr>
+            </a:lvl7pPr>
+            <a:lvl8pPr marL="3429000" indent="-228600" algn="l" defTabSz="914400" rtl="0" eaLnBrk="1" latinLnBrk="0" hangingPunct="1">
+              <a:lnSpc>
+                <a:spcPct val="120000"/>
+              </a:lnSpc>
+              <a:spcBef>
+                <a:spcPts val="500"/>
+              </a:spcBef>
+              <a:buSzPct val="125000"/>
+              <a:buFont typeface="Arial" panose="020B0604020202020204" pitchFamily="34" charset="0"/>
+              <a:buChar char="•"/>
+              <a:defRPr sz="1400" kern="1200">
+                <a:solidFill>
+                  <a:schemeClr val="tx1"/>
+                </a:solidFill>
+                <a:latin typeface="+mn-lt"/>
+                <a:ea typeface="+mn-ea"/>
+                <a:cs typeface="+mn-cs"/>
+              </a:defRPr>
+            </a:lvl8pPr>
+            <a:lvl9pPr marL="3886200" indent="-228600" algn="l" defTabSz="914400" rtl="0" eaLnBrk="1" latinLnBrk="0" hangingPunct="1">
+              <a:lnSpc>
+                <a:spcPct val="120000"/>
+              </a:lnSpc>
+              <a:spcBef>
+                <a:spcPts val="500"/>
+              </a:spcBef>
+              <a:buSzPct val="125000"/>
+              <a:buFont typeface="Arial" panose="020B0604020202020204" pitchFamily="34" charset="0"/>
+              <a:buChar char="•"/>
+              <a:defRPr sz="1400" kern="1200">
+                <a:solidFill>
+                  <a:schemeClr val="tx1"/>
+                </a:solidFill>
+                <a:latin typeface="+mn-lt"/>
+                <a:ea typeface="+mn-ea"/>
+                <a:cs typeface="+mn-cs"/>
+              </a:defRPr>
+            </a:lvl9pPr>
+          </a:lstStyle>
+          <a:p>
+            <a:pPr marL="0" indent="0">
+              <a:buNone/>
+            </a:pPr>
+            <a:r>
+              <a:rPr lang="es-ES" dirty="0"/>
+              <a:t>. </a:t>
+            </a:r>
+            <a:br>
+              <a:rPr lang="es-ES" dirty="0"/>
+            </a:br>
+            <a:endParaRPr lang="es-ES" dirty="0"/>
+          </a:p>
+          <a:p>
+            <a:pPr marL="0" indent="0">
+              <a:buFont typeface="Arial" panose="020B0604020202020204" pitchFamily="34" charset="0"/>
+              <a:buNone/>
+            </a:pPr>
+            <a:endParaRPr lang="en-US" dirty="0"/>
+          </a:p>
+        </p:txBody>
+      </p:sp>
+      <p:sp>
+        <p:nvSpPr>
+          <p:cNvPr id="9" name="Vertical Text Placeholder 2"/>
+          <p:cNvSpPr txBox="1">
+            <a:spLocks/>
+          </p:cNvSpPr>
+          <p:nvPr/>
+        </p:nvSpPr>
+        <p:spPr>
+          <a:xfrm rot="16200000">
+            <a:off x="6767940" y="1474591"/>
+            <a:ext cx="1902475" cy="7307360"/>
+          </a:xfrm>
+          <a:prstGeom prst="rect">
+            <a:avLst/>
+          </a:prstGeom>
+        </p:spPr>
+        <p:txBody>
+          <a:bodyPr vert="eaVert" lIns="91440" tIns="45720" rIns="91440" bIns="45720" rtlCol="0" anchor="t">
+            <a:normAutofit fontScale="92500"/>
+          </a:bodyPr>
+          <a:lstStyle>
+            <a:lvl1pPr marL="228600" indent="-228600" algn="l" defTabSz="914400" rtl="0" eaLnBrk="1" latinLnBrk="0" hangingPunct="1">
+              <a:lnSpc>
+                <a:spcPct val="120000"/>
+              </a:lnSpc>
+              <a:spcBef>
+                <a:spcPts val="1000"/>
+              </a:spcBef>
+              <a:buSzPct val="125000"/>
+              <a:buFont typeface="Arial" panose="020B0604020202020204" pitchFamily="34" charset="0"/>
+              <a:buChar char="•"/>
+              <a:defRPr sz="2400" kern="1200">
+                <a:solidFill>
+                  <a:schemeClr val="tx1"/>
+                </a:solidFill>
+                <a:latin typeface="+mn-lt"/>
+                <a:ea typeface="+mn-ea"/>
+                <a:cs typeface="+mn-cs"/>
+              </a:defRPr>
+            </a:lvl1pPr>
+            <a:lvl2pPr marL="685800" indent="-228600" algn="l" defTabSz="914400" rtl="0" eaLnBrk="1" latinLnBrk="0" hangingPunct="1">
+              <a:lnSpc>
+                <a:spcPct val="120000"/>
+              </a:lnSpc>
+              <a:spcBef>
+                <a:spcPts val="500"/>
+              </a:spcBef>
+              <a:buSzPct val="125000"/>
+              <a:buFont typeface="Arial" panose="020B0604020202020204" pitchFamily="34" charset="0"/>
+              <a:buChar char="•"/>
+              <a:defRPr sz="2000" kern="1200">
+                <a:solidFill>
+                  <a:schemeClr val="tx1"/>
+                </a:solidFill>
+                <a:latin typeface="+mn-lt"/>
+                <a:ea typeface="+mn-ea"/>
+                <a:cs typeface="+mn-cs"/>
+              </a:defRPr>
+            </a:lvl2pPr>
+            <a:lvl3pPr marL="1143000" indent="-228600" algn="l" defTabSz="914400" rtl="0" eaLnBrk="1" latinLnBrk="0" hangingPunct="1">
+              <a:lnSpc>
+                <a:spcPct val="120000"/>
+              </a:lnSpc>
+              <a:spcBef>
+                <a:spcPts val="500"/>
+              </a:spcBef>
+              <a:buSzPct val="125000"/>
+              <a:buFont typeface="Arial" panose="020B0604020202020204" pitchFamily="34" charset="0"/>
+              <a:buChar char="•"/>
+              <a:defRPr sz="1800" kern="1200">
+                <a:solidFill>
+                  <a:schemeClr val="tx1"/>
+                </a:solidFill>
+                <a:latin typeface="+mn-lt"/>
+                <a:ea typeface="+mn-ea"/>
+                <a:cs typeface="+mn-cs"/>
+              </a:defRPr>
+            </a:lvl3pPr>
+            <a:lvl4pPr marL="1600200" indent="-228600" algn="l" defTabSz="914400" rtl="0" eaLnBrk="1" latinLnBrk="0" hangingPunct="1">
+              <a:lnSpc>
+                <a:spcPct val="120000"/>
+              </a:lnSpc>
+              <a:spcBef>
+                <a:spcPts val="500"/>
+              </a:spcBef>
+              <a:buSzPct val="125000"/>
+              <a:buFont typeface="Arial" panose="020B0604020202020204" pitchFamily="34" charset="0"/>
+              <a:buChar char="•"/>
+              <a:defRPr sz="1600" kern="1200">
+                <a:solidFill>
+                  <a:schemeClr val="tx1"/>
+                </a:solidFill>
+                <a:latin typeface="+mn-lt"/>
+                <a:ea typeface="+mn-ea"/>
+                <a:cs typeface="+mn-cs"/>
+              </a:defRPr>
+            </a:lvl4pPr>
+            <a:lvl5pPr marL="2057400" indent="-228600" algn="l" defTabSz="914400" rtl="0" eaLnBrk="1" latinLnBrk="0" hangingPunct="1">
+              <a:lnSpc>
+                <a:spcPct val="120000"/>
+              </a:lnSpc>
+              <a:spcBef>
+                <a:spcPts val="500"/>
+              </a:spcBef>
+              <a:buSzPct val="125000"/>
+              <a:buFont typeface="Arial" panose="020B0604020202020204" pitchFamily="34" charset="0"/>
+              <a:buChar char="•"/>
+              <a:defRPr sz="1600" kern="1200">
+                <a:solidFill>
+                  <a:schemeClr val="tx1"/>
+                </a:solidFill>
+                <a:latin typeface="+mn-lt"/>
+                <a:ea typeface="+mn-ea"/>
+                <a:cs typeface="+mn-cs"/>
+              </a:defRPr>
+            </a:lvl5pPr>
+            <a:lvl6pPr marL="2514600" indent="-228600" algn="l" defTabSz="914400" rtl="0" eaLnBrk="1" latinLnBrk="0" hangingPunct="1">
+              <a:lnSpc>
+                <a:spcPct val="120000"/>
+              </a:lnSpc>
+              <a:spcBef>
+                <a:spcPts val="500"/>
+              </a:spcBef>
+              <a:buSzPct val="125000"/>
+              <a:buFont typeface="Arial" panose="020B0604020202020204" pitchFamily="34" charset="0"/>
+              <a:buChar char="•"/>
+              <a:defRPr sz="1400" kern="1200">
+                <a:solidFill>
+                  <a:schemeClr val="tx1"/>
+                </a:solidFill>
+                <a:latin typeface="+mn-lt"/>
+                <a:ea typeface="+mn-ea"/>
+                <a:cs typeface="+mn-cs"/>
+              </a:defRPr>
+            </a:lvl6pPr>
+            <a:lvl7pPr marL="2971800" indent="-228600" algn="l" defTabSz="914400" rtl="0" eaLnBrk="1" latinLnBrk="0" hangingPunct="1">
+              <a:lnSpc>
+                <a:spcPct val="120000"/>
+              </a:lnSpc>
+              <a:spcBef>
+                <a:spcPts val="500"/>
+              </a:spcBef>
+              <a:buSzPct val="125000"/>
+              <a:buFont typeface="Arial" panose="020B0604020202020204" pitchFamily="34" charset="0"/>
+              <a:buChar char="•"/>
+              <a:defRPr sz="1400" kern="1200">
+                <a:solidFill>
+                  <a:schemeClr val="tx1"/>
+                </a:solidFill>
+                <a:latin typeface="+mn-lt"/>
+                <a:ea typeface="+mn-ea"/>
+                <a:cs typeface="+mn-cs"/>
+              </a:defRPr>
+            </a:lvl7pPr>
+            <a:lvl8pPr marL="3429000" indent="-228600" algn="l" defTabSz="914400" rtl="0" eaLnBrk="1" latinLnBrk="0" hangingPunct="1">
+              <a:lnSpc>
+                <a:spcPct val="120000"/>
+              </a:lnSpc>
+              <a:spcBef>
+                <a:spcPts val="500"/>
+              </a:spcBef>
+              <a:buSzPct val="125000"/>
+              <a:buFont typeface="Arial" panose="020B0604020202020204" pitchFamily="34" charset="0"/>
+              <a:buChar char="•"/>
+              <a:defRPr sz="1400" kern="1200">
+                <a:solidFill>
+                  <a:schemeClr val="tx1"/>
+                </a:solidFill>
+                <a:latin typeface="+mn-lt"/>
+                <a:ea typeface="+mn-ea"/>
+                <a:cs typeface="+mn-cs"/>
+              </a:defRPr>
+            </a:lvl8pPr>
+            <a:lvl9pPr marL="3886200" indent="-228600" algn="l" defTabSz="914400" rtl="0" eaLnBrk="1" latinLnBrk="0" hangingPunct="1">
+              <a:lnSpc>
+                <a:spcPct val="120000"/>
+              </a:lnSpc>
+              <a:spcBef>
+                <a:spcPts val="500"/>
+              </a:spcBef>
+              <a:buSzPct val="125000"/>
+              <a:buFont typeface="Arial" panose="020B0604020202020204" pitchFamily="34" charset="0"/>
+              <a:buChar char="•"/>
+              <a:defRPr sz="1400" kern="1200">
+                <a:solidFill>
+                  <a:schemeClr val="tx1"/>
+                </a:solidFill>
+                <a:latin typeface="+mn-lt"/>
+                <a:ea typeface="+mn-ea"/>
+                <a:cs typeface="+mn-cs"/>
+              </a:defRPr>
+            </a:lvl9pPr>
+          </a:lstStyle>
+          <a:p>
+            <a:pPr marL="0" indent="0" algn="just">
+              <a:buNone/>
+            </a:pPr>
+            <a:r>
+              <a:rPr lang="es-ES" dirty="0"/>
+              <a:t>Se ha buscado ir de estaciones de mediciones fijas a sensores IoT, ya que las estaciones están limitadas a medir únicamente las concentraciones de ciertos puntos fijos en la ciudad</a:t>
+            </a:r>
+            <a:br>
+              <a:rPr lang="es-ES" dirty="0"/>
+            </a:br>
+            <a:endParaRPr lang="es-ES" dirty="0"/>
+          </a:p>
+          <a:p>
+            <a:pPr marL="0" indent="0" algn="just">
+              <a:buFont typeface="Arial" panose="020B0604020202020204" pitchFamily="34" charset="0"/>
+              <a:buNone/>
+            </a:pPr>
+            <a:endParaRPr lang="en-US" dirty="0"/>
+          </a:p>
+        </p:txBody>
+      </p:sp>
+      <p:pic>
+        <p:nvPicPr>
+          <p:cNvPr id="1026" name="Picture 2" descr="Contaminación del aire: estas son algunas de sus causas">
+            <a:extLst>
+              <a:ext uri="{FF2B5EF4-FFF2-40B4-BE49-F238E27FC236}">
+                <a16:creationId xmlns:a16="http://schemas.microsoft.com/office/drawing/2014/main" id="{D300D097-D62D-8A4C-AB7A-DD0949838D6A}"/>
+              </a:ext>
+            </a:extLst>
+          </p:cNvPr>
+          <p:cNvPicPr>
+            <a:picLocks noChangeAspect="1" noChangeArrowheads="1"/>
+          </p:cNvPicPr>
+          <p:nvPr/>
+        </p:nvPicPr>
+        <p:blipFill>
+          <a:blip r:embed="rId2">
+            <a:extLst>
+              <a:ext uri="{28A0092B-C50C-407E-A947-70E740481C1C}">
+                <a14:useLocalDpi xmlns:a14="http://schemas.microsoft.com/office/drawing/2010/main" val="0"/>
+              </a:ext>
+            </a:extLst>
+          </a:blip>
+          <a:srcRect/>
+          <a:stretch>
+            <a:fillRect/>
+          </a:stretch>
+        </p:blipFill>
+        <p:spPr bwMode="auto">
           <a:xfrm>
-            <a:off x="1413164" y="2235200"/>
-            <a:ext cx="7379854" cy="923330"/>
+            <a:off x="8337177" y="2083717"/>
+            <a:ext cx="3470551" cy="1919146"/>
           </a:xfrm>
           <a:prstGeom prst="rect">
             <a:avLst/>
           </a:prstGeom>
           <a:noFill/>
+          <a:extLst>
+            <a:ext uri="{909E8E84-426E-40DD-AFC4-6F175D3DCCD1}">
+              <a14:hiddenFill xmlns:a14="http://schemas.microsoft.com/office/drawing/2010/main">
+                <a:solidFill>
+                  <a:srgbClr val="FFFFFF"/>
+                </a:solidFill>
+              </a14:hiddenFill>
+            </a:ext>
+          </a:extLst>
         </p:spPr>
-        <p:txBody>
-          <a:bodyPr wrap="square" rtlCol="0">
-            <a:spAutoFit/>
-          </a:bodyPr>
-          <a:lstStyle/>
-          <a:p>
-            <a:r>
-              <a:rPr lang="es-ES" dirty="0"/>
-              <a:t>* Desconocido. (2021). Sensores de calidad de aire. 18/03/2021, de </a:t>
-            </a:r>
-            <a:r>
-              <a:rPr lang="es-ES" dirty="0" err="1"/>
-              <a:t>Arrow</a:t>
-            </a:r>
-            <a:r>
-              <a:rPr lang="es-ES" dirty="0"/>
-              <a:t> Sitio web: https://www.arrow.com/es-mx/categories/sensors/air-quality-sensors</a:t>
-            </a:r>
-            <a:endParaRPr lang="en-US" dirty="0"/>
-          </a:p>
-        </p:txBody>
-      </p:sp>
+      </p:pic>
+      <p:pic>
+        <p:nvPicPr>
+          <p:cNvPr id="1028" name="Picture 4" descr="Control de la calidad del Aire - Catsensors">
+            <a:extLst>
+              <a:ext uri="{FF2B5EF4-FFF2-40B4-BE49-F238E27FC236}">
+                <a16:creationId xmlns:a16="http://schemas.microsoft.com/office/drawing/2014/main" id="{EADAA34D-9614-5542-BAAC-2CF3A8A7F2CF}"/>
+              </a:ext>
+            </a:extLst>
+          </p:cNvPr>
+          <p:cNvPicPr>
+            <a:picLocks noChangeAspect="1" noChangeArrowheads="1"/>
+          </p:cNvPicPr>
+          <p:nvPr/>
+        </p:nvPicPr>
+        <p:blipFill>
+          <a:blip r:embed="rId3">
+            <a:extLst>
+              <a:ext uri="{28A0092B-C50C-407E-A947-70E740481C1C}">
+                <a14:useLocalDpi xmlns:a14="http://schemas.microsoft.com/office/drawing/2010/main" val="0"/>
+              </a:ext>
+            </a:extLst>
+          </a:blip>
+          <a:srcRect/>
+          <a:stretch>
+            <a:fillRect/>
+          </a:stretch>
+        </p:blipFill>
+        <p:spPr bwMode="auto">
+          <a:xfrm>
+            <a:off x="1039906" y="4177033"/>
+            <a:ext cx="2412440" cy="1560842"/>
+          </a:xfrm>
+          <a:prstGeom prst="rect">
+            <a:avLst/>
+          </a:prstGeom>
+          <a:noFill/>
+          <a:extLst>
+            <a:ext uri="{909E8E84-426E-40DD-AFC4-6F175D3DCCD1}">
+              <a14:hiddenFill xmlns:a14="http://schemas.microsoft.com/office/drawing/2010/main">
+                <a:solidFill>
+                  <a:srgbClr val="FFFFFF"/>
+                </a:solidFill>
+              </a14:hiddenFill>
+            </a:ext>
+          </a:extLst>
+        </p:spPr>
+      </p:pic>
     </p:spTree>
     <p:extLst>
       <p:ext uri="{BB962C8B-B14F-4D97-AF65-F5344CB8AC3E}">
-        <p14:creationId xmlns:p14="http://schemas.microsoft.com/office/powerpoint/2010/main" val="2001969038"/>
+        <p14:creationId xmlns:p14="http://schemas.microsoft.com/office/powerpoint/2010/main" val="3779547293"/>
       </p:ext>
     </p:extLst>
   </p:cSld>
@@ -14346,7 +14975,627 @@
 </p:sld>
 </file>
 
-<file path=ppt/slides/slide5.xml><?xml version="1.0" encoding="utf-8"?>
+<file path=ppt/slides/slide6.xml><?xml version="1.0" encoding="utf-8"?>
+<p:sld xmlns:a="http://schemas.openxmlformats.org/drawingml/2006/main" xmlns:r="http://schemas.openxmlformats.org/officeDocument/2006/relationships" xmlns:p="http://schemas.openxmlformats.org/presentationml/2006/main">
+  <p:cSld>
+    <p:spTree>
+      <p:nvGrpSpPr>
+        <p:cNvPr id="1" name=""/>
+        <p:cNvGrpSpPr/>
+        <p:nvPr/>
+      </p:nvGrpSpPr>
+      <p:grpSpPr>
+        <a:xfrm>
+          <a:off x="0" y="0"/>
+          <a:ext cx="0" cy="0"/>
+          <a:chOff x="0" y="0"/>
+          <a:chExt cx="0" cy="0"/>
+        </a:xfrm>
+      </p:grpSpPr>
+      <p:sp>
+        <p:nvSpPr>
+          <p:cNvPr id="2" name="Title 1"/>
+          <p:cNvSpPr>
+            <a:spLocks noGrp="1"/>
+          </p:cNvSpPr>
+          <p:nvPr>
+            <p:ph type="title"/>
+          </p:nvPr>
+        </p:nvSpPr>
+        <p:spPr>
+          <a:xfrm>
+            <a:off x="1233776" y="119754"/>
+            <a:ext cx="9905998" cy="1478570"/>
+          </a:xfrm>
+        </p:spPr>
+        <p:txBody>
+          <a:bodyPr/>
+          <a:lstStyle/>
+          <a:p>
+            <a:r>
+              <a:rPr lang="es-ES" dirty="0"/>
+              <a:t>Relación con el covid-19</a:t>
+            </a:r>
+            <a:endParaRPr lang="en-US" dirty="0"/>
+          </a:p>
+        </p:txBody>
+      </p:sp>
+      <p:sp>
+        <p:nvSpPr>
+          <p:cNvPr id="3" name="Vertical Text Placeholder 2"/>
+          <p:cNvSpPr>
+            <a:spLocks noGrp="1"/>
+          </p:cNvSpPr>
+          <p:nvPr>
+            <p:ph type="body" orient="vert" idx="1"/>
+          </p:nvPr>
+        </p:nvSpPr>
+        <p:spPr>
+          <a:xfrm rot="16200000">
+            <a:off x="3519517" y="-591832"/>
+            <a:ext cx="1478569" cy="7307361"/>
+          </a:xfrm>
+        </p:spPr>
+        <p:txBody>
+          <a:bodyPr>
+            <a:normAutofit/>
+          </a:bodyPr>
+          <a:lstStyle/>
+          <a:p>
+            <a:pPr marL="0" indent="0" algn="just">
+              <a:buNone/>
+            </a:pPr>
+            <a:r>
+              <a:rPr lang="es-ES" dirty="0"/>
+              <a:t>El control de la cantidad del aire se ha convertido un aspecto fundamental durante la pandemia.</a:t>
+            </a:r>
+            <a:endParaRPr lang="en-US" dirty="0"/>
+          </a:p>
+        </p:txBody>
+      </p:sp>
+      <p:sp>
+        <p:nvSpPr>
+          <p:cNvPr id="6" name="Vertical Text Placeholder 2"/>
+          <p:cNvSpPr txBox="1">
+            <a:spLocks/>
+          </p:cNvSpPr>
+          <p:nvPr/>
+        </p:nvSpPr>
+        <p:spPr>
+          <a:xfrm rot="16200000">
+            <a:off x="7629351" y="801244"/>
+            <a:ext cx="2230369" cy="4521211"/>
+          </a:xfrm>
+          <a:prstGeom prst="rect">
+            <a:avLst/>
+          </a:prstGeom>
+        </p:spPr>
+        <p:txBody>
+          <a:bodyPr vert="eaVert" lIns="91440" tIns="45720" rIns="91440" bIns="45720" rtlCol="0" anchor="t">
+            <a:normAutofit/>
+          </a:bodyPr>
+          <a:lstStyle>
+            <a:lvl1pPr marL="228600" indent="-228600" algn="l" defTabSz="914400" rtl="0" eaLnBrk="1" latinLnBrk="0" hangingPunct="1">
+              <a:lnSpc>
+                <a:spcPct val="120000"/>
+              </a:lnSpc>
+              <a:spcBef>
+                <a:spcPts val="1000"/>
+              </a:spcBef>
+              <a:buSzPct val="125000"/>
+              <a:buFont typeface="Arial" panose="020B0604020202020204" pitchFamily="34" charset="0"/>
+              <a:buChar char="•"/>
+              <a:defRPr sz="2400" kern="1200">
+                <a:solidFill>
+                  <a:schemeClr val="tx1"/>
+                </a:solidFill>
+                <a:latin typeface="+mn-lt"/>
+                <a:ea typeface="+mn-ea"/>
+                <a:cs typeface="+mn-cs"/>
+              </a:defRPr>
+            </a:lvl1pPr>
+            <a:lvl2pPr marL="685800" indent="-228600" algn="l" defTabSz="914400" rtl="0" eaLnBrk="1" latinLnBrk="0" hangingPunct="1">
+              <a:lnSpc>
+                <a:spcPct val="120000"/>
+              </a:lnSpc>
+              <a:spcBef>
+                <a:spcPts val="500"/>
+              </a:spcBef>
+              <a:buSzPct val="125000"/>
+              <a:buFont typeface="Arial" panose="020B0604020202020204" pitchFamily="34" charset="0"/>
+              <a:buChar char="•"/>
+              <a:defRPr sz="2000" kern="1200">
+                <a:solidFill>
+                  <a:schemeClr val="tx1"/>
+                </a:solidFill>
+                <a:latin typeface="+mn-lt"/>
+                <a:ea typeface="+mn-ea"/>
+                <a:cs typeface="+mn-cs"/>
+              </a:defRPr>
+            </a:lvl2pPr>
+            <a:lvl3pPr marL="1143000" indent="-228600" algn="l" defTabSz="914400" rtl="0" eaLnBrk="1" latinLnBrk="0" hangingPunct="1">
+              <a:lnSpc>
+                <a:spcPct val="120000"/>
+              </a:lnSpc>
+              <a:spcBef>
+                <a:spcPts val="500"/>
+              </a:spcBef>
+              <a:buSzPct val="125000"/>
+              <a:buFont typeface="Arial" panose="020B0604020202020204" pitchFamily="34" charset="0"/>
+              <a:buChar char="•"/>
+              <a:defRPr sz="1800" kern="1200">
+                <a:solidFill>
+                  <a:schemeClr val="tx1"/>
+                </a:solidFill>
+                <a:latin typeface="+mn-lt"/>
+                <a:ea typeface="+mn-ea"/>
+                <a:cs typeface="+mn-cs"/>
+              </a:defRPr>
+            </a:lvl3pPr>
+            <a:lvl4pPr marL="1600200" indent="-228600" algn="l" defTabSz="914400" rtl="0" eaLnBrk="1" latinLnBrk="0" hangingPunct="1">
+              <a:lnSpc>
+                <a:spcPct val="120000"/>
+              </a:lnSpc>
+              <a:spcBef>
+                <a:spcPts val="500"/>
+              </a:spcBef>
+              <a:buSzPct val="125000"/>
+              <a:buFont typeface="Arial" panose="020B0604020202020204" pitchFamily="34" charset="0"/>
+              <a:buChar char="•"/>
+              <a:defRPr sz="1600" kern="1200">
+                <a:solidFill>
+                  <a:schemeClr val="tx1"/>
+                </a:solidFill>
+                <a:latin typeface="+mn-lt"/>
+                <a:ea typeface="+mn-ea"/>
+                <a:cs typeface="+mn-cs"/>
+              </a:defRPr>
+            </a:lvl4pPr>
+            <a:lvl5pPr marL="2057400" indent="-228600" algn="l" defTabSz="914400" rtl="0" eaLnBrk="1" latinLnBrk="0" hangingPunct="1">
+              <a:lnSpc>
+                <a:spcPct val="120000"/>
+              </a:lnSpc>
+              <a:spcBef>
+                <a:spcPts val="500"/>
+              </a:spcBef>
+              <a:buSzPct val="125000"/>
+              <a:buFont typeface="Arial" panose="020B0604020202020204" pitchFamily="34" charset="0"/>
+              <a:buChar char="•"/>
+              <a:defRPr sz="1600" kern="1200">
+                <a:solidFill>
+                  <a:schemeClr val="tx1"/>
+                </a:solidFill>
+                <a:latin typeface="+mn-lt"/>
+                <a:ea typeface="+mn-ea"/>
+                <a:cs typeface="+mn-cs"/>
+              </a:defRPr>
+            </a:lvl5pPr>
+            <a:lvl6pPr marL="2514600" indent="-228600" algn="l" defTabSz="914400" rtl="0" eaLnBrk="1" latinLnBrk="0" hangingPunct="1">
+              <a:lnSpc>
+                <a:spcPct val="120000"/>
+              </a:lnSpc>
+              <a:spcBef>
+                <a:spcPts val="500"/>
+              </a:spcBef>
+              <a:buSzPct val="125000"/>
+              <a:buFont typeface="Arial" panose="020B0604020202020204" pitchFamily="34" charset="0"/>
+              <a:buChar char="•"/>
+              <a:defRPr sz="1400" kern="1200">
+                <a:solidFill>
+                  <a:schemeClr val="tx1"/>
+                </a:solidFill>
+                <a:latin typeface="+mn-lt"/>
+                <a:ea typeface="+mn-ea"/>
+                <a:cs typeface="+mn-cs"/>
+              </a:defRPr>
+            </a:lvl6pPr>
+            <a:lvl7pPr marL="2971800" indent="-228600" algn="l" defTabSz="914400" rtl="0" eaLnBrk="1" latinLnBrk="0" hangingPunct="1">
+              <a:lnSpc>
+                <a:spcPct val="120000"/>
+              </a:lnSpc>
+              <a:spcBef>
+                <a:spcPts val="500"/>
+              </a:spcBef>
+              <a:buSzPct val="125000"/>
+              <a:buFont typeface="Arial" panose="020B0604020202020204" pitchFamily="34" charset="0"/>
+              <a:buChar char="•"/>
+              <a:defRPr sz="1400" kern="1200">
+                <a:solidFill>
+                  <a:schemeClr val="tx1"/>
+                </a:solidFill>
+                <a:latin typeface="+mn-lt"/>
+                <a:ea typeface="+mn-ea"/>
+                <a:cs typeface="+mn-cs"/>
+              </a:defRPr>
+            </a:lvl7pPr>
+            <a:lvl8pPr marL="3429000" indent="-228600" algn="l" defTabSz="914400" rtl="0" eaLnBrk="1" latinLnBrk="0" hangingPunct="1">
+              <a:lnSpc>
+                <a:spcPct val="120000"/>
+              </a:lnSpc>
+              <a:spcBef>
+                <a:spcPts val="500"/>
+              </a:spcBef>
+              <a:buSzPct val="125000"/>
+              <a:buFont typeface="Arial" panose="020B0604020202020204" pitchFamily="34" charset="0"/>
+              <a:buChar char="•"/>
+              <a:defRPr sz="1400" kern="1200">
+                <a:solidFill>
+                  <a:schemeClr val="tx1"/>
+                </a:solidFill>
+                <a:latin typeface="+mn-lt"/>
+                <a:ea typeface="+mn-ea"/>
+                <a:cs typeface="+mn-cs"/>
+              </a:defRPr>
+            </a:lvl8pPr>
+            <a:lvl9pPr marL="3886200" indent="-228600" algn="l" defTabSz="914400" rtl="0" eaLnBrk="1" latinLnBrk="0" hangingPunct="1">
+              <a:lnSpc>
+                <a:spcPct val="120000"/>
+              </a:lnSpc>
+              <a:spcBef>
+                <a:spcPts val="500"/>
+              </a:spcBef>
+              <a:buSzPct val="125000"/>
+              <a:buFont typeface="Arial" panose="020B0604020202020204" pitchFamily="34" charset="0"/>
+              <a:buChar char="•"/>
+              <a:defRPr sz="1400" kern="1200">
+                <a:solidFill>
+                  <a:schemeClr val="tx1"/>
+                </a:solidFill>
+                <a:latin typeface="+mn-lt"/>
+                <a:ea typeface="+mn-ea"/>
+                <a:cs typeface="+mn-cs"/>
+              </a:defRPr>
+            </a:lvl9pPr>
+          </a:lstStyle>
+          <a:p>
+            <a:pPr marL="0" indent="0">
+              <a:buNone/>
+            </a:pPr>
+            <a:r>
+              <a:rPr lang="es-ES" dirty="0"/>
+              <a:t>. </a:t>
+            </a:r>
+            <a:br>
+              <a:rPr lang="es-ES" dirty="0"/>
+            </a:br>
+            <a:endParaRPr lang="es-ES" dirty="0"/>
+          </a:p>
+          <a:p>
+            <a:pPr marL="0" indent="0">
+              <a:buFont typeface="Arial" panose="020B0604020202020204" pitchFamily="34" charset="0"/>
+              <a:buNone/>
+            </a:pPr>
+            <a:endParaRPr lang="en-US" dirty="0"/>
+          </a:p>
+        </p:txBody>
+      </p:sp>
+      <p:sp>
+        <p:nvSpPr>
+          <p:cNvPr id="9" name="Vertical Text Placeholder 2"/>
+          <p:cNvSpPr txBox="1">
+            <a:spLocks/>
+          </p:cNvSpPr>
+          <p:nvPr/>
+        </p:nvSpPr>
+        <p:spPr>
+          <a:xfrm rot="16200000">
+            <a:off x="6819827" y="2012560"/>
+            <a:ext cx="2185312" cy="7266058"/>
+          </a:xfrm>
+          <a:prstGeom prst="rect">
+            <a:avLst/>
+          </a:prstGeom>
+        </p:spPr>
+        <p:txBody>
+          <a:bodyPr vert="eaVert" lIns="91440" tIns="45720" rIns="91440" bIns="45720" rtlCol="0" anchor="t">
+            <a:normAutofit fontScale="85000" lnSpcReduction="20000"/>
+          </a:bodyPr>
+          <a:lstStyle>
+            <a:lvl1pPr marL="228600" indent="-228600" algn="l" defTabSz="914400" rtl="0" eaLnBrk="1" latinLnBrk="0" hangingPunct="1">
+              <a:lnSpc>
+                <a:spcPct val="120000"/>
+              </a:lnSpc>
+              <a:spcBef>
+                <a:spcPts val="1000"/>
+              </a:spcBef>
+              <a:buSzPct val="125000"/>
+              <a:buFont typeface="Arial" panose="020B0604020202020204" pitchFamily="34" charset="0"/>
+              <a:buChar char="•"/>
+              <a:defRPr sz="2400" kern="1200">
+                <a:solidFill>
+                  <a:schemeClr val="tx1"/>
+                </a:solidFill>
+                <a:latin typeface="+mn-lt"/>
+                <a:ea typeface="+mn-ea"/>
+                <a:cs typeface="+mn-cs"/>
+              </a:defRPr>
+            </a:lvl1pPr>
+            <a:lvl2pPr marL="685800" indent="-228600" algn="l" defTabSz="914400" rtl="0" eaLnBrk="1" latinLnBrk="0" hangingPunct="1">
+              <a:lnSpc>
+                <a:spcPct val="120000"/>
+              </a:lnSpc>
+              <a:spcBef>
+                <a:spcPts val="500"/>
+              </a:spcBef>
+              <a:buSzPct val="125000"/>
+              <a:buFont typeface="Arial" panose="020B0604020202020204" pitchFamily="34" charset="0"/>
+              <a:buChar char="•"/>
+              <a:defRPr sz="2000" kern="1200">
+                <a:solidFill>
+                  <a:schemeClr val="tx1"/>
+                </a:solidFill>
+                <a:latin typeface="+mn-lt"/>
+                <a:ea typeface="+mn-ea"/>
+                <a:cs typeface="+mn-cs"/>
+              </a:defRPr>
+            </a:lvl2pPr>
+            <a:lvl3pPr marL="1143000" indent="-228600" algn="l" defTabSz="914400" rtl="0" eaLnBrk="1" latinLnBrk="0" hangingPunct="1">
+              <a:lnSpc>
+                <a:spcPct val="120000"/>
+              </a:lnSpc>
+              <a:spcBef>
+                <a:spcPts val="500"/>
+              </a:spcBef>
+              <a:buSzPct val="125000"/>
+              <a:buFont typeface="Arial" panose="020B0604020202020204" pitchFamily="34" charset="0"/>
+              <a:buChar char="•"/>
+              <a:defRPr sz="1800" kern="1200">
+                <a:solidFill>
+                  <a:schemeClr val="tx1"/>
+                </a:solidFill>
+                <a:latin typeface="+mn-lt"/>
+                <a:ea typeface="+mn-ea"/>
+                <a:cs typeface="+mn-cs"/>
+              </a:defRPr>
+            </a:lvl3pPr>
+            <a:lvl4pPr marL="1600200" indent="-228600" algn="l" defTabSz="914400" rtl="0" eaLnBrk="1" latinLnBrk="0" hangingPunct="1">
+              <a:lnSpc>
+                <a:spcPct val="120000"/>
+              </a:lnSpc>
+              <a:spcBef>
+                <a:spcPts val="500"/>
+              </a:spcBef>
+              <a:buSzPct val="125000"/>
+              <a:buFont typeface="Arial" panose="020B0604020202020204" pitchFamily="34" charset="0"/>
+              <a:buChar char="•"/>
+              <a:defRPr sz="1600" kern="1200">
+                <a:solidFill>
+                  <a:schemeClr val="tx1"/>
+                </a:solidFill>
+                <a:latin typeface="+mn-lt"/>
+                <a:ea typeface="+mn-ea"/>
+                <a:cs typeface="+mn-cs"/>
+              </a:defRPr>
+            </a:lvl4pPr>
+            <a:lvl5pPr marL="2057400" indent="-228600" algn="l" defTabSz="914400" rtl="0" eaLnBrk="1" latinLnBrk="0" hangingPunct="1">
+              <a:lnSpc>
+                <a:spcPct val="120000"/>
+              </a:lnSpc>
+              <a:spcBef>
+                <a:spcPts val="500"/>
+              </a:spcBef>
+              <a:buSzPct val="125000"/>
+              <a:buFont typeface="Arial" panose="020B0604020202020204" pitchFamily="34" charset="0"/>
+              <a:buChar char="•"/>
+              <a:defRPr sz="1600" kern="1200">
+                <a:solidFill>
+                  <a:schemeClr val="tx1"/>
+                </a:solidFill>
+                <a:latin typeface="+mn-lt"/>
+                <a:ea typeface="+mn-ea"/>
+                <a:cs typeface="+mn-cs"/>
+              </a:defRPr>
+            </a:lvl5pPr>
+            <a:lvl6pPr marL="2514600" indent="-228600" algn="l" defTabSz="914400" rtl="0" eaLnBrk="1" latinLnBrk="0" hangingPunct="1">
+              <a:lnSpc>
+                <a:spcPct val="120000"/>
+              </a:lnSpc>
+              <a:spcBef>
+                <a:spcPts val="500"/>
+              </a:spcBef>
+              <a:buSzPct val="125000"/>
+              <a:buFont typeface="Arial" panose="020B0604020202020204" pitchFamily="34" charset="0"/>
+              <a:buChar char="•"/>
+              <a:defRPr sz="1400" kern="1200">
+                <a:solidFill>
+                  <a:schemeClr val="tx1"/>
+                </a:solidFill>
+                <a:latin typeface="+mn-lt"/>
+                <a:ea typeface="+mn-ea"/>
+                <a:cs typeface="+mn-cs"/>
+              </a:defRPr>
+            </a:lvl6pPr>
+            <a:lvl7pPr marL="2971800" indent="-228600" algn="l" defTabSz="914400" rtl="0" eaLnBrk="1" latinLnBrk="0" hangingPunct="1">
+              <a:lnSpc>
+                <a:spcPct val="120000"/>
+              </a:lnSpc>
+              <a:spcBef>
+                <a:spcPts val="500"/>
+              </a:spcBef>
+              <a:buSzPct val="125000"/>
+              <a:buFont typeface="Arial" panose="020B0604020202020204" pitchFamily="34" charset="0"/>
+              <a:buChar char="•"/>
+              <a:defRPr sz="1400" kern="1200">
+                <a:solidFill>
+                  <a:schemeClr val="tx1"/>
+                </a:solidFill>
+                <a:latin typeface="+mn-lt"/>
+                <a:ea typeface="+mn-ea"/>
+                <a:cs typeface="+mn-cs"/>
+              </a:defRPr>
+            </a:lvl7pPr>
+            <a:lvl8pPr marL="3429000" indent="-228600" algn="l" defTabSz="914400" rtl="0" eaLnBrk="1" latinLnBrk="0" hangingPunct="1">
+              <a:lnSpc>
+                <a:spcPct val="120000"/>
+              </a:lnSpc>
+              <a:spcBef>
+                <a:spcPts val="500"/>
+              </a:spcBef>
+              <a:buSzPct val="125000"/>
+              <a:buFont typeface="Arial" panose="020B0604020202020204" pitchFamily="34" charset="0"/>
+              <a:buChar char="•"/>
+              <a:defRPr sz="1400" kern="1200">
+                <a:solidFill>
+                  <a:schemeClr val="tx1"/>
+                </a:solidFill>
+                <a:latin typeface="+mn-lt"/>
+                <a:ea typeface="+mn-ea"/>
+                <a:cs typeface="+mn-cs"/>
+              </a:defRPr>
+            </a:lvl8pPr>
+            <a:lvl9pPr marL="3886200" indent="-228600" algn="l" defTabSz="914400" rtl="0" eaLnBrk="1" latinLnBrk="0" hangingPunct="1">
+              <a:lnSpc>
+                <a:spcPct val="120000"/>
+              </a:lnSpc>
+              <a:spcBef>
+                <a:spcPts val="500"/>
+              </a:spcBef>
+              <a:buSzPct val="125000"/>
+              <a:buFont typeface="Arial" panose="020B0604020202020204" pitchFamily="34" charset="0"/>
+              <a:buChar char="•"/>
+              <a:defRPr sz="1400" kern="1200">
+                <a:solidFill>
+                  <a:schemeClr val="tx1"/>
+                </a:solidFill>
+                <a:latin typeface="+mn-lt"/>
+                <a:ea typeface="+mn-ea"/>
+                <a:cs typeface="+mn-cs"/>
+              </a:defRPr>
+            </a:lvl9pPr>
+          </a:lstStyle>
+          <a:p>
+            <a:pPr lvl="0"/>
+            <a:r>
+              <a:rPr lang="es-ES" dirty="0"/>
+              <a:t>La alta propagación del COVID-19 en algunas áreas puede estar vinculada a la existencia de niveles altos de material particulado en el aire.</a:t>
+            </a:r>
+            <a:endParaRPr lang="en-US" dirty="0"/>
+          </a:p>
+          <a:p>
+            <a:pPr lvl="0"/>
+            <a:r>
+              <a:rPr lang="es-ES" dirty="0"/>
+              <a:t>Exposición crónica a contaminantes como el dióxido de nitrógeno y el material particulado se relacionan con un aumento de la mortalidad por COVID-19.</a:t>
+            </a:r>
+            <a:endParaRPr lang="en-US" dirty="0"/>
+          </a:p>
+          <a:p>
+            <a:pPr marL="0" indent="0" algn="just">
+              <a:buFont typeface="Arial" panose="020B0604020202020204" pitchFamily="34" charset="0"/>
+              <a:buNone/>
+            </a:pPr>
+            <a:endParaRPr lang="en-US" dirty="0"/>
+          </a:p>
+        </p:txBody>
+      </p:sp>
+      <p:pic>
+        <p:nvPicPr>
+          <p:cNvPr id="2050" name="Picture 2" descr="How the IoT can help Control Coronavirus| M2M Data Connect">
+            <a:extLst>
+              <a:ext uri="{FF2B5EF4-FFF2-40B4-BE49-F238E27FC236}">
+                <a16:creationId xmlns:a16="http://schemas.microsoft.com/office/drawing/2014/main" id="{4061C65F-A91B-BD42-8ABD-FE2A0F5431A8}"/>
+              </a:ext>
+            </a:extLst>
+          </p:cNvPr>
+          <p:cNvPicPr>
+            <a:picLocks noChangeAspect="1" noChangeArrowheads="1"/>
+          </p:cNvPicPr>
+          <p:nvPr/>
+        </p:nvPicPr>
+        <p:blipFill>
+          <a:blip r:embed="rId2">
+            <a:extLst>
+              <a:ext uri="{28A0092B-C50C-407E-A947-70E740481C1C}">
+                <a14:useLocalDpi xmlns:a14="http://schemas.microsoft.com/office/drawing/2010/main" val="0"/>
+              </a:ext>
+            </a:extLst>
+          </a:blip>
+          <a:srcRect/>
+          <a:stretch>
+            <a:fillRect/>
+          </a:stretch>
+        </p:blipFill>
+        <p:spPr bwMode="auto">
+          <a:xfrm>
+            <a:off x="1233776" y="4552932"/>
+            <a:ext cx="2592668" cy="1438457"/>
+          </a:xfrm>
+          <a:prstGeom prst="rect">
+            <a:avLst/>
+          </a:prstGeom>
+          <a:noFill/>
+          <a:extLst>
+            <a:ext uri="{909E8E84-426E-40DD-AFC4-6F175D3DCCD1}">
+              <a14:hiddenFill xmlns:a14="http://schemas.microsoft.com/office/drawing/2010/main">
+                <a:solidFill>
+                  <a:srgbClr val="FFFFFF"/>
+                </a:solidFill>
+              </a14:hiddenFill>
+            </a:ext>
+          </a:extLst>
+        </p:spPr>
+      </p:pic>
+      <p:pic>
+        <p:nvPicPr>
+          <p:cNvPr id="2052" name="Picture 4" descr="Mejora la calidad del aire por las cuarentenas mundiales impuestas por  coronavirus">
+            <a:extLst>
+              <a:ext uri="{FF2B5EF4-FFF2-40B4-BE49-F238E27FC236}">
+                <a16:creationId xmlns:a16="http://schemas.microsoft.com/office/drawing/2014/main" id="{6FBF319A-8B7B-EE4D-97EB-652CC0E14A34}"/>
+              </a:ext>
+            </a:extLst>
+          </p:cNvPr>
+          <p:cNvPicPr>
+            <a:picLocks noChangeAspect="1" noChangeArrowheads="1"/>
+          </p:cNvPicPr>
+          <p:nvPr/>
+        </p:nvPicPr>
+        <p:blipFill>
+          <a:blip r:embed="rId3">
+            <a:extLst>
+              <a:ext uri="{28A0092B-C50C-407E-A947-70E740481C1C}">
+                <a14:useLocalDpi xmlns:a14="http://schemas.microsoft.com/office/drawing/2010/main" val="0"/>
+              </a:ext>
+            </a:extLst>
+          </a:blip>
+          <a:srcRect/>
+          <a:stretch>
+            <a:fillRect/>
+          </a:stretch>
+        </p:blipFill>
+        <p:spPr bwMode="auto">
+          <a:xfrm>
+            <a:off x="8102597" y="1946664"/>
+            <a:ext cx="3251200" cy="2133600"/>
+          </a:xfrm>
+          <a:prstGeom prst="rect">
+            <a:avLst/>
+          </a:prstGeom>
+          <a:noFill/>
+          <a:extLst>
+            <a:ext uri="{909E8E84-426E-40DD-AFC4-6F175D3DCCD1}">
+              <a14:hiddenFill xmlns:a14="http://schemas.microsoft.com/office/drawing/2010/main">
+                <a:solidFill>
+                  <a:srgbClr val="FFFFFF"/>
+                </a:solidFill>
+              </a14:hiddenFill>
+            </a:ext>
+          </a:extLst>
+        </p:spPr>
+      </p:pic>
+    </p:spTree>
+    <p:extLst>
+      <p:ext uri="{BB962C8B-B14F-4D97-AF65-F5344CB8AC3E}">
+        <p14:creationId xmlns:p14="http://schemas.microsoft.com/office/powerpoint/2010/main" val="107089344"/>
+      </p:ext>
+    </p:extLst>
+  </p:cSld>
+  <p:clrMapOvr>
+    <a:masterClrMapping/>
+  </p:clrMapOvr>
+</p:sld>
+</file>
+
+<file path=ppt/slides/slide7.xml><?xml version="1.0" encoding="utf-8"?>
 <p:sld xmlns:a="http://schemas.openxmlformats.org/drawingml/2006/main" xmlns:r="http://schemas.openxmlformats.org/officeDocument/2006/relationships" xmlns:p="http://schemas.openxmlformats.org/presentationml/2006/main">
   <p:cSld>
     <p:spTree>
@@ -14425,15 +15674,7 @@
             </a:pPr>
             <a:r>
               <a:rPr lang="es-ES" dirty="0"/>
-              <a:t>A modo de conclusión, detectar la contaminación del aire por medio de un sensor de polvo permite tomar decisiones por el bien de una población. Previniendo enfermedades respiratorias relacionadas con la contaminación. Además de tener parámetros para tener una mejor planeación ambiental a futuro. Sin </a:t>
-            </a:r>
-            <a:r>
-              <a:rPr lang="es-ES" dirty="0" err="1"/>
-              <a:t>IoT</a:t>
-            </a:r>
-            <a:r>
-              <a:rPr lang="es-ES" dirty="0"/>
-              <a:t>, la captura, visualización y análisis de datos para la toma de decisiones sería muy lenta.</a:t>
+              <a:t>A modo de conclusión, detectar la contaminación del aire por medio de un sensor de polvo permite tomar decisiones por el bien de una población. Previniendo enfermedades respiratorias relacionadas con la contaminación. Además de tener parámetros para tener una mejor planeación ambiental a futuro. Sin IoT, la captura, visualización y análisis de datos para la toma de decisiones sería muy lenta.</a:t>
             </a:r>
           </a:p>
           <a:p>
@@ -14452,6 +15693,144 @@
     <p:extLst>
       <p:ext uri="{BB962C8B-B14F-4D97-AF65-F5344CB8AC3E}">
         <p14:creationId xmlns:p14="http://schemas.microsoft.com/office/powerpoint/2010/main" val="2897461968"/>
+      </p:ext>
+    </p:extLst>
+  </p:cSld>
+  <p:clrMapOvr>
+    <a:masterClrMapping/>
+  </p:clrMapOvr>
+</p:sld>
+</file>
+
+<file path=ppt/slides/slide8.xml><?xml version="1.0" encoding="utf-8"?>
+<p:sld xmlns:a="http://schemas.openxmlformats.org/drawingml/2006/main" xmlns:r="http://schemas.openxmlformats.org/officeDocument/2006/relationships" xmlns:p="http://schemas.openxmlformats.org/presentationml/2006/main">
+  <p:cSld>
+    <p:spTree>
+      <p:nvGrpSpPr>
+        <p:cNvPr id="1" name=""/>
+        <p:cNvGrpSpPr/>
+        <p:nvPr/>
+      </p:nvGrpSpPr>
+      <p:grpSpPr>
+        <a:xfrm>
+          <a:off x="0" y="0"/>
+          <a:ext cx="0" cy="0"/>
+          <a:chOff x="0" y="0"/>
+          <a:chExt cx="0" cy="0"/>
+        </a:xfrm>
+      </p:grpSpPr>
+      <p:sp>
+        <p:nvSpPr>
+          <p:cNvPr id="2" name="Title 1"/>
+          <p:cNvSpPr>
+            <a:spLocks noGrp="1"/>
+          </p:cNvSpPr>
+          <p:nvPr>
+            <p:ph type="title"/>
+          </p:nvPr>
+        </p:nvSpPr>
+        <p:spPr/>
+        <p:txBody>
+          <a:bodyPr/>
+          <a:lstStyle/>
+          <a:p>
+            <a:r>
+              <a:rPr lang="es-ES_tradnl"/>
+              <a:t>Referencias</a:t>
+            </a:r>
+          </a:p>
+        </p:txBody>
+      </p:sp>
+      <p:sp>
+        <p:nvSpPr>
+          <p:cNvPr id="3" name="TextBox 2"/>
+          <p:cNvSpPr txBox="1"/>
+          <p:nvPr/>
+        </p:nvSpPr>
+        <p:spPr>
+          <a:xfrm>
+            <a:off x="1277288" y="2097088"/>
+            <a:ext cx="9634247" cy="1938992"/>
+          </a:xfrm>
+          <a:prstGeom prst="rect">
+            <a:avLst/>
+          </a:prstGeom>
+          <a:noFill/>
+        </p:spPr>
+        <p:txBody>
+          <a:bodyPr wrap="square" rtlCol="0">
+            <a:spAutoFit/>
+          </a:bodyPr>
+          <a:lstStyle/>
+          <a:p>
+            <a:pPr marL="285750" indent="-285750">
+              <a:buFont typeface="Arial" panose="020B0604020202020204" pitchFamily="34" charset="0"/>
+              <a:buChar char="•"/>
+            </a:pPr>
+            <a:r>
+              <a:rPr lang="es-ES" sz="2000" dirty="0"/>
+              <a:t>Desconocido. (2021). Sensores de calidad de aire. 18/03/2021, de </a:t>
+            </a:r>
+            <a:r>
+              <a:rPr lang="es-ES" sz="2000" dirty="0" err="1"/>
+              <a:t>Arrow</a:t>
+            </a:r>
+            <a:r>
+              <a:rPr lang="es-ES" sz="2000" dirty="0"/>
+              <a:t> Sitio web: </a:t>
+            </a:r>
+            <a:r>
+              <a:rPr lang="es-ES" sz="2000" dirty="0">
+                <a:hlinkClick r:id="rId2"/>
+              </a:rPr>
+              <a:t>https://www.arrow.com/es-mx/categories/sensors/air-quality-sensors</a:t>
+            </a:r>
+            <a:r>
+              <a:rPr lang="es-ES" sz="2000" dirty="0"/>
+              <a:t> </a:t>
+            </a:r>
+          </a:p>
+          <a:p>
+            <a:pPr marL="285750" indent="-285750">
+              <a:buFont typeface="Arial" panose="020B0604020202020204" pitchFamily="34" charset="0"/>
+              <a:buChar char="•"/>
+            </a:pPr>
+            <a:endParaRPr lang="es-ES" sz="2000" dirty="0"/>
+          </a:p>
+          <a:p>
+            <a:pPr marL="285750" indent="-285750">
+              <a:buFont typeface="Arial" panose="020B0604020202020204" pitchFamily="34" charset="0"/>
+              <a:buChar char="•"/>
+            </a:pPr>
+            <a:r>
+              <a:rPr lang="es-ES" sz="2000" dirty="0"/>
+              <a:t>Arranz Ruiz, S. (2020, 6 julio). Sensores IoT para medir la calidad del aire y el COVID-19. </a:t>
+            </a:r>
+            <a:r>
+              <a:rPr lang="en-US" sz="2000" dirty="0"/>
+              <a:t>Think Big. </a:t>
+            </a:r>
+            <a:r>
+              <a:rPr lang="en-US" sz="2000" u="sng" dirty="0">
+                <a:hlinkClick r:id="rId3"/>
+              </a:rPr>
+              <a:t>https://empresas.blogthinkbig.com/sensores-iot-para-medir-calidad-aire/</a:t>
+            </a:r>
+            <a:endParaRPr lang="en-US" sz="2000" dirty="0"/>
+          </a:p>
+          <a:p>
+            <a:pPr marL="285750" indent="-285750">
+              <a:buFont typeface="Arial" panose="020B0604020202020204" pitchFamily="34" charset="0"/>
+              <a:buChar char="•"/>
+            </a:pPr>
+            <a:endParaRPr lang="en-US" sz="2000" dirty="0"/>
+          </a:p>
+        </p:txBody>
+      </p:sp>
+    </p:spTree>
+    <p:extLst>
+      <p:ext uri="{BB962C8B-B14F-4D97-AF65-F5344CB8AC3E}">
+        <p14:creationId xmlns:p14="http://schemas.microsoft.com/office/powerpoint/2010/main" val="2001969038"/>
       </p:ext>
     </p:extLst>
   </p:cSld>

</xml_diff>

<commit_message>
Agregué mi parte al powerpoint
</commit_message>
<xml_diff>
--- a/Proyecto Final CS.pptx
+++ b/Proyecto Final CS.pptx
@@ -184,7 +184,7 @@
           <a:noFill/>
           <a:extLst>
             <a:ext uri="{909E8E84-426E-40dd-AFC4-6F175D3DCCD1}">
-              <a14:hiddenFill xmlns="" xmlns:a14="http://schemas.microsoft.com/office/drawing/2010/main">
+              <a14:hiddenFill xmlns:a14="http://schemas.microsoft.com/office/drawing/2010/main" xmlns="">
                 <a:solidFill>
                   <a:srgbClr val="FFFFFF"/>
                 </a:solidFill>
@@ -243,7 +243,7 @@
             </a:ln>
             <a:extLst>
               <a:ext uri="{91240B29-F687-4f45-9708-019B960494DF}">
-                <a14:hiddenLine xmlns="" xmlns:a14="http://schemas.microsoft.com/office/drawing/2010/main" w="9525">
+                <a14:hiddenLine xmlns:a14="http://schemas.microsoft.com/office/drawing/2010/main" xmlns="" w="9525">
                   <a:solidFill>
                     <a:srgbClr val="000000"/>
                   </a:solidFill>
@@ -333,7 +333,7 @@
             </a:ln>
             <a:extLst>
               <a:ext uri="{91240B29-F687-4f45-9708-019B960494DF}">
-                <a14:hiddenLine xmlns="" xmlns:a14="http://schemas.microsoft.com/office/drawing/2010/main" w="9525">
+                <a14:hiddenLine xmlns:a14="http://schemas.microsoft.com/office/drawing/2010/main" xmlns="" w="9525">
                   <a:solidFill>
                     <a:srgbClr val="000000"/>
                   </a:solidFill>
@@ -423,7 +423,7 @@
             </a:ln>
             <a:extLst>
               <a:ext uri="{91240B29-F687-4f45-9708-019B960494DF}">
-                <a14:hiddenLine xmlns="" xmlns:a14="http://schemas.microsoft.com/office/drawing/2010/main" w="9525">
+                <a14:hiddenLine xmlns:a14="http://schemas.microsoft.com/office/drawing/2010/main" xmlns="" w="9525">
                   <a:solidFill>
                     <a:srgbClr val="000000"/>
                   </a:solidFill>
@@ -457,7 +457,7 @@
             </a:ln>
             <a:extLst>
               <a:ext uri="{91240B29-F687-4f45-9708-019B960494DF}">
-                <a14:hiddenLine xmlns="" xmlns:a14="http://schemas.microsoft.com/office/drawing/2010/main" w="9525">
+                <a14:hiddenLine xmlns:a14="http://schemas.microsoft.com/office/drawing/2010/main" xmlns="" w="9525">
                   <a:solidFill>
                     <a:srgbClr val="000000"/>
                   </a:solidFill>
@@ -547,7 +547,7 @@
             </a:ln>
             <a:extLst>
               <a:ext uri="{91240B29-F687-4f45-9708-019B960494DF}">
-                <a14:hiddenLine xmlns="" xmlns:a14="http://schemas.microsoft.com/office/drawing/2010/main" w="9525">
+                <a14:hiddenLine xmlns:a14="http://schemas.microsoft.com/office/drawing/2010/main" xmlns="" w="9525">
                   <a:solidFill>
                     <a:srgbClr val="000000"/>
                   </a:solidFill>
@@ -609,7 +609,7 @@
             </a:ln>
             <a:extLst>
               <a:ext uri="{91240B29-F687-4f45-9708-019B960494DF}">
-                <a14:hiddenLine xmlns="" xmlns:a14="http://schemas.microsoft.com/office/drawing/2010/main" w="9525">
+                <a14:hiddenLine xmlns:a14="http://schemas.microsoft.com/office/drawing/2010/main" xmlns="" w="9525">
                   <a:solidFill>
                     <a:srgbClr val="000000"/>
                   </a:solidFill>
@@ -671,7 +671,7 @@
             </a:ln>
             <a:extLst>
               <a:ext uri="{91240B29-F687-4f45-9708-019B960494DF}">
-                <a14:hiddenLine xmlns="" xmlns:a14="http://schemas.microsoft.com/office/drawing/2010/main" w="9525">
+                <a14:hiddenLine xmlns:a14="http://schemas.microsoft.com/office/drawing/2010/main" xmlns="" w="9525">
                   <a:solidFill>
                     <a:srgbClr val="000000"/>
                   </a:solidFill>
@@ -761,7 +761,7 @@
             </a:ln>
             <a:extLst>
               <a:ext uri="{91240B29-F687-4f45-9708-019B960494DF}">
-                <a14:hiddenLine xmlns="" xmlns:a14="http://schemas.microsoft.com/office/drawing/2010/main" w="9525">
+                <a14:hiddenLine xmlns:a14="http://schemas.microsoft.com/office/drawing/2010/main" xmlns="" w="9525">
                   <a:solidFill>
                     <a:srgbClr val="000000"/>
                   </a:solidFill>
@@ -823,7 +823,7 @@
             </a:ln>
             <a:extLst>
               <a:ext uri="{91240B29-F687-4f45-9708-019B960494DF}">
-                <a14:hiddenLine xmlns="" xmlns:a14="http://schemas.microsoft.com/office/drawing/2010/main" w="9525">
+                <a14:hiddenLine xmlns:a14="http://schemas.microsoft.com/office/drawing/2010/main" xmlns="" w="9525">
                   <a:solidFill>
                     <a:srgbClr val="000000"/>
                   </a:solidFill>
@@ -885,7 +885,7 @@
             </a:ln>
             <a:extLst>
               <a:ext uri="{91240B29-F687-4f45-9708-019B960494DF}">
-                <a14:hiddenLine xmlns="" xmlns:a14="http://schemas.microsoft.com/office/drawing/2010/main" w="9525">
+                <a14:hiddenLine xmlns:a14="http://schemas.microsoft.com/office/drawing/2010/main" xmlns="" w="9525">
                   <a:solidFill>
                     <a:srgbClr val="000000"/>
                   </a:solidFill>
@@ -975,7 +975,7 @@
             </a:ln>
             <a:extLst>
               <a:ext uri="{91240B29-F687-4f45-9708-019B960494DF}">
-                <a14:hiddenLine xmlns="" xmlns:a14="http://schemas.microsoft.com/office/drawing/2010/main" w="9525">
+                <a14:hiddenLine xmlns:a14="http://schemas.microsoft.com/office/drawing/2010/main" xmlns="" w="9525">
                   <a:solidFill>
                     <a:srgbClr val="000000"/>
                   </a:solidFill>
@@ -1065,7 +1065,7 @@
             </a:ln>
             <a:extLst>
               <a:ext uri="{91240B29-F687-4f45-9708-019B960494DF}">
-                <a14:hiddenLine xmlns="" xmlns:a14="http://schemas.microsoft.com/office/drawing/2010/main" w="9525">
+                <a14:hiddenLine xmlns:a14="http://schemas.microsoft.com/office/drawing/2010/main" xmlns="" w="9525">
                   <a:solidFill>
                     <a:srgbClr val="000000"/>
                   </a:solidFill>
@@ -1127,7 +1127,7 @@
             </a:ln>
             <a:extLst>
               <a:ext uri="{91240B29-F687-4f45-9708-019B960494DF}">
-                <a14:hiddenLine xmlns="" xmlns:a14="http://schemas.microsoft.com/office/drawing/2010/main" w="9525">
+                <a14:hiddenLine xmlns:a14="http://schemas.microsoft.com/office/drawing/2010/main" xmlns="" w="9525">
                   <a:solidFill>
                     <a:srgbClr val="000000"/>
                   </a:solidFill>
@@ -1237,7 +1237,7 @@
             </a:ln>
             <a:extLst>
               <a:ext uri="{91240B29-F687-4f45-9708-019B960494DF}">
-                <a14:hiddenLine xmlns="" xmlns:a14="http://schemas.microsoft.com/office/drawing/2010/main" w="9525">
+                <a14:hiddenLine xmlns:a14="http://schemas.microsoft.com/office/drawing/2010/main" xmlns="" w="9525">
                   <a:solidFill>
                     <a:srgbClr val="000000"/>
                   </a:solidFill>
@@ -1299,7 +1299,7 @@
             </a:ln>
             <a:extLst>
               <a:ext uri="{91240B29-F687-4f45-9708-019B960494DF}">
-                <a14:hiddenLine xmlns="" xmlns:a14="http://schemas.microsoft.com/office/drawing/2010/main" w="9525">
+                <a14:hiddenLine xmlns:a14="http://schemas.microsoft.com/office/drawing/2010/main" xmlns="" w="9525">
                   <a:solidFill>
                     <a:srgbClr val="000000"/>
                   </a:solidFill>
@@ -1389,7 +1389,7 @@
             </a:ln>
             <a:extLst>
               <a:ext uri="{91240B29-F687-4f45-9708-019B960494DF}">
-                <a14:hiddenLine xmlns="" xmlns:a14="http://schemas.microsoft.com/office/drawing/2010/main" w="9525">
+                <a14:hiddenLine xmlns:a14="http://schemas.microsoft.com/office/drawing/2010/main" xmlns="" w="9525">
                   <a:solidFill>
                     <a:srgbClr val="000000"/>
                   </a:solidFill>
@@ -1479,7 +1479,7 @@
             </a:ln>
             <a:extLst>
               <a:ext uri="{91240B29-F687-4f45-9708-019B960494DF}">
-                <a14:hiddenLine xmlns="" xmlns:a14="http://schemas.microsoft.com/office/drawing/2010/main" w="9525">
+                <a14:hiddenLine xmlns:a14="http://schemas.microsoft.com/office/drawing/2010/main" xmlns="" w="9525">
                   <a:solidFill>
                     <a:srgbClr val="000000"/>
                   </a:solidFill>
@@ -1541,7 +1541,7 @@
             </a:ln>
             <a:extLst>
               <a:ext uri="{91240B29-F687-4f45-9708-019B960494DF}">
-                <a14:hiddenLine xmlns="" xmlns:a14="http://schemas.microsoft.com/office/drawing/2010/main" w="9525">
+                <a14:hiddenLine xmlns:a14="http://schemas.microsoft.com/office/drawing/2010/main" xmlns="" w="9525">
                   <a:solidFill>
                     <a:srgbClr val="000000"/>
                   </a:solidFill>
@@ -1631,7 +1631,7 @@
             </a:ln>
             <a:extLst>
               <a:ext uri="{91240B29-F687-4f45-9708-019B960494DF}">
-                <a14:hiddenLine xmlns="" xmlns:a14="http://schemas.microsoft.com/office/drawing/2010/main" w="9525">
+                <a14:hiddenLine xmlns:a14="http://schemas.microsoft.com/office/drawing/2010/main" xmlns="" w="9525">
                   <a:solidFill>
                     <a:srgbClr val="000000"/>
                   </a:solidFill>
@@ -1721,7 +1721,7 @@
             </a:ln>
             <a:extLst>
               <a:ext uri="{91240B29-F687-4f45-9708-019B960494DF}">
-                <a14:hiddenLine xmlns="" xmlns:a14="http://schemas.microsoft.com/office/drawing/2010/main" w="9525">
+                <a14:hiddenLine xmlns:a14="http://schemas.microsoft.com/office/drawing/2010/main" xmlns="" w="9525">
                   <a:solidFill>
                     <a:srgbClr val="000000"/>
                   </a:solidFill>
@@ -1777,7 +1777,7 @@
             </a:ln>
             <a:extLst>
               <a:ext uri="{91240B29-F687-4f45-9708-019B960494DF}">
-                <a14:hiddenLine xmlns="" xmlns:a14="http://schemas.microsoft.com/office/drawing/2010/main" w="9525">
+                <a14:hiddenLine xmlns:a14="http://schemas.microsoft.com/office/drawing/2010/main" xmlns="" w="9525">
                   <a:solidFill>
                     <a:srgbClr val="000000"/>
                   </a:solidFill>
@@ -1867,7 +1867,7 @@
             </a:ln>
             <a:extLst>
               <a:ext uri="{91240B29-F687-4f45-9708-019B960494DF}">
-                <a14:hiddenLine xmlns="" xmlns:a14="http://schemas.microsoft.com/office/drawing/2010/main" w="9525">
+                <a14:hiddenLine xmlns:a14="http://schemas.microsoft.com/office/drawing/2010/main" xmlns="" w="9525">
                   <a:solidFill>
                     <a:srgbClr val="000000"/>
                   </a:solidFill>
@@ -1923,7 +1923,7 @@
             </a:ln>
             <a:extLst>
               <a:ext uri="{91240B29-F687-4f45-9708-019B960494DF}">
-                <a14:hiddenLine xmlns="" xmlns:a14="http://schemas.microsoft.com/office/drawing/2010/main" w="9525">
+                <a14:hiddenLine xmlns:a14="http://schemas.microsoft.com/office/drawing/2010/main" xmlns="" w="9525">
                   <a:solidFill>
                     <a:srgbClr val="000000"/>
                   </a:solidFill>
@@ -2013,7 +2013,7 @@
             </a:ln>
             <a:extLst>
               <a:ext uri="{91240B29-F687-4f45-9708-019B960494DF}">
-                <a14:hiddenLine xmlns="" xmlns:a14="http://schemas.microsoft.com/office/drawing/2010/main" w="9525">
+                <a14:hiddenLine xmlns:a14="http://schemas.microsoft.com/office/drawing/2010/main" xmlns="" w="9525">
                   <a:solidFill>
                     <a:srgbClr val="000000"/>
                   </a:solidFill>
@@ -2081,7 +2081,7 @@
             </a:ln>
             <a:extLst>
               <a:ext uri="{91240B29-F687-4f45-9708-019B960494DF}">
-                <a14:hiddenLine xmlns="" xmlns:a14="http://schemas.microsoft.com/office/drawing/2010/main" w="9525">
+                <a14:hiddenLine xmlns:a14="http://schemas.microsoft.com/office/drawing/2010/main" xmlns="" w="9525">
                   <a:solidFill>
                     <a:srgbClr val="000000"/>
                   </a:solidFill>
@@ -2171,7 +2171,7 @@
             </a:ln>
             <a:extLst>
               <a:ext uri="{91240B29-F687-4f45-9708-019B960494DF}">
-                <a14:hiddenLine xmlns="" xmlns:a14="http://schemas.microsoft.com/office/drawing/2010/main" w="9525">
+                <a14:hiddenLine xmlns:a14="http://schemas.microsoft.com/office/drawing/2010/main" xmlns="" w="9525">
                   <a:solidFill>
                     <a:srgbClr val="000000"/>
                   </a:solidFill>
@@ -2239,7 +2239,7 @@
             </a:ln>
             <a:extLst>
               <a:ext uri="{91240B29-F687-4f45-9708-019B960494DF}">
-                <a14:hiddenLine xmlns="" xmlns:a14="http://schemas.microsoft.com/office/drawing/2010/main" w="9525">
+                <a14:hiddenLine xmlns:a14="http://schemas.microsoft.com/office/drawing/2010/main" xmlns="" w="9525">
                   <a:solidFill>
                     <a:srgbClr val="000000"/>
                   </a:solidFill>
@@ -2329,7 +2329,7 @@
             </a:ln>
             <a:extLst>
               <a:ext uri="{91240B29-F687-4f45-9708-019B960494DF}">
-                <a14:hiddenLine xmlns="" xmlns:a14="http://schemas.microsoft.com/office/drawing/2010/main" w="9525">
+                <a14:hiddenLine xmlns:a14="http://schemas.microsoft.com/office/drawing/2010/main" xmlns="" w="9525">
                   <a:solidFill>
                     <a:srgbClr val="000000"/>
                   </a:solidFill>
@@ -2363,7 +2363,7 @@
             </a:ln>
             <a:extLst>
               <a:ext uri="{91240B29-F687-4f45-9708-019B960494DF}">
-                <a14:hiddenLine xmlns="" xmlns:a14="http://schemas.microsoft.com/office/drawing/2010/main" w="9525">
+                <a14:hiddenLine xmlns:a14="http://schemas.microsoft.com/office/drawing/2010/main" xmlns="" w="9525">
                   <a:solidFill>
                     <a:srgbClr val="000000"/>
                   </a:solidFill>
@@ -2453,7 +2453,7 @@
             </a:ln>
             <a:extLst>
               <a:ext uri="{91240B29-F687-4f45-9708-019B960494DF}">
-                <a14:hiddenLine xmlns="" xmlns:a14="http://schemas.microsoft.com/office/drawing/2010/main" w="9525">
+                <a14:hiddenLine xmlns:a14="http://schemas.microsoft.com/office/drawing/2010/main" xmlns="" w="9525">
                   <a:solidFill>
                     <a:srgbClr val="000000"/>
                   </a:solidFill>
@@ -2515,7 +2515,7 @@
             </a:ln>
             <a:extLst>
               <a:ext uri="{91240B29-F687-4f45-9708-019B960494DF}">
-                <a14:hiddenLine xmlns="" xmlns:a14="http://schemas.microsoft.com/office/drawing/2010/main" w="9525">
+                <a14:hiddenLine xmlns:a14="http://schemas.microsoft.com/office/drawing/2010/main" xmlns="" w="9525">
                   <a:solidFill>
                     <a:srgbClr val="000000"/>
                   </a:solidFill>
@@ -2577,7 +2577,7 @@
             </a:ln>
             <a:extLst>
               <a:ext uri="{91240B29-F687-4f45-9708-019B960494DF}">
-                <a14:hiddenLine xmlns="" xmlns:a14="http://schemas.microsoft.com/office/drawing/2010/main" w="9525">
+                <a14:hiddenLine xmlns:a14="http://schemas.microsoft.com/office/drawing/2010/main" xmlns="" w="9525">
                   <a:solidFill>
                     <a:srgbClr val="000000"/>
                   </a:solidFill>
@@ -2667,7 +2667,7 @@
             </a:ln>
             <a:extLst>
               <a:ext uri="{91240B29-F687-4f45-9708-019B960494DF}">
-                <a14:hiddenLine xmlns="" xmlns:a14="http://schemas.microsoft.com/office/drawing/2010/main" w="9525">
+                <a14:hiddenLine xmlns:a14="http://schemas.microsoft.com/office/drawing/2010/main" xmlns="" w="9525">
                   <a:solidFill>
                     <a:srgbClr val="000000"/>
                   </a:solidFill>
@@ -2735,7 +2735,7 @@
             </a:ln>
             <a:extLst>
               <a:ext uri="{91240B29-F687-4f45-9708-019B960494DF}">
-                <a14:hiddenLine xmlns="" xmlns:a14="http://schemas.microsoft.com/office/drawing/2010/main" w="9525">
+                <a14:hiddenLine xmlns:a14="http://schemas.microsoft.com/office/drawing/2010/main" xmlns="" w="9525">
                   <a:solidFill>
                     <a:srgbClr val="000000"/>
                   </a:solidFill>
@@ -2797,7 +2797,7 @@
             </a:ln>
             <a:extLst>
               <a:ext uri="{91240B29-F687-4f45-9708-019B960494DF}">
-                <a14:hiddenLine xmlns="" xmlns:a14="http://schemas.microsoft.com/office/drawing/2010/main" w="9525">
+                <a14:hiddenLine xmlns:a14="http://schemas.microsoft.com/office/drawing/2010/main" xmlns="" w="9525">
                   <a:solidFill>
                     <a:srgbClr val="000000"/>
                   </a:solidFill>
@@ -2887,7 +2887,7 @@
             </a:ln>
             <a:extLst>
               <a:ext uri="{91240B29-F687-4f45-9708-019B960494DF}">
-                <a14:hiddenLine xmlns="" xmlns:a14="http://schemas.microsoft.com/office/drawing/2010/main" w="9525">
+                <a14:hiddenLine xmlns:a14="http://schemas.microsoft.com/office/drawing/2010/main" xmlns="" w="9525">
                   <a:solidFill>
                     <a:srgbClr val="000000"/>
                   </a:solidFill>
@@ -2949,7 +2949,7 @@
             </a:ln>
             <a:extLst>
               <a:ext uri="{91240B29-F687-4f45-9708-019B960494DF}">
-                <a14:hiddenLine xmlns="" xmlns:a14="http://schemas.microsoft.com/office/drawing/2010/main" w="9525">
+                <a14:hiddenLine xmlns:a14="http://schemas.microsoft.com/office/drawing/2010/main" xmlns="" w="9525">
                   <a:solidFill>
                     <a:srgbClr val="000000"/>
                   </a:solidFill>
@@ -3039,7 +3039,7 @@
             </a:ln>
             <a:extLst>
               <a:ext uri="{91240B29-F687-4f45-9708-019B960494DF}">
-                <a14:hiddenLine xmlns="" xmlns:a14="http://schemas.microsoft.com/office/drawing/2010/main" w="9525">
+                <a14:hiddenLine xmlns:a14="http://schemas.microsoft.com/office/drawing/2010/main" xmlns="" w="9525">
                   <a:solidFill>
                     <a:srgbClr val="000000"/>
                   </a:solidFill>
@@ -3101,7 +3101,7 @@
             </a:ln>
             <a:extLst>
               <a:ext uri="{91240B29-F687-4f45-9708-019B960494DF}">
-                <a14:hiddenLine xmlns="" xmlns:a14="http://schemas.microsoft.com/office/drawing/2010/main" w="9525">
+                <a14:hiddenLine xmlns:a14="http://schemas.microsoft.com/office/drawing/2010/main" xmlns="" w="9525">
                   <a:solidFill>
                     <a:srgbClr val="000000"/>
                   </a:solidFill>
@@ -3191,7 +3191,7 @@
             </a:ln>
             <a:extLst>
               <a:ext uri="{91240B29-F687-4f45-9708-019B960494DF}">
-                <a14:hiddenLine xmlns="" xmlns:a14="http://schemas.microsoft.com/office/drawing/2010/main" w="9525">
+                <a14:hiddenLine xmlns:a14="http://schemas.microsoft.com/office/drawing/2010/main" xmlns="" w="9525">
                   <a:solidFill>
                     <a:srgbClr val="000000"/>
                   </a:solidFill>
@@ -3225,7 +3225,7 @@
             </a:ln>
             <a:extLst>
               <a:ext uri="{91240B29-F687-4f45-9708-019B960494DF}">
-                <a14:hiddenLine xmlns="" xmlns:a14="http://schemas.microsoft.com/office/drawing/2010/main" w="9525">
+                <a14:hiddenLine xmlns:a14="http://schemas.microsoft.com/office/drawing/2010/main" xmlns="" w="9525">
                   <a:solidFill>
                     <a:srgbClr val="000000"/>
                   </a:solidFill>
@@ -3290,7 +3290,7 @@
             </a:ln>
             <a:extLst>
               <a:ext uri="{91240B29-F687-4f45-9708-019B960494DF}">
-                <a14:hiddenLine xmlns="" xmlns:a14="http://schemas.microsoft.com/office/drawing/2010/main" w="9525">
+                <a14:hiddenLine xmlns:a14="http://schemas.microsoft.com/office/drawing/2010/main" xmlns="" w="9525">
                   <a:solidFill>
                     <a:srgbClr val="000000"/>
                   </a:solidFill>
@@ -3380,7 +3380,7 @@
             </a:ln>
             <a:extLst>
               <a:ext uri="{91240B29-F687-4f45-9708-019B960494DF}">
-                <a14:hiddenLine xmlns="" xmlns:a14="http://schemas.microsoft.com/office/drawing/2010/main" w="9525">
+                <a14:hiddenLine xmlns:a14="http://schemas.microsoft.com/office/drawing/2010/main" xmlns="" w="9525">
                   <a:solidFill>
                     <a:srgbClr val="000000"/>
                   </a:solidFill>
@@ -3442,7 +3442,7 @@
             </a:ln>
             <a:extLst>
               <a:ext uri="{91240B29-F687-4f45-9708-019B960494DF}">
-                <a14:hiddenLine xmlns="" xmlns:a14="http://schemas.microsoft.com/office/drawing/2010/main" w="9525">
+                <a14:hiddenLine xmlns:a14="http://schemas.microsoft.com/office/drawing/2010/main" xmlns="" w="9525">
                   <a:solidFill>
                     <a:srgbClr val="000000"/>
                   </a:solidFill>
@@ -3532,7 +3532,7 @@
             </a:ln>
             <a:extLst>
               <a:ext uri="{91240B29-F687-4f45-9708-019B960494DF}">
-                <a14:hiddenLine xmlns="" xmlns:a14="http://schemas.microsoft.com/office/drawing/2010/main" w="9525">
+                <a14:hiddenLine xmlns:a14="http://schemas.microsoft.com/office/drawing/2010/main" xmlns="" w="9525">
                   <a:solidFill>
                     <a:srgbClr val="000000"/>
                   </a:solidFill>
@@ -3622,7 +3622,7 @@
             </a:ln>
             <a:extLst>
               <a:ext uri="{91240B29-F687-4f45-9708-019B960494DF}">
-                <a14:hiddenLine xmlns="" xmlns:a14="http://schemas.microsoft.com/office/drawing/2010/main" w="9525">
+                <a14:hiddenLine xmlns:a14="http://schemas.microsoft.com/office/drawing/2010/main" xmlns="" w="9525">
                   <a:solidFill>
                     <a:srgbClr val="000000"/>
                   </a:solidFill>
@@ -3687,7 +3687,7 @@
             </a:ln>
             <a:extLst>
               <a:ext uri="{91240B29-F687-4f45-9708-019B960494DF}">
-                <a14:hiddenLine xmlns="" xmlns:a14="http://schemas.microsoft.com/office/drawing/2010/main" w="9525">
+                <a14:hiddenLine xmlns:a14="http://schemas.microsoft.com/office/drawing/2010/main" xmlns="" w="9525">
                   <a:solidFill>
                     <a:srgbClr val="000000"/>
                   </a:solidFill>
@@ -3749,7 +3749,7 @@
             </a:ln>
             <a:extLst>
               <a:ext uri="{91240B29-F687-4f45-9708-019B960494DF}">
-                <a14:hiddenLine xmlns="" xmlns:a14="http://schemas.microsoft.com/office/drawing/2010/main" w="9525">
+                <a14:hiddenLine xmlns:a14="http://schemas.microsoft.com/office/drawing/2010/main" xmlns="" w="9525">
                   <a:solidFill>
                     <a:srgbClr val="000000"/>
                   </a:solidFill>
@@ -3839,7 +3839,7 @@
             </a:ln>
             <a:extLst>
               <a:ext uri="{91240B29-F687-4f45-9708-019B960494DF}">
-                <a14:hiddenLine xmlns="" xmlns:a14="http://schemas.microsoft.com/office/drawing/2010/main" w="9525">
+                <a14:hiddenLine xmlns:a14="http://schemas.microsoft.com/office/drawing/2010/main" xmlns="" w="9525">
                   <a:solidFill>
                     <a:srgbClr val="000000"/>
                   </a:solidFill>
@@ -3929,7 +3929,7 @@
             </a:ln>
             <a:extLst>
               <a:ext uri="{91240B29-F687-4f45-9708-019B960494DF}">
-                <a14:hiddenLine xmlns="" xmlns:a14="http://schemas.microsoft.com/office/drawing/2010/main" w="9525">
+                <a14:hiddenLine xmlns:a14="http://schemas.microsoft.com/office/drawing/2010/main" xmlns="" w="9525">
                   <a:solidFill>
                     <a:srgbClr val="000000"/>
                   </a:solidFill>
@@ -3991,7 +3991,7 @@
             </a:ln>
             <a:extLst>
               <a:ext uri="{91240B29-F687-4f45-9708-019B960494DF}">
-                <a14:hiddenLine xmlns="" xmlns:a14="http://schemas.microsoft.com/office/drawing/2010/main" w="9525">
+                <a14:hiddenLine xmlns:a14="http://schemas.microsoft.com/office/drawing/2010/main" xmlns="" w="9525">
                   <a:solidFill>
                     <a:srgbClr val="000000"/>
                   </a:solidFill>
@@ -4111,7 +4111,7 @@
             </a:ln>
             <a:extLst>
               <a:ext uri="{91240B29-F687-4f45-9708-019B960494DF}">
-                <a14:hiddenLine xmlns="" xmlns:a14="http://schemas.microsoft.com/office/drawing/2010/main" w="9525">
+                <a14:hiddenLine xmlns:a14="http://schemas.microsoft.com/office/drawing/2010/main" xmlns="" w="9525">
                   <a:solidFill>
                     <a:srgbClr val="000000"/>
                   </a:solidFill>
@@ -4179,7 +4179,7 @@
             </a:ln>
             <a:extLst>
               <a:ext uri="{91240B29-F687-4f45-9708-019B960494DF}">
-                <a14:hiddenLine xmlns="" xmlns:a14="http://schemas.microsoft.com/office/drawing/2010/main" w="9525">
+                <a14:hiddenLine xmlns:a14="http://schemas.microsoft.com/office/drawing/2010/main" xmlns="" w="9525">
                   <a:solidFill>
                     <a:srgbClr val="000000"/>
                   </a:solidFill>
@@ -4269,7 +4269,7 @@
             </a:ln>
             <a:extLst>
               <a:ext uri="{91240B29-F687-4f45-9708-019B960494DF}">
-                <a14:hiddenLine xmlns="" xmlns:a14="http://schemas.microsoft.com/office/drawing/2010/main" w="9525">
+                <a14:hiddenLine xmlns:a14="http://schemas.microsoft.com/office/drawing/2010/main" xmlns="" w="9525">
                   <a:solidFill>
                     <a:srgbClr val="000000"/>
                   </a:solidFill>
@@ -9591,7 +9591,7 @@
           <a:noFill/>
           <a:extLst>
             <a:ext uri="{909E8E84-426E-40dd-AFC4-6F175D3DCCD1}">
-              <a14:hiddenFill xmlns="" xmlns:a14="http://schemas.microsoft.com/office/drawing/2010/main">
+              <a14:hiddenFill xmlns:a14="http://schemas.microsoft.com/office/drawing/2010/main" xmlns="">
                 <a:solidFill>
                   <a:srgbClr val="FFFFFF"/>
                 </a:solidFill>
@@ -9665,7 +9665,7 @@
               </a:ln>
               <a:extLst>
                 <a:ext uri="{91240B29-F687-4f45-9708-019B960494DF}">
-                  <a14:hiddenLine xmlns="" xmlns:a14="http://schemas.microsoft.com/office/drawing/2010/main" w="9525">
+                  <a14:hiddenLine xmlns:a14="http://schemas.microsoft.com/office/drawing/2010/main" xmlns="" w="9525">
                     <a:solidFill>
                       <a:srgbClr val="000000"/>
                     </a:solidFill>
@@ -9755,7 +9755,7 @@
               </a:ln>
               <a:extLst>
                 <a:ext uri="{91240B29-F687-4f45-9708-019B960494DF}">
-                  <a14:hiddenLine xmlns="" xmlns:a14="http://schemas.microsoft.com/office/drawing/2010/main" w="9525">
+                  <a14:hiddenLine xmlns:a14="http://schemas.microsoft.com/office/drawing/2010/main" xmlns="" w="9525">
                     <a:solidFill>
                       <a:srgbClr val="000000"/>
                     </a:solidFill>
@@ -9845,7 +9845,7 @@
               </a:ln>
               <a:extLst>
                 <a:ext uri="{91240B29-F687-4f45-9708-019B960494DF}">
-                  <a14:hiddenLine xmlns="" xmlns:a14="http://schemas.microsoft.com/office/drawing/2010/main" w="9525">
+                  <a14:hiddenLine xmlns:a14="http://schemas.microsoft.com/office/drawing/2010/main" xmlns="" w="9525">
                     <a:solidFill>
                       <a:srgbClr val="000000"/>
                     </a:solidFill>
@@ -9907,7 +9907,7 @@
               </a:ln>
               <a:extLst>
                 <a:ext uri="{91240B29-F687-4f45-9708-019B960494DF}">
-                  <a14:hiddenLine xmlns="" xmlns:a14="http://schemas.microsoft.com/office/drawing/2010/main" w="9525">
+                  <a14:hiddenLine xmlns:a14="http://schemas.microsoft.com/office/drawing/2010/main" xmlns="" w="9525">
                     <a:solidFill>
                       <a:srgbClr val="000000"/>
                     </a:solidFill>
@@ -9997,7 +9997,7 @@
               </a:ln>
               <a:extLst>
                 <a:ext uri="{91240B29-F687-4f45-9708-019B960494DF}">
-                  <a14:hiddenLine xmlns="" xmlns:a14="http://schemas.microsoft.com/office/drawing/2010/main" w="9525">
+                  <a14:hiddenLine xmlns:a14="http://schemas.microsoft.com/office/drawing/2010/main" xmlns="" w="9525">
                     <a:solidFill>
                       <a:srgbClr val="000000"/>
                     </a:solidFill>
@@ -10059,7 +10059,7 @@
               </a:ln>
               <a:extLst>
                 <a:ext uri="{91240B29-F687-4f45-9708-019B960494DF}">
-                  <a14:hiddenLine xmlns="" xmlns:a14="http://schemas.microsoft.com/office/drawing/2010/main" w="9525">
+                  <a14:hiddenLine xmlns:a14="http://schemas.microsoft.com/office/drawing/2010/main" xmlns="" w="9525">
                     <a:solidFill>
                       <a:srgbClr val="000000"/>
                     </a:solidFill>
@@ -10121,7 +10121,7 @@
               </a:ln>
               <a:extLst>
                 <a:ext uri="{91240B29-F687-4f45-9708-019B960494DF}">
-                  <a14:hiddenLine xmlns="" xmlns:a14="http://schemas.microsoft.com/office/drawing/2010/main" w="9525">
+                  <a14:hiddenLine xmlns:a14="http://schemas.microsoft.com/office/drawing/2010/main" xmlns="" w="9525">
                     <a:solidFill>
                       <a:srgbClr val="000000"/>
                     </a:solidFill>
@@ -10211,7 +10211,7 @@
               </a:ln>
               <a:extLst>
                 <a:ext uri="{91240B29-F687-4f45-9708-019B960494DF}">
-                  <a14:hiddenLine xmlns="" xmlns:a14="http://schemas.microsoft.com/office/drawing/2010/main" w="9525">
+                  <a14:hiddenLine xmlns:a14="http://schemas.microsoft.com/office/drawing/2010/main" xmlns="" w="9525">
                     <a:solidFill>
                       <a:srgbClr val="000000"/>
                     </a:solidFill>
@@ -10301,7 +10301,7 @@
               </a:ln>
               <a:extLst>
                 <a:ext uri="{91240B29-F687-4f45-9708-019B960494DF}">
-                  <a14:hiddenLine xmlns="" xmlns:a14="http://schemas.microsoft.com/office/drawing/2010/main" w="9525">
+                  <a14:hiddenLine xmlns:a14="http://schemas.microsoft.com/office/drawing/2010/main" xmlns="" w="9525">
                     <a:solidFill>
                       <a:srgbClr val="000000"/>
                     </a:solidFill>
@@ -10363,7 +10363,7 @@
               </a:ln>
               <a:extLst>
                 <a:ext uri="{91240B29-F687-4f45-9708-019B960494DF}">
-                  <a14:hiddenLine xmlns="" xmlns:a14="http://schemas.microsoft.com/office/drawing/2010/main" w="9525">
+                  <a14:hiddenLine xmlns:a14="http://schemas.microsoft.com/office/drawing/2010/main" xmlns="" w="9525">
                     <a:solidFill>
                       <a:srgbClr val="000000"/>
                     </a:solidFill>
@@ -10473,7 +10473,7 @@
               </a:ln>
               <a:extLst>
                 <a:ext uri="{91240B29-F687-4f45-9708-019B960494DF}">
-                  <a14:hiddenLine xmlns="" xmlns:a14="http://schemas.microsoft.com/office/drawing/2010/main" w="9525">
+                  <a14:hiddenLine xmlns:a14="http://schemas.microsoft.com/office/drawing/2010/main" xmlns="" w="9525">
                     <a:solidFill>
                       <a:srgbClr val="000000"/>
                     </a:solidFill>
@@ -10557,7 +10557,7 @@
               </a:ln>
               <a:extLst>
                 <a:ext uri="{91240B29-F687-4f45-9708-019B960494DF}">
-                  <a14:hiddenLine xmlns="" xmlns:a14="http://schemas.microsoft.com/office/drawing/2010/main" w="9525">
+                  <a14:hiddenLine xmlns:a14="http://schemas.microsoft.com/office/drawing/2010/main" xmlns="" w="9525">
                     <a:solidFill>
                       <a:srgbClr val="000000"/>
                     </a:solidFill>
@@ -10619,7 +10619,7 @@
               </a:ln>
               <a:extLst>
                 <a:ext uri="{91240B29-F687-4f45-9708-019B960494DF}">
-                  <a14:hiddenLine xmlns="" xmlns:a14="http://schemas.microsoft.com/office/drawing/2010/main" w="9525">
+                  <a14:hiddenLine xmlns:a14="http://schemas.microsoft.com/office/drawing/2010/main" xmlns="" w="9525">
                     <a:solidFill>
                       <a:srgbClr val="000000"/>
                     </a:solidFill>
@@ -10681,7 +10681,7 @@
               </a:ln>
               <a:extLst>
                 <a:ext uri="{91240B29-F687-4f45-9708-019B960494DF}">
-                  <a14:hiddenLine xmlns="" xmlns:a14="http://schemas.microsoft.com/office/drawing/2010/main" w="9525">
+                  <a14:hiddenLine xmlns:a14="http://schemas.microsoft.com/office/drawing/2010/main" xmlns="" w="9525">
                     <a:solidFill>
                       <a:srgbClr val="000000"/>
                     </a:solidFill>
@@ -10771,7 +10771,7 @@
               </a:ln>
               <a:extLst>
                 <a:ext uri="{91240B29-F687-4f45-9708-019B960494DF}">
-                  <a14:hiddenLine xmlns="" xmlns:a14="http://schemas.microsoft.com/office/drawing/2010/main" w="9525">
+                  <a14:hiddenLine xmlns:a14="http://schemas.microsoft.com/office/drawing/2010/main" xmlns="" w="9525">
                     <a:solidFill>
                       <a:srgbClr val="000000"/>
                     </a:solidFill>
@@ -10805,7 +10805,7 @@
               </a:ln>
               <a:extLst>
                 <a:ext uri="{91240B29-F687-4f45-9708-019B960494DF}">
-                  <a14:hiddenLine xmlns="" xmlns:a14="http://schemas.microsoft.com/office/drawing/2010/main" w="9525">
+                  <a14:hiddenLine xmlns:a14="http://schemas.microsoft.com/office/drawing/2010/main" xmlns="" w="9525">
                     <a:solidFill>
                       <a:srgbClr val="000000"/>
                     </a:solidFill>
@@ -10870,7 +10870,7 @@
               </a:ln>
               <a:extLst>
                 <a:ext uri="{91240B29-F687-4f45-9708-019B960494DF}">
-                  <a14:hiddenLine xmlns="" xmlns:a14="http://schemas.microsoft.com/office/drawing/2010/main" w="9525">
+                  <a14:hiddenLine xmlns:a14="http://schemas.microsoft.com/office/drawing/2010/main" xmlns="" w="9525">
                     <a:solidFill>
                       <a:srgbClr val="000000"/>
                     </a:solidFill>
@@ -10960,7 +10960,7 @@
               </a:ln>
               <a:extLst>
                 <a:ext uri="{91240B29-F687-4f45-9708-019B960494DF}">
-                  <a14:hiddenLine xmlns="" xmlns:a14="http://schemas.microsoft.com/office/drawing/2010/main" w="9525">
+                  <a14:hiddenLine xmlns:a14="http://schemas.microsoft.com/office/drawing/2010/main" xmlns="" w="9525">
                     <a:solidFill>
                       <a:srgbClr val="000000"/>
                     </a:solidFill>
@@ -11022,7 +11022,7 @@
               </a:ln>
               <a:extLst>
                 <a:ext uri="{91240B29-F687-4f45-9708-019B960494DF}">
-                  <a14:hiddenLine xmlns="" xmlns:a14="http://schemas.microsoft.com/office/drawing/2010/main" w="9525">
+                  <a14:hiddenLine xmlns:a14="http://schemas.microsoft.com/office/drawing/2010/main" xmlns="" w="9525">
                     <a:solidFill>
                       <a:srgbClr val="000000"/>
                     </a:solidFill>
@@ -11112,7 +11112,7 @@
               </a:ln>
               <a:extLst>
                 <a:ext uri="{91240B29-F687-4f45-9708-019B960494DF}">
-                  <a14:hiddenLine xmlns="" xmlns:a14="http://schemas.microsoft.com/office/drawing/2010/main" w="9525">
+                  <a14:hiddenLine xmlns:a14="http://schemas.microsoft.com/office/drawing/2010/main" xmlns="" w="9525">
                     <a:solidFill>
                       <a:srgbClr val="000000"/>
                     </a:solidFill>
@@ -11177,7 +11177,7 @@
               </a:ln>
               <a:extLst>
                 <a:ext uri="{91240B29-F687-4f45-9708-019B960494DF}">
-                  <a14:hiddenLine xmlns="" xmlns:a14="http://schemas.microsoft.com/office/drawing/2010/main" w="9525">
+                  <a14:hiddenLine xmlns:a14="http://schemas.microsoft.com/office/drawing/2010/main" xmlns="" w="9525">
                     <a:solidFill>
                       <a:srgbClr val="000000"/>
                     </a:solidFill>
@@ -11239,7 +11239,7 @@
               </a:ln>
               <a:extLst>
                 <a:ext uri="{91240B29-F687-4f45-9708-019B960494DF}">
-                  <a14:hiddenLine xmlns="" xmlns:a14="http://schemas.microsoft.com/office/drawing/2010/main" w="9525">
+                  <a14:hiddenLine xmlns:a14="http://schemas.microsoft.com/office/drawing/2010/main" xmlns="" w="9525">
                     <a:solidFill>
                       <a:srgbClr val="000000"/>
                     </a:solidFill>
@@ -11329,7 +11329,7 @@
               </a:ln>
               <a:extLst>
                 <a:ext uri="{91240B29-F687-4f45-9708-019B960494DF}">
-                  <a14:hiddenLine xmlns="" xmlns:a14="http://schemas.microsoft.com/office/drawing/2010/main" w="9525">
+                  <a14:hiddenLine xmlns:a14="http://schemas.microsoft.com/office/drawing/2010/main" xmlns="" w="9525">
                     <a:solidFill>
                       <a:srgbClr val="000000"/>
                     </a:solidFill>
@@ -11419,7 +11419,7 @@
               </a:ln>
               <a:extLst>
                 <a:ext uri="{91240B29-F687-4f45-9708-019B960494DF}">
-                  <a14:hiddenLine xmlns="" xmlns:a14="http://schemas.microsoft.com/office/drawing/2010/main" w="9525">
+                  <a14:hiddenLine xmlns:a14="http://schemas.microsoft.com/office/drawing/2010/main" xmlns="" w="9525">
                     <a:solidFill>
                       <a:srgbClr val="000000"/>
                     </a:solidFill>
@@ -11484,7 +11484,7 @@
               </a:ln>
               <a:extLst>
                 <a:ext uri="{91240B29-F687-4f45-9708-019B960494DF}">
-                  <a14:hiddenLine xmlns="" xmlns:a14="http://schemas.microsoft.com/office/drawing/2010/main" w="9525">
+                  <a14:hiddenLine xmlns:a14="http://schemas.microsoft.com/office/drawing/2010/main" xmlns="" w="9525">
                     <a:solidFill>
                       <a:srgbClr val="000000"/>
                     </a:solidFill>
@@ -11604,7 +11604,7 @@
               </a:ln>
               <a:extLst>
                 <a:ext uri="{91240B29-F687-4f45-9708-019B960494DF}">
-                  <a14:hiddenLine xmlns="" xmlns:a14="http://schemas.microsoft.com/office/drawing/2010/main" w="9525">
+                  <a14:hiddenLine xmlns:a14="http://schemas.microsoft.com/office/drawing/2010/main" xmlns="" w="9525">
                     <a:solidFill>
                       <a:srgbClr val="000000"/>
                     </a:solidFill>
@@ -11685,7 +11685,7 @@
               </a:ln>
               <a:extLst>
                 <a:ext uri="{91240B29-F687-4f45-9708-019B960494DF}">
-                  <a14:hiddenLine xmlns="" xmlns:a14="http://schemas.microsoft.com/office/drawing/2010/main" w="9525">
+                  <a14:hiddenLine xmlns:a14="http://schemas.microsoft.com/office/drawing/2010/main" xmlns="" w="9525">
                     <a:solidFill>
                       <a:srgbClr val="000000"/>
                     </a:solidFill>
@@ -11800,7 +11800,7 @@
               </a:ln>
               <a:extLst>
                 <a:ext uri="{91240B29-F687-4f45-9708-019B960494DF}">
-                  <a14:hiddenLine xmlns="" xmlns:a14="http://schemas.microsoft.com/office/drawing/2010/main" w="9525">
+                  <a14:hiddenLine xmlns:a14="http://schemas.microsoft.com/office/drawing/2010/main" xmlns="" w="9525">
                     <a:solidFill>
                       <a:srgbClr val="000000"/>
                     </a:solidFill>
@@ -11890,7 +11890,7 @@
               </a:ln>
               <a:extLst>
                 <a:ext uri="{91240B29-F687-4f45-9708-019B960494DF}">
-                  <a14:hiddenLine xmlns="" xmlns:a14="http://schemas.microsoft.com/office/drawing/2010/main" w="9525">
+                  <a14:hiddenLine xmlns:a14="http://schemas.microsoft.com/office/drawing/2010/main" xmlns="" w="9525">
                     <a:solidFill>
                       <a:srgbClr val="000000"/>
                     </a:solidFill>
@@ -11955,7 +11955,7 @@
               </a:ln>
               <a:extLst>
                 <a:ext uri="{91240B29-F687-4f45-9708-019B960494DF}">
-                  <a14:hiddenLine xmlns="" xmlns:a14="http://schemas.microsoft.com/office/drawing/2010/main" w="9525">
+                  <a14:hiddenLine xmlns:a14="http://schemas.microsoft.com/office/drawing/2010/main" xmlns="" w="9525">
                     <a:solidFill>
                       <a:srgbClr val="000000"/>
                     </a:solidFill>
@@ -12045,7 +12045,7 @@
               </a:ln>
               <a:extLst>
                 <a:ext uri="{91240B29-F687-4f45-9708-019B960494DF}">
-                  <a14:hiddenLine xmlns="" xmlns:a14="http://schemas.microsoft.com/office/drawing/2010/main" w="9525">
+                  <a14:hiddenLine xmlns:a14="http://schemas.microsoft.com/office/drawing/2010/main" xmlns="" w="9525">
                     <a:solidFill>
                       <a:srgbClr val="000000"/>
                     </a:solidFill>
@@ -12113,7 +12113,7 @@
               </a:ln>
               <a:extLst>
                 <a:ext uri="{91240B29-F687-4f45-9708-019B960494DF}">
-                  <a14:hiddenLine xmlns="" xmlns:a14="http://schemas.microsoft.com/office/drawing/2010/main" w="9525">
+                  <a14:hiddenLine xmlns:a14="http://schemas.microsoft.com/office/drawing/2010/main" xmlns="" w="9525">
                     <a:solidFill>
                       <a:srgbClr val="000000"/>
                     </a:solidFill>
@@ -12203,7 +12203,7 @@
               </a:ln>
               <a:extLst>
                 <a:ext uri="{91240B29-F687-4f45-9708-019B960494DF}">
-                  <a14:hiddenLine xmlns="" xmlns:a14="http://schemas.microsoft.com/office/drawing/2010/main" w="9525">
+                  <a14:hiddenLine xmlns:a14="http://schemas.microsoft.com/office/drawing/2010/main" xmlns="" w="9525">
                     <a:solidFill>
                       <a:srgbClr val="000000"/>
                     </a:solidFill>
@@ -12271,7 +12271,7 @@
               </a:ln>
               <a:extLst>
                 <a:ext uri="{91240B29-F687-4f45-9708-019B960494DF}">
-                  <a14:hiddenLine xmlns="" xmlns:a14="http://schemas.microsoft.com/office/drawing/2010/main" w="9525">
+                  <a14:hiddenLine xmlns:a14="http://schemas.microsoft.com/office/drawing/2010/main" xmlns="" w="9525">
                     <a:solidFill>
                       <a:srgbClr val="000000"/>
                     </a:solidFill>
@@ -12361,7 +12361,7 @@
               </a:ln>
               <a:extLst>
                 <a:ext uri="{91240B29-F687-4f45-9708-019B960494DF}">
-                  <a14:hiddenLine xmlns="" xmlns:a14="http://schemas.microsoft.com/office/drawing/2010/main" w="9525">
+                  <a14:hiddenLine xmlns:a14="http://schemas.microsoft.com/office/drawing/2010/main" xmlns="" w="9525">
                     <a:solidFill>
                       <a:srgbClr val="000000"/>
                     </a:solidFill>
@@ -12395,7 +12395,7 @@
               </a:ln>
               <a:extLst>
                 <a:ext uri="{91240B29-F687-4f45-9708-019B960494DF}">
-                  <a14:hiddenLine xmlns="" xmlns:a14="http://schemas.microsoft.com/office/drawing/2010/main" w="9525">
+                  <a14:hiddenLine xmlns:a14="http://schemas.microsoft.com/office/drawing/2010/main" xmlns="" w="9525">
                     <a:solidFill>
                       <a:srgbClr val="000000"/>
                     </a:solidFill>
@@ -13659,15 +13659,305 @@
             <p:ph type="body" idx="1"/>
           </p:nvPr>
         </p:nvSpPr>
-        <p:spPr/>
+        <p:spPr>
+          <a:xfrm rot="16200000">
+            <a:off x="5483809" y="1131762"/>
+            <a:ext cx="2361899" cy="2737265"/>
+          </a:xfrm>
+        </p:spPr>
         <p:txBody>
           <a:bodyPr/>
           <a:lstStyle/>
           <a:p>
-            <a:endParaRPr lang="es-ES_tradnl" dirty="0"/>
+            <a:pPr algn="just"/>
+            <a:r>
+              <a:rPr lang="es-ES_tradnl" dirty="0"/>
+              <a:t>En humanos que ya contaban con problemas cardiovasculares o respiratorios, una exposición prolongada al aire contaminado puede resultar letal </a:t>
+            </a:r>
           </a:p>
         </p:txBody>
       </p:sp>
+      <p:pic>
+        <p:nvPicPr>
+          <p:cNvPr id="6" name="Picture 5" descr="Shape&#10;&#10;Description automatically generated with medium confidence">
+            <a:extLst>
+              <a:ext uri="{FF2B5EF4-FFF2-40B4-BE49-F238E27FC236}">
+                <a16:creationId xmlns:a16="http://schemas.microsoft.com/office/drawing/2014/main" id="{311DD271-B6A2-9F43-A0B7-D90B9838A2A1}"/>
+              </a:ext>
+            </a:extLst>
+          </p:cNvPr>
+          <p:cNvPicPr>
+            <a:picLocks noChangeAspect="1"/>
+          </p:cNvPicPr>
+          <p:nvPr/>
+        </p:nvPicPr>
+        <p:blipFill>
+          <a:blip r:embed="rId2">
+            <a:extLst>
+              <a:ext uri="{28A0092B-C50C-407E-A947-70E740481C1C}">
+                <a14:useLocalDpi xmlns:a14="http://schemas.microsoft.com/office/drawing/2010/main" val="0"/>
+              </a:ext>
+            </a:extLst>
+          </a:blip>
+          <a:stretch>
+            <a:fillRect/>
+          </a:stretch>
+        </p:blipFill>
+        <p:spPr>
+          <a:xfrm>
+            <a:off x="2761344" y="4226365"/>
+            <a:ext cx="1550101" cy="1587647"/>
+          </a:xfrm>
+          <a:prstGeom prst="rect">
+            <a:avLst/>
+          </a:prstGeom>
+        </p:spPr>
+      </p:pic>
+      <p:sp>
+        <p:nvSpPr>
+          <p:cNvPr id="7" name="Text Placeholder 4">
+            <a:extLst>
+              <a:ext uri="{FF2B5EF4-FFF2-40B4-BE49-F238E27FC236}">
+                <a16:creationId xmlns:a16="http://schemas.microsoft.com/office/drawing/2014/main" id="{3EEDA0E0-A28B-2848-A9E8-18A34AE68C68}"/>
+              </a:ext>
+            </a:extLst>
+          </p:cNvPr>
+          <p:cNvSpPr txBox="1">
+            <a:spLocks/>
+          </p:cNvSpPr>
+          <p:nvPr/>
+        </p:nvSpPr>
+        <p:spPr>
+          <a:xfrm rot="16200000">
+            <a:off x="705361" y="948327"/>
+            <a:ext cx="2912814" cy="3104138"/>
+          </a:xfrm>
+          <a:prstGeom prst="rect">
+            <a:avLst/>
+          </a:prstGeom>
+        </p:spPr>
+        <p:txBody>
+          <a:bodyPr vert="eaVert" lIns="91440" tIns="45720" rIns="91440" bIns="45720" rtlCol="0" anchor="t">
+            <a:normAutofit/>
+          </a:bodyPr>
+          <a:lstStyle>
+            <a:lvl1pPr marL="228600" indent="-228600" algn="l" defTabSz="914400" rtl="0" eaLnBrk="1" latinLnBrk="0" hangingPunct="1">
+              <a:lnSpc>
+                <a:spcPct val="120000"/>
+              </a:lnSpc>
+              <a:spcBef>
+                <a:spcPts val="1000"/>
+              </a:spcBef>
+              <a:buSzPct val="125000"/>
+              <a:buFont typeface="Arial" panose="020B0604020202020204" pitchFamily="34" charset="0"/>
+              <a:buChar char="•"/>
+              <a:defRPr sz="2400" kern="1200">
+                <a:solidFill>
+                  <a:schemeClr val="tx1"/>
+                </a:solidFill>
+                <a:latin typeface="+mn-lt"/>
+                <a:ea typeface="+mn-ea"/>
+                <a:cs typeface="+mn-cs"/>
+              </a:defRPr>
+            </a:lvl1pPr>
+            <a:lvl2pPr marL="685800" indent="-228600" algn="l" defTabSz="914400" rtl="0" eaLnBrk="1" latinLnBrk="0" hangingPunct="1">
+              <a:lnSpc>
+                <a:spcPct val="120000"/>
+              </a:lnSpc>
+              <a:spcBef>
+                <a:spcPts val="500"/>
+              </a:spcBef>
+              <a:buSzPct val="125000"/>
+              <a:buFont typeface="Arial" panose="020B0604020202020204" pitchFamily="34" charset="0"/>
+              <a:buChar char="•"/>
+              <a:defRPr sz="2000" kern="1200">
+                <a:solidFill>
+                  <a:schemeClr val="tx1"/>
+                </a:solidFill>
+                <a:latin typeface="+mn-lt"/>
+                <a:ea typeface="+mn-ea"/>
+                <a:cs typeface="+mn-cs"/>
+              </a:defRPr>
+            </a:lvl2pPr>
+            <a:lvl3pPr marL="1143000" indent="-228600" algn="l" defTabSz="914400" rtl="0" eaLnBrk="1" latinLnBrk="0" hangingPunct="1">
+              <a:lnSpc>
+                <a:spcPct val="120000"/>
+              </a:lnSpc>
+              <a:spcBef>
+                <a:spcPts val="500"/>
+              </a:spcBef>
+              <a:buSzPct val="125000"/>
+              <a:buFont typeface="Arial" panose="020B0604020202020204" pitchFamily="34" charset="0"/>
+              <a:buChar char="•"/>
+              <a:defRPr sz="1800" kern="1200">
+                <a:solidFill>
+                  <a:schemeClr val="tx1"/>
+                </a:solidFill>
+                <a:latin typeface="+mn-lt"/>
+                <a:ea typeface="+mn-ea"/>
+                <a:cs typeface="+mn-cs"/>
+              </a:defRPr>
+            </a:lvl3pPr>
+            <a:lvl4pPr marL="1600200" indent="-228600" algn="l" defTabSz="914400" rtl="0" eaLnBrk="1" latinLnBrk="0" hangingPunct="1">
+              <a:lnSpc>
+                <a:spcPct val="120000"/>
+              </a:lnSpc>
+              <a:spcBef>
+                <a:spcPts val="500"/>
+              </a:spcBef>
+              <a:buSzPct val="125000"/>
+              <a:buFont typeface="Arial" panose="020B0604020202020204" pitchFamily="34" charset="0"/>
+              <a:buChar char="•"/>
+              <a:defRPr sz="1600" kern="1200">
+                <a:solidFill>
+                  <a:schemeClr val="tx1"/>
+                </a:solidFill>
+                <a:latin typeface="+mn-lt"/>
+                <a:ea typeface="+mn-ea"/>
+                <a:cs typeface="+mn-cs"/>
+              </a:defRPr>
+            </a:lvl4pPr>
+            <a:lvl5pPr marL="2057400" indent="-228600" algn="l" defTabSz="914400" rtl="0" eaLnBrk="1" latinLnBrk="0" hangingPunct="1">
+              <a:lnSpc>
+                <a:spcPct val="120000"/>
+              </a:lnSpc>
+              <a:spcBef>
+                <a:spcPts val="500"/>
+              </a:spcBef>
+              <a:buSzPct val="125000"/>
+              <a:buFont typeface="Arial" panose="020B0604020202020204" pitchFamily="34" charset="0"/>
+              <a:buChar char="•"/>
+              <a:defRPr sz="1600" kern="1200">
+                <a:solidFill>
+                  <a:schemeClr val="tx1"/>
+                </a:solidFill>
+                <a:latin typeface="+mn-lt"/>
+                <a:ea typeface="+mn-ea"/>
+                <a:cs typeface="+mn-cs"/>
+              </a:defRPr>
+            </a:lvl5pPr>
+            <a:lvl6pPr marL="2514600" indent="-228600" algn="l" defTabSz="914400" rtl="0" eaLnBrk="1" latinLnBrk="0" hangingPunct="1">
+              <a:lnSpc>
+                <a:spcPct val="120000"/>
+              </a:lnSpc>
+              <a:spcBef>
+                <a:spcPts val="500"/>
+              </a:spcBef>
+              <a:buSzPct val="125000"/>
+              <a:buFont typeface="Arial" panose="020B0604020202020204" pitchFamily="34" charset="0"/>
+              <a:buChar char="•"/>
+              <a:defRPr sz="1400" kern="1200">
+                <a:solidFill>
+                  <a:schemeClr val="tx1"/>
+                </a:solidFill>
+                <a:latin typeface="+mn-lt"/>
+                <a:ea typeface="+mn-ea"/>
+                <a:cs typeface="+mn-cs"/>
+              </a:defRPr>
+            </a:lvl6pPr>
+            <a:lvl7pPr marL="2971800" indent="-228600" algn="l" defTabSz="914400" rtl="0" eaLnBrk="1" latinLnBrk="0" hangingPunct="1">
+              <a:lnSpc>
+                <a:spcPct val="120000"/>
+              </a:lnSpc>
+              <a:spcBef>
+                <a:spcPts val="500"/>
+              </a:spcBef>
+              <a:buSzPct val="125000"/>
+              <a:buFont typeface="Arial" panose="020B0604020202020204" pitchFamily="34" charset="0"/>
+              <a:buChar char="•"/>
+              <a:defRPr sz="1400" kern="1200">
+                <a:solidFill>
+                  <a:schemeClr val="tx1"/>
+                </a:solidFill>
+                <a:latin typeface="+mn-lt"/>
+                <a:ea typeface="+mn-ea"/>
+                <a:cs typeface="+mn-cs"/>
+              </a:defRPr>
+            </a:lvl7pPr>
+            <a:lvl8pPr marL="3429000" indent="-228600" algn="l" defTabSz="914400" rtl="0" eaLnBrk="1" latinLnBrk="0" hangingPunct="1">
+              <a:lnSpc>
+                <a:spcPct val="120000"/>
+              </a:lnSpc>
+              <a:spcBef>
+                <a:spcPts val="500"/>
+              </a:spcBef>
+              <a:buSzPct val="125000"/>
+              <a:buFont typeface="Arial" panose="020B0604020202020204" pitchFamily="34" charset="0"/>
+              <a:buChar char="•"/>
+              <a:defRPr sz="1400" kern="1200">
+                <a:solidFill>
+                  <a:schemeClr val="tx1"/>
+                </a:solidFill>
+                <a:latin typeface="+mn-lt"/>
+                <a:ea typeface="+mn-ea"/>
+                <a:cs typeface="+mn-cs"/>
+              </a:defRPr>
+            </a:lvl8pPr>
+            <a:lvl9pPr marL="3886200" indent="-228600" algn="l" defTabSz="914400" rtl="0" eaLnBrk="1" latinLnBrk="0" hangingPunct="1">
+              <a:lnSpc>
+                <a:spcPct val="120000"/>
+              </a:lnSpc>
+              <a:spcBef>
+                <a:spcPts val="500"/>
+              </a:spcBef>
+              <a:buSzPct val="125000"/>
+              <a:buFont typeface="Arial" panose="020B0604020202020204" pitchFamily="34" charset="0"/>
+              <a:buChar char="•"/>
+              <a:defRPr sz="1400" kern="1200">
+                <a:solidFill>
+                  <a:schemeClr val="tx1"/>
+                </a:solidFill>
+                <a:latin typeface="+mn-lt"/>
+                <a:ea typeface="+mn-ea"/>
+                <a:cs typeface="+mn-cs"/>
+              </a:defRPr>
+            </a:lvl9pPr>
+          </a:lstStyle>
+          <a:p>
+            <a:pPr algn="just"/>
+            <a:r>
+              <a:rPr lang="es-ES_tradnl" dirty="0"/>
+              <a:t>La mala calidad del aire puede resultar dañina para la población debido a los problemas respiratorios que genera</a:t>
+            </a:r>
+          </a:p>
+        </p:txBody>
+      </p:sp>
+      <p:pic>
+        <p:nvPicPr>
+          <p:cNvPr id="9" name="Picture 8" descr="A picture containing smoke, train, steam, sky&#10;&#10;Description automatically generated">
+            <a:extLst>
+              <a:ext uri="{FF2B5EF4-FFF2-40B4-BE49-F238E27FC236}">
+                <a16:creationId xmlns:a16="http://schemas.microsoft.com/office/drawing/2014/main" id="{A6D8B690-0A60-8C46-93EF-2120525958EC}"/>
+              </a:ext>
+            </a:extLst>
+          </p:cNvPr>
+          <p:cNvPicPr>
+            <a:picLocks noChangeAspect="1"/>
+          </p:cNvPicPr>
+          <p:nvPr/>
+        </p:nvPicPr>
+        <p:blipFill>
+          <a:blip r:embed="rId3">
+            <a:extLst>
+              <a:ext uri="{28A0092B-C50C-407E-A947-70E740481C1C}">
+                <a14:useLocalDpi xmlns:a14="http://schemas.microsoft.com/office/drawing/2010/main" val="0"/>
+              </a:ext>
+            </a:extLst>
+          </a:blip>
+          <a:stretch>
+            <a:fillRect/>
+          </a:stretch>
+        </p:blipFill>
+        <p:spPr>
+          <a:xfrm>
+            <a:off x="9070399" y="1515428"/>
+            <a:ext cx="2562005" cy="1478570"/>
+          </a:xfrm>
+          <a:prstGeom prst="rect">
+            <a:avLst/>
+          </a:prstGeom>
+        </p:spPr>
+      </p:pic>
     </p:spTree>
     <p:extLst>
       <p:ext uri="{BB962C8B-B14F-4D97-AF65-F5344CB8AC3E}">

</xml_diff>